<commit_message>
apresentação quase completa. faltando uns simples retoques.
</commit_message>
<xml_diff>
--- a/apresentacao/ApresentacaoSBCUP.pptx
+++ b/apresentacao/ApresentacaoSBCUP.pptx
@@ -248,7 +248,7 @@
           <a:p>
             <a:fld id="{5FD99E58-1C9B-E44B-8998-0A321153317B}" type="datetimeFigureOut">
               <a:rPr lang="en-US" smtClean="0"/>
-              <a:t>6/21/2012</a:t>
+              <a:t>6/24/2012</a:t>
             </a:fld>
             <a:endParaRPr lang="en-US"/>
           </a:p>
@@ -1423,7 +1423,7 @@
           <a:p>
             <a:fld id="{7D290233-0DD1-4A80-BB1E-9ADC3556DBB6}" type="datetimeFigureOut">
               <a:rPr lang="en-US" smtClean="0"/>
-              <a:t>6/21/2012</a:t>
+              <a:t>6/24/2012</a:t>
             </a:fld>
             <a:endParaRPr lang="en-US"/>
           </a:p>
@@ -1619,7 +1619,7 @@
           <a:p>
             <a:fld id="{7D290233-0DD1-4A80-BB1E-9ADC3556DBB6}" type="datetimeFigureOut">
               <a:rPr lang="en-US" smtClean="0"/>
-              <a:t>6/21/2012</a:t>
+              <a:t>6/24/2012</a:t>
             </a:fld>
             <a:endParaRPr lang="en-US"/>
           </a:p>
@@ -1811,7 +1811,7 @@
           <a:p>
             <a:fld id="{7D290233-0DD1-4A80-BB1E-9ADC3556DBB6}" type="datetimeFigureOut">
               <a:rPr lang="en-US" smtClean="0"/>
-              <a:t>6/21/2012</a:t>
+              <a:t>6/24/2012</a:t>
             </a:fld>
             <a:endParaRPr lang="en-US"/>
           </a:p>
@@ -1993,7 +1993,7 @@
           <a:p>
             <a:fld id="{7D290233-0DD1-4A80-BB1E-9ADC3556DBB6}" type="datetimeFigureOut">
               <a:rPr lang="en-US" smtClean="0"/>
-              <a:t>6/21/2012</a:t>
+              <a:t>6/24/2012</a:t>
             </a:fld>
             <a:endParaRPr lang="en-US"/>
           </a:p>
@@ -2231,7 +2231,7 @@
           <a:p>
             <a:fld id="{7D290233-0DD1-4A80-BB1E-9ADC3556DBB6}" type="datetimeFigureOut">
               <a:rPr lang="en-US" smtClean="0"/>
-              <a:t>6/21/2012</a:t>
+              <a:t>6/24/2012</a:t>
             </a:fld>
             <a:endParaRPr lang="en-US"/>
           </a:p>
@@ -2507,7 +2507,7 @@
           <a:p>
             <a:fld id="{7D290233-0DD1-4A80-BB1E-9ADC3556DBB6}" type="datetimeFigureOut">
               <a:rPr lang="en-US" smtClean="0"/>
-              <a:t>6/21/2012</a:t>
+              <a:t>6/24/2012</a:t>
             </a:fld>
             <a:endParaRPr lang="en-US"/>
           </a:p>
@@ -2928,7 +2928,7 @@
           <a:p>
             <a:fld id="{7D290233-0DD1-4A80-BB1E-9ADC3556DBB6}" type="datetimeFigureOut">
               <a:rPr lang="en-US" smtClean="0"/>
-              <a:t>6/21/2012</a:t>
+              <a:t>6/24/2012</a:t>
             </a:fld>
             <a:endParaRPr lang="en-US"/>
           </a:p>
@@ -3076,7 +3076,7 @@
           <a:p>
             <a:fld id="{7D290233-0DD1-4A80-BB1E-9ADC3556DBB6}" type="datetimeFigureOut">
               <a:rPr lang="en-US" smtClean="0"/>
-              <a:t>6/21/2012</a:t>
+              <a:t>6/24/2012</a:t>
             </a:fld>
             <a:endParaRPr lang="en-US"/>
           </a:p>
@@ -3183,7 +3183,7 @@
           <a:p>
             <a:fld id="{7D290233-0DD1-4A80-BB1E-9ADC3556DBB6}" type="datetimeFigureOut">
               <a:rPr lang="en-US" smtClean="0"/>
-              <a:t>6/21/2012</a:t>
+              <a:t>6/24/2012</a:t>
             </a:fld>
             <a:endParaRPr lang="en-US"/>
           </a:p>
@@ -3445,7 +3445,7 @@
           <a:p>
             <a:fld id="{7D290233-0DD1-4A80-BB1E-9ADC3556DBB6}" type="datetimeFigureOut">
               <a:rPr lang="en-US" smtClean="0"/>
-              <a:t>6/21/2012</a:t>
+              <a:t>6/24/2012</a:t>
             </a:fld>
             <a:endParaRPr lang="en-US"/>
           </a:p>
@@ -3709,7 +3709,7 @@
           <a:p>
             <a:fld id="{7D290233-0DD1-4A80-BB1E-9ADC3556DBB6}" type="datetimeFigureOut">
               <a:rPr lang="en-US" smtClean="0"/>
-              <a:t>6/21/2012</a:t>
+              <a:t>6/24/2012</a:t>
             </a:fld>
             <a:endParaRPr lang="en-US"/>
           </a:p>
@@ -4550,7 +4550,7 @@
               </a14:hiddenLine>
             </a:ext>
             <a:ext uri="{FAA26D3D-D897-4be2-8F04-BA451C77F1D7}">
-              <ma14:placeholderFlag xmlns="" xmlns:ma14="http://schemas.microsoft.com/office/mac/drawingml/2011/main" val="1"/>
+              <ma14:placeholderFlag xmlns:ma14="http://schemas.microsoft.com/office/mac/drawingml/2011/main" xmlns="" val="1"/>
             </a:ext>
           </a:extLst>
         </p:spPr>
@@ -4612,7 +4612,7 @@
               </a14:hiddenLine>
             </a:ext>
             <a:ext uri="{FAA26D3D-D897-4be2-8F04-BA451C77F1D7}">
-              <ma14:placeholderFlag xmlns="" xmlns:ma14="http://schemas.microsoft.com/office/mac/drawingml/2011/main" val="1"/>
+              <ma14:placeholderFlag xmlns:ma14="http://schemas.microsoft.com/office/mac/drawingml/2011/main" xmlns="" val="1"/>
             </a:ext>
           </a:extLst>
         </p:spPr>
@@ -4699,7 +4699,7 @@
           <a:p>
             <a:fld id="{7D290233-0DD1-4A80-BB1E-9ADC3556DBB6}" type="datetimeFigureOut">
               <a:rPr lang="en-US" smtClean="0"/>
-              <a:t>6/21/2012</a:t>
+              <a:t>6/24/2012</a:t>
             </a:fld>
             <a:endParaRPr lang="en-US"/>
           </a:p>
@@ -8059,11 +8059,7 @@
             </a:r>
             <a:r>
               <a:rPr lang="pt-BR" dirty="0" smtClean="0"/>
-              <a:t>várias pessoas</a:t>
-            </a:r>
-            <a:r>
-              <a:rPr lang="pt-BR" dirty="0" smtClean="0"/>
-              <a:t>;</a:t>
+              <a:t>várias pessoas;</a:t>
             </a:r>
           </a:p>
           <a:p>
@@ -8097,6 +8093,13 @@
   <p:clrMapOvr>
     <a:masterClrMapping/>
   </p:clrMapOvr>
+  <p:timing>
+    <p:tnLst>
+      <p:par>
+        <p:cTn id="1" dur="indefinite" restart="never" nodeType="tmRoot"/>
+      </p:par>
+    </p:tnLst>
+  </p:timing>
 </p:sld>
 </file>
 
@@ -8344,9 +8347,10 @@
           </a:p>
           <a:p>
             <a:r>
-              <a:rPr lang="pt-BR" dirty="0" smtClean="0"/>
-              <a:t>Fundamentação Teórica</a:t>
-            </a:r>
+              <a:rPr lang="pt-BR" dirty="0"/>
+              <a:t>Reconhecimento Facial e Rastreamento</a:t>
+            </a:r>
+            <a:endParaRPr lang="pt-BR" dirty="0" smtClean="0"/>
           </a:p>
           <a:p>
             <a:r>
@@ -12226,8 +12230,8 @@
         </p:nvSpPr>
         <p:spPr>
           <a:xfrm rot="20572439">
-            <a:off x="3913704" y="3046301"/>
-            <a:ext cx="1351827" cy="523220"/>
+            <a:off x="3432095" y="2864749"/>
+            <a:ext cx="2315056" cy="1107996"/>
           </a:xfrm>
           <a:prstGeom prst="rect">
             <a:avLst/>
@@ -12241,7 +12245,7 @@
           <a:p>
             <a:pPr algn="ctr"/>
             <a:r>
-              <a:rPr lang="pt-BR" sz="2800" b="1" dirty="0" smtClean="0">
+              <a:rPr lang="pt-BR" sz="2200" b="1" dirty="0" smtClean="0">
                 <a:ln w="12700">
                   <a:solidFill>
                     <a:schemeClr val="tx2">
@@ -12264,9 +12268,67 @@
                   </a:outerShdw>
                 </a:effectLst>
               </a:rPr>
-              <a:t>Testes</a:t>
-            </a:r>
-            <a:endParaRPr lang="en-US" sz="2800" dirty="0"/>
+              <a:t>Ambiente e </a:t>
+            </a:r>
+          </a:p>
+          <a:p>
+            <a:pPr algn="ctr"/>
+            <a:r>
+              <a:rPr lang="pt-BR" sz="2200" b="1" dirty="0" smtClean="0">
+                <a:ln w="12700">
+                  <a:solidFill>
+                    <a:schemeClr val="tx2">
+                      <a:satMod val="155000"/>
+                    </a:schemeClr>
+                  </a:solidFill>
+                  <a:prstDash val="solid"/>
+                </a:ln>
+                <a:solidFill>
+                  <a:schemeClr val="bg2">
+                    <a:tint val="85000"/>
+                    <a:satMod val="155000"/>
+                  </a:schemeClr>
+                </a:solidFill>
+                <a:effectLst>
+                  <a:outerShdw blurRad="41275" dist="20320" dir="1800000" algn="tl" rotWithShape="0">
+                    <a:srgbClr val="000000">
+                      <a:alpha val="40000"/>
+                    </a:srgbClr>
+                  </a:outerShdw>
+                </a:effectLst>
+              </a:rPr>
+              <a:t>Resultados </a:t>
+            </a:r>
+          </a:p>
+          <a:p>
+            <a:pPr algn="ctr"/>
+            <a:r>
+              <a:rPr lang="pt-BR" sz="2200" b="1" dirty="0" smtClean="0">
+                <a:ln w="12700">
+                  <a:solidFill>
+                    <a:schemeClr val="tx2">
+                      <a:satMod val="155000"/>
+                    </a:schemeClr>
+                  </a:solidFill>
+                  <a:prstDash val="solid"/>
+                </a:ln>
+                <a:solidFill>
+                  <a:schemeClr val="bg2">
+                    <a:tint val="85000"/>
+                    <a:satMod val="155000"/>
+                  </a:schemeClr>
+                </a:solidFill>
+                <a:effectLst>
+                  <a:outerShdw blurRad="41275" dist="20320" dir="1800000" algn="tl" rotWithShape="0">
+                    <a:srgbClr val="000000">
+                      <a:alpha val="40000"/>
+                    </a:srgbClr>
+                  </a:outerShdw>
+                </a:effectLst>
+              </a:rPr>
+              <a:t>Experimentais</a:t>
+            </a:r>
+            <a:endParaRPr lang="en-US" sz="2200" dirty="0"/>
           </a:p>
         </p:txBody>
       </p:sp>
@@ -12328,8 +12390,24 @@
           <a:lstStyle/>
           <a:p>
             <a:r>
+              <a:rPr lang="en-US" dirty="0" err="1" smtClean="0"/>
+              <a:t>Ambiente</a:t>
+            </a:r>
+            <a:r>
               <a:rPr lang="en-US" dirty="0" smtClean="0"/>
-              <a:t>Testes</a:t>
+              <a:t> e </a:t>
+            </a:r>
+            <a:r>
+              <a:rPr lang="en-US" dirty="0" err="1" smtClean="0"/>
+              <a:t>Resultados</a:t>
+            </a:r>
+            <a:r>
+              <a:rPr lang="en-US" dirty="0" smtClean="0"/>
+              <a:t> </a:t>
+            </a:r>
+            <a:r>
+              <a:rPr lang="en-US" dirty="0" err="1" smtClean="0"/>
+              <a:t>Experimentais</a:t>
             </a:r>
             <a:endParaRPr lang="en-US" dirty="0"/>
           </a:p>
@@ -12347,8 +12425,8 @@
         </p:nvSpPr>
         <p:spPr>
           <a:xfrm>
-            <a:off x="457200" y="1613102"/>
-            <a:ext cx="3905380" cy="4960736"/>
+            <a:off x="457200" y="1981200"/>
+            <a:ext cx="3905380" cy="4592638"/>
           </a:xfrm>
         </p:spPr>
         <p:txBody>
@@ -12405,7 +12483,7 @@
         </p:blipFill>
         <p:spPr>
           <a:xfrm>
-            <a:off x="4362580" y="1408197"/>
+            <a:off x="4362580" y="1616022"/>
             <a:ext cx="4324220" cy="3607251"/>
           </a:xfrm>
           <a:prstGeom prst="rect">
@@ -12421,7 +12499,7 @@
         </p:nvSpPr>
         <p:spPr>
           <a:xfrm>
-            <a:off x="6109133" y="5015448"/>
+            <a:off x="6109133" y="5237128"/>
             <a:ext cx="888772" cy="369332"/>
           </a:xfrm>
           <a:prstGeom prst="rect">
@@ -13552,7 +13630,7 @@
               </a14:hiddenLine>
             </a:ext>
             <a:ext uri="{FAA26D3D-D897-4be2-8F04-BA451C77F1D7}">
-              <ma14:placeholderFlag xmlns="" xmlns:ma14="http://schemas.microsoft.com/office/mac/drawingml/2011/main" val="1"/>
+              <ma14:placeholderFlag xmlns:ma14="http://schemas.microsoft.com/office/mac/drawingml/2011/main" xmlns="" val="1"/>
             </a:ext>
           </a:extLst>
         </p:spPr>
@@ -13797,7 +13875,7 @@
               </a14:hiddenLine>
             </a:ext>
             <a:ext uri="{FAA26D3D-D897-4be2-8F04-BA451C77F1D7}">
-              <ma14:placeholderFlag xmlns="" xmlns:ma14="http://schemas.microsoft.com/office/mac/drawingml/2011/main" val="1"/>
+              <ma14:placeholderFlag xmlns:ma14="http://schemas.microsoft.com/office/mac/drawingml/2011/main" xmlns="" val="1"/>
             </a:ext>
           </a:extLst>
         </p:spPr>
@@ -14227,7 +14305,7 @@
               </a14:hiddenLine>
             </a:ext>
             <a:ext uri="{FAA26D3D-D897-4be2-8F04-BA451C77F1D7}">
-              <ma14:placeholderFlag xmlns="" xmlns:ma14="http://schemas.microsoft.com/office/mac/drawingml/2011/main" val="1"/>
+              <ma14:placeholderFlag xmlns:ma14="http://schemas.microsoft.com/office/mac/drawingml/2011/main" xmlns="" val="1"/>
             </a:ext>
           </a:extLst>
         </p:spPr>
@@ -14828,7 +14906,7 @@
               </a14:hiddenLine>
             </a:ext>
             <a:ext uri="{FAA26D3D-D897-4be2-8F04-BA451C77F1D7}">
-              <ma14:placeholderFlag xmlns="" xmlns:ma14="http://schemas.microsoft.com/office/mac/drawingml/2011/main" val="1"/>
+              <ma14:placeholderFlag xmlns:ma14="http://schemas.microsoft.com/office/mac/drawingml/2011/main" xmlns="" val="1"/>
             </a:ext>
           </a:extLst>
         </p:spPr>
@@ -15179,7 +15257,7 @@
               </a14:hiddenLine>
             </a:ext>
             <a:ext uri="{FAA26D3D-D897-4be2-8F04-BA451C77F1D7}">
-              <ma14:placeholderFlag xmlns="" xmlns:ma14="http://schemas.microsoft.com/office/mac/drawingml/2011/main" val="1"/>
+              <ma14:placeholderFlag xmlns:ma14="http://schemas.microsoft.com/office/mac/drawingml/2011/main" xmlns="" val="1"/>
             </a:ext>
           </a:extLst>
         </p:spPr>
@@ -18212,406 +18290,6 @@
       </p:grpSpPr>
       <p:sp>
         <p:nvSpPr>
-          <p:cNvPr id="3" name="Content Placeholder 2"/>
-          <p:cNvSpPr>
-            <a:spLocks noGrp="1"/>
-          </p:cNvSpPr>
-          <p:nvPr>
-            <p:ph idx="1"/>
-          </p:nvPr>
-        </p:nvSpPr>
-        <p:spPr>
-          <a:xfrm>
-            <a:off x="360218" y="1625746"/>
-            <a:ext cx="8589818" cy="4948092"/>
-          </a:xfrm>
-        </p:spPr>
-        <p:txBody>
-          <a:bodyPr>
-            <a:normAutofit fontScale="92500"/>
-          </a:bodyPr>
-          <a:lstStyle/>
-          <a:p>
-            <a:r>
-              <a:rPr lang="en-US" dirty="0" smtClean="0"/>
-              <a:t>Com o </a:t>
-            </a:r>
-            <a:r>
-              <a:rPr lang="en-US" dirty="0" err="1" smtClean="0"/>
-              <a:t>Sistema</a:t>
-            </a:r>
-            <a:r>
-              <a:rPr lang="en-US" dirty="0" smtClean="0"/>
-              <a:t> TRUE </a:t>
-            </a:r>
-            <a:r>
-              <a:rPr lang="en-US" dirty="0" err="1" smtClean="0"/>
-              <a:t>tornou</a:t>
-            </a:r>
-            <a:r>
-              <a:rPr lang="en-US" dirty="0" smtClean="0"/>
-              <a:t>-se </a:t>
-            </a:r>
-            <a:r>
-              <a:rPr lang="en-US" dirty="0" err="1" smtClean="0"/>
-              <a:t>possível</a:t>
-            </a:r>
-            <a:r>
-              <a:rPr lang="en-US" dirty="0" smtClean="0"/>
-              <a:t> o </a:t>
-            </a:r>
-            <a:r>
-              <a:rPr lang="en-US" dirty="0" err="1" smtClean="0"/>
-              <a:t>desenvolvimento</a:t>
-            </a:r>
-            <a:r>
-              <a:rPr lang="en-US" dirty="0" smtClean="0"/>
-              <a:t> de:</a:t>
-            </a:r>
-          </a:p>
-          <a:p>
-            <a:pPr lvl="1"/>
-            <a:r>
-              <a:rPr lang="en-US" dirty="0" err="1" smtClean="0"/>
-              <a:t>Aplicações</a:t>
-            </a:r>
-            <a:r>
-              <a:rPr lang="en-US" dirty="0" smtClean="0"/>
-              <a:t> </a:t>
-            </a:r>
-            <a:r>
-              <a:rPr lang="en-US" dirty="0"/>
-              <a:t>de </a:t>
-            </a:r>
-            <a:r>
-              <a:rPr lang="en-US" dirty="0" err="1"/>
-              <a:t>reconfiguração</a:t>
-            </a:r>
-            <a:r>
-              <a:rPr lang="en-US" dirty="0"/>
-              <a:t> </a:t>
-            </a:r>
-            <a:r>
-              <a:rPr lang="en-US" dirty="0" err="1"/>
-              <a:t>automática</a:t>
-            </a:r>
-            <a:r>
-              <a:rPr lang="en-US" dirty="0"/>
-              <a:t> de </a:t>
-            </a:r>
-            <a:r>
-              <a:rPr lang="en-US" dirty="0" err="1" smtClean="0"/>
-              <a:t>serviços</a:t>
-            </a:r>
-            <a:r>
-              <a:rPr lang="en-US" dirty="0" smtClean="0"/>
-              <a:t>;</a:t>
-            </a:r>
-          </a:p>
-          <a:p>
-            <a:pPr lvl="1"/>
-            <a:r>
-              <a:rPr lang="en-US" dirty="0" err="1"/>
-              <a:t>E</a:t>
-            </a:r>
-            <a:r>
-              <a:rPr lang="en-US" dirty="0" err="1" smtClean="0"/>
-              <a:t>stabelecimento</a:t>
-            </a:r>
-            <a:r>
-              <a:rPr lang="en-US" dirty="0" smtClean="0"/>
-              <a:t> </a:t>
-            </a:r>
-            <a:r>
-              <a:rPr lang="en-US" dirty="0"/>
-              <a:t>de </a:t>
-            </a:r>
-            <a:r>
-              <a:rPr lang="en-US" dirty="0" err="1" smtClean="0"/>
-              <a:t>contextos</a:t>
-            </a:r>
-            <a:r>
-              <a:rPr lang="en-US" dirty="0" smtClean="0"/>
-              <a:t>;</a:t>
-            </a:r>
-          </a:p>
-          <a:p>
-            <a:pPr lvl="1"/>
-            <a:r>
-              <a:rPr lang="en-US" dirty="0" err="1"/>
-              <a:t>D</a:t>
-            </a:r>
-            <a:r>
-              <a:rPr lang="en-US" dirty="0" err="1" smtClean="0"/>
-              <a:t>efinição</a:t>
-            </a:r>
-            <a:r>
-              <a:rPr lang="en-US" dirty="0" smtClean="0"/>
-              <a:t> </a:t>
-            </a:r>
-            <a:r>
-              <a:rPr lang="en-US" dirty="0"/>
-              <a:t>de </a:t>
-            </a:r>
-            <a:r>
-              <a:rPr lang="en-US" dirty="0" err="1" smtClean="0"/>
-              <a:t>perfis</a:t>
-            </a:r>
-            <a:r>
-              <a:rPr lang="en-US" dirty="0" smtClean="0"/>
-              <a:t>.</a:t>
-            </a:r>
-          </a:p>
-          <a:p>
-            <a:r>
-              <a:rPr lang="en-US" dirty="0" smtClean="0"/>
-              <a:t>O </a:t>
-            </a:r>
-            <a:r>
-              <a:rPr lang="en-US" dirty="0" err="1" smtClean="0"/>
-              <a:t>Sistema</a:t>
-            </a:r>
-            <a:r>
-              <a:rPr lang="en-US" dirty="0" smtClean="0"/>
-              <a:t> TRUE </a:t>
-            </a:r>
-            <a:r>
-              <a:rPr lang="en-US" dirty="0" err="1" smtClean="0"/>
-              <a:t>pode</a:t>
-            </a:r>
-            <a:r>
-              <a:rPr lang="en-US" dirty="0" smtClean="0"/>
-              <a:t> </a:t>
-            </a:r>
-            <a:r>
-              <a:rPr lang="en-US" dirty="0" err="1" smtClean="0"/>
-              <a:t>ser</a:t>
-            </a:r>
-            <a:r>
-              <a:rPr lang="en-US" dirty="0" smtClean="0"/>
-              <a:t> </a:t>
-            </a:r>
-            <a:r>
-              <a:rPr lang="en-US" dirty="0" err="1" smtClean="0"/>
-              <a:t>melhorado</a:t>
-            </a:r>
-            <a:r>
-              <a:rPr lang="en-US" dirty="0" smtClean="0"/>
-              <a:t> </a:t>
-            </a:r>
-            <a:r>
-              <a:rPr lang="en-US" dirty="0" err="1" smtClean="0"/>
-              <a:t>em</a:t>
-            </a:r>
-            <a:r>
-              <a:rPr lang="en-US" dirty="0" smtClean="0"/>
-              <a:t> </a:t>
-            </a:r>
-            <a:r>
-              <a:rPr lang="en-US" dirty="0" err="1" smtClean="0"/>
-              <a:t>algumas</a:t>
-            </a:r>
-            <a:r>
-              <a:rPr lang="en-US" dirty="0" smtClean="0"/>
-              <a:t> de </a:t>
-            </a:r>
-            <a:r>
-              <a:rPr lang="en-US" dirty="0" err="1" smtClean="0"/>
-              <a:t>suas</a:t>
-            </a:r>
-            <a:r>
-              <a:rPr lang="en-US" dirty="0" smtClean="0"/>
-              <a:t> </a:t>
-            </a:r>
-            <a:r>
-              <a:rPr lang="en-US" dirty="0" err="1" smtClean="0"/>
-              <a:t>características</a:t>
-            </a:r>
-            <a:r>
-              <a:rPr lang="en-US" dirty="0" smtClean="0"/>
-              <a:t>:</a:t>
-            </a:r>
-          </a:p>
-          <a:p>
-            <a:pPr lvl="1"/>
-            <a:r>
-              <a:rPr lang="en-US" dirty="0" err="1" smtClean="0"/>
-              <a:t>Múltiplos</a:t>
-            </a:r>
-            <a:r>
-              <a:rPr lang="en-US" dirty="0" smtClean="0"/>
-              <a:t> </a:t>
-            </a:r>
-            <a:r>
-              <a:rPr lang="en-US" dirty="0" err="1" smtClean="0"/>
-              <a:t>Kinects</a:t>
-            </a:r>
-            <a:r>
-              <a:rPr lang="en-US" dirty="0" smtClean="0"/>
-              <a:t>;</a:t>
-            </a:r>
-          </a:p>
-          <a:p>
-            <a:pPr lvl="1"/>
-            <a:r>
-              <a:rPr lang="en-US" dirty="0" err="1" smtClean="0"/>
-              <a:t>Reconhecimento</a:t>
-            </a:r>
-            <a:r>
-              <a:rPr lang="en-US" dirty="0" smtClean="0"/>
-              <a:t>:</a:t>
-            </a:r>
-          </a:p>
-          <a:p>
-            <a:pPr lvl="2"/>
-            <a:r>
-              <a:rPr lang="en-US" dirty="0" err="1" smtClean="0"/>
-              <a:t>Estudos</a:t>
-            </a:r>
-            <a:r>
-              <a:rPr lang="en-US" dirty="0" smtClean="0"/>
-              <a:t> de </a:t>
-            </a:r>
-            <a:r>
-              <a:rPr lang="en-US" dirty="0" err="1" smtClean="0"/>
-              <a:t>novas</a:t>
-            </a:r>
-            <a:r>
-              <a:rPr lang="en-US" dirty="0" smtClean="0"/>
-              <a:t> </a:t>
-            </a:r>
-            <a:r>
-              <a:rPr lang="en-US" dirty="0" err="1" smtClean="0"/>
-              <a:t>formas</a:t>
-            </a:r>
-            <a:r>
-              <a:rPr lang="en-US" dirty="0" smtClean="0"/>
-              <a:t> de </a:t>
-            </a:r>
-            <a:r>
-              <a:rPr lang="en-US" dirty="0" err="1" smtClean="0"/>
-              <a:t>cadastros</a:t>
-            </a:r>
-            <a:r>
-              <a:rPr lang="en-US" dirty="0" smtClean="0"/>
-              <a:t> de </a:t>
-            </a:r>
-            <a:r>
-              <a:rPr lang="en-US" dirty="0" err="1" smtClean="0"/>
-              <a:t>usuários</a:t>
-            </a:r>
-            <a:r>
-              <a:rPr lang="en-US" dirty="0" smtClean="0"/>
-              <a:t>;</a:t>
-            </a:r>
-          </a:p>
-          <a:p>
-            <a:pPr lvl="2"/>
-            <a:r>
-              <a:rPr lang="en-US" dirty="0" err="1"/>
-              <a:t>Estudos</a:t>
-            </a:r>
-            <a:r>
-              <a:rPr lang="en-US" dirty="0"/>
-              <a:t> </a:t>
-            </a:r>
-            <a:r>
-              <a:rPr lang="en-US" dirty="0" err="1"/>
-              <a:t>sobre</a:t>
-            </a:r>
-            <a:r>
-              <a:rPr lang="en-US" dirty="0"/>
-              <a:t> a </a:t>
-            </a:r>
-            <a:r>
-              <a:rPr lang="en-US" dirty="0" err="1"/>
-              <a:t>utilização</a:t>
-            </a:r>
-            <a:r>
-              <a:rPr lang="en-US" dirty="0"/>
-              <a:t> de </a:t>
-            </a:r>
-            <a:r>
-              <a:rPr lang="en-US" dirty="0" err="1"/>
-              <a:t>novos</a:t>
-            </a:r>
-            <a:r>
-              <a:rPr lang="en-US" dirty="0"/>
-              <a:t> </a:t>
-            </a:r>
-            <a:r>
-              <a:rPr lang="en-US" dirty="0" err="1"/>
-              <a:t>classificadores</a:t>
-            </a:r>
-            <a:r>
-              <a:rPr lang="en-US" dirty="0"/>
-              <a:t> (</a:t>
-            </a:r>
-            <a:r>
-              <a:rPr lang="en-US" dirty="0" err="1"/>
-              <a:t>perfil</a:t>
-            </a:r>
-            <a:r>
-              <a:rPr lang="en-US" dirty="0" smtClean="0"/>
-              <a:t>);</a:t>
-            </a:r>
-          </a:p>
-          <a:p>
-            <a:pPr lvl="2"/>
-            <a:r>
-              <a:rPr lang="en-US" dirty="0" err="1" smtClean="0"/>
-              <a:t>Novas</a:t>
-            </a:r>
-            <a:r>
-              <a:rPr lang="en-US" dirty="0" smtClean="0"/>
-              <a:t> </a:t>
-            </a:r>
-            <a:r>
-              <a:rPr lang="en-US" dirty="0" err="1" smtClean="0"/>
-              <a:t>técnicas</a:t>
-            </a:r>
-            <a:r>
-              <a:rPr lang="en-US" dirty="0" smtClean="0"/>
-              <a:t> </a:t>
-            </a:r>
-            <a:r>
-              <a:rPr lang="en-US" dirty="0" err="1" smtClean="0"/>
-              <a:t>que</a:t>
-            </a:r>
-            <a:r>
-              <a:rPr lang="en-US" dirty="0" smtClean="0"/>
-              <a:t> </a:t>
-            </a:r>
-            <a:r>
-              <a:rPr lang="en-US" dirty="0" err="1" smtClean="0"/>
-              <a:t>utilizam</a:t>
-            </a:r>
-            <a:r>
-              <a:rPr lang="en-US" dirty="0" smtClean="0"/>
-              <a:t> </a:t>
-            </a:r>
-            <a:r>
-              <a:rPr lang="en-US" dirty="0" err="1" smtClean="0"/>
-              <a:t>os</a:t>
-            </a:r>
-            <a:r>
-              <a:rPr lang="en-US" dirty="0" smtClean="0"/>
-              <a:t> dados de </a:t>
-            </a:r>
-            <a:r>
-              <a:rPr lang="en-US" dirty="0" err="1" smtClean="0"/>
-              <a:t>profundidade</a:t>
-            </a:r>
-            <a:r>
-              <a:rPr lang="en-US" dirty="0" smtClean="0"/>
-              <a:t>.</a:t>
-            </a:r>
-            <a:endParaRPr lang="en-US" dirty="0"/>
-          </a:p>
-        </p:txBody>
-      </p:sp>
-      <p:sp>
-        <p:nvSpPr>
           <p:cNvPr id="4" name="Title 1"/>
           <p:cNvSpPr>
             <a:spLocks noGrp="1"/>
@@ -18646,6 +18324,47 @@
           </a:p>
         </p:txBody>
       </p:sp>
+      <p:pic>
+        <p:nvPicPr>
+          <p:cNvPr id="1026" name="Picture 2" descr="C:\Users\Tales\Documents\GitHub\Artigo-TRUE-SBCUP\img\multiples_kinects.jpg"/>
+          <p:cNvPicPr>
+            <a:picLocks noChangeAspect="1" noChangeArrowheads="1"/>
+          </p:cNvPicPr>
+          <p:nvPr/>
+        </p:nvPicPr>
+        <p:blipFill>
+          <a:blip r:embed="rId2">
+            <a:extLst>
+              <a:ext uri="{28A0092B-C50C-407E-A947-70E740481C1C}">
+                <a14:useLocalDpi xmlns:a14="http://schemas.microsoft.com/office/drawing/2010/main" val="0"/>
+              </a:ext>
+            </a:extLst>
+          </a:blip>
+          <a:srcRect/>
+          <a:stretch>
+            <a:fillRect/>
+          </a:stretch>
+        </p:blipFill>
+        <p:spPr bwMode="auto">
+          <a:xfrm>
+            <a:off x="457199" y="2295966"/>
+            <a:ext cx="8269169" cy="3509096"/>
+          </a:xfrm>
+          <a:prstGeom prst="rect">
+            <a:avLst/>
+          </a:prstGeom>
+          <a:noFill/>
+          <a:extLst>
+            <a:ext uri="{909E8E84-426E-40DD-AFC4-6F175D3DCCD1}">
+              <a14:hiddenFill xmlns:a14="http://schemas.microsoft.com/office/drawing/2010/main">
+                <a:solidFill>
+                  <a:srgbClr val="FFFFFF"/>
+                </a:solidFill>
+              </a14:hiddenFill>
+            </a:ext>
+          </a:extLst>
+        </p:spPr>
+      </p:pic>
     </p:spTree>
     <p:extLst>
       <p:ext uri="{BB962C8B-B14F-4D97-AF65-F5344CB8AC3E}">
@@ -18802,25 +18521,6 @@
           <a:chExt cx="0" cy="0"/>
         </a:xfrm>
       </p:grpSpPr>
-      <p:sp>
-        <p:nvSpPr>
-          <p:cNvPr id="3" name="Título 2"/>
-          <p:cNvSpPr>
-            <a:spLocks noGrp="1"/>
-          </p:cNvSpPr>
-          <p:nvPr>
-            <p:ph type="title"/>
-          </p:nvPr>
-        </p:nvSpPr>
-        <p:spPr/>
-        <p:txBody>
-          <a:bodyPr/>
-          <a:lstStyle/>
-          <a:p>
-            <a:endParaRPr lang="pt-BR"/>
-          </a:p>
-        </p:txBody>
-      </p:sp>
     </p:spTree>
     <p:extLst>
       <p:ext uri="{BB962C8B-B14F-4D97-AF65-F5344CB8AC3E}">
@@ -19493,7 +19193,7 @@
               </a14:hiddenLine>
             </a:ext>
             <a:ext uri="{FAA26D3D-D897-4be2-8F04-BA451C77F1D7}">
-              <ma14:placeholderFlag xmlns="" xmlns:ma14="http://schemas.microsoft.com/office/mac/drawingml/2011/main" val="1"/>
+              <ma14:placeholderFlag xmlns:ma14="http://schemas.microsoft.com/office/mac/drawingml/2011/main" xmlns="" val="1"/>
             </a:ext>
           </a:extLst>
         </p:spPr>
@@ -19784,7 +19484,7 @@
               </a14:hiddenLine>
             </a:ext>
             <a:ext uri="{FAA26D3D-D897-4be2-8F04-BA451C77F1D7}">
-              <ma14:placeholderFlag xmlns="" xmlns:ma14="http://schemas.microsoft.com/office/mac/drawingml/2011/main" val="1"/>
+              <ma14:placeholderFlag xmlns:ma14="http://schemas.microsoft.com/office/mac/drawingml/2011/main" xmlns="" val="1"/>
             </a:ext>
           </a:extLst>
         </p:spPr>
@@ -22056,7 +21756,7 @@
               </a14:hiddenLine>
             </a:ext>
             <a:ext uri="{FAA26D3D-D897-4be2-8F04-BA451C77F1D7}">
-              <ma14:placeholderFlag xmlns="" xmlns:ma14="http://schemas.microsoft.com/office/mac/drawingml/2011/main" val="1"/>
+              <ma14:placeholderFlag xmlns:ma14="http://schemas.microsoft.com/office/mac/drawingml/2011/main" xmlns="" val="1"/>
             </a:ext>
           </a:extLst>
         </p:spPr>
@@ -22718,8 +22418,8 @@
         </p:nvSpPr>
         <p:spPr>
           <a:xfrm rot="20572439">
-            <a:off x="3150493" y="2781161"/>
-            <a:ext cx="2748469" cy="830997"/>
+            <a:off x="3227055" y="2681203"/>
+            <a:ext cx="2706189" cy="1446550"/>
           </a:xfrm>
           <a:prstGeom prst="rect">
             <a:avLst/>
@@ -22733,7 +22433,7 @@
           <a:p>
             <a:pPr algn="ctr"/>
             <a:r>
-              <a:rPr lang="pt-BR" sz="2400" b="1" dirty="0" smtClean="0">
+              <a:rPr lang="pt-BR" sz="2200" b="1" dirty="0" smtClean="0">
                 <a:ln w="12700">
                   <a:solidFill>
                     <a:schemeClr val="tx2">
@@ -22756,13 +22456,13 @@
                   </a:outerShdw>
                 </a:effectLst>
               </a:rPr>
-              <a:t>Fundamentação </a:t>
+              <a:t>Reconhecimento </a:t>
             </a:r>
           </a:p>
           <a:p>
             <a:pPr algn="ctr"/>
             <a:r>
-              <a:rPr lang="pt-BR" sz="2400" b="1" dirty="0" smtClean="0">
+              <a:rPr lang="pt-BR" sz="2200" b="1" dirty="0" smtClean="0">
                 <a:ln w="12700">
                   <a:solidFill>
                     <a:schemeClr val="tx2">
@@ -22785,9 +22485,67 @@
                   </a:outerShdw>
                 </a:effectLst>
               </a:rPr>
-              <a:t>Teórica</a:t>
-            </a:r>
-            <a:endParaRPr lang="en-US" sz="2400" dirty="0"/>
+              <a:t>Facial </a:t>
+            </a:r>
+          </a:p>
+          <a:p>
+            <a:pPr algn="ctr"/>
+            <a:r>
+              <a:rPr lang="pt-BR" sz="2200" b="1" dirty="0" smtClean="0">
+                <a:ln w="12700">
+                  <a:solidFill>
+                    <a:schemeClr val="tx2">
+                      <a:satMod val="155000"/>
+                    </a:schemeClr>
+                  </a:solidFill>
+                  <a:prstDash val="solid"/>
+                </a:ln>
+                <a:solidFill>
+                  <a:schemeClr val="bg2">
+                    <a:tint val="85000"/>
+                    <a:satMod val="155000"/>
+                  </a:schemeClr>
+                </a:solidFill>
+                <a:effectLst>
+                  <a:outerShdw blurRad="41275" dist="20320" dir="1800000" algn="tl" rotWithShape="0">
+                    <a:srgbClr val="000000">
+                      <a:alpha val="40000"/>
+                    </a:srgbClr>
+                  </a:outerShdw>
+                </a:effectLst>
+              </a:rPr>
+              <a:t>e </a:t>
+            </a:r>
+          </a:p>
+          <a:p>
+            <a:pPr algn="ctr"/>
+            <a:r>
+              <a:rPr lang="pt-BR" sz="2200" b="1" dirty="0" smtClean="0">
+                <a:ln w="12700">
+                  <a:solidFill>
+                    <a:schemeClr val="tx2">
+                      <a:satMod val="155000"/>
+                    </a:schemeClr>
+                  </a:solidFill>
+                  <a:prstDash val="solid"/>
+                </a:ln>
+                <a:solidFill>
+                  <a:schemeClr val="bg2">
+                    <a:tint val="85000"/>
+                    <a:satMod val="155000"/>
+                  </a:schemeClr>
+                </a:solidFill>
+                <a:effectLst>
+                  <a:outerShdw blurRad="41275" dist="20320" dir="1800000" algn="tl" rotWithShape="0">
+                    <a:srgbClr val="000000">
+                      <a:alpha val="40000"/>
+                    </a:srgbClr>
+                  </a:outerShdw>
+                </a:effectLst>
+              </a:rPr>
+              <a:t>Rastreamento</a:t>
+            </a:r>
+            <a:endParaRPr lang="en-US" sz="2200" dirty="0"/>
           </a:p>
         </p:txBody>
       </p:sp>

</xml_diff>

<commit_message>
apresentação pronta v1 e enviada para a professora carla e para o fabricio dar uma olhada.
</commit_message>
<xml_diff>
--- a/apresentacao/ApresentacaoSBCUP.pptx
+++ b/apresentacao/ApresentacaoSBCUP.pptx
@@ -4550,7 +4550,7 @@
               </a14:hiddenLine>
             </a:ext>
             <a:ext uri="{FAA26D3D-D897-4be2-8F04-BA451C77F1D7}">
-              <ma14:placeholderFlag xmlns:ma14="http://schemas.microsoft.com/office/mac/drawingml/2011/main" xmlns="" val="1"/>
+              <ma14:placeholderFlag xmlns="" xmlns:ma14="http://schemas.microsoft.com/office/mac/drawingml/2011/main" val="1"/>
             </a:ext>
           </a:extLst>
         </p:spPr>
@@ -4612,7 +4612,7 @@
               </a14:hiddenLine>
             </a:ext>
             <a:ext uri="{FAA26D3D-D897-4be2-8F04-BA451C77F1D7}">
-              <ma14:placeholderFlag xmlns:ma14="http://schemas.microsoft.com/office/mac/drawingml/2011/main" xmlns="" val="1"/>
+              <ma14:placeholderFlag xmlns="" xmlns:ma14="http://schemas.microsoft.com/office/mac/drawingml/2011/main" val="1"/>
             </a:ext>
           </a:extLst>
         </p:spPr>
@@ -5287,19 +5287,44 @@
         </p:nvSpPr>
         <p:spPr>
           <a:xfrm>
-            <a:off x="333827" y="4253723"/>
+            <a:off x="319972" y="4253723"/>
             <a:ext cx="5584371" cy="1752600"/>
           </a:xfrm>
         </p:spPr>
         <p:txBody>
           <a:bodyPr>
-            <a:normAutofit fontScale="85000" lnSpcReduction="10000"/>
+            <a:normAutofit fontScale="85000" lnSpcReduction="20000"/>
           </a:bodyPr>
           <a:lstStyle/>
           <a:p>
             <a:r>
               <a:rPr lang="pt-BR" dirty="0" smtClean="0"/>
-              <a:t>Danilo Ávila Monte </a:t>
+              <a:t>Autores: </a:t>
+            </a:r>
+          </a:p>
+          <a:p>
+            <a:r>
+              <a:rPr lang="pt-BR" dirty="0"/>
+              <a:t>Tales </a:t>
+            </a:r>
+            <a:r>
+              <a:rPr lang="pt-BR" dirty="0" err="1"/>
+              <a:t>Mundim</a:t>
+            </a:r>
+            <a:r>
+              <a:rPr lang="pt-BR" dirty="0"/>
+              <a:t> Andrade Porto</a:t>
+            </a:r>
+            <a:endParaRPr lang="pt-BR" dirty="0" smtClean="0"/>
+          </a:p>
+          <a:p>
+            <a:r>
+              <a:rPr lang="pt-BR" dirty="0" smtClean="0"/>
+              <a:t>Danilo </a:t>
+            </a:r>
+            <a:r>
+              <a:rPr lang="pt-BR" dirty="0" smtClean="0"/>
+              <a:t>Ávila Monte </a:t>
             </a:r>
             <a:r>
               <a:rPr lang="pt-BR" dirty="0" err="1" smtClean="0"/>
@@ -5307,54 +5332,52 @@
             </a:r>
             <a:r>
               <a:rPr lang="pt-BR" dirty="0" smtClean="0"/>
-              <a:t> Ferreira 08/27452</a:t>
-            </a:r>
-          </a:p>
-          <a:p>
+              <a:t> </a:t>
+            </a:r>
             <a:r>
               <a:rPr lang="pt-BR" dirty="0" smtClean="0"/>
-              <a:t>Tales </a:t>
+              <a:t>Ferreira</a:t>
+            </a:r>
+          </a:p>
+          <a:p>
+            <a:r>
+              <a:rPr lang="pt-BR" dirty="0"/>
+              <a:t>Fabricio Nogueira </a:t>
+            </a:r>
+            <a:r>
+              <a:rPr lang="pt-BR" dirty="0" err="1"/>
+              <a:t>Buzeto</a:t>
+            </a:r>
+            <a:endParaRPr lang="pt-BR" dirty="0" smtClean="0"/>
+          </a:p>
+          <a:p>
+            <a:r>
+              <a:rPr lang="pt-BR" dirty="0" smtClean="0"/>
+              <a:t>Carla </a:t>
+            </a:r>
+            <a:r>
+              <a:rPr lang="pt-BR" dirty="0" smtClean="0"/>
+              <a:t>Denise </a:t>
+            </a:r>
+            <a:r>
+              <a:rPr lang="pt-BR" dirty="0" smtClean="0"/>
+              <a:t>Castanho</a:t>
+            </a:r>
+          </a:p>
+          <a:p>
+            <a:r>
+              <a:rPr lang="pt-BR" dirty="0" smtClean="0"/>
+              <a:t>Ricardo </a:t>
             </a:r>
             <a:r>
               <a:rPr lang="pt-BR" dirty="0" err="1" smtClean="0"/>
-              <a:t>Mundim</a:t>
+              <a:t>Pezzoul</a:t>
             </a:r>
             <a:r>
               <a:rPr lang="pt-BR" dirty="0" smtClean="0"/>
-              <a:t> Andrade Porto 08/41200</a:t>
-            </a:r>
-          </a:p>
-          <a:p>
+              <a:t> Jacobi</a:t>
+            </a:r>
             <a:endParaRPr lang="pt-BR" dirty="0" smtClean="0"/>
-          </a:p>
-          <a:p>
-            <a:r>
-              <a:rPr lang="pt-BR" dirty="0" smtClean="0"/>
-              <a:t>Orientador: Prof. Dr. Carla Denise Castanho</a:t>
-            </a:r>
-          </a:p>
-          <a:p>
-            <a:r>
-              <a:rPr lang="pt-BR" dirty="0" err="1" smtClean="0"/>
-              <a:t>Coorientador</a:t>
-            </a:r>
-            <a:r>
-              <a:rPr lang="pt-BR" dirty="0" smtClean="0"/>
-              <a:t>: </a:t>
-            </a:r>
-            <a:r>
-              <a:rPr lang="pt-BR" dirty="0" err="1" smtClean="0"/>
-              <a:t>Msc</a:t>
-            </a:r>
-            <a:r>
-              <a:rPr lang="pt-BR" dirty="0" smtClean="0"/>
-              <a:t>. Fabricio Nogueira </a:t>
-            </a:r>
-            <a:r>
-              <a:rPr lang="pt-BR" dirty="0" err="1" smtClean="0"/>
-              <a:t>Buzeto</a:t>
-            </a:r>
-            <a:endParaRPr lang="pt-BR" dirty="0"/>
           </a:p>
         </p:txBody>
       </p:sp>
@@ -13630,7 +13653,7 @@
               </a14:hiddenLine>
             </a:ext>
             <a:ext uri="{FAA26D3D-D897-4be2-8F04-BA451C77F1D7}">
-              <ma14:placeholderFlag xmlns:ma14="http://schemas.microsoft.com/office/mac/drawingml/2011/main" xmlns="" val="1"/>
+              <ma14:placeholderFlag xmlns="" xmlns:ma14="http://schemas.microsoft.com/office/mac/drawingml/2011/main" val="1"/>
             </a:ext>
           </a:extLst>
         </p:spPr>
@@ -13875,7 +13898,7 @@
               </a14:hiddenLine>
             </a:ext>
             <a:ext uri="{FAA26D3D-D897-4be2-8F04-BA451C77F1D7}">
-              <ma14:placeholderFlag xmlns:ma14="http://schemas.microsoft.com/office/mac/drawingml/2011/main" xmlns="" val="1"/>
+              <ma14:placeholderFlag xmlns="" xmlns:ma14="http://schemas.microsoft.com/office/mac/drawingml/2011/main" val="1"/>
             </a:ext>
           </a:extLst>
         </p:spPr>
@@ -14305,7 +14328,7 @@
               </a14:hiddenLine>
             </a:ext>
             <a:ext uri="{FAA26D3D-D897-4be2-8F04-BA451C77F1D7}">
-              <ma14:placeholderFlag xmlns:ma14="http://schemas.microsoft.com/office/mac/drawingml/2011/main" xmlns="" val="1"/>
+              <ma14:placeholderFlag xmlns="" xmlns:ma14="http://schemas.microsoft.com/office/mac/drawingml/2011/main" val="1"/>
             </a:ext>
           </a:extLst>
         </p:spPr>
@@ -14906,7 +14929,7 @@
               </a14:hiddenLine>
             </a:ext>
             <a:ext uri="{FAA26D3D-D897-4be2-8F04-BA451C77F1D7}">
-              <ma14:placeholderFlag xmlns:ma14="http://schemas.microsoft.com/office/mac/drawingml/2011/main" xmlns="" val="1"/>
+              <ma14:placeholderFlag xmlns="" xmlns:ma14="http://schemas.microsoft.com/office/mac/drawingml/2011/main" val="1"/>
             </a:ext>
           </a:extLst>
         </p:spPr>
@@ -15257,7 +15280,7 @@
               </a14:hiddenLine>
             </a:ext>
             <a:ext uri="{FAA26D3D-D897-4be2-8F04-BA451C77F1D7}">
-              <ma14:placeholderFlag xmlns:ma14="http://schemas.microsoft.com/office/mac/drawingml/2011/main" xmlns="" val="1"/>
+              <ma14:placeholderFlag xmlns="" xmlns:ma14="http://schemas.microsoft.com/office/mac/drawingml/2011/main" val="1"/>
             </a:ext>
           </a:extLst>
         </p:spPr>
@@ -19193,7 +19216,7 @@
               </a14:hiddenLine>
             </a:ext>
             <a:ext uri="{FAA26D3D-D897-4be2-8F04-BA451C77F1D7}">
-              <ma14:placeholderFlag xmlns:ma14="http://schemas.microsoft.com/office/mac/drawingml/2011/main" xmlns="" val="1"/>
+              <ma14:placeholderFlag xmlns="" xmlns:ma14="http://schemas.microsoft.com/office/mac/drawingml/2011/main" val="1"/>
             </a:ext>
           </a:extLst>
         </p:spPr>
@@ -19484,7 +19507,7 @@
               </a14:hiddenLine>
             </a:ext>
             <a:ext uri="{FAA26D3D-D897-4be2-8F04-BA451C77F1D7}">
-              <ma14:placeholderFlag xmlns:ma14="http://schemas.microsoft.com/office/mac/drawingml/2011/main" xmlns="" val="1"/>
+              <ma14:placeholderFlag xmlns="" xmlns:ma14="http://schemas.microsoft.com/office/mac/drawingml/2011/main" val="1"/>
             </a:ext>
           </a:extLst>
         </p:spPr>
@@ -21756,7 +21779,7 @@
               </a14:hiddenLine>
             </a:ext>
             <a:ext uri="{FAA26D3D-D897-4be2-8F04-BA451C77F1D7}">
-              <ma14:placeholderFlag xmlns:ma14="http://schemas.microsoft.com/office/mac/drawingml/2011/main" xmlns="" val="1"/>
+              <ma14:placeholderFlag xmlns="" xmlns:ma14="http://schemas.microsoft.com/office/mac/drawingml/2011/main" val="1"/>
             </a:ext>
           </a:extLst>
         </p:spPr>

</xml_diff>

<commit_message>
Adicionando alterações solicitadas pelo Fabricio!
</commit_message>
<xml_diff>
--- a/apresentacao/ApresentacaoSBCUP.pptx
+++ b/apresentacao/ApresentacaoSBCUP.pptx
@@ -248,7 +248,7 @@
           <a:p>
             <a:fld id="{5FD99E58-1C9B-E44B-8998-0A321153317B}" type="datetimeFigureOut">
               <a:rPr lang="en-US" smtClean="0"/>
-              <a:t>6/24/2012</a:t>
+              <a:t>6/26/2012</a:t>
             </a:fld>
             <a:endParaRPr lang="en-US"/>
           </a:p>
@@ -1423,7 +1423,7 @@
           <a:p>
             <a:fld id="{7D290233-0DD1-4A80-BB1E-9ADC3556DBB6}" type="datetimeFigureOut">
               <a:rPr lang="en-US" smtClean="0"/>
-              <a:t>6/24/2012</a:t>
+              <a:t>6/26/2012</a:t>
             </a:fld>
             <a:endParaRPr lang="en-US"/>
           </a:p>
@@ -1619,7 +1619,7 @@
           <a:p>
             <a:fld id="{7D290233-0DD1-4A80-BB1E-9ADC3556DBB6}" type="datetimeFigureOut">
               <a:rPr lang="en-US" smtClean="0"/>
-              <a:t>6/24/2012</a:t>
+              <a:t>6/26/2012</a:t>
             </a:fld>
             <a:endParaRPr lang="en-US"/>
           </a:p>
@@ -1811,7 +1811,7 @@
           <a:p>
             <a:fld id="{7D290233-0DD1-4A80-BB1E-9ADC3556DBB6}" type="datetimeFigureOut">
               <a:rPr lang="en-US" smtClean="0"/>
-              <a:t>6/24/2012</a:t>
+              <a:t>6/26/2012</a:t>
             </a:fld>
             <a:endParaRPr lang="en-US"/>
           </a:p>
@@ -1993,7 +1993,7 @@
           <a:p>
             <a:fld id="{7D290233-0DD1-4A80-BB1E-9ADC3556DBB6}" type="datetimeFigureOut">
               <a:rPr lang="en-US" smtClean="0"/>
-              <a:t>6/24/2012</a:t>
+              <a:t>6/26/2012</a:t>
             </a:fld>
             <a:endParaRPr lang="en-US"/>
           </a:p>
@@ -2231,7 +2231,7 @@
           <a:p>
             <a:fld id="{7D290233-0DD1-4A80-BB1E-9ADC3556DBB6}" type="datetimeFigureOut">
               <a:rPr lang="en-US" smtClean="0"/>
-              <a:t>6/24/2012</a:t>
+              <a:t>6/26/2012</a:t>
             </a:fld>
             <a:endParaRPr lang="en-US"/>
           </a:p>
@@ -2507,7 +2507,7 @@
           <a:p>
             <a:fld id="{7D290233-0DD1-4A80-BB1E-9ADC3556DBB6}" type="datetimeFigureOut">
               <a:rPr lang="en-US" smtClean="0"/>
-              <a:t>6/24/2012</a:t>
+              <a:t>6/26/2012</a:t>
             </a:fld>
             <a:endParaRPr lang="en-US"/>
           </a:p>
@@ -2928,7 +2928,7 @@
           <a:p>
             <a:fld id="{7D290233-0DD1-4A80-BB1E-9ADC3556DBB6}" type="datetimeFigureOut">
               <a:rPr lang="en-US" smtClean="0"/>
-              <a:t>6/24/2012</a:t>
+              <a:t>6/26/2012</a:t>
             </a:fld>
             <a:endParaRPr lang="en-US"/>
           </a:p>
@@ -3076,7 +3076,7 @@
           <a:p>
             <a:fld id="{7D290233-0DD1-4A80-BB1E-9ADC3556DBB6}" type="datetimeFigureOut">
               <a:rPr lang="en-US" smtClean="0"/>
-              <a:t>6/24/2012</a:t>
+              <a:t>6/26/2012</a:t>
             </a:fld>
             <a:endParaRPr lang="en-US"/>
           </a:p>
@@ -3183,7 +3183,7 @@
           <a:p>
             <a:fld id="{7D290233-0DD1-4A80-BB1E-9ADC3556DBB6}" type="datetimeFigureOut">
               <a:rPr lang="en-US" smtClean="0"/>
-              <a:t>6/24/2012</a:t>
+              <a:t>6/26/2012</a:t>
             </a:fld>
             <a:endParaRPr lang="en-US"/>
           </a:p>
@@ -3445,7 +3445,7 @@
           <a:p>
             <a:fld id="{7D290233-0DD1-4A80-BB1E-9ADC3556DBB6}" type="datetimeFigureOut">
               <a:rPr lang="en-US" smtClean="0"/>
-              <a:t>6/24/2012</a:t>
+              <a:t>6/26/2012</a:t>
             </a:fld>
             <a:endParaRPr lang="en-US"/>
           </a:p>
@@ -3709,7 +3709,7 @@
           <a:p>
             <a:fld id="{7D290233-0DD1-4A80-BB1E-9ADC3556DBB6}" type="datetimeFigureOut">
               <a:rPr lang="en-US" smtClean="0"/>
-              <a:t>6/24/2012</a:t>
+              <a:t>6/26/2012</a:t>
             </a:fld>
             <a:endParaRPr lang="en-US"/>
           </a:p>
@@ -4550,7 +4550,7 @@
               </a14:hiddenLine>
             </a:ext>
             <a:ext uri="{FAA26D3D-D897-4be2-8F04-BA451C77F1D7}">
-              <ma14:placeholderFlag xmlns="" xmlns:ma14="http://schemas.microsoft.com/office/mac/drawingml/2011/main" val="1"/>
+              <ma14:placeholderFlag xmlns:ma14="http://schemas.microsoft.com/office/mac/drawingml/2011/main" xmlns="" val="1"/>
             </a:ext>
           </a:extLst>
         </p:spPr>
@@ -4612,7 +4612,7 @@
               </a14:hiddenLine>
             </a:ext>
             <a:ext uri="{FAA26D3D-D897-4be2-8F04-BA451C77F1D7}">
-              <ma14:placeholderFlag xmlns="" xmlns:ma14="http://schemas.microsoft.com/office/mac/drawingml/2011/main" val="1"/>
+              <ma14:placeholderFlag xmlns:ma14="http://schemas.microsoft.com/office/mac/drawingml/2011/main" xmlns="" val="1"/>
             </a:ext>
           </a:extLst>
         </p:spPr>
@@ -4699,7 +4699,7 @@
           <a:p>
             <a:fld id="{7D290233-0DD1-4A80-BB1E-9ADC3556DBB6}" type="datetimeFigureOut">
               <a:rPr lang="en-US" smtClean="0"/>
-              <a:t>6/24/2012</a:t>
+              <a:t>6/26/2012</a:t>
             </a:fld>
             <a:endParaRPr lang="en-US"/>
           </a:p>
@@ -5320,11 +5320,7 @@
           <a:p>
             <a:r>
               <a:rPr lang="pt-BR" dirty="0" smtClean="0"/>
-              <a:t>Danilo </a:t>
-            </a:r>
-            <a:r>
-              <a:rPr lang="pt-BR" dirty="0" smtClean="0"/>
-              <a:t>Ávila Monte </a:t>
+              <a:t>Danilo Ávila Monte </a:t>
             </a:r>
             <a:r>
               <a:rPr lang="pt-BR" dirty="0" err="1" smtClean="0"/>
@@ -5332,11 +5328,7 @@
             </a:r>
             <a:r>
               <a:rPr lang="pt-BR" dirty="0" smtClean="0"/>
-              <a:t> </a:t>
-            </a:r>
-            <a:r>
-              <a:rPr lang="pt-BR" dirty="0" smtClean="0"/>
-              <a:t>Ferreira</a:t>
+              <a:t> Ferreira</a:t>
             </a:r>
           </a:p>
           <a:p>
@@ -5353,15 +5345,7 @@
           <a:p>
             <a:r>
               <a:rPr lang="pt-BR" dirty="0" smtClean="0"/>
-              <a:t>Carla </a:t>
-            </a:r>
-            <a:r>
-              <a:rPr lang="pt-BR" dirty="0" smtClean="0"/>
-              <a:t>Denise </a:t>
-            </a:r>
-            <a:r>
-              <a:rPr lang="pt-BR" dirty="0" smtClean="0"/>
-              <a:t>Castanho</a:t>
+              <a:t>Carla Denise Castanho</a:t>
             </a:r>
           </a:p>
           <a:p>
@@ -5377,7 +5361,6 @@
               <a:rPr lang="pt-BR" dirty="0" smtClean="0"/>
               <a:t> Jacobi</a:t>
             </a:r>
-            <a:endParaRPr lang="pt-BR" dirty="0" smtClean="0"/>
           </a:p>
         </p:txBody>
       </p:sp>
@@ -5524,7 +5507,20 @@
             </a:r>
             <a:r>
               <a:rPr lang="en-US" dirty="0" smtClean="0"/>
-              <a:t> da face do </a:t>
+              <a:t> da face </a:t>
+            </a:r>
+            <a:r>
+              <a:rPr lang="en-US" dirty="0" smtClean="0"/>
+              <a:t>do</a:t>
+            </a:r>
+          </a:p>
+          <a:p>
+            <a:pPr marL="411162" lvl="1" indent="0">
+              <a:buNone/>
+            </a:pPr>
+            <a:r>
+              <a:rPr lang="en-US" dirty="0" smtClean="0"/>
+              <a:t> </a:t>
             </a:r>
             <a:r>
               <a:rPr lang="en-US" dirty="0" err="1" smtClean="0"/>
@@ -5535,6 +5531,9 @@
               <a:t>.</a:t>
             </a:r>
             <a:endParaRPr lang="en-US" dirty="0"/>
+          </a:p>
+          <a:p>
+            <a:endParaRPr lang="en-US" dirty="0" smtClean="0"/>
           </a:p>
           <a:p>
             <a:r>
@@ -5597,6 +5596,47 @@
           </a:p>
         </p:txBody>
       </p:sp>
+      <p:pic>
+        <p:nvPicPr>
+          <p:cNvPr id="3074" name="Picture 2" descr="C:\Users\Tales\Documents\GitHub\Projeto-Final\figuras\2.FundamentacaoTeorica\diferencailuminacao.png"/>
+          <p:cNvPicPr>
+            <a:picLocks noChangeAspect="1" noChangeArrowheads="1"/>
+          </p:cNvPicPr>
+          <p:nvPr/>
+        </p:nvPicPr>
+        <p:blipFill>
+          <a:blip r:embed="rId2" cstate="email">
+            <a:extLst>
+              <a:ext uri="{28A0092B-C50C-407E-A947-70E740481C1C}">
+                <a14:useLocalDpi xmlns:a14="http://schemas.microsoft.com/office/drawing/2010/main" val="0"/>
+              </a:ext>
+            </a:extLst>
+          </a:blip>
+          <a:srcRect/>
+          <a:stretch>
+            <a:fillRect/>
+          </a:stretch>
+        </p:blipFill>
+        <p:spPr bwMode="auto">
+          <a:xfrm>
+            <a:off x="4169686" y="1174215"/>
+            <a:ext cx="4877331" cy="3439350"/>
+          </a:xfrm>
+          <a:prstGeom prst="rect">
+            <a:avLst/>
+          </a:prstGeom>
+          <a:noFill/>
+          <a:extLst>
+            <a:ext uri="{909E8E84-426E-40DD-AFC4-6F175D3DCCD1}">
+              <a14:hiddenFill xmlns:a14="http://schemas.microsoft.com/office/drawing/2010/main">
+                <a:solidFill>
+                  <a:srgbClr val="FFFFFF"/>
+                </a:solidFill>
+              </a14:hiddenFill>
+            </a:ext>
+          </a:extLst>
+        </p:spPr>
+      </p:pic>
     </p:spTree>
     <p:extLst>
       <p:ext uri="{BB962C8B-B14F-4D97-AF65-F5344CB8AC3E}">
@@ -5778,14 +5818,14 @@
       </p:sp>
       <p:pic>
         <p:nvPicPr>
-          <p:cNvPr id="2050" name="Picture 2" descr="C:\Users\Tales\Documents\GitHub\Artigo-TRUE-SBCUP\img\viola-jones.png"/>
+          <p:cNvPr id="1026" name="Picture 2" descr="C:\Users\Tales\Documents\GitHub\Projeto-Final\figuras\2.FundamentacaoTeorica\enquadramentoRosto.png"/>
           <p:cNvPicPr>
             <a:picLocks noChangeAspect="1" noChangeArrowheads="1"/>
           </p:cNvPicPr>
           <p:nvPr/>
         </p:nvPicPr>
         <p:blipFill>
-          <a:blip r:embed="rId2">
+          <a:blip r:embed="rId2" cstate="email">
             <a:extLst>
               <a:ext uri="{28A0092B-C50C-407E-A947-70E740481C1C}">
                 <a14:useLocalDpi xmlns:a14="http://schemas.microsoft.com/office/drawing/2010/main" val="0"/>
@@ -5799,8 +5839,8 @@
         </p:blipFill>
         <p:spPr bwMode="auto">
           <a:xfrm>
-            <a:off x="5035550" y="2295525"/>
-            <a:ext cx="3816350" cy="3816350"/>
+            <a:off x="4592782" y="2119745"/>
+            <a:ext cx="4231266" cy="4231266"/>
           </a:xfrm>
           <a:prstGeom prst="rect">
             <a:avLst/>
@@ -6220,83 +6260,7 @@
   <p:timing>
     <p:tnLst>
       <p:par>
-        <p:cTn id="1" dur="indefinite" restart="never" nodeType="tmRoot">
-          <p:childTnLst>
-            <p:seq concurrent="1" nextAc="seek">
-              <p:cTn id="2" dur="indefinite" nodeType="mainSeq">
-                <p:childTnLst>
-                  <p:par>
-                    <p:cTn id="3" fill="hold">
-                      <p:stCondLst>
-                        <p:cond delay="indefinite"/>
-                      </p:stCondLst>
-                      <p:childTnLst>
-                        <p:par>
-                          <p:cTn id="4" fill="hold">
-                            <p:stCondLst>
-                              <p:cond delay="0"/>
-                            </p:stCondLst>
-                            <p:childTnLst>
-                              <p:par>
-                                <p:cTn id="5" presetID="10" presetClass="entr" presetSubtype="0" fill="hold" nodeType="clickEffect">
-                                  <p:stCondLst>
-                                    <p:cond delay="0"/>
-                                  </p:stCondLst>
-                                  <p:childTnLst>
-                                    <p:set>
-                                      <p:cBhvr>
-                                        <p:cTn id="6" dur="1" fill="hold">
-                                          <p:stCondLst>
-                                            <p:cond delay="0"/>
-                                          </p:stCondLst>
-                                        </p:cTn>
-                                        <p:tgtEl>
-                                          <p:spTgt spid="4"/>
-                                        </p:tgtEl>
-                                        <p:attrNameLst>
-                                          <p:attrName>style.visibility</p:attrName>
-                                        </p:attrNameLst>
-                                      </p:cBhvr>
-                                      <p:to>
-                                        <p:strVal val="visible"/>
-                                      </p:to>
-                                    </p:set>
-                                    <p:animEffect transition="in" filter="fade">
-                                      <p:cBhvr>
-                                        <p:cTn id="7" dur="500"/>
-                                        <p:tgtEl>
-                                          <p:spTgt spid="4"/>
-                                        </p:tgtEl>
-                                      </p:cBhvr>
-                                    </p:animEffect>
-                                  </p:childTnLst>
-                                </p:cTn>
-                              </p:par>
-                            </p:childTnLst>
-                          </p:cTn>
-                        </p:par>
-                      </p:childTnLst>
-                    </p:cTn>
-                  </p:par>
-                </p:childTnLst>
-              </p:cTn>
-              <p:prevCondLst>
-                <p:cond evt="onPrev" delay="0">
-                  <p:tgtEl>
-                    <p:sldTgt/>
-                  </p:tgtEl>
-                </p:cond>
-              </p:prevCondLst>
-              <p:nextCondLst>
-                <p:cond evt="onNext" delay="0">
-                  <p:tgtEl>
-                    <p:sldTgt/>
-                  </p:tgtEl>
-                </p:cond>
-              </p:nextCondLst>
-            </p:seq>
-          </p:childTnLst>
-        </p:cTn>
+        <p:cTn id="1" dur="indefinite" restart="never" nodeType="tmRoot"/>
       </p:par>
     </p:tnLst>
   </p:timing>
@@ -6360,7 +6324,7 @@
         </p:nvSpPr>
         <p:spPr>
           <a:xfrm>
-            <a:off x="457200" y="1576019"/>
+            <a:off x="457200" y="1798284"/>
             <a:ext cx="7913888" cy="1501853"/>
           </a:xfrm>
         </p:spPr>
@@ -6477,6 +6441,47 @@
           </a:p>
         </p:txBody>
       </p:sp>
+      <p:pic>
+        <p:nvPicPr>
+          <p:cNvPr id="2050" name="Picture 2" descr="C:\Users\Tales\Documents\GitHub\Projeto-Final\figuras\5.Testes\oclusao\4.png"/>
+          <p:cNvPicPr>
+            <a:picLocks noChangeAspect="1" noChangeArrowheads="1"/>
+          </p:cNvPicPr>
+          <p:nvPr/>
+        </p:nvPicPr>
+        <p:blipFill>
+          <a:blip r:embed="rId2" cstate="email">
+            <a:extLst>
+              <a:ext uri="{28A0092B-C50C-407E-A947-70E740481C1C}">
+                <a14:useLocalDpi xmlns:a14="http://schemas.microsoft.com/office/drawing/2010/main" val="0"/>
+              </a:ext>
+            </a:extLst>
+          </a:blip>
+          <a:srcRect/>
+          <a:stretch>
+            <a:fillRect/>
+          </a:stretch>
+        </p:blipFill>
+        <p:spPr bwMode="auto">
+          <a:xfrm>
+            <a:off x="2119745" y="3421559"/>
+            <a:ext cx="4707081" cy="3173314"/>
+          </a:xfrm>
+          <a:prstGeom prst="rect">
+            <a:avLst/>
+          </a:prstGeom>
+          <a:noFill/>
+          <a:extLst>
+            <a:ext uri="{909E8E84-426E-40DD-AFC4-6F175D3DCCD1}">
+              <a14:hiddenFill xmlns:a14="http://schemas.microsoft.com/office/drawing/2010/main">
+                <a:solidFill>
+                  <a:srgbClr val="FFFFFF"/>
+                </a:solidFill>
+              </a14:hiddenFill>
+            </a:ext>
+          </a:extLst>
+        </p:spPr>
+      </p:pic>
     </p:spTree>
     <p:extLst>
       <p:ext uri="{BB962C8B-B14F-4D97-AF65-F5344CB8AC3E}">
@@ -6514,6 +6519,47 @@
           <a:chExt cx="0" cy="0"/>
         </a:xfrm>
       </p:grpSpPr>
+      <p:pic>
+        <p:nvPicPr>
+          <p:cNvPr id="4098" name="Picture 2" descr="http://www.lps.usp.br/~hae/projform/2010_gabriel_ramires/Imagens/subtracao.png"/>
+          <p:cNvPicPr>
+            <a:picLocks noChangeAspect="1" noChangeArrowheads="1"/>
+          </p:cNvPicPr>
+          <p:nvPr/>
+        </p:nvPicPr>
+        <p:blipFill>
+          <a:blip r:embed="rId3" cstate="email">
+            <a:extLst>
+              <a:ext uri="{28A0092B-C50C-407E-A947-70E740481C1C}">
+                <a14:useLocalDpi xmlns:a14="http://schemas.microsoft.com/office/drawing/2010/main" val="0"/>
+              </a:ext>
+            </a:extLst>
+          </a:blip>
+          <a:srcRect/>
+          <a:stretch>
+            <a:fillRect/>
+          </a:stretch>
+        </p:blipFill>
+        <p:spPr bwMode="auto">
+          <a:xfrm>
+            <a:off x="3079676" y="2947021"/>
+            <a:ext cx="5290834" cy="1481433"/>
+          </a:xfrm>
+          <a:prstGeom prst="rect">
+            <a:avLst/>
+          </a:prstGeom>
+          <a:noFill/>
+          <a:extLst>
+            <a:ext uri="{909E8E84-426E-40DD-AFC4-6F175D3DCCD1}">
+              <a14:hiddenFill xmlns:a14="http://schemas.microsoft.com/office/drawing/2010/main">
+                <a:solidFill>
+                  <a:srgbClr val="FFFFFF"/>
+                </a:solidFill>
+              </a14:hiddenFill>
+            </a:ext>
+          </a:extLst>
+        </p:spPr>
+      </p:pic>
       <p:sp>
         <p:nvSpPr>
           <p:cNvPr id="2" name="Title 1"/>
@@ -6884,65 +6930,84 @@
                             </p:stCondLst>
                             <p:childTnLst>
                               <p:par>
-                                <p:cTn id="5" presetID="1" presetClass="emph" presetSubtype="2" fill="hold" nodeType="clickEffect">
+                                <p:cTn id="5" presetID="9" presetClass="exit" presetSubtype="0" fill="hold" grpId="0" nodeType="clickEffect">
                                   <p:stCondLst>
                                     <p:cond delay="0"/>
                                   </p:stCondLst>
                                   <p:childTnLst>
-                                    <p:animClr clrSpc="rgb" dir="cw">
+                                    <p:animEffect transition="out" filter="dissolve">
                                       <p:cBhvr>
-                                        <p:cTn id="6" dur="2000" fill="hold"/>
+                                        <p:cTn id="6" dur="500"/>
                                         <p:tgtEl>
-                                          <p:spTgt spid="6"/>
+                                          <p:spTgt spid="9"/>
+                                        </p:tgtEl>
+                                      </p:cBhvr>
+                                    </p:animEffect>
+                                    <p:set>
+                                      <p:cBhvr>
+                                        <p:cTn id="7" dur="1" fill="hold">
+                                          <p:stCondLst>
+                                            <p:cond delay="499"/>
+                                          </p:stCondLst>
+                                        </p:cTn>
+                                        <p:tgtEl>
+                                          <p:spTgt spid="9"/>
                                         </p:tgtEl>
                                         <p:attrNameLst>
-                                          <p:attrName>fillcolor</p:attrName>
+                                          <p:attrName>style.visibility</p:attrName>
                                         </p:attrNameLst>
                                       </p:cBhvr>
                                       <p:to>
-                                        <a:schemeClr val="accent2"/>
-                                      </p:to>
-                                    </p:animClr>
-                                    <p:set>
-                                      <p:cBhvr>
-                                        <p:cTn id="7" dur="2000" fill="hold"/>
-                                        <p:tgtEl>
-                                          <p:spTgt spid="6"/>
-                                        </p:tgtEl>
-                                        <p:attrNameLst>
-                                          <p:attrName>fill.type</p:attrName>
-                                        </p:attrNameLst>
-                                      </p:cBhvr>
-                                      <p:to>
-                                        <p:strVal val="solid"/>
-                                      </p:to>
-                                    </p:set>
-                                    <p:set>
-                                      <p:cBhvr>
-                                        <p:cTn id="8" dur="2000" fill="hold"/>
-                                        <p:tgtEl>
-                                          <p:spTgt spid="6"/>
-                                        </p:tgtEl>
-                                        <p:attrNameLst>
-                                          <p:attrName>fill.on</p:attrName>
-                                        </p:attrNameLst>
-                                      </p:cBhvr>
-                                      <p:to>
-                                        <p:strVal val="true"/>
+                                        <p:strVal val="hidden"/>
                                       </p:to>
                                     </p:set>
                                   </p:childTnLst>
                                 </p:cTn>
                               </p:par>
                               <p:par>
-                                <p:cTn id="9" presetID="9" presetClass="exit" presetSubtype="0" fill="hold" grpId="0" nodeType="withEffect">
+                                <p:cTn id="8" presetID="9" presetClass="exit" presetSubtype="0" fill="hold" grpId="0" nodeType="withEffect">
                                   <p:stCondLst>
                                     <p:cond delay="0"/>
                                   </p:stCondLst>
                                   <p:childTnLst>
                                     <p:animEffect transition="out" filter="dissolve">
                                       <p:cBhvr>
-                                        <p:cTn id="10" dur="500"/>
+                                        <p:cTn id="9" dur="500"/>
+                                        <p:tgtEl>
+                                          <p:spTgt spid="7"/>
+                                        </p:tgtEl>
+                                      </p:cBhvr>
+                                    </p:animEffect>
+                                    <p:set>
+                                      <p:cBhvr>
+                                        <p:cTn id="10" dur="1" fill="hold">
+                                          <p:stCondLst>
+                                            <p:cond delay="499"/>
+                                          </p:stCondLst>
+                                        </p:cTn>
+                                        <p:tgtEl>
+                                          <p:spTgt spid="7"/>
+                                        </p:tgtEl>
+                                        <p:attrNameLst>
+                                          <p:attrName>style.visibility</p:attrName>
+                                        </p:attrNameLst>
+                                      </p:cBhvr>
+                                      <p:to>
+                                        <p:strVal val="hidden"/>
+                                      </p:to>
+                                    </p:set>
+                                  </p:childTnLst>
+                                </p:cTn>
+                              </p:par>
+                              <p:par>
+                                <p:cTn id="11" presetID="9" presetClass="exit" presetSubtype="0" fill="hold" grpId="0" nodeType="withEffect">
+                                  <p:stCondLst>
+                                    <p:cond delay="0"/>
+                                  </p:stCondLst>
+                                  <p:childTnLst>
+                                    <p:animEffect transition="out" filter="dissolve">
+                                      <p:cBhvr>
+                                        <p:cTn id="12" dur="500"/>
                                         <p:tgtEl>
                                           <p:spTgt spid="5"/>
                                         </p:tgtEl>
@@ -6950,7 +7015,7 @@
                                     </p:animEffect>
                                     <p:set>
                                       <p:cBhvr>
-                                        <p:cTn id="11" dur="1" fill="hold">
+                                        <p:cTn id="13" dur="1" fill="hold">
                                           <p:stCondLst>
                                             <p:cond delay="499"/>
                                           </p:stCondLst>
@@ -6970,14 +7035,14 @@
                                 </p:cTn>
                               </p:par>
                               <p:par>
-                                <p:cTn id="12" presetID="9" presetClass="exit" presetSubtype="0" fill="hold" grpId="0" nodeType="withEffect">
+                                <p:cTn id="14" presetID="9" presetClass="exit" presetSubtype="0" fill="hold" grpId="0" nodeType="withEffect">
                                   <p:stCondLst>
                                     <p:cond delay="0"/>
                                   </p:stCondLst>
                                   <p:childTnLst>
                                     <p:animEffect transition="out" filter="dissolve">
                                       <p:cBhvr>
-                                        <p:cTn id="13" dur="500"/>
+                                        <p:cTn id="15" dur="500"/>
                                         <p:tgtEl>
                                           <p:spTgt spid="8"/>
                                         </p:tgtEl>
@@ -6985,7 +7050,7 @@
                                     </p:animEffect>
                                     <p:set>
                                       <p:cBhvr>
-                                        <p:cTn id="14" dur="1" fill="hold">
+                                        <p:cTn id="16" dur="1" fill="hold">
                                           <p:stCondLst>
                                             <p:cond delay="499"/>
                                           </p:stCondLst>
@@ -7005,72 +7070,103 @@
                                 </p:cTn>
                               </p:par>
                               <p:par>
-                                <p:cTn id="15" presetID="9" presetClass="exit" presetSubtype="0" fill="hold" grpId="0" nodeType="withEffect">
+                                <p:cTn id="17" presetID="42" presetClass="path" presetSubtype="0" accel="50000" decel="50000" fill="hold" grpId="0" nodeType="withEffect">
                                   <p:stCondLst>
                                     <p:cond delay="0"/>
                                   </p:stCondLst>
                                   <p:childTnLst>
-                                    <p:animEffect transition="out" filter="dissolve">
+                                    <p:animMotion origin="layout" path="M -1.94444E-6 3.7037E-6 L -0.33541 3.7037E-6 " pathEditMode="relative" rAng="0" ptsTypes="AA">
                                       <p:cBhvr>
-                                        <p:cTn id="16" dur="500"/>
+                                        <p:cTn id="18" dur="2000" fill="hold"/>
                                         <p:tgtEl>
-                                          <p:spTgt spid="9"/>
+                                          <p:spTgt spid="6"/>
                                         </p:tgtEl>
+                                        <p:attrNameLst>
+                                          <p:attrName>ppt_x</p:attrName>
+                                          <p:attrName>ppt_y</p:attrName>
+                                        </p:attrNameLst>
                                       </p:cBhvr>
-                                    </p:animEffect>
+                                      <p:rCtr x="-16771" y="0"/>
+                                    </p:animMotion>
+                                  </p:childTnLst>
+                                </p:cTn>
+                              </p:par>
+                              <p:par>
+                                <p:cTn id="19" presetID="35" presetClass="path" presetSubtype="0" accel="50000" decel="50000" fill="hold" grpId="0" nodeType="withEffect">
+                                  <p:stCondLst>
+                                    <p:cond delay="0"/>
+                                  </p:stCondLst>
+                                  <p:childTnLst>
+                                    <p:animMotion origin="layout" path="M -1.94444E-6 1.11111E-6 L -0.33541 1.11111E-6 " pathEditMode="relative" rAng="0" ptsTypes="AA">
+                                      <p:cBhvr>
+                                        <p:cTn id="20" dur="2000" fill="hold"/>
+                                        <p:tgtEl>
+                                          <p:spTgt spid="4"/>
+                                        </p:tgtEl>
+                                        <p:attrNameLst>
+                                          <p:attrName>ppt_x</p:attrName>
+                                          <p:attrName>ppt_y</p:attrName>
+                                        </p:attrNameLst>
+                                      </p:cBhvr>
+                                      <p:rCtr x="-16771" y="0"/>
+                                    </p:animMotion>
+                                  </p:childTnLst>
+                                </p:cTn>
+                              </p:par>
+                              <p:par>
+                                <p:cTn id="21" presetID="42" presetClass="path" presetSubtype="0" accel="50000" decel="50000" fill="hold" grpId="0" nodeType="withEffect">
+                                  <p:stCondLst>
+                                    <p:cond delay="0"/>
+                                  </p:stCondLst>
+                                  <p:childTnLst>
+                                    <p:animMotion origin="layout" path="M 4.44444E-6 -3.7037E-6 L -0.33559 -3.7037E-6 " pathEditMode="relative" rAng="0" ptsTypes="AA">
+                                      <p:cBhvr>
+                                        <p:cTn id="22" dur="2000" fill="hold"/>
+                                        <p:tgtEl>
+                                          <p:spTgt spid="10"/>
+                                        </p:tgtEl>
+                                        <p:attrNameLst>
+                                          <p:attrName>ppt_x</p:attrName>
+                                          <p:attrName>ppt_y</p:attrName>
+                                        </p:attrNameLst>
+                                      </p:cBhvr>
+                                      <p:rCtr x="-16788" y="0"/>
+                                    </p:animMotion>
+                                  </p:childTnLst>
+                                </p:cTn>
+                              </p:par>
+                              <p:par>
+                                <p:cTn id="23" presetID="10" presetClass="entr" presetSubtype="0" fill="hold" nodeType="withEffect">
+                                  <p:stCondLst>
+                                    <p:cond delay="1000"/>
+                                  </p:stCondLst>
+                                  <p:childTnLst>
                                     <p:set>
                                       <p:cBhvr>
-                                        <p:cTn id="17" dur="1" fill="hold">
+                                        <p:cTn id="24" dur="1" fill="hold">
                                           <p:stCondLst>
-                                            <p:cond delay="499"/>
+                                            <p:cond delay="0"/>
                                           </p:stCondLst>
                                         </p:cTn>
                                         <p:tgtEl>
-                                          <p:spTgt spid="9"/>
+                                          <p:spTgt spid="4098"/>
                                         </p:tgtEl>
                                         <p:attrNameLst>
                                           <p:attrName>style.visibility</p:attrName>
                                         </p:attrNameLst>
                                       </p:cBhvr>
                                       <p:to>
-                                        <p:strVal val="hidden"/>
+                                        <p:strVal val="visible"/>
                                       </p:to>
                                     </p:set>
-                                  </p:childTnLst>
-                                </p:cTn>
-                              </p:par>
-                              <p:par>
-                                <p:cTn id="18" presetID="9" presetClass="exit" presetSubtype="0" fill="hold" grpId="0" nodeType="withEffect">
-                                  <p:stCondLst>
-                                    <p:cond delay="0"/>
-                                  </p:stCondLst>
-                                  <p:childTnLst>
-                                    <p:animEffect transition="out" filter="dissolve">
+                                    <p:animEffect transition="in" filter="fade">
                                       <p:cBhvr>
-                                        <p:cTn id="19" dur="500"/>
+                                        <p:cTn id="25" dur="2000"/>
                                         <p:tgtEl>
-                                          <p:spTgt spid="7"/>
+                                          <p:spTgt spid="4098"/>
                                         </p:tgtEl>
                                       </p:cBhvr>
                                     </p:animEffect>
-                                    <p:set>
-                                      <p:cBhvr>
-                                        <p:cTn id="20" dur="1" fill="hold">
-                                          <p:stCondLst>
-                                            <p:cond delay="499"/>
-                                          </p:stCondLst>
-                                        </p:cTn>
-                                        <p:tgtEl>
-                                          <p:spTgt spid="7"/>
-                                        </p:tgtEl>
-                                        <p:attrNameLst>
-                                          <p:attrName>style.visibility</p:attrName>
-                                        </p:attrNameLst>
-                                      </p:cBhvr>
-                                      <p:to>
-                                        <p:strVal val="hidden"/>
-                                      </p:to>
-                                    </p:set>
                                   </p:childTnLst>
                                 </p:cTn>
                               </p:par>
@@ -7102,10 +7198,13 @@
       </p:par>
     </p:tnLst>
     <p:bldLst>
+      <p:bldP spid="4" grpId="0" animBg="1"/>
       <p:bldP spid="5" grpId="0" animBg="1"/>
+      <p:bldP spid="6" grpId="0" animBg="1"/>
       <p:bldP spid="7" grpId="0" animBg="1"/>
       <p:bldP spid="8" grpId="0" animBg="1"/>
       <p:bldP spid="9" grpId="0" animBg="1"/>
+      <p:bldP spid="10" grpId="0" animBg="1"/>
     </p:bldLst>
   </p:timing>
 </p:sld>
@@ -7128,6 +7227,47 @@
           <a:chExt cx="0" cy="0"/>
         </a:xfrm>
       </p:grpSpPr>
+      <p:pic>
+        <p:nvPicPr>
+          <p:cNvPr id="5122" name="Picture 2" descr="http://imp.iis.sinica.edu.tw/ivclab/research/batracker/fig_1.png"/>
+          <p:cNvPicPr>
+            <a:picLocks noChangeAspect="1" noChangeArrowheads="1"/>
+          </p:cNvPicPr>
+          <p:nvPr/>
+        </p:nvPicPr>
+        <p:blipFill>
+          <a:blip r:embed="rId2">
+            <a:extLst>
+              <a:ext uri="{28A0092B-C50C-407E-A947-70E740481C1C}">
+                <a14:useLocalDpi xmlns:a14="http://schemas.microsoft.com/office/drawing/2010/main" val="0"/>
+              </a:ext>
+            </a:extLst>
+          </a:blip>
+          <a:srcRect/>
+          <a:stretch>
+            <a:fillRect/>
+          </a:stretch>
+        </p:blipFill>
+        <p:spPr bwMode="auto">
+          <a:xfrm>
+            <a:off x="3247740" y="1828800"/>
+            <a:ext cx="5599757" cy="4109800"/>
+          </a:xfrm>
+          <a:prstGeom prst="rect">
+            <a:avLst/>
+          </a:prstGeom>
+          <a:noFill/>
+          <a:extLst>
+            <a:ext uri="{909E8E84-426E-40DD-AFC4-6F175D3DCCD1}">
+              <a14:hiddenFill xmlns:a14="http://schemas.microsoft.com/office/drawing/2010/main">
+                <a:solidFill>
+                  <a:srgbClr val="FFFFFF"/>
+                </a:solidFill>
+              </a14:hiddenFill>
+            </a:ext>
+          </a:extLst>
+        </p:spPr>
+      </p:pic>
       <p:sp>
         <p:nvSpPr>
           <p:cNvPr id="4" name="Title 1"/>
@@ -7158,13 +7298,262 @@
       </p:sp>
       <p:sp>
         <p:nvSpPr>
+          <p:cNvPr id="6" name="Rounded Rectangle 5"/>
+          <p:cNvSpPr/>
+          <p:nvPr/>
+        </p:nvSpPr>
+        <p:spPr>
+          <a:xfrm>
+            <a:off x="797985" y="4535428"/>
+            <a:ext cx="1915593" cy="914400"/>
+          </a:xfrm>
+          <a:prstGeom prst="roundRect">
+            <a:avLst/>
+          </a:prstGeom>
+        </p:spPr>
+        <p:style>
+          <a:lnRef idx="1">
+            <a:schemeClr val="accent1"/>
+          </a:lnRef>
+          <a:fillRef idx="3">
+            <a:schemeClr val="accent1"/>
+          </a:fillRef>
+          <a:effectRef idx="2">
+            <a:schemeClr val="accent1"/>
+          </a:effectRef>
+          <a:fontRef idx="minor">
+            <a:schemeClr val="lt1"/>
+          </a:fontRef>
+        </p:style>
+        <p:txBody>
+          <a:bodyPr rtlCol="0" anchor="ctr"/>
+          <a:lstStyle/>
+          <a:p>
+            <a:pPr algn="ctr"/>
+            <a:r>
+              <a:rPr lang="en-US" dirty="0" err="1" smtClean="0"/>
+              <a:t>Pontos</a:t>
+            </a:r>
+            <a:endParaRPr lang="pt-BR" dirty="0"/>
+          </a:p>
+        </p:txBody>
+      </p:sp>
+      <p:sp>
+        <p:nvSpPr>
+          <p:cNvPr id="7" name="Rounded Rectangle 6"/>
+          <p:cNvSpPr/>
+          <p:nvPr/>
+        </p:nvSpPr>
+        <p:spPr>
+          <a:xfrm>
+            <a:off x="3695516" y="4535428"/>
+            <a:ext cx="1915593" cy="914400"/>
+          </a:xfrm>
+          <a:prstGeom prst="roundRect">
+            <a:avLst/>
+          </a:prstGeom>
+        </p:spPr>
+        <p:style>
+          <a:lnRef idx="1">
+            <a:schemeClr val="accent1"/>
+          </a:lnRef>
+          <a:fillRef idx="3">
+            <a:schemeClr val="accent1"/>
+          </a:fillRef>
+          <a:effectRef idx="2">
+            <a:schemeClr val="accent1"/>
+          </a:effectRef>
+          <a:fontRef idx="minor">
+            <a:schemeClr val="lt1"/>
+          </a:fontRef>
+        </p:style>
+        <p:txBody>
+          <a:bodyPr rtlCol="0" anchor="ctr"/>
+          <a:lstStyle/>
+          <a:p>
+            <a:pPr algn="ctr"/>
+            <a:r>
+              <a:rPr lang="pt-BR" dirty="0" smtClean="0"/>
+              <a:t>Silhuetas</a:t>
+            </a:r>
+            <a:endParaRPr lang="pt-BR" dirty="0"/>
+          </a:p>
+        </p:txBody>
+      </p:sp>
+      <p:sp>
+        <p:nvSpPr>
+          <p:cNvPr id="8" name="Rounded Rectangle 7"/>
+          <p:cNvSpPr/>
+          <p:nvPr/>
+        </p:nvSpPr>
+        <p:spPr>
+          <a:xfrm>
+            <a:off x="6768064" y="4535428"/>
+            <a:ext cx="1915593" cy="914400"/>
+          </a:xfrm>
+          <a:prstGeom prst="roundRect">
+            <a:avLst/>
+          </a:prstGeom>
+        </p:spPr>
+        <p:style>
+          <a:lnRef idx="1">
+            <a:schemeClr val="accent1"/>
+          </a:lnRef>
+          <a:fillRef idx="3">
+            <a:schemeClr val="accent1"/>
+          </a:fillRef>
+          <a:effectRef idx="2">
+            <a:schemeClr val="accent1"/>
+          </a:effectRef>
+          <a:fontRef idx="minor">
+            <a:schemeClr val="lt1"/>
+          </a:fontRef>
+        </p:style>
+        <p:txBody>
+          <a:bodyPr rtlCol="0" anchor="ctr"/>
+          <a:lstStyle/>
+          <a:p>
+            <a:pPr algn="ctr"/>
+            <a:r>
+              <a:rPr lang="en-US" dirty="0" err="1"/>
+              <a:t>Núcleo</a:t>
+            </a:r>
+            <a:endParaRPr lang="pt-BR" dirty="0"/>
+          </a:p>
+        </p:txBody>
+      </p:sp>
+      <p:sp>
+        <p:nvSpPr>
+          <p:cNvPr id="9" name="Right Arrow 8"/>
+          <p:cNvSpPr/>
+          <p:nvPr/>
+        </p:nvSpPr>
+        <p:spPr>
+          <a:xfrm rot="8550772">
+            <a:off x="2203452" y="3800881"/>
+            <a:ext cx="1585223" cy="231767"/>
+          </a:xfrm>
+          <a:prstGeom prst="rightArrow">
+            <a:avLst>
+              <a:gd name="adj1" fmla="val 50001"/>
+              <a:gd name="adj2" fmla="val 97998"/>
+            </a:avLst>
+          </a:prstGeom>
+        </p:spPr>
+        <p:style>
+          <a:lnRef idx="1">
+            <a:schemeClr val="accent1"/>
+          </a:lnRef>
+          <a:fillRef idx="3">
+            <a:schemeClr val="accent1"/>
+          </a:fillRef>
+          <a:effectRef idx="2">
+            <a:schemeClr val="accent1"/>
+          </a:effectRef>
+          <a:fontRef idx="minor">
+            <a:schemeClr val="lt1"/>
+          </a:fontRef>
+        </p:style>
+        <p:txBody>
+          <a:bodyPr rtlCol="0" anchor="ctr"/>
+          <a:lstStyle/>
+          <a:p>
+            <a:pPr algn="ctr"/>
+            <a:endParaRPr lang="pt-BR"/>
+          </a:p>
+        </p:txBody>
+      </p:sp>
+      <p:sp>
+        <p:nvSpPr>
+          <p:cNvPr id="10" name="Right Arrow 9"/>
+          <p:cNvSpPr/>
+          <p:nvPr/>
+        </p:nvSpPr>
+        <p:spPr>
+          <a:xfrm rot="2616808">
+            <a:off x="5472292" y="3857197"/>
+            <a:ext cx="1585223" cy="231767"/>
+          </a:xfrm>
+          <a:prstGeom prst="rightArrow">
+            <a:avLst>
+              <a:gd name="adj1" fmla="val 50001"/>
+              <a:gd name="adj2" fmla="val 97998"/>
+            </a:avLst>
+          </a:prstGeom>
+        </p:spPr>
+        <p:style>
+          <a:lnRef idx="1">
+            <a:schemeClr val="accent1"/>
+          </a:lnRef>
+          <a:fillRef idx="3">
+            <a:schemeClr val="accent1"/>
+          </a:fillRef>
+          <a:effectRef idx="2">
+            <a:schemeClr val="accent1"/>
+          </a:effectRef>
+          <a:fontRef idx="minor">
+            <a:schemeClr val="lt1"/>
+          </a:fontRef>
+        </p:style>
+        <p:txBody>
+          <a:bodyPr rtlCol="0" anchor="ctr"/>
+          <a:lstStyle/>
+          <a:p>
+            <a:pPr algn="ctr"/>
+            <a:endParaRPr lang="pt-BR"/>
+          </a:p>
+        </p:txBody>
+      </p:sp>
+      <p:sp>
+        <p:nvSpPr>
+          <p:cNvPr id="11" name="Right Arrow 10"/>
+          <p:cNvSpPr/>
+          <p:nvPr/>
+        </p:nvSpPr>
+        <p:spPr>
+          <a:xfrm rot="5400000">
+            <a:off x="4148206" y="3867476"/>
+            <a:ext cx="1015455" cy="231767"/>
+          </a:xfrm>
+          <a:prstGeom prst="rightArrow">
+            <a:avLst>
+              <a:gd name="adj1" fmla="val 50001"/>
+              <a:gd name="adj2" fmla="val 97998"/>
+            </a:avLst>
+          </a:prstGeom>
+        </p:spPr>
+        <p:style>
+          <a:lnRef idx="1">
+            <a:schemeClr val="accent1"/>
+          </a:lnRef>
+          <a:fillRef idx="3">
+            <a:schemeClr val="accent1"/>
+          </a:fillRef>
+          <a:effectRef idx="2">
+            <a:schemeClr val="accent1"/>
+          </a:effectRef>
+          <a:fontRef idx="minor">
+            <a:schemeClr val="lt1"/>
+          </a:fontRef>
+        </p:style>
+        <p:txBody>
+          <a:bodyPr rtlCol="0" anchor="ctr"/>
+          <a:lstStyle/>
+          <a:p>
+            <a:pPr algn="ctr"/>
+            <a:endParaRPr lang="pt-BR"/>
+          </a:p>
+        </p:txBody>
+      </p:sp>
+      <p:sp>
+        <p:nvSpPr>
           <p:cNvPr id="5" name="Rounded Rectangle 4"/>
           <p:cNvSpPr/>
           <p:nvPr/>
         </p:nvSpPr>
         <p:spPr>
           <a:xfrm>
-            <a:off x="3606149" y="2252780"/>
+            <a:off x="3695517" y="2428043"/>
             <a:ext cx="2039469" cy="914400"/>
           </a:xfrm>
           <a:prstGeom prst="roundRect">
@@ -7195,255 +7584,6 @@
               <a:t>Rastreamento</a:t>
             </a:r>
             <a:endParaRPr lang="pt-BR" b="1" dirty="0"/>
-          </a:p>
-        </p:txBody>
-      </p:sp>
-      <p:sp>
-        <p:nvSpPr>
-          <p:cNvPr id="6" name="Rounded Rectangle 5"/>
-          <p:cNvSpPr/>
-          <p:nvPr/>
-        </p:nvSpPr>
-        <p:spPr>
-          <a:xfrm>
-            <a:off x="708617" y="4360165"/>
-            <a:ext cx="1915593" cy="914400"/>
-          </a:xfrm>
-          <a:prstGeom prst="roundRect">
-            <a:avLst/>
-          </a:prstGeom>
-        </p:spPr>
-        <p:style>
-          <a:lnRef idx="1">
-            <a:schemeClr val="accent1"/>
-          </a:lnRef>
-          <a:fillRef idx="3">
-            <a:schemeClr val="accent1"/>
-          </a:fillRef>
-          <a:effectRef idx="2">
-            <a:schemeClr val="accent1"/>
-          </a:effectRef>
-          <a:fontRef idx="minor">
-            <a:schemeClr val="lt1"/>
-          </a:fontRef>
-        </p:style>
-        <p:txBody>
-          <a:bodyPr rtlCol="0" anchor="ctr"/>
-          <a:lstStyle/>
-          <a:p>
-            <a:pPr algn="ctr"/>
-            <a:r>
-              <a:rPr lang="en-US" dirty="0" err="1" smtClean="0"/>
-              <a:t>Pontos</a:t>
-            </a:r>
-            <a:endParaRPr lang="pt-BR" dirty="0"/>
-          </a:p>
-        </p:txBody>
-      </p:sp>
-      <p:sp>
-        <p:nvSpPr>
-          <p:cNvPr id="7" name="Rounded Rectangle 6"/>
-          <p:cNvSpPr/>
-          <p:nvPr/>
-        </p:nvSpPr>
-        <p:spPr>
-          <a:xfrm>
-            <a:off x="3606148" y="4360165"/>
-            <a:ext cx="1915593" cy="914400"/>
-          </a:xfrm>
-          <a:prstGeom prst="roundRect">
-            <a:avLst/>
-          </a:prstGeom>
-        </p:spPr>
-        <p:style>
-          <a:lnRef idx="1">
-            <a:schemeClr val="accent1"/>
-          </a:lnRef>
-          <a:fillRef idx="3">
-            <a:schemeClr val="accent1"/>
-          </a:fillRef>
-          <a:effectRef idx="2">
-            <a:schemeClr val="accent1"/>
-          </a:effectRef>
-          <a:fontRef idx="minor">
-            <a:schemeClr val="lt1"/>
-          </a:fontRef>
-        </p:style>
-        <p:txBody>
-          <a:bodyPr rtlCol="0" anchor="ctr"/>
-          <a:lstStyle/>
-          <a:p>
-            <a:pPr algn="ctr"/>
-            <a:r>
-              <a:rPr lang="pt-BR" dirty="0" smtClean="0"/>
-              <a:t>Silhuetas</a:t>
-            </a:r>
-            <a:endParaRPr lang="pt-BR" dirty="0"/>
-          </a:p>
-        </p:txBody>
-      </p:sp>
-      <p:sp>
-        <p:nvSpPr>
-          <p:cNvPr id="8" name="Rounded Rectangle 7"/>
-          <p:cNvSpPr/>
-          <p:nvPr/>
-        </p:nvSpPr>
-        <p:spPr>
-          <a:xfrm>
-            <a:off x="6678696" y="4360165"/>
-            <a:ext cx="1915593" cy="914400"/>
-          </a:xfrm>
-          <a:prstGeom prst="roundRect">
-            <a:avLst/>
-          </a:prstGeom>
-        </p:spPr>
-        <p:style>
-          <a:lnRef idx="1">
-            <a:schemeClr val="accent1"/>
-          </a:lnRef>
-          <a:fillRef idx="3">
-            <a:schemeClr val="accent1"/>
-          </a:fillRef>
-          <a:effectRef idx="2">
-            <a:schemeClr val="accent1"/>
-          </a:effectRef>
-          <a:fontRef idx="minor">
-            <a:schemeClr val="lt1"/>
-          </a:fontRef>
-        </p:style>
-        <p:txBody>
-          <a:bodyPr rtlCol="0" anchor="ctr"/>
-          <a:lstStyle/>
-          <a:p>
-            <a:pPr algn="ctr"/>
-            <a:r>
-              <a:rPr lang="en-US" dirty="0" err="1"/>
-              <a:t>Núcleo</a:t>
-            </a:r>
-            <a:endParaRPr lang="pt-BR" dirty="0"/>
-          </a:p>
-        </p:txBody>
-      </p:sp>
-      <p:sp>
-        <p:nvSpPr>
-          <p:cNvPr id="9" name="Right Arrow 8"/>
-          <p:cNvSpPr/>
-          <p:nvPr/>
-        </p:nvSpPr>
-        <p:spPr>
-          <a:xfrm rot="8550772">
-            <a:off x="2114084" y="3625618"/>
-            <a:ext cx="1585223" cy="231767"/>
-          </a:xfrm>
-          <a:prstGeom prst="rightArrow">
-            <a:avLst>
-              <a:gd name="adj1" fmla="val 50001"/>
-              <a:gd name="adj2" fmla="val 97998"/>
-            </a:avLst>
-          </a:prstGeom>
-        </p:spPr>
-        <p:style>
-          <a:lnRef idx="1">
-            <a:schemeClr val="accent1"/>
-          </a:lnRef>
-          <a:fillRef idx="3">
-            <a:schemeClr val="accent1"/>
-          </a:fillRef>
-          <a:effectRef idx="2">
-            <a:schemeClr val="accent1"/>
-          </a:effectRef>
-          <a:fontRef idx="minor">
-            <a:schemeClr val="lt1"/>
-          </a:fontRef>
-        </p:style>
-        <p:txBody>
-          <a:bodyPr rtlCol="0" anchor="ctr"/>
-          <a:lstStyle/>
-          <a:p>
-            <a:pPr algn="ctr"/>
-            <a:endParaRPr lang="pt-BR"/>
-          </a:p>
-        </p:txBody>
-      </p:sp>
-      <p:sp>
-        <p:nvSpPr>
-          <p:cNvPr id="10" name="Right Arrow 9"/>
-          <p:cNvSpPr/>
-          <p:nvPr/>
-        </p:nvSpPr>
-        <p:spPr>
-          <a:xfrm rot="2616808">
-            <a:off x="5382924" y="3681934"/>
-            <a:ext cx="1585223" cy="231767"/>
-          </a:xfrm>
-          <a:prstGeom prst="rightArrow">
-            <a:avLst>
-              <a:gd name="adj1" fmla="val 50001"/>
-              <a:gd name="adj2" fmla="val 97998"/>
-            </a:avLst>
-          </a:prstGeom>
-        </p:spPr>
-        <p:style>
-          <a:lnRef idx="1">
-            <a:schemeClr val="accent1"/>
-          </a:lnRef>
-          <a:fillRef idx="3">
-            <a:schemeClr val="accent1"/>
-          </a:fillRef>
-          <a:effectRef idx="2">
-            <a:schemeClr val="accent1"/>
-          </a:effectRef>
-          <a:fontRef idx="minor">
-            <a:schemeClr val="lt1"/>
-          </a:fontRef>
-        </p:style>
-        <p:txBody>
-          <a:bodyPr rtlCol="0" anchor="ctr"/>
-          <a:lstStyle/>
-          <a:p>
-            <a:pPr algn="ctr"/>
-            <a:endParaRPr lang="pt-BR"/>
-          </a:p>
-        </p:txBody>
-      </p:sp>
-      <p:sp>
-        <p:nvSpPr>
-          <p:cNvPr id="11" name="Right Arrow 10"/>
-          <p:cNvSpPr/>
-          <p:nvPr/>
-        </p:nvSpPr>
-        <p:spPr>
-          <a:xfrm rot="5400000">
-            <a:off x="4058838" y="3692213"/>
-            <a:ext cx="1015455" cy="231767"/>
-          </a:xfrm>
-          <a:prstGeom prst="rightArrow">
-            <a:avLst>
-              <a:gd name="adj1" fmla="val 50001"/>
-              <a:gd name="adj2" fmla="val 97998"/>
-            </a:avLst>
-          </a:prstGeom>
-        </p:spPr>
-        <p:style>
-          <a:lnRef idx="1">
-            <a:schemeClr val="accent1"/>
-          </a:lnRef>
-          <a:fillRef idx="3">
-            <a:schemeClr val="accent1"/>
-          </a:fillRef>
-          <a:effectRef idx="2">
-            <a:schemeClr val="accent1"/>
-          </a:effectRef>
-          <a:fontRef idx="minor">
-            <a:schemeClr val="lt1"/>
-          </a:fontRef>
-        </p:style>
-        <p:txBody>
-          <a:bodyPr rtlCol="0" anchor="ctr"/>
-          <a:lstStyle/>
-          <a:p>
-            <a:pPr algn="ctr"/>
-            <a:endParaRPr lang="pt-BR"/>
           </a:p>
         </p:txBody>
       </p:sp>
@@ -7478,65 +7618,14 @@
                             </p:stCondLst>
                             <p:childTnLst>
                               <p:par>
-                                <p:cTn id="5" presetID="1" presetClass="emph" presetSubtype="2" fill="hold" nodeType="clickEffect">
-                                  <p:stCondLst>
-                                    <p:cond delay="0"/>
-                                  </p:stCondLst>
-                                  <p:childTnLst>
-                                    <p:animClr clrSpc="rgb" dir="cw">
-                                      <p:cBhvr>
-                                        <p:cTn id="6" dur="2000" fill="hold"/>
-                                        <p:tgtEl>
-                                          <p:spTgt spid="7"/>
-                                        </p:tgtEl>
-                                        <p:attrNameLst>
-                                          <p:attrName>fillcolor</p:attrName>
-                                        </p:attrNameLst>
-                                      </p:cBhvr>
-                                      <p:to>
-                                        <a:schemeClr val="accent2"/>
-                                      </p:to>
-                                    </p:animClr>
-                                    <p:set>
-                                      <p:cBhvr>
-                                        <p:cTn id="7" dur="2000" fill="hold"/>
-                                        <p:tgtEl>
-                                          <p:spTgt spid="7"/>
-                                        </p:tgtEl>
-                                        <p:attrNameLst>
-                                          <p:attrName>fill.type</p:attrName>
-                                        </p:attrNameLst>
-                                      </p:cBhvr>
-                                      <p:to>
-                                        <p:strVal val="solid"/>
-                                      </p:to>
-                                    </p:set>
-                                    <p:set>
-                                      <p:cBhvr>
-                                        <p:cTn id="8" dur="2000" fill="hold"/>
-                                        <p:tgtEl>
-                                          <p:spTgt spid="7"/>
-                                        </p:tgtEl>
-                                        <p:attrNameLst>
-                                          <p:attrName>fill.on</p:attrName>
-                                        </p:attrNameLst>
-                                      </p:cBhvr>
-                                      <p:to>
-                                        <p:strVal val="true"/>
-                                      </p:to>
-                                    </p:set>
-                                  </p:childTnLst>
-                                </p:cTn>
-                              </p:par>
-                              <p:par>
-                                <p:cTn id="9" presetID="9" presetClass="exit" presetSubtype="0" fill="hold" grpId="0" nodeType="withEffect">
+                                <p:cTn id="5" presetID="9" presetClass="exit" presetSubtype="0" fill="hold" grpId="0" nodeType="clickEffect">
                                   <p:stCondLst>
                                     <p:cond delay="0"/>
                                   </p:stCondLst>
                                   <p:childTnLst>
                                     <p:animEffect transition="out" filter="dissolve">
                                       <p:cBhvr>
-                                        <p:cTn id="10" dur="500"/>
+                                        <p:cTn id="6" dur="500"/>
                                         <p:tgtEl>
                                           <p:spTgt spid="9"/>
                                         </p:tgtEl>
@@ -7544,7 +7633,7 @@
                                     </p:animEffect>
                                     <p:set>
                                       <p:cBhvr>
-                                        <p:cTn id="11" dur="1" fill="hold">
+                                        <p:cTn id="7" dur="1" fill="hold">
                                           <p:stCondLst>
                                             <p:cond delay="499"/>
                                           </p:stCondLst>
@@ -7564,14 +7653,14 @@
                                 </p:cTn>
                               </p:par>
                               <p:par>
-                                <p:cTn id="12" presetID="9" presetClass="exit" presetSubtype="0" fill="hold" grpId="0" nodeType="withEffect">
+                                <p:cTn id="8" presetID="9" presetClass="exit" presetSubtype="0" fill="hold" grpId="0" nodeType="withEffect">
                                   <p:stCondLst>
                                     <p:cond delay="0"/>
                                   </p:stCondLst>
                                   <p:childTnLst>
                                     <p:animEffect transition="out" filter="dissolve">
                                       <p:cBhvr>
-                                        <p:cTn id="13" dur="500"/>
+                                        <p:cTn id="9" dur="500"/>
                                         <p:tgtEl>
                                           <p:spTgt spid="6"/>
                                         </p:tgtEl>
@@ -7579,7 +7668,7 @@
                                     </p:animEffect>
                                     <p:set>
                                       <p:cBhvr>
-                                        <p:cTn id="14" dur="1" fill="hold">
+                                        <p:cTn id="10" dur="1" fill="hold">
                                           <p:stCondLst>
                                             <p:cond delay="499"/>
                                           </p:stCondLst>
@@ -7599,14 +7688,14 @@
                                 </p:cTn>
                               </p:par>
                               <p:par>
-                                <p:cTn id="15" presetID="9" presetClass="exit" presetSubtype="0" fill="hold" grpId="0" nodeType="withEffect">
+                                <p:cTn id="11" presetID="9" presetClass="exit" presetSubtype="0" fill="hold" grpId="0" nodeType="withEffect">
                                   <p:stCondLst>
                                     <p:cond delay="0"/>
                                   </p:stCondLst>
                                   <p:childTnLst>
                                     <p:animEffect transition="out" filter="dissolve">
                                       <p:cBhvr>
-                                        <p:cTn id="16" dur="500"/>
+                                        <p:cTn id="12" dur="500"/>
                                         <p:tgtEl>
                                           <p:spTgt spid="8"/>
                                         </p:tgtEl>
@@ -7614,7 +7703,7 @@
                                     </p:animEffect>
                                     <p:set>
                                       <p:cBhvr>
-                                        <p:cTn id="17" dur="1" fill="hold">
+                                        <p:cTn id="13" dur="1" fill="hold">
                                           <p:stCondLst>
                                             <p:cond delay="499"/>
                                           </p:stCondLst>
@@ -7634,14 +7723,14 @@
                                 </p:cTn>
                               </p:par>
                               <p:par>
-                                <p:cTn id="18" presetID="9" presetClass="exit" presetSubtype="0" fill="hold" grpId="0" nodeType="withEffect">
+                                <p:cTn id="14" presetID="9" presetClass="exit" presetSubtype="0" fill="hold" grpId="0" nodeType="withEffect">
                                   <p:stCondLst>
                                     <p:cond delay="0"/>
                                   </p:stCondLst>
                                   <p:childTnLst>
                                     <p:animEffect transition="out" filter="dissolve">
                                       <p:cBhvr>
-                                        <p:cTn id="19" dur="500"/>
+                                        <p:cTn id="15" dur="500"/>
                                         <p:tgtEl>
                                           <p:spTgt spid="10"/>
                                         </p:tgtEl>
@@ -7649,7 +7738,7 @@
                                     </p:animEffect>
                                     <p:set>
                                       <p:cBhvr>
-                                        <p:cTn id="20" dur="1" fill="hold">
+                                        <p:cTn id="16" dur="1" fill="hold">
                                           <p:stCondLst>
                                             <p:cond delay="499"/>
                                           </p:stCondLst>
@@ -7665,6 +7754,107 @@
                                         <p:strVal val="hidden"/>
                                       </p:to>
                                     </p:set>
+                                  </p:childTnLst>
+                                </p:cTn>
+                              </p:par>
+                              <p:par>
+                                <p:cTn id="17" presetID="57" presetClass="path" presetSubtype="0" accel="50000" decel="50000" fill="hold" grpId="0" nodeType="withEffect">
+                                  <p:stCondLst>
+                                    <p:cond delay="0"/>
+                                  </p:stCondLst>
+                                  <p:childTnLst>
+                                    <p:animMotion origin="layout" path="M -4.16667E-6 7.40741E-7 L -4.16667E-6 0.00301 C -4.16667E-6 0.0044 -0.09375 0.00625 -0.16961 0.00625 L -0.33923 0.00625 " pathEditMode="relative" rAng="0" ptsTypes="FfFF">
+                                      <p:cBhvr>
+                                        <p:cTn id="18" dur="2000" fill="hold"/>
+                                        <p:tgtEl>
+                                          <p:spTgt spid="7"/>
+                                        </p:tgtEl>
+                                        <p:attrNameLst>
+                                          <p:attrName>ppt_x</p:attrName>
+                                          <p:attrName>ppt_y</p:attrName>
+                                        </p:attrNameLst>
+                                      </p:cBhvr>
+                                      <p:rCtr x="-16962" y="301"/>
+                                    </p:animMotion>
+                                  </p:childTnLst>
+                                </p:cTn>
+                              </p:par>
+                              <p:par>
+                                <p:cTn id="19" presetID="57" presetClass="path" presetSubtype="0" accel="50000" decel="50000" fill="hold" grpId="0" nodeType="withEffect">
+                                  <p:stCondLst>
+                                    <p:cond delay="0"/>
+                                  </p:stCondLst>
+                                  <p:childTnLst>
+                                    <p:animMotion origin="layout" path="M 5E-6 -1.85185E-6 L 5E-6 -0.00324 C 5E-6 -0.00463 -0.09549 -0.00625 -0.17327 -0.00625 L -0.34601 -0.00625 " pathEditMode="relative" rAng="0" ptsTypes="FfFF">
+                                      <p:cBhvr>
+                                        <p:cTn id="20" dur="2000" fill="hold"/>
+                                        <p:tgtEl>
+                                          <p:spTgt spid="5"/>
+                                        </p:tgtEl>
+                                        <p:attrNameLst>
+                                          <p:attrName>ppt_x</p:attrName>
+                                          <p:attrName>ppt_y</p:attrName>
+                                        </p:attrNameLst>
+                                      </p:cBhvr>
+                                      <p:rCtr x="-17309" y="-324"/>
+                                    </p:animMotion>
+                                  </p:childTnLst>
+                                </p:cTn>
+                              </p:par>
+                              <p:par>
+                                <p:cTn id="21" presetID="57" presetClass="path" presetSubtype="0" accel="50000" decel="50000" fill="hold" grpId="0" nodeType="withEffect">
+                                  <p:stCondLst>
+                                    <p:cond delay="0"/>
+                                  </p:stCondLst>
+                                  <p:childTnLst>
+                                    <p:animMotion origin="layout" path="M -1.38889E-6 2.96296E-6 L -1.38889E-6 -0.00324 C -1.38889E-6 -0.00463 -0.09375 -0.00625 -0.16979 -0.00625 L -0.33958 -0.00625 " pathEditMode="relative" rAng="0" ptsTypes="FfFF">
+                                      <p:cBhvr>
+                                        <p:cTn id="22" dur="2000" fill="hold"/>
+                                        <p:tgtEl>
+                                          <p:spTgt spid="11"/>
+                                        </p:tgtEl>
+                                        <p:attrNameLst>
+                                          <p:attrName>ppt_x</p:attrName>
+                                          <p:attrName>ppt_y</p:attrName>
+                                        </p:attrNameLst>
+                                      </p:cBhvr>
+                                      <p:rCtr x="-16979" y="-324"/>
+                                    </p:animMotion>
+                                  </p:childTnLst>
+                                </p:cTn>
+                              </p:par>
+                              <p:par>
+                                <p:cTn id="23" presetID="10" presetClass="entr" presetSubtype="0" fill="hold" nodeType="withEffect">
+                                  <p:stCondLst>
+                                    <p:cond delay="1000"/>
+                                  </p:stCondLst>
+                                  <p:childTnLst>
+                                    <p:set>
+                                      <p:cBhvr>
+                                        <p:cTn id="24" dur="1" fill="hold">
+                                          <p:stCondLst>
+                                            <p:cond delay="0"/>
+                                          </p:stCondLst>
+                                        </p:cTn>
+                                        <p:tgtEl>
+                                          <p:spTgt spid="5122"/>
+                                        </p:tgtEl>
+                                        <p:attrNameLst>
+                                          <p:attrName>style.visibility</p:attrName>
+                                        </p:attrNameLst>
+                                      </p:cBhvr>
+                                      <p:to>
+                                        <p:strVal val="visible"/>
+                                      </p:to>
+                                    </p:set>
+                                    <p:animEffect transition="in" filter="fade">
+                                      <p:cBhvr>
+                                        <p:cTn id="25" dur="2000"/>
+                                        <p:tgtEl>
+                                          <p:spTgt spid="5122"/>
+                                        </p:tgtEl>
+                                      </p:cBhvr>
+                                    </p:animEffect>
                                   </p:childTnLst>
                                 </p:cTn>
                               </p:par>
@@ -7697,9 +7887,12 @@
     </p:tnLst>
     <p:bldLst>
       <p:bldP spid="6" grpId="0" animBg="1"/>
+      <p:bldP spid="7" grpId="0" animBg="1"/>
       <p:bldP spid="8" grpId="0" animBg="1"/>
       <p:bldP spid="9" grpId="0" animBg="1"/>
       <p:bldP spid="10" grpId="0" animBg="1"/>
+      <p:bldP spid="11" grpId="0" animBg="1"/>
+      <p:bldP spid="5" grpId="0" animBg="1"/>
     </p:bldLst>
   </p:timing>
 </p:sld>
@@ -8370,8 +8563,12 @@
           </a:p>
           <a:p>
             <a:r>
+              <a:rPr lang="pt-BR" dirty="0" smtClean="0"/>
+              <a:t>Identificação e </a:t>
+            </a:r>
+            <a:r>
               <a:rPr lang="pt-BR" dirty="0"/>
-              <a:t>Reconhecimento Facial e Rastreamento</a:t>
+              <a:t>Rastreamento</a:t>
             </a:r>
             <a:endParaRPr lang="pt-BR" dirty="0" smtClean="0"/>
           </a:p>
@@ -8695,9 +8892,82 @@
   <p:timing>
     <p:tnLst>
       <p:par>
-        <p:cTn id="1" dur="indefinite" restart="never" nodeType="tmRoot"/>
+        <p:cTn id="1" dur="indefinite" restart="never" nodeType="tmRoot">
+          <p:childTnLst>
+            <p:seq concurrent="1" nextAc="seek">
+              <p:cTn id="2" dur="indefinite" nodeType="mainSeq">
+                <p:childTnLst>
+                  <p:par>
+                    <p:cTn id="3" fill="hold">
+                      <p:stCondLst>
+                        <p:cond delay="indefinite"/>
+                        <p:cond evt="onBegin" delay="0">
+                          <p:tn val="2"/>
+                        </p:cond>
+                      </p:stCondLst>
+                      <p:childTnLst>
+                        <p:par>
+                          <p:cTn id="4" fill="hold">
+                            <p:stCondLst>
+                              <p:cond delay="0"/>
+                            </p:stCondLst>
+                            <p:childTnLst>
+                              <p:par>
+                                <p:cTn id="5" presetID="26" presetClass="emph" presetSubtype="0" fill="hold" grpId="0" nodeType="withEffect">
+                                  <p:stCondLst>
+                                    <p:cond delay="0"/>
+                                  </p:stCondLst>
+                                  <p:childTnLst>
+                                    <p:animEffect transition="out" filter="fade">
+                                      <p:cBhvr>
+                                        <p:cTn id="6" dur="1000" tmFilter="0, 0; .2, .5; .8, .5; 1, 0"/>
+                                        <p:tgtEl>
+                                          <p:spTgt spid="7"/>
+                                        </p:tgtEl>
+                                      </p:cBhvr>
+                                    </p:animEffect>
+                                    <p:animScale>
+                                      <p:cBhvr>
+                                        <p:cTn id="7" dur="500" autoRev="1" fill="hold"/>
+                                        <p:tgtEl>
+                                          <p:spTgt spid="7"/>
+                                        </p:tgtEl>
+                                      </p:cBhvr>
+                                      <p:by x="105000" y="105000"/>
+                                    </p:animScale>
+                                  </p:childTnLst>
+                                </p:cTn>
+                              </p:par>
+                            </p:childTnLst>
+                          </p:cTn>
+                        </p:par>
+                      </p:childTnLst>
+                    </p:cTn>
+                  </p:par>
+                </p:childTnLst>
+              </p:cTn>
+              <p:prevCondLst>
+                <p:cond evt="onPrev" delay="0">
+                  <p:tgtEl>
+                    <p:sldTgt/>
+                  </p:tgtEl>
+                </p:cond>
+              </p:prevCondLst>
+              <p:nextCondLst>
+                <p:cond evt="onNext" delay="0">
+                  <p:tgtEl>
+                    <p:sldTgt/>
+                  </p:tgtEl>
+                </p:cond>
+              </p:nextCondLst>
+            </p:seq>
+          </p:childTnLst>
+        </p:cTn>
       </p:par>
     </p:tnLst>
+    <p:bldLst>
+      <p:bldP spid="7" grpId="0" animBg="1"/>
+    </p:bldLst>
   </p:timing>
 </p:sld>
 </file>
@@ -8845,9 +9115,82 @@
   <p:timing>
     <p:tnLst>
       <p:par>
-        <p:cTn id="1" dur="indefinite" restart="never" nodeType="tmRoot"/>
+        <p:cTn id="1" dur="indefinite" restart="never" nodeType="tmRoot">
+          <p:childTnLst>
+            <p:seq concurrent="1" nextAc="seek">
+              <p:cTn id="2" dur="indefinite" nodeType="mainSeq">
+                <p:childTnLst>
+                  <p:par>
+                    <p:cTn id="3" fill="hold">
+                      <p:stCondLst>
+                        <p:cond delay="indefinite"/>
+                        <p:cond evt="onBegin" delay="0">
+                          <p:tn val="2"/>
+                        </p:cond>
+                      </p:stCondLst>
+                      <p:childTnLst>
+                        <p:par>
+                          <p:cTn id="4" fill="hold">
+                            <p:stCondLst>
+                              <p:cond delay="0"/>
+                            </p:stCondLst>
+                            <p:childTnLst>
+                              <p:par>
+                                <p:cTn id="5" presetID="26" presetClass="emph" presetSubtype="0" fill="hold" grpId="0" nodeType="afterEffect">
+                                  <p:stCondLst>
+                                    <p:cond delay="0"/>
+                                  </p:stCondLst>
+                                  <p:childTnLst>
+                                    <p:animEffect transition="out" filter="fade">
+                                      <p:cBhvr>
+                                        <p:cTn id="6" dur="1000" tmFilter="0, 0; .2, .5; .8, .5; 1, 0"/>
+                                        <p:tgtEl>
+                                          <p:spTgt spid="6"/>
+                                        </p:tgtEl>
+                                      </p:cBhvr>
+                                    </p:animEffect>
+                                    <p:animScale>
+                                      <p:cBhvr>
+                                        <p:cTn id="7" dur="500" autoRev="1" fill="hold"/>
+                                        <p:tgtEl>
+                                          <p:spTgt spid="6"/>
+                                        </p:tgtEl>
+                                      </p:cBhvr>
+                                      <p:by x="105000" y="105000"/>
+                                    </p:animScale>
+                                  </p:childTnLst>
+                                </p:cTn>
+                              </p:par>
+                            </p:childTnLst>
+                          </p:cTn>
+                        </p:par>
+                      </p:childTnLst>
+                    </p:cTn>
+                  </p:par>
+                </p:childTnLst>
+              </p:cTn>
+              <p:prevCondLst>
+                <p:cond evt="onPrev" delay="0">
+                  <p:tgtEl>
+                    <p:sldTgt/>
+                  </p:tgtEl>
+                </p:cond>
+              </p:prevCondLst>
+              <p:nextCondLst>
+                <p:cond evt="onNext" delay="0">
+                  <p:tgtEl>
+                    <p:sldTgt/>
+                  </p:tgtEl>
+                </p:cond>
+              </p:nextCondLst>
+            </p:seq>
+          </p:childTnLst>
+        </p:cTn>
       </p:par>
     </p:tnLst>
+    <p:bldLst>
+      <p:bldP spid="6" grpId="0" animBg="1"/>
+    </p:bldLst>
   </p:timing>
 </p:sld>
 </file>
@@ -9233,9 +9576,82 @@
   <p:timing>
     <p:tnLst>
       <p:par>
-        <p:cTn id="1" dur="indefinite" restart="never" nodeType="tmRoot"/>
+        <p:cTn id="1" dur="indefinite" restart="never" nodeType="tmRoot">
+          <p:childTnLst>
+            <p:seq concurrent="1" nextAc="seek">
+              <p:cTn id="2" dur="indefinite" nodeType="mainSeq">
+                <p:childTnLst>
+                  <p:par>
+                    <p:cTn id="3" fill="hold">
+                      <p:stCondLst>
+                        <p:cond delay="indefinite"/>
+                        <p:cond evt="onBegin" delay="0">
+                          <p:tn val="2"/>
+                        </p:cond>
+                      </p:stCondLst>
+                      <p:childTnLst>
+                        <p:par>
+                          <p:cTn id="4" fill="hold">
+                            <p:stCondLst>
+                              <p:cond delay="0"/>
+                            </p:stCondLst>
+                            <p:childTnLst>
+                              <p:par>
+                                <p:cTn id="5" presetID="26" presetClass="emph" presetSubtype="0" fill="hold" grpId="0" nodeType="withEffect">
+                                  <p:stCondLst>
+                                    <p:cond delay="0"/>
+                                  </p:stCondLst>
+                                  <p:childTnLst>
+                                    <p:animEffect transition="out" filter="fade">
+                                      <p:cBhvr>
+                                        <p:cTn id="6" dur="1000" tmFilter="0, 0; .2, .5; .8, .5; 1, 0"/>
+                                        <p:tgtEl>
+                                          <p:spTgt spid="6"/>
+                                        </p:tgtEl>
+                                      </p:cBhvr>
+                                    </p:animEffect>
+                                    <p:animScale>
+                                      <p:cBhvr>
+                                        <p:cTn id="7" dur="500" autoRev="1" fill="hold"/>
+                                        <p:tgtEl>
+                                          <p:spTgt spid="6"/>
+                                        </p:tgtEl>
+                                      </p:cBhvr>
+                                      <p:by x="105000" y="105000"/>
+                                    </p:animScale>
+                                  </p:childTnLst>
+                                </p:cTn>
+                              </p:par>
+                            </p:childTnLst>
+                          </p:cTn>
+                        </p:par>
+                      </p:childTnLst>
+                    </p:cTn>
+                  </p:par>
+                </p:childTnLst>
+              </p:cTn>
+              <p:prevCondLst>
+                <p:cond evt="onPrev" delay="0">
+                  <p:tgtEl>
+                    <p:sldTgt/>
+                  </p:tgtEl>
+                </p:cond>
+              </p:prevCondLst>
+              <p:nextCondLst>
+                <p:cond evt="onNext" delay="0">
+                  <p:tgtEl>
+                    <p:sldTgt/>
+                  </p:tgtEl>
+                </p:cond>
+              </p:nextCondLst>
+            </p:seq>
+          </p:childTnLst>
+        </p:cTn>
       </p:par>
     </p:tnLst>
+    <p:bldLst>
+      <p:bldP spid="6" grpId="0" animBg="1"/>
+    </p:bldLst>
   </p:timing>
 </p:sld>
 </file>
@@ -10245,6 +10661,156 @@
   <p:timing>
     <p:tnLst>
       <p:par>
+        <p:cTn id="1" dur="indefinite" restart="never" nodeType="tmRoot"/>
+      </p:par>
+    </p:tnLst>
+  </p:timing>
+</p:sld>
+</file>
+
+<file path=ppt/slides/slide28.xml><?xml version="1.0" encoding="utf-8"?>
+<p:sld xmlns:a="http://schemas.openxmlformats.org/drawingml/2006/main" xmlns:r="http://schemas.openxmlformats.org/officeDocument/2006/relationships" xmlns:p="http://schemas.openxmlformats.org/presentationml/2006/main">
+  <p:cSld>
+    <p:spTree>
+      <p:nvGrpSpPr>
+        <p:cNvPr id="1" name=""/>
+        <p:cNvGrpSpPr/>
+        <p:nvPr/>
+      </p:nvGrpSpPr>
+      <p:grpSpPr>
+        <a:xfrm>
+          <a:off x="0" y="0"/>
+          <a:ext cx="0" cy="0"/>
+          <a:chOff x="0" y="0"/>
+          <a:chExt cx="0" cy="0"/>
+        </a:xfrm>
+      </p:grpSpPr>
+      <p:sp>
+        <p:nvSpPr>
+          <p:cNvPr id="5" name="Title 1"/>
+          <p:cNvSpPr>
+            <a:spLocks noGrp="1"/>
+          </p:cNvSpPr>
+          <p:nvPr>
+            <p:ph type="title"/>
+          </p:nvPr>
+        </p:nvSpPr>
+        <p:spPr>
+          <a:xfrm>
+            <a:off x="457200" y="698006"/>
+            <a:ext cx="8229600" cy="1066800"/>
+          </a:xfrm>
+        </p:spPr>
+        <p:txBody>
+          <a:bodyPr/>
+          <a:lstStyle/>
+          <a:p>
+            <a:r>
+              <a:rPr lang="x-none" dirty="0" smtClean="0"/>
+              <a:t>TRUE – Módulo de Rastreamento</a:t>
+            </a:r>
+            <a:endParaRPr lang="en-US" dirty="0"/>
+          </a:p>
+        </p:txBody>
+      </p:sp>
+      <p:pic>
+        <p:nvPicPr>
+          <p:cNvPr id="8" name="Picture 2" descr="C:\Users\Tales\Documents\GitHub\Artigo-TRUE-SBCUP\img\modulo-integracao.png"/>
+          <p:cNvPicPr>
+            <a:picLocks noChangeAspect="1" noChangeArrowheads="1"/>
+          </p:cNvPicPr>
+          <p:nvPr/>
+        </p:nvPicPr>
+        <p:blipFill>
+          <a:blip r:embed="rId2" cstate="email">
+            <a:extLst>
+              <a:ext uri="{28A0092B-C50C-407E-A947-70E740481C1C}">
+                <a14:useLocalDpi xmlns:a14="http://schemas.microsoft.com/office/drawing/2010/main" val="0"/>
+              </a:ext>
+            </a:extLst>
+          </a:blip>
+          <a:srcRect/>
+          <a:stretch>
+            <a:fillRect/>
+          </a:stretch>
+        </p:blipFill>
+        <p:spPr bwMode="auto">
+          <a:xfrm>
+            <a:off x="-1" y="2341418"/>
+            <a:ext cx="9144001" cy="3483429"/>
+          </a:xfrm>
+          <a:prstGeom prst="rect">
+            <a:avLst/>
+          </a:prstGeom>
+          <a:noFill/>
+          <a:extLst>
+            <a:ext uri="{909E8E84-426E-40DD-AFC4-6F175D3DCCD1}">
+              <a14:hiddenFill xmlns:a14="http://schemas.microsoft.com/office/drawing/2010/main">
+                <a:solidFill>
+                  <a:srgbClr val="FFFFFF"/>
+                </a:solidFill>
+              </a14:hiddenFill>
+            </a:ext>
+          </a:extLst>
+        </p:spPr>
+      </p:pic>
+      <p:sp>
+        <p:nvSpPr>
+          <p:cNvPr id="7" name="Rounded Rectangle 6"/>
+          <p:cNvSpPr/>
+          <p:nvPr/>
+        </p:nvSpPr>
+        <p:spPr>
+          <a:xfrm>
+            <a:off x="1882485" y="5082540"/>
+            <a:ext cx="1348395" cy="579120"/>
+          </a:xfrm>
+          <a:prstGeom prst="roundRect">
+            <a:avLst/>
+          </a:prstGeom>
+          <a:noFill/>
+          <a:ln>
+            <a:solidFill>
+              <a:srgbClr val="FF0000"/>
+            </a:solidFill>
+          </a:ln>
+        </p:spPr>
+        <p:style>
+          <a:lnRef idx="3">
+            <a:schemeClr val="lt1"/>
+          </a:lnRef>
+          <a:fillRef idx="1">
+            <a:schemeClr val="dk1"/>
+          </a:fillRef>
+          <a:effectRef idx="1">
+            <a:schemeClr val="dk1"/>
+          </a:effectRef>
+          <a:fontRef idx="minor">
+            <a:schemeClr val="lt1"/>
+          </a:fontRef>
+        </p:style>
+        <p:txBody>
+          <a:bodyPr rtlCol="0" anchor="ctr"/>
+          <a:lstStyle/>
+          <a:p>
+            <a:pPr algn="ctr"/>
+            <a:endParaRPr lang="pt-BR"/>
+          </a:p>
+        </p:txBody>
+      </p:sp>
+    </p:spTree>
+    <p:extLst>
+      <p:ext uri="{BB962C8B-B14F-4D97-AF65-F5344CB8AC3E}">
+        <p14:creationId xmlns:p14="http://schemas.microsoft.com/office/powerpoint/2010/main" val="3899986371"/>
+      </p:ext>
+    </p:extLst>
+  </p:cSld>
+  <p:clrMapOvr>
+    <a:masterClrMapping/>
+  </p:clrMapOvr>
+  <p:timing>
+    <p:tnLst>
+      <p:par>
         <p:cTn id="1" dur="indefinite" restart="never" nodeType="tmRoot">
           <p:childTnLst>
             <p:seq concurrent="1" nextAc="seek">
@@ -10254,6 +10820,9 @@
                     <p:cTn id="3" fill="hold">
                       <p:stCondLst>
                         <p:cond delay="indefinite"/>
+                        <p:cond evt="onBegin" delay="0">
+                          <p:tn val="2"/>
+                        </p:cond>
                       </p:stCondLst>
                       <p:childTnLst>
                         <p:par>
@@ -10263,37 +10832,28 @@
                             </p:stCondLst>
                             <p:childTnLst>
                               <p:par>
-                                <p:cTn id="5" presetID="10" presetClass="entr" presetSubtype="0" fill="hold" nodeType="clickEffect">
+                                <p:cTn id="5" presetID="26" presetClass="emph" presetSubtype="0" fill="hold" grpId="0" nodeType="withEffect">
                                   <p:stCondLst>
                                     <p:cond delay="0"/>
                                   </p:stCondLst>
                                   <p:childTnLst>
-                                    <p:set>
+                                    <p:animEffect transition="out" filter="fade">
                                       <p:cBhvr>
-                                        <p:cTn id="6" dur="1" fill="hold">
-                                          <p:stCondLst>
-                                            <p:cond delay="0"/>
-                                          </p:stCondLst>
-                                        </p:cTn>
+                                        <p:cTn id="6" dur="1000" tmFilter="0, 0; .2, .5; .8, .5; 1, 0"/>
                                         <p:tgtEl>
-                                          <p:spTgt spid="5"/>
-                                        </p:tgtEl>
-                                        <p:attrNameLst>
-                                          <p:attrName>style.visibility</p:attrName>
-                                        </p:attrNameLst>
-                                      </p:cBhvr>
-                                      <p:to>
-                                        <p:strVal val="visible"/>
-                                      </p:to>
-                                    </p:set>
-                                    <p:animEffect transition="in" filter="fade">
-                                      <p:cBhvr>
-                                        <p:cTn id="7" dur="500"/>
-                                        <p:tgtEl>
-                                          <p:spTgt spid="5"/>
+                                          <p:spTgt spid="7"/>
                                         </p:tgtEl>
                                       </p:cBhvr>
                                     </p:animEffect>
+                                    <p:animScale>
+                                      <p:cBhvr>
+                                        <p:cTn id="7" dur="500" autoRev="1" fill="hold"/>
+                                        <p:tgtEl>
+                                          <p:spTgt spid="7"/>
+                                        </p:tgtEl>
+                                      </p:cBhvr>
+                                      <p:by x="105000" y="105000"/>
+                                    </p:animScale>
                                   </p:childTnLst>
                                 </p:cTn>
                               </p:par>
@@ -10324,156 +10884,9 @@
         </p:cTn>
       </p:par>
     </p:tnLst>
-  </p:timing>
-</p:sld>
-</file>
-
-<file path=ppt/slides/slide28.xml><?xml version="1.0" encoding="utf-8"?>
-<p:sld xmlns:a="http://schemas.openxmlformats.org/drawingml/2006/main" xmlns:r="http://schemas.openxmlformats.org/officeDocument/2006/relationships" xmlns:p="http://schemas.openxmlformats.org/presentationml/2006/main">
-  <p:cSld>
-    <p:spTree>
-      <p:nvGrpSpPr>
-        <p:cNvPr id="1" name=""/>
-        <p:cNvGrpSpPr/>
-        <p:nvPr/>
-      </p:nvGrpSpPr>
-      <p:grpSpPr>
-        <a:xfrm>
-          <a:off x="0" y="0"/>
-          <a:ext cx="0" cy="0"/>
-          <a:chOff x="0" y="0"/>
-          <a:chExt cx="0" cy="0"/>
-        </a:xfrm>
-      </p:grpSpPr>
-      <p:sp>
-        <p:nvSpPr>
-          <p:cNvPr id="5" name="Title 1"/>
-          <p:cNvSpPr>
-            <a:spLocks noGrp="1"/>
-          </p:cNvSpPr>
-          <p:nvPr>
-            <p:ph type="title"/>
-          </p:nvPr>
-        </p:nvSpPr>
-        <p:spPr>
-          <a:xfrm>
-            <a:off x="457200" y="698006"/>
-            <a:ext cx="8229600" cy="1066800"/>
-          </a:xfrm>
-        </p:spPr>
-        <p:txBody>
-          <a:bodyPr/>
-          <a:lstStyle/>
-          <a:p>
-            <a:r>
-              <a:rPr lang="x-none" dirty="0" smtClean="0"/>
-              <a:t>TRUE – Módulo de Rastreamento</a:t>
-            </a:r>
-            <a:endParaRPr lang="en-US" dirty="0"/>
-          </a:p>
-        </p:txBody>
-      </p:sp>
-      <p:pic>
-        <p:nvPicPr>
-          <p:cNvPr id="8" name="Picture 2" descr="C:\Users\Tales\Documents\GitHub\Artigo-TRUE-SBCUP\img\modulo-integracao.png"/>
-          <p:cNvPicPr>
-            <a:picLocks noChangeAspect="1" noChangeArrowheads="1"/>
-          </p:cNvPicPr>
-          <p:nvPr/>
-        </p:nvPicPr>
-        <p:blipFill>
-          <a:blip r:embed="rId2" cstate="email">
-            <a:extLst>
-              <a:ext uri="{28A0092B-C50C-407E-A947-70E740481C1C}">
-                <a14:useLocalDpi xmlns:a14="http://schemas.microsoft.com/office/drawing/2010/main" val="0"/>
-              </a:ext>
-            </a:extLst>
-          </a:blip>
-          <a:srcRect/>
-          <a:stretch>
-            <a:fillRect/>
-          </a:stretch>
-        </p:blipFill>
-        <p:spPr bwMode="auto">
-          <a:xfrm>
-            <a:off x="-1" y="2341418"/>
-            <a:ext cx="9144001" cy="3483429"/>
-          </a:xfrm>
-          <a:prstGeom prst="rect">
-            <a:avLst/>
-          </a:prstGeom>
-          <a:noFill/>
-          <a:extLst>
-            <a:ext uri="{909E8E84-426E-40DD-AFC4-6F175D3DCCD1}">
-              <a14:hiddenFill xmlns:a14="http://schemas.microsoft.com/office/drawing/2010/main">
-                <a:solidFill>
-                  <a:srgbClr val="FFFFFF"/>
-                </a:solidFill>
-              </a14:hiddenFill>
-            </a:ext>
-          </a:extLst>
-        </p:spPr>
-      </p:pic>
-      <p:sp>
-        <p:nvSpPr>
-          <p:cNvPr id="7" name="Rounded Rectangle 6"/>
-          <p:cNvSpPr/>
-          <p:nvPr/>
-        </p:nvSpPr>
-        <p:spPr>
-          <a:xfrm>
-            <a:off x="1882485" y="5082540"/>
-            <a:ext cx="1348395" cy="579120"/>
-          </a:xfrm>
-          <a:prstGeom prst="roundRect">
-            <a:avLst/>
-          </a:prstGeom>
-          <a:noFill/>
-          <a:ln>
-            <a:solidFill>
-              <a:srgbClr val="FF0000"/>
-            </a:solidFill>
-          </a:ln>
-        </p:spPr>
-        <p:style>
-          <a:lnRef idx="3">
-            <a:schemeClr val="lt1"/>
-          </a:lnRef>
-          <a:fillRef idx="1">
-            <a:schemeClr val="dk1"/>
-          </a:fillRef>
-          <a:effectRef idx="1">
-            <a:schemeClr val="dk1"/>
-          </a:effectRef>
-          <a:fontRef idx="minor">
-            <a:schemeClr val="lt1"/>
-          </a:fontRef>
-        </p:style>
-        <p:txBody>
-          <a:bodyPr rtlCol="0" anchor="ctr"/>
-          <a:lstStyle/>
-          <a:p>
-            <a:pPr algn="ctr"/>
-            <a:endParaRPr lang="pt-BR"/>
-          </a:p>
-        </p:txBody>
-      </p:sp>
-    </p:spTree>
-    <p:extLst>
-      <p:ext uri="{BB962C8B-B14F-4D97-AF65-F5344CB8AC3E}">
-        <p14:creationId xmlns:p14="http://schemas.microsoft.com/office/powerpoint/2010/main" val="3899986371"/>
-      </p:ext>
-    </p:extLst>
-  </p:cSld>
-  <p:clrMapOvr>
-    <a:masterClrMapping/>
-  </p:clrMapOvr>
-  <p:timing>
-    <p:tnLst>
-      <p:par>
-        <p:cTn id="1" dur="indefinite" restart="never" nodeType="tmRoot"/>
-      </p:par>
-    </p:tnLst>
+    <p:bldLst>
+      <p:bldP spid="7" grpId="0" animBg="1"/>
+    </p:bldLst>
   </p:timing>
 </p:sld>
 </file>
@@ -10650,83 +11063,7 @@
   <p:timing>
     <p:tnLst>
       <p:par>
-        <p:cTn id="1" dur="indefinite" restart="never" nodeType="tmRoot">
-          <p:childTnLst>
-            <p:seq concurrent="1" nextAc="seek">
-              <p:cTn id="2" dur="indefinite" nodeType="mainSeq">
-                <p:childTnLst>
-                  <p:par>
-                    <p:cTn id="3" fill="hold">
-                      <p:stCondLst>
-                        <p:cond delay="indefinite"/>
-                      </p:stCondLst>
-                      <p:childTnLst>
-                        <p:par>
-                          <p:cTn id="4" fill="hold">
-                            <p:stCondLst>
-                              <p:cond delay="0"/>
-                            </p:stCondLst>
-                            <p:childTnLst>
-                              <p:par>
-                                <p:cTn id="5" presetID="10" presetClass="entr" presetSubtype="0" fill="hold" nodeType="clickEffect">
-                                  <p:stCondLst>
-                                    <p:cond delay="0"/>
-                                  </p:stCondLst>
-                                  <p:childTnLst>
-                                    <p:set>
-                                      <p:cBhvr>
-                                        <p:cTn id="6" dur="1" fill="hold">
-                                          <p:stCondLst>
-                                            <p:cond delay="0"/>
-                                          </p:stCondLst>
-                                        </p:cTn>
-                                        <p:tgtEl>
-                                          <p:spTgt spid="5"/>
-                                        </p:tgtEl>
-                                        <p:attrNameLst>
-                                          <p:attrName>style.visibility</p:attrName>
-                                        </p:attrNameLst>
-                                      </p:cBhvr>
-                                      <p:to>
-                                        <p:strVal val="visible"/>
-                                      </p:to>
-                                    </p:set>
-                                    <p:animEffect transition="in" filter="fade">
-                                      <p:cBhvr>
-                                        <p:cTn id="7" dur="500"/>
-                                        <p:tgtEl>
-                                          <p:spTgt spid="5"/>
-                                        </p:tgtEl>
-                                      </p:cBhvr>
-                                    </p:animEffect>
-                                  </p:childTnLst>
-                                </p:cTn>
-                              </p:par>
-                            </p:childTnLst>
-                          </p:cTn>
-                        </p:par>
-                      </p:childTnLst>
-                    </p:cTn>
-                  </p:par>
-                </p:childTnLst>
-              </p:cTn>
-              <p:prevCondLst>
-                <p:cond evt="onPrev" delay="0">
-                  <p:tgtEl>
-                    <p:sldTgt/>
-                  </p:tgtEl>
-                </p:cond>
-              </p:prevCondLst>
-              <p:nextCondLst>
-                <p:cond evt="onNext" delay="0">
-                  <p:tgtEl>
-                    <p:sldTgt/>
-                  </p:tgtEl>
-                </p:cond>
-              </p:nextCondLst>
-            </p:seq>
-          </p:childTnLst>
-        </p:cTn>
+        <p:cTn id="1" dur="indefinite" restart="never" nodeType="tmRoot"/>
       </p:par>
     </p:tnLst>
   </p:timing>
@@ -11043,9 +11380,82 @@
   <p:timing>
     <p:tnLst>
       <p:par>
-        <p:cTn id="1" dur="indefinite" restart="never" nodeType="tmRoot"/>
+        <p:cTn id="1" dur="indefinite" restart="never" nodeType="tmRoot">
+          <p:childTnLst>
+            <p:seq concurrent="1" nextAc="seek">
+              <p:cTn id="2" dur="indefinite" nodeType="mainSeq">
+                <p:childTnLst>
+                  <p:par>
+                    <p:cTn id="3" fill="hold">
+                      <p:stCondLst>
+                        <p:cond delay="indefinite"/>
+                        <p:cond evt="onBegin" delay="0">
+                          <p:tn val="2"/>
+                        </p:cond>
+                      </p:stCondLst>
+                      <p:childTnLst>
+                        <p:par>
+                          <p:cTn id="4" fill="hold">
+                            <p:stCondLst>
+                              <p:cond delay="0"/>
+                            </p:stCondLst>
+                            <p:childTnLst>
+                              <p:par>
+                                <p:cTn id="5" presetID="26" presetClass="emph" presetSubtype="0" fill="hold" grpId="0" nodeType="withEffect">
+                                  <p:stCondLst>
+                                    <p:cond delay="0"/>
+                                  </p:stCondLst>
+                                  <p:childTnLst>
+                                    <p:animEffect transition="out" filter="fade">
+                                      <p:cBhvr>
+                                        <p:cTn id="6" dur="1000" tmFilter="0, 0; .2, .5; .8, .5; 1, 0"/>
+                                        <p:tgtEl>
+                                          <p:spTgt spid="6"/>
+                                        </p:tgtEl>
+                                      </p:cBhvr>
+                                    </p:animEffect>
+                                    <p:animScale>
+                                      <p:cBhvr>
+                                        <p:cTn id="7" dur="500" autoRev="1" fill="hold"/>
+                                        <p:tgtEl>
+                                          <p:spTgt spid="6"/>
+                                        </p:tgtEl>
+                                      </p:cBhvr>
+                                      <p:by x="105000" y="105000"/>
+                                    </p:animScale>
+                                  </p:childTnLst>
+                                </p:cTn>
+                              </p:par>
+                            </p:childTnLst>
+                          </p:cTn>
+                        </p:par>
+                      </p:childTnLst>
+                    </p:cTn>
+                  </p:par>
+                </p:childTnLst>
+              </p:cTn>
+              <p:prevCondLst>
+                <p:cond evt="onPrev" delay="0">
+                  <p:tgtEl>
+                    <p:sldTgt/>
+                  </p:tgtEl>
+                </p:cond>
+              </p:prevCondLst>
+              <p:nextCondLst>
+                <p:cond evt="onNext" delay="0">
+                  <p:tgtEl>
+                    <p:sldTgt/>
+                  </p:tgtEl>
+                </p:cond>
+              </p:nextCondLst>
+            </p:seq>
+          </p:childTnLst>
+        </p:cTn>
       </p:par>
     </p:tnLst>
+    <p:bldLst>
+      <p:bldP spid="6" grpId="0" animBg="1"/>
+    </p:bldLst>
   </p:timing>
 </p:sld>
 </file>
@@ -13653,7 +14063,7 @@
               </a14:hiddenLine>
             </a:ext>
             <a:ext uri="{FAA26D3D-D897-4be2-8F04-BA451C77F1D7}">
-              <ma14:placeholderFlag xmlns="" xmlns:ma14="http://schemas.microsoft.com/office/mac/drawingml/2011/main" val="1"/>
+              <ma14:placeholderFlag xmlns:ma14="http://schemas.microsoft.com/office/mac/drawingml/2011/main" xmlns="" val="1"/>
             </a:ext>
           </a:extLst>
         </p:spPr>
@@ -13898,7 +14308,7 @@
               </a14:hiddenLine>
             </a:ext>
             <a:ext uri="{FAA26D3D-D897-4be2-8F04-BA451C77F1D7}">
-              <ma14:placeholderFlag xmlns="" xmlns:ma14="http://schemas.microsoft.com/office/mac/drawingml/2011/main" val="1"/>
+              <ma14:placeholderFlag xmlns:ma14="http://schemas.microsoft.com/office/mac/drawingml/2011/main" xmlns="" val="1"/>
             </a:ext>
           </a:extLst>
         </p:spPr>
@@ -14328,7 +14738,7 @@
               </a14:hiddenLine>
             </a:ext>
             <a:ext uri="{FAA26D3D-D897-4be2-8F04-BA451C77F1D7}">
-              <ma14:placeholderFlag xmlns="" xmlns:ma14="http://schemas.microsoft.com/office/mac/drawingml/2011/main" val="1"/>
+              <ma14:placeholderFlag xmlns:ma14="http://schemas.microsoft.com/office/mac/drawingml/2011/main" xmlns="" val="1"/>
             </a:ext>
           </a:extLst>
         </p:spPr>
@@ -14929,7 +15339,7 @@
               </a14:hiddenLine>
             </a:ext>
             <a:ext uri="{FAA26D3D-D897-4be2-8F04-BA451C77F1D7}">
-              <ma14:placeholderFlag xmlns="" xmlns:ma14="http://schemas.microsoft.com/office/mac/drawingml/2011/main" val="1"/>
+              <ma14:placeholderFlag xmlns:ma14="http://schemas.microsoft.com/office/mac/drawingml/2011/main" xmlns="" val="1"/>
             </a:ext>
           </a:extLst>
         </p:spPr>
@@ -15280,7 +15690,7 @@
               </a14:hiddenLine>
             </a:ext>
             <a:ext uri="{FAA26D3D-D897-4be2-8F04-BA451C77F1D7}">
-              <ma14:placeholderFlag xmlns="" xmlns:ma14="http://schemas.microsoft.com/office/mac/drawingml/2011/main" val="1"/>
+              <ma14:placeholderFlag xmlns:ma14="http://schemas.microsoft.com/office/mac/drawingml/2011/main" xmlns="" val="1"/>
             </a:ext>
           </a:extLst>
         </p:spPr>
@@ -15753,8 +16163,8 @@
         </p:nvSpPr>
         <p:spPr>
           <a:xfrm>
-            <a:off x="4194315" y="3419475"/>
-            <a:ext cx="706582" cy="371475"/>
+            <a:off x="4302125" y="3533775"/>
+            <a:ext cx="441326" cy="200025"/>
           </a:xfrm>
           <a:prstGeom prst="roundRect">
             <a:avLst/>
@@ -15786,9 +16196,10 @@
           <a:p>
             <a:pPr algn="ctr"/>
             <a:r>
-              <a:rPr lang="pt-BR" sz="1100" dirty="0" smtClean="0"/>
-              <a:t>95%</a:t>
-            </a:r>
+              <a:rPr lang="pt-BR" sz="900" dirty="0" smtClean="0"/>
+              <a:t>95% </a:t>
+            </a:r>
+            <a:endParaRPr lang="pt-BR" sz="900" dirty="0" smtClean="0"/>
           </a:p>
         </p:txBody>
       </p:sp>
@@ -16026,7 +16437,7 @@
             </a:r>
             <a:r>
               <a:rPr lang="en-US" dirty="0" err="1" smtClean="0"/>
-              <a:t>Conjunto</a:t>
+              <a:t>Cenário</a:t>
             </a:r>
             <a:endParaRPr lang="en-US" dirty="0"/>
           </a:p>
@@ -16062,6 +16473,210 @@
           </a:prstGeom>
         </p:spPr>
       </p:pic>
+      <p:sp>
+        <p:nvSpPr>
+          <p:cNvPr id="2" name="Retângulo 1"/>
+          <p:cNvSpPr/>
+          <p:nvPr/>
+        </p:nvSpPr>
+        <p:spPr>
+          <a:xfrm>
+            <a:off x="2302784" y="2786742"/>
+            <a:ext cx="449942" cy="213633"/>
+          </a:xfrm>
+          <a:prstGeom prst="rect">
+            <a:avLst/>
+          </a:prstGeom>
+          <a:noFill/>
+          <a:ln w="19050">
+            <a:solidFill>
+              <a:srgbClr val="00B050"/>
+            </a:solidFill>
+          </a:ln>
+          <a:effectLst>
+            <a:outerShdw blurRad="63500" sx="102000" sy="102000" algn="ctr" rotWithShape="0">
+              <a:prstClr val="black">
+                <a:alpha val="40000"/>
+              </a:prstClr>
+            </a:outerShdw>
+          </a:effectLst>
+        </p:spPr>
+        <p:style>
+          <a:lnRef idx="2">
+            <a:schemeClr val="accent6"/>
+          </a:lnRef>
+          <a:fillRef idx="1">
+            <a:schemeClr val="lt1"/>
+          </a:fillRef>
+          <a:effectRef idx="0">
+            <a:schemeClr val="accent6"/>
+          </a:effectRef>
+          <a:fontRef idx="minor">
+            <a:schemeClr val="dk1"/>
+          </a:fontRef>
+        </p:style>
+        <p:txBody>
+          <a:bodyPr rtlCol="0" anchor="ctr"/>
+          <a:lstStyle/>
+          <a:p>
+            <a:pPr algn="ctr"/>
+            <a:endParaRPr lang="pt-BR"/>
+          </a:p>
+        </p:txBody>
+      </p:sp>
+      <p:sp>
+        <p:nvSpPr>
+          <p:cNvPr id="9" name="Retângulo 8"/>
+          <p:cNvSpPr/>
+          <p:nvPr/>
+        </p:nvSpPr>
+        <p:spPr>
+          <a:xfrm>
+            <a:off x="3255284" y="3205842"/>
+            <a:ext cx="449942" cy="213633"/>
+          </a:xfrm>
+          <a:prstGeom prst="rect">
+            <a:avLst/>
+          </a:prstGeom>
+          <a:noFill/>
+          <a:ln w="19050">
+            <a:solidFill>
+              <a:srgbClr val="00B050"/>
+            </a:solidFill>
+          </a:ln>
+          <a:effectLst>
+            <a:outerShdw blurRad="63500" sx="102000" sy="102000" algn="ctr" rotWithShape="0">
+              <a:prstClr val="black">
+                <a:alpha val="40000"/>
+              </a:prstClr>
+            </a:outerShdw>
+          </a:effectLst>
+        </p:spPr>
+        <p:style>
+          <a:lnRef idx="2">
+            <a:schemeClr val="accent6"/>
+          </a:lnRef>
+          <a:fillRef idx="1">
+            <a:schemeClr val="lt1"/>
+          </a:fillRef>
+          <a:effectRef idx="0">
+            <a:schemeClr val="accent6"/>
+          </a:effectRef>
+          <a:fontRef idx="minor">
+            <a:schemeClr val="dk1"/>
+          </a:fontRef>
+        </p:style>
+        <p:txBody>
+          <a:bodyPr rtlCol="0" anchor="ctr"/>
+          <a:lstStyle/>
+          <a:p>
+            <a:pPr algn="ctr"/>
+            <a:endParaRPr lang="pt-BR"/>
+          </a:p>
+        </p:txBody>
+      </p:sp>
+      <p:sp>
+        <p:nvSpPr>
+          <p:cNvPr id="10" name="Retângulo 9"/>
+          <p:cNvSpPr/>
+          <p:nvPr/>
+        </p:nvSpPr>
+        <p:spPr>
+          <a:xfrm>
+            <a:off x="7074809" y="4891767"/>
+            <a:ext cx="488041" cy="213633"/>
+          </a:xfrm>
+          <a:prstGeom prst="rect">
+            <a:avLst/>
+          </a:prstGeom>
+          <a:noFill/>
+          <a:ln w="19050">
+            <a:solidFill>
+              <a:srgbClr val="00B050"/>
+            </a:solidFill>
+          </a:ln>
+          <a:effectLst>
+            <a:outerShdw blurRad="63500" sx="102000" sy="102000" algn="ctr" rotWithShape="0">
+              <a:prstClr val="black">
+                <a:alpha val="40000"/>
+              </a:prstClr>
+            </a:outerShdw>
+          </a:effectLst>
+        </p:spPr>
+        <p:style>
+          <a:lnRef idx="2">
+            <a:schemeClr val="accent6"/>
+          </a:lnRef>
+          <a:fillRef idx="1">
+            <a:schemeClr val="lt1"/>
+          </a:fillRef>
+          <a:effectRef idx="0">
+            <a:schemeClr val="accent6"/>
+          </a:effectRef>
+          <a:fontRef idx="minor">
+            <a:schemeClr val="dk1"/>
+          </a:fontRef>
+        </p:style>
+        <p:txBody>
+          <a:bodyPr rtlCol="0" anchor="ctr"/>
+          <a:lstStyle/>
+          <a:p>
+            <a:pPr algn="ctr"/>
+            <a:endParaRPr lang="pt-BR"/>
+          </a:p>
+        </p:txBody>
+      </p:sp>
+      <p:sp>
+        <p:nvSpPr>
+          <p:cNvPr id="12" name="Retângulo 11"/>
+          <p:cNvSpPr/>
+          <p:nvPr/>
+        </p:nvSpPr>
+        <p:spPr>
+          <a:xfrm>
+            <a:off x="6067426" y="4467225"/>
+            <a:ext cx="502558" cy="205467"/>
+          </a:xfrm>
+          <a:prstGeom prst="rect">
+            <a:avLst/>
+          </a:prstGeom>
+          <a:noFill/>
+          <a:ln w="19050">
+            <a:solidFill>
+              <a:srgbClr val="E80000"/>
+            </a:solidFill>
+          </a:ln>
+          <a:effectLst>
+            <a:outerShdw blurRad="63500" sx="102000" sy="102000" algn="ctr" rotWithShape="0">
+              <a:prstClr val="black">
+                <a:alpha val="40000"/>
+              </a:prstClr>
+            </a:outerShdw>
+          </a:effectLst>
+        </p:spPr>
+        <p:style>
+          <a:lnRef idx="2">
+            <a:schemeClr val="accent6"/>
+          </a:lnRef>
+          <a:fillRef idx="1">
+            <a:schemeClr val="lt1"/>
+          </a:fillRef>
+          <a:effectRef idx="0">
+            <a:schemeClr val="accent6"/>
+          </a:effectRef>
+          <a:fontRef idx="minor">
+            <a:schemeClr val="dk1"/>
+          </a:fontRef>
+        </p:style>
+        <p:txBody>
+          <a:bodyPr rtlCol="0" anchor="ctr"/>
+          <a:lstStyle/>
+          <a:p>
+            <a:pPr algn="ctr"/>
+            <a:endParaRPr lang="pt-BR"/>
+          </a:p>
+        </p:txBody>
+      </p:sp>
     </p:spTree>
     <p:extLst>
       <p:ext uri="{BB962C8B-B14F-4D97-AF65-F5344CB8AC3E}">
@@ -16093,7 +16708,7 @@
                             </p:stCondLst>
                             <p:childTnLst>
                               <p:par>
-                                <p:cTn id="5" presetID="10" presetClass="entr" presetSubtype="0" fill="hold" nodeType="clickEffect">
+                                <p:cTn id="5" presetID="10" presetClass="entr" presetSubtype="0" fill="hold" grpId="0" nodeType="clickEffect">
                                   <p:stCondLst>
                                     <p:cond delay="0"/>
                                   </p:stCondLst>
@@ -16101,6 +16716,182 @@
                                     <p:set>
                                       <p:cBhvr>
                                         <p:cTn id="6" dur="1" fill="hold">
+                                          <p:stCondLst>
+                                            <p:cond delay="0"/>
+                                          </p:stCondLst>
+                                        </p:cTn>
+                                        <p:tgtEl>
+                                          <p:spTgt spid="2"/>
+                                        </p:tgtEl>
+                                        <p:attrNameLst>
+                                          <p:attrName>style.visibility</p:attrName>
+                                        </p:attrNameLst>
+                                      </p:cBhvr>
+                                      <p:to>
+                                        <p:strVal val="visible"/>
+                                      </p:to>
+                                    </p:set>
+                                    <p:animEffect transition="in" filter="fade">
+                                      <p:cBhvr>
+                                        <p:cTn id="7" dur="500"/>
+                                        <p:tgtEl>
+                                          <p:spTgt spid="2"/>
+                                        </p:tgtEl>
+                                      </p:cBhvr>
+                                    </p:animEffect>
+                                  </p:childTnLst>
+                                </p:cTn>
+                              </p:par>
+                              <p:par>
+                                <p:cTn id="8" presetID="10" presetClass="entr" presetSubtype="0" fill="hold" grpId="0" nodeType="withEffect">
+                                  <p:stCondLst>
+                                    <p:cond delay="0"/>
+                                  </p:stCondLst>
+                                  <p:childTnLst>
+                                    <p:set>
+                                      <p:cBhvr>
+                                        <p:cTn id="9" dur="1" fill="hold">
+                                          <p:stCondLst>
+                                            <p:cond delay="0"/>
+                                          </p:stCondLst>
+                                        </p:cTn>
+                                        <p:tgtEl>
+                                          <p:spTgt spid="9"/>
+                                        </p:tgtEl>
+                                        <p:attrNameLst>
+                                          <p:attrName>style.visibility</p:attrName>
+                                        </p:attrNameLst>
+                                      </p:cBhvr>
+                                      <p:to>
+                                        <p:strVal val="visible"/>
+                                      </p:to>
+                                    </p:set>
+                                    <p:animEffect transition="in" filter="fade">
+                                      <p:cBhvr>
+                                        <p:cTn id="10" dur="500"/>
+                                        <p:tgtEl>
+                                          <p:spTgt spid="9"/>
+                                        </p:tgtEl>
+                                      </p:cBhvr>
+                                    </p:animEffect>
+                                  </p:childTnLst>
+                                </p:cTn>
+                              </p:par>
+                              <p:par>
+                                <p:cTn id="11" presetID="10" presetClass="entr" presetSubtype="0" fill="hold" grpId="0" nodeType="withEffect">
+                                  <p:stCondLst>
+                                    <p:cond delay="0"/>
+                                  </p:stCondLst>
+                                  <p:childTnLst>
+                                    <p:set>
+                                      <p:cBhvr>
+                                        <p:cTn id="12" dur="1" fill="hold">
+                                          <p:stCondLst>
+                                            <p:cond delay="0"/>
+                                          </p:stCondLst>
+                                        </p:cTn>
+                                        <p:tgtEl>
+                                          <p:spTgt spid="10"/>
+                                        </p:tgtEl>
+                                        <p:attrNameLst>
+                                          <p:attrName>style.visibility</p:attrName>
+                                        </p:attrNameLst>
+                                      </p:cBhvr>
+                                      <p:to>
+                                        <p:strVal val="visible"/>
+                                      </p:to>
+                                    </p:set>
+                                    <p:animEffect transition="in" filter="fade">
+                                      <p:cBhvr>
+                                        <p:cTn id="13" dur="500"/>
+                                        <p:tgtEl>
+                                          <p:spTgt spid="10"/>
+                                        </p:tgtEl>
+                                      </p:cBhvr>
+                                    </p:animEffect>
+                                  </p:childTnLst>
+                                </p:cTn>
+                              </p:par>
+                            </p:childTnLst>
+                          </p:cTn>
+                        </p:par>
+                      </p:childTnLst>
+                    </p:cTn>
+                  </p:par>
+                  <p:par>
+                    <p:cTn id="14" fill="hold">
+                      <p:stCondLst>
+                        <p:cond delay="indefinite"/>
+                      </p:stCondLst>
+                      <p:childTnLst>
+                        <p:par>
+                          <p:cTn id="15" fill="hold">
+                            <p:stCondLst>
+                              <p:cond delay="0"/>
+                            </p:stCondLst>
+                            <p:childTnLst>
+                              <p:par>
+                                <p:cTn id="16" presetID="10" presetClass="entr" presetSubtype="0" fill="hold" grpId="0" nodeType="clickEffect">
+                                  <p:stCondLst>
+                                    <p:cond delay="0"/>
+                                  </p:stCondLst>
+                                  <p:childTnLst>
+                                    <p:set>
+                                      <p:cBhvr>
+                                        <p:cTn id="17" dur="1" fill="hold">
+                                          <p:stCondLst>
+                                            <p:cond delay="0"/>
+                                          </p:stCondLst>
+                                        </p:cTn>
+                                        <p:tgtEl>
+                                          <p:spTgt spid="12"/>
+                                        </p:tgtEl>
+                                        <p:attrNameLst>
+                                          <p:attrName>style.visibility</p:attrName>
+                                        </p:attrNameLst>
+                                      </p:cBhvr>
+                                      <p:to>
+                                        <p:strVal val="visible"/>
+                                      </p:to>
+                                    </p:set>
+                                    <p:animEffect transition="in" filter="fade">
+                                      <p:cBhvr>
+                                        <p:cTn id="18" dur="500"/>
+                                        <p:tgtEl>
+                                          <p:spTgt spid="12"/>
+                                        </p:tgtEl>
+                                      </p:cBhvr>
+                                    </p:animEffect>
+                                  </p:childTnLst>
+                                </p:cTn>
+                              </p:par>
+                            </p:childTnLst>
+                          </p:cTn>
+                        </p:par>
+                      </p:childTnLst>
+                    </p:cTn>
+                  </p:par>
+                  <p:par>
+                    <p:cTn id="19" fill="hold">
+                      <p:stCondLst>
+                        <p:cond delay="indefinite"/>
+                      </p:stCondLst>
+                      <p:childTnLst>
+                        <p:par>
+                          <p:cTn id="20" fill="hold">
+                            <p:stCondLst>
+                              <p:cond delay="0"/>
+                            </p:stCondLst>
+                            <p:childTnLst>
+                              <p:par>
+                                <p:cTn id="21" presetID="10" presetClass="entr" presetSubtype="0" fill="hold" nodeType="clickEffect">
+                                  <p:stCondLst>
+                                    <p:cond delay="0"/>
+                                  </p:stCondLst>
+                                  <p:childTnLst>
+                                    <p:set>
+                                      <p:cBhvr>
+                                        <p:cTn id="22" dur="1" fill="hold">
                                           <p:stCondLst>
                                             <p:cond delay="0"/>
                                           </p:stCondLst>
@@ -16118,7 +16909,7 @@
                                     </p:set>
                                     <p:animEffect transition="in" filter="fade">
                                       <p:cBhvr>
-                                        <p:cTn id="7" dur="500"/>
+                                        <p:cTn id="23" dur="500"/>
                                         <p:tgtEl>
                                           <p:spTgt spid="8"/>
                                         </p:tgtEl>
@@ -16154,6 +16945,12 @@
         </p:cTn>
       </p:par>
     </p:tnLst>
+    <p:bldLst>
+      <p:bldP spid="2" grpId="0" animBg="1"/>
+      <p:bldP spid="9" grpId="0" animBg="1"/>
+      <p:bldP spid="10" grpId="0" animBg="1"/>
+      <p:bldP spid="12" grpId="0" animBg="1"/>
+    </p:bldLst>
   </p:timing>
 </p:sld>
 </file>
@@ -16208,8 +17005,8 @@
               <a:t> – 2º </a:t>
             </a:r>
             <a:r>
-              <a:rPr lang="en-US" dirty="0" err="1" smtClean="0"/>
-              <a:t>Conjunto</a:t>
+              <a:rPr lang="en-US" dirty="0" err="1"/>
+              <a:t>Cenário</a:t>
             </a:r>
             <a:endParaRPr lang="en-US" dirty="0"/>
           </a:p>
@@ -19216,7 +20013,7 @@
               </a14:hiddenLine>
             </a:ext>
             <a:ext uri="{FAA26D3D-D897-4be2-8F04-BA451C77F1D7}">
-              <ma14:placeholderFlag xmlns="" xmlns:ma14="http://schemas.microsoft.com/office/mac/drawingml/2011/main" val="1"/>
+              <ma14:placeholderFlag xmlns:ma14="http://schemas.microsoft.com/office/mac/drawingml/2011/main" xmlns="" val="1"/>
             </a:ext>
           </a:extLst>
         </p:spPr>
@@ -19507,7 +20304,7 @@
               </a14:hiddenLine>
             </a:ext>
             <a:ext uri="{FAA26D3D-D897-4be2-8F04-BA451C77F1D7}">
-              <ma14:placeholderFlag xmlns="" xmlns:ma14="http://schemas.microsoft.com/office/mac/drawingml/2011/main" val="1"/>
+              <ma14:placeholderFlag xmlns:ma14="http://schemas.microsoft.com/office/mac/drawingml/2011/main" xmlns="" val="1"/>
             </a:ext>
           </a:extLst>
         </p:spPr>
@@ -21779,7 +22576,7 @@
               </a14:hiddenLine>
             </a:ext>
             <a:ext uri="{FAA26D3D-D897-4be2-8F04-BA451C77F1D7}">
-              <ma14:placeholderFlag xmlns="" xmlns:ma14="http://schemas.microsoft.com/office/mac/drawingml/2011/main" val="1"/>
+              <ma14:placeholderFlag xmlns:ma14="http://schemas.microsoft.com/office/mac/drawingml/2011/main" xmlns="" val="1"/>
             </a:ext>
           </a:extLst>
         </p:spPr>
@@ -22441,8 +23238,8 @@
         </p:nvSpPr>
         <p:spPr>
           <a:xfrm rot="20572439">
-            <a:off x="3227055" y="2681203"/>
-            <a:ext cx="2706189" cy="1446550"/>
+            <a:off x="3457085" y="2850480"/>
+            <a:ext cx="2246128" cy="1107996"/>
           </a:xfrm>
           <a:prstGeom prst="rect">
             <a:avLst/>
@@ -22479,37 +23276,31 @@
                   </a:outerShdw>
                 </a:effectLst>
               </a:rPr>
-              <a:t>Reconhecimento </a:t>
-            </a:r>
-          </a:p>
-          <a:p>
-            <a:pPr algn="ctr"/>
-            <a:r>
-              <a:rPr lang="pt-BR" sz="2200" b="1" dirty="0" smtClean="0">
-                <a:ln w="12700">
-                  <a:solidFill>
-                    <a:schemeClr val="tx2">
-                      <a:satMod val="155000"/>
-                    </a:schemeClr>
-                  </a:solidFill>
-                  <a:prstDash val="solid"/>
-                </a:ln>
+              <a:t>Identificação </a:t>
+            </a:r>
+            <a:endParaRPr lang="pt-BR" sz="2200" b="1" dirty="0" smtClean="0">
+              <a:ln w="12700">
                 <a:solidFill>
-                  <a:schemeClr val="bg2">
-                    <a:tint val="85000"/>
+                  <a:schemeClr val="tx2">
                     <a:satMod val="155000"/>
                   </a:schemeClr>
                 </a:solidFill>
-                <a:effectLst>
-                  <a:outerShdw blurRad="41275" dist="20320" dir="1800000" algn="tl" rotWithShape="0">
-                    <a:srgbClr val="000000">
-                      <a:alpha val="40000"/>
-                    </a:srgbClr>
-                  </a:outerShdw>
-                </a:effectLst>
-              </a:rPr>
-              <a:t>Facial </a:t>
-            </a:r>
+                <a:prstDash val="solid"/>
+              </a:ln>
+              <a:solidFill>
+                <a:schemeClr val="bg2">
+                  <a:tint val="85000"/>
+                  <a:satMod val="155000"/>
+                </a:schemeClr>
+              </a:solidFill>
+              <a:effectLst>
+                <a:outerShdw blurRad="41275" dist="20320" dir="1800000" algn="tl" rotWithShape="0">
+                  <a:srgbClr val="000000">
+                    <a:alpha val="40000"/>
+                  </a:srgbClr>
+                </a:outerShdw>
+              </a:effectLst>
+            </a:endParaRPr>
           </a:p>
           <a:p>
             <a:pPr algn="ctr"/>

</xml_diff>

<commit_message>
Versão anterior a primeiro revisão impressa. #123
</commit_message>
<xml_diff>
--- a/apresentacao/ApresentacaoSBCUP.pptx
+++ b/apresentacao/ApresentacaoSBCUP.pptx
@@ -5,7 +5,7 @@
     <p:sldMasterId id="2147483855" r:id="rId1"/>
   </p:sldMasterIdLst>
   <p:notesMasterIdLst>
-    <p:notesMasterId r:id="rId59"/>
+    <p:notesMasterId r:id="rId57"/>
   </p:notesMasterIdLst>
   <p:sldIdLst>
     <p:sldId id="256" r:id="rId2"/>
@@ -47,24 +47,22 @@
     <p:sldId id="299" r:id="rId38"/>
     <p:sldId id="300" r:id="rId39"/>
     <p:sldId id="301" r:id="rId40"/>
-    <p:sldId id="302" r:id="rId41"/>
+    <p:sldId id="325" r:id="rId41"/>
     <p:sldId id="303" r:id="rId42"/>
-    <p:sldId id="304" r:id="rId43"/>
-    <p:sldId id="305" r:id="rId44"/>
-    <p:sldId id="306" r:id="rId45"/>
-    <p:sldId id="307" r:id="rId46"/>
-    <p:sldId id="308" r:id="rId47"/>
-    <p:sldId id="270" r:id="rId48"/>
-    <p:sldId id="309" r:id="rId49"/>
-    <p:sldId id="271" r:id="rId50"/>
-    <p:sldId id="310" r:id="rId51"/>
-    <p:sldId id="322" r:id="rId52"/>
-    <p:sldId id="323" r:id="rId53"/>
-    <p:sldId id="312" r:id="rId54"/>
-    <p:sldId id="320" r:id="rId55"/>
-    <p:sldId id="286" r:id="rId56"/>
-    <p:sldId id="290" r:id="rId57"/>
-    <p:sldId id="291" r:id="rId58"/>
+    <p:sldId id="305" r:id="rId43"/>
+    <p:sldId id="306" r:id="rId44"/>
+    <p:sldId id="307" r:id="rId45"/>
+    <p:sldId id="308" r:id="rId46"/>
+    <p:sldId id="270" r:id="rId47"/>
+    <p:sldId id="309" r:id="rId48"/>
+    <p:sldId id="310" r:id="rId49"/>
+    <p:sldId id="322" r:id="rId50"/>
+    <p:sldId id="323" r:id="rId51"/>
+    <p:sldId id="312" r:id="rId52"/>
+    <p:sldId id="320" r:id="rId53"/>
+    <p:sldId id="286" r:id="rId54"/>
+    <p:sldId id="290" r:id="rId55"/>
+    <p:sldId id="291" r:id="rId56"/>
   </p:sldIdLst>
   <p:sldSz cx="9144000" cy="6858000" type="screen4x3"/>
   <p:notesSz cx="6858000" cy="9144000"/>
@@ -248,7 +246,7 @@
           <a:p>
             <a:fld id="{5FD99E58-1C9B-E44B-8998-0A321153317B}" type="datetimeFigureOut">
               <a:rPr lang="en-US" smtClean="0"/>
-              <a:t>6/26/2012</a:t>
+              <a:t>6/28/2012</a:t>
             </a:fld>
             <a:endParaRPr lang="en-US"/>
           </a:p>
@@ -1423,7 +1421,7 @@
           <a:p>
             <a:fld id="{7D290233-0DD1-4A80-BB1E-9ADC3556DBB6}" type="datetimeFigureOut">
               <a:rPr lang="en-US" smtClean="0"/>
-              <a:t>6/26/2012</a:t>
+              <a:t>6/28/2012</a:t>
             </a:fld>
             <a:endParaRPr lang="en-US"/>
           </a:p>
@@ -1619,7 +1617,7 @@
           <a:p>
             <a:fld id="{7D290233-0DD1-4A80-BB1E-9ADC3556DBB6}" type="datetimeFigureOut">
               <a:rPr lang="en-US" smtClean="0"/>
-              <a:t>6/26/2012</a:t>
+              <a:t>6/28/2012</a:t>
             </a:fld>
             <a:endParaRPr lang="en-US"/>
           </a:p>
@@ -1811,7 +1809,7 @@
           <a:p>
             <a:fld id="{7D290233-0DD1-4A80-BB1E-9ADC3556DBB6}" type="datetimeFigureOut">
               <a:rPr lang="en-US" smtClean="0"/>
-              <a:t>6/26/2012</a:t>
+              <a:t>6/28/2012</a:t>
             </a:fld>
             <a:endParaRPr lang="en-US"/>
           </a:p>
@@ -1993,7 +1991,7 @@
           <a:p>
             <a:fld id="{7D290233-0DD1-4A80-BB1E-9ADC3556DBB6}" type="datetimeFigureOut">
               <a:rPr lang="en-US" smtClean="0"/>
-              <a:t>6/26/2012</a:t>
+              <a:t>6/28/2012</a:t>
             </a:fld>
             <a:endParaRPr lang="en-US"/>
           </a:p>
@@ -2231,7 +2229,7 @@
           <a:p>
             <a:fld id="{7D290233-0DD1-4A80-BB1E-9ADC3556DBB6}" type="datetimeFigureOut">
               <a:rPr lang="en-US" smtClean="0"/>
-              <a:t>6/26/2012</a:t>
+              <a:t>6/28/2012</a:t>
             </a:fld>
             <a:endParaRPr lang="en-US"/>
           </a:p>
@@ -2507,7 +2505,7 @@
           <a:p>
             <a:fld id="{7D290233-0DD1-4A80-BB1E-9ADC3556DBB6}" type="datetimeFigureOut">
               <a:rPr lang="en-US" smtClean="0"/>
-              <a:t>6/26/2012</a:t>
+              <a:t>6/28/2012</a:t>
             </a:fld>
             <a:endParaRPr lang="en-US"/>
           </a:p>
@@ -2928,7 +2926,7 @@
           <a:p>
             <a:fld id="{7D290233-0DD1-4A80-BB1E-9ADC3556DBB6}" type="datetimeFigureOut">
               <a:rPr lang="en-US" smtClean="0"/>
-              <a:t>6/26/2012</a:t>
+              <a:t>6/28/2012</a:t>
             </a:fld>
             <a:endParaRPr lang="en-US"/>
           </a:p>
@@ -3076,7 +3074,7 @@
           <a:p>
             <a:fld id="{7D290233-0DD1-4A80-BB1E-9ADC3556DBB6}" type="datetimeFigureOut">
               <a:rPr lang="en-US" smtClean="0"/>
-              <a:t>6/26/2012</a:t>
+              <a:t>6/28/2012</a:t>
             </a:fld>
             <a:endParaRPr lang="en-US"/>
           </a:p>
@@ -3183,7 +3181,7 @@
           <a:p>
             <a:fld id="{7D290233-0DD1-4A80-BB1E-9ADC3556DBB6}" type="datetimeFigureOut">
               <a:rPr lang="en-US" smtClean="0"/>
-              <a:t>6/26/2012</a:t>
+              <a:t>6/28/2012</a:t>
             </a:fld>
             <a:endParaRPr lang="en-US"/>
           </a:p>
@@ -3445,7 +3443,7 @@
           <a:p>
             <a:fld id="{7D290233-0DD1-4A80-BB1E-9ADC3556DBB6}" type="datetimeFigureOut">
               <a:rPr lang="en-US" smtClean="0"/>
-              <a:t>6/26/2012</a:t>
+              <a:t>6/28/2012</a:t>
             </a:fld>
             <a:endParaRPr lang="en-US"/>
           </a:p>
@@ -3709,7 +3707,7 @@
           <a:p>
             <a:fld id="{7D290233-0DD1-4A80-BB1E-9ADC3556DBB6}" type="datetimeFigureOut">
               <a:rPr lang="en-US" smtClean="0"/>
-              <a:t>6/26/2012</a:t>
+              <a:t>6/28/2012</a:t>
             </a:fld>
             <a:endParaRPr lang="en-US"/>
           </a:p>
@@ -4550,7 +4548,7 @@
               </a14:hiddenLine>
             </a:ext>
             <a:ext uri="{FAA26D3D-D897-4be2-8F04-BA451C77F1D7}">
-              <ma14:placeholderFlag xmlns:ma14="http://schemas.microsoft.com/office/mac/drawingml/2011/main" xmlns="" val="1"/>
+              <ma14:placeholderFlag xmlns="" xmlns:ma14="http://schemas.microsoft.com/office/mac/drawingml/2011/main" val="1"/>
             </a:ext>
           </a:extLst>
         </p:spPr>
@@ -4612,7 +4610,7 @@
               </a14:hiddenLine>
             </a:ext>
             <a:ext uri="{FAA26D3D-D897-4be2-8F04-BA451C77F1D7}">
-              <ma14:placeholderFlag xmlns:ma14="http://schemas.microsoft.com/office/mac/drawingml/2011/main" xmlns="" val="1"/>
+              <ma14:placeholderFlag xmlns="" xmlns:ma14="http://schemas.microsoft.com/office/mac/drawingml/2011/main" val="1"/>
             </a:ext>
           </a:extLst>
         </p:spPr>
@@ -4699,7 +4697,7 @@
           <a:p>
             <a:fld id="{7D290233-0DD1-4A80-BB1E-9ADC3556DBB6}" type="datetimeFigureOut">
               <a:rPr lang="en-US" smtClean="0"/>
-              <a:t>6/26/2012</a:t>
+              <a:t>6/28/2012</a:t>
             </a:fld>
             <a:endParaRPr lang="en-US"/>
           </a:p>
@@ -5507,11 +5505,7 @@
             </a:r>
             <a:r>
               <a:rPr lang="en-US" dirty="0" smtClean="0"/>
-              <a:t> da face </a:t>
-            </a:r>
-            <a:r>
-              <a:rPr lang="en-US" dirty="0" smtClean="0"/>
-              <a:t>do</a:t>
+              <a:t> da face do</a:t>
             </a:r>
           </a:p>
           <a:p>
@@ -8595,15 +8589,7 @@
               <a:rPr lang="pt-BR" dirty="0" smtClean="0"/>
               <a:t>Conclusão</a:t>
             </a:r>
-          </a:p>
-          <a:p>
-            <a:r>
-              <a:rPr lang="pt-BR" dirty="0" smtClean="0"/>
-              <a:t>Trabalhos Futuros</a:t>
-            </a:r>
-          </a:p>
-          <a:p>
-            <a:endParaRPr lang="pt-BR" dirty="0"/>
+            <a:endParaRPr lang="pt-BR" dirty="0" smtClean="0"/>
           </a:p>
         </p:txBody>
       </p:sp>
@@ -13994,36 +13980,6 @@
           <a:chExt cx="0" cy="0"/>
         </a:xfrm>
       </p:grpSpPr>
-      <p:pic>
-        <p:nvPicPr>
-          <p:cNvPr id="4" name="Picture 3" descr="usuarios-rastreados.png"/>
-          <p:cNvPicPr>
-            <a:picLocks noChangeAspect="1"/>
-          </p:cNvPicPr>
-          <p:nvPr/>
-        </p:nvPicPr>
-        <p:blipFill>
-          <a:blip r:embed="rId2" cstate="email">
-            <a:extLst>
-              <a:ext uri="{28A0092B-C50C-407E-A947-70E740481C1C}">
-                <a14:useLocalDpi xmlns:a14="http://schemas.microsoft.com/office/drawing/2010/main" val="0"/>
-              </a:ext>
-            </a:extLst>
-          </a:blip>
-          <a:stretch>
-            <a:fillRect/>
-          </a:stretch>
-        </p:blipFill>
-        <p:spPr>
-          <a:xfrm>
-            <a:off x="1173250" y="1774076"/>
-            <a:ext cx="6573122" cy="4418752"/>
-          </a:xfrm>
-          <a:prstGeom prst="rect">
-            <a:avLst/>
-          </a:prstGeom>
-        </p:spPr>
-      </p:pic>
       <p:sp>
         <p:nvSpPr>
           <p:cNvPr id="5" name="Title 1"/>
@@ -14063,7 +14019,7 @@
               </a14:hiddenLine>
             </a:ext>
             <a:ext uri="{FAA26D3D-D897-4be2-8F04-BA451C77F1D7}">
-              <ma14:placeholderFlag xmlns:ma14="http://schemas.microsoft.com/office/mac/drawingml/2011/main" xmlns="" val="1"/>
+              <ma14:placeholderFlag xmlns="" xmlns:ma14="http://schemas.microsoft.com/office/mac/drawingml/2011/main" val="1"/>
             </a:ext>
           </a:extLst>
         </p:spPr>
@@ -14232,6 +14188,47 @@
           </a:p>
         </p:txBody>
       </p:sp>
+      <p:pic>
+        <p:nvPicPr>
+          <p:cNvPr id="2050" name="Picture 2" descr="C:\Users\Tales\Downloads\Imagem1.png"/>
+          <p:cNvPicPr>
+            <a:picLocks noChangeAspect="1" noChangeArrowheads="1"/>
+          </p:cNvPicPr>
+          <p:nvPr/>
+        </p:nvPicPr>
+        <p:blipFill>
+          <a:blip r:embed="rId2" cstate="email">
+            <a:extLst>
+              <a:ext uri="{28A0092B-C50C-407E-A947-70E740481C1C}">
+                <a14:useLocalDpi xmlns:a14="http://schemas.microsoft.com/office/drawing/2010/main" val="0"/>
+              </a:ext>
+            </a:extLst>
+          </a:blip>
+          <a:srcRect/>
+          <a:stretch>
+            <a:fillRect/>
+          </a:stretch>
+        </p:blipFill>
+        <p:spPr bwMode="auto">
+          <a:xfrm>
+            <a:off x="1388918" y="1801234"/>
+            <a:ext cx="6642100" cy="4462463"/>
+          </a:xfrm>
+          <a:prstGeom prst="rect">
+            <a:avLst/>
+          </a:prstGeom>
+          <a:noFill/>
+          <a:extLst>
+            <a:ext uri="{909E8E84-426E-40DD-AFC4-6F175D3DCCD1}">
+              <a14:hiddenFill xmlns:a14="http://schemas.microsoft.com/office/drawing/2010/main">
+                <a:solidFill>
+                  <a:srgbClr val="FFFFFF"/>
+                </a:solidFill>
+              </a14:hiddenFill>
+            </a:ext>
+          </a:extLst>
+        </p:spPr>
+      </p:pic>
     </p:spTree>
     <p:extLst>
       <p:ext uri="{BB962C8B-B14F-4D97-AF65-F5344CB8AC3E}">
@@ -14308,7 +14305,7 @@
               </a14:hiddenLine>
             </a:ext>
             <a:ext uri="{FAA26D3D-D897-4be2-8F04-BA451C77F1D7}">
-              <ma14:placeholderFlag xmlns:ma14="http://schemas.microsoft.com/office/mac/drawingml/2011/main" xmlns="" val="1"/>
+              <ma14:placeholderFlag xmlns="" xmlns:ma14="http://schemas.microsoft.com/office/mac/drawingml/2011/main" val="1"/>
             </a:ext>
           </a:extLst>
         </p:spPr>
@@ -14473,31 +14470,15 @@
               <a:rPr lang="en-US" dirty="0" err="1" smtClean="0"/>
               <a:t>Localização</a:t>
             </a:r>
-            <a:r>
-              <a:rPr lang="en-US" dirty="0" smtClean="0"/>
-              <a:t> </a:t>
-            </a:r>
-            <a:r>
-              <a:rPr lang="en-US" sz="3600" b="1" dirty="0" smtClean="0"/>
-              <a:t>– </a:t>
-            </a:r>
-            <a:r>
-              <a:rPr lang="en-US" sz="3600" b="1" dirty="0" err="1" smtClean="0"/>
-              <a:t>eixo</a:t>
-            </a:r>
-            <a:r>
-              <a:rPr lang="en-US" sz="3600" b="1" dirty="0" smtClean="0"/>
-              <a:t> z</a:t>
-            </a:r>
             <a:endParaRPr lang="en-US" sz="3600" b="1" dirty="0"/>
           </a:p>
         </p:txBody>
       </p:sp>
       <p:pic>
         <p:nvPicPr>
-          <p:cNvPr id="5" name="Picture 4" descr="Captura de tela 2011-12-03 às 18.24.37.png"/>
+          <p:cNvPr id="1028" name="Picture 4" descr="C:\Users\Tales\Downloads\IC534689.png"/>
           <p:cNvPicPr>
-            <a:picLocks noChangeAspect="1"/>
+            <a:picLocks noChangeAspect="1" noChangeArrowheads="1"/>
           </p:cNvPicPr>
           <p:nvPr/>
         </p:nvPicPr>
@@ -14509,48 +14490,29 @@
               </a:ext>
             </a:extLst>
           </a:blip>
+          <a:srcRect/>
           <a:stretch>
             <a:fillRect/>
           </a:stretch>
         </p:blipFill>
-        <p:spPr>
-          <a:xfrm>
-            <a:off x="1890345" y="4966779"/>
-            <a:ext cx="5496361" cy="1891221"/>
+        <p:spPr bwMode="auto">
+          <a:xfrm>
+            <a:off x="2537257" y="1413035"/>
+            <a:ext cx="4528559" cy="5023276"/>
           </a:xfrm>
           <a:prstGeom prst="rect">
             <a:avLst/>
           </a:prstGeom>
-        </p:spPr>
-      </p:pic>
-      <p:pic>
-        <p:nvPicPr>
-          <p:cNvPr id="6" name="Picture 5" descr="eixoz-imgs2.png"/>
-          <p:cNvPicPr>
-            <a:picLocks noChangeAspect="1"/>
-          </p:cNvPicPr>
-          <p:nvPr/>
-        </p:nvPicPr>
-        <p:blipFill>
-          <a:blip r:embed="rId3" cstate="email">
-            <a:extLst>
-              <a:ext uri="{28A0092B-C50C-407E-A947-70E740481C1C}">
-                <a14:useLocalDpi xmlns:a14="http://schemas.microsoft.com/office/drawing/2010/main" val="0"/>
-              </a:ext>
-            </a:extLst>
-          </a:blip>
-          <a:stretch>
-            <a:fillRect/>
-          </a:stretch>
-        </p:blipFill>
-        <p:spPr>
-          <a:xfrm>
-            <a:off x="1161651" y="1527139"/>
-            <a:ext cx="6610348" cy="3186868"/>
-          </a:xfrm>
-          <a:prstGeom prst="rect">
-            <a:avLst/>
-          </a:prstGeom>
+          <a:noFill/>
+          <a:extLst>
+            <a:ext uri="{909E8E84-426E-40DD-AFC4-6F175D3DCCD1}">
+              <a14:hiddenFill xmlns:a14="http://schemas.microsoft.com/office/drawing/2010/main">
+                <a:solidFill>
+                  <a:srgbClr val="FFFFFF"/>
+                </a:solidFill>
+              </a14:hiddenFill>
+            </a:ext>
+          </a:extLst>
         </p:spPr>
       </p:pic>
     </p:spTree>
@@ -14738,7 +14700,7 @@
               </a14:hiddenLine>
             </a:ext>
             <a:ext uri="{FAA26D3D-D897-4be2-8F04-BA451C77F1D7}">
-              <ma14:placeholderFlag xmlns:ma14="http://schemas.microsoft.com/office/mac/drawingml/2011/main" xmlns="" val="1"/>
+              <ma14:placeholderFlag xmlns="" xmlns:ma14="http://schemas.microsoft.com/office/mac/drawingml/2011/main" val="1"/>
             </a:ext>
           </a:extLst>
         </p:spPr>
@@ -14925,14 +14887,14 @@
       </p:sp>
       <p:pic>
         <p:nvPicPr>
-          <p:cNvPr id="5" name="Picture 4" descr="grafico-eixo-z.png"/>
+          <p:cNvPr id="5" name="Picture 4" descr="Captura de tela 2011-12-03 às 18.24.37.png"/>
           <p:cNvPicPr>
             <a:picLocks noChangeAspect="1"/>
           </p:cNvPicPr>
           <p:nvPr/>
         </p:nvPicPr>
         <p:blipFill>
-          <a:blip r:embed="rId2" cstate="email">
+          <a:blip r:embed="rId2">
             <a:extLst>
               <a:ext uri="{28A0092B-C50C-407E-A947-70E740481C1C}">
                 <a14:useLocalDpi xmlns:a14="http://schemas.microsoft.com/office/drawing/2010/main" val="0"/>
@@ -14945,129 +14907,75 @@
         </p:blipFill>
         <p:spPr>
           <a:xfrm>
-            <a:off x="954842" y="1413317"/>
-            <a:ext cx="7197234" cy="5444683"/>
+            <a:off x="1890345" y="4966779"/>
+            <a:ext cx="5496361" cy="1891221"/>
           </a:xfrm>
           <a:prstGeom prst="rect">
             <a:avLst/>
           </a:prstGeom>
         </p:spPr>
       </p:pic>
-      <p:cxnSp>
-        <p:nvCxnSpPr>
-          <p:cNvPr id="3" name="Conector reto 2"/>
-          <p:cNvCxnSpPr/>
+      <p:pic>
+        <p:nvPicPr>
+          <p:cNvPr id="6" name="Picture 5" descr="eixoz-imgs2.png"/>
+          <p:cNvPicPr>
+            <a:picLocks noChangeAspect="1"/>
+          </p:cNvPicPr>
           <p:nvPr/>
-        </p:nvCxnSpPr>
-        <p:spPr>
-          <a:xfrm>
-            <a:off x="6096000" y="2219325"/>
-            <a:ext cx="0" cy="4000500"/>
-          </a:xfrm>
-          <a:prstGeom prst="line">
+        </p:nvPicPr>
+        <p:blipFill>
+          <a:blip r:embed="rId3" cstate="email">
+            <a:extLst>
+              <a:ext uri="{28A0092B-C50C-407E-A947-70E740481C1C}">
+                <a14:useLocalDpi xmlns:a14="http://schemas.microsoft.com/office/drawing/2010/main" val="0"/>
+              </a:ext>
+            </a:extLst>
+          </a:blip>
+          <a:stretch>
+            <a:fillRect/>
+          </a:stretch>
+        </p:blipFill>
+        <p:spPr>
+          <a:xfrm>
+            <a:off x="1161651" y="1527139"/>
+            <a:ext cx="6610348" cy="3186868"/>
+          </a:xfrm>
+          <a:prstGeom prst="rect">
             <a:avLst/>
           </a:prstGeom>
-          <a:ln>
-            <a:solidFill>
-              <a:srgbClr val="FF0000"/>
-            </a:solidFill>
-          </a:ln>
-        </p:spPr>
-        <p:style>
-          <a:lnRef idx="3">
-            <a:schemeClr val="accent4"/>
-          </a:lnRef>
-          <a:fillRef idx="0">
-            <a:schemeClr val="accent4"/>
-          </a:fillRef>
-          <a:effectRef idx="2">
-            <a:schemeClr val="accent4"/>
-          </a:effectRef>
-          <a:fontRef idx="minor">
-            <a:schemeClr val="tx1"/>
-          </a:fontRef>
-        </p:style>
-      </p:cxnSp>
-      <p:sp>
-        <p:nvSpPr>
-          <p:cNvPr id="12" name="Texto explicativo retangular com cantos arredondados 11"/>
-          <p:cNvSpPr/>
+        </p:spPr>
+      </p:pic>
+      <p:sp>
+        <p:nvSpPr>
+          <p:cNvPr id="7" name="CaixaDeTexto 6"/>
+          <p:cNvSpPr txBox="1"/>
           <p:nvPr/>
         </p:nvSpPr>
         <p:spPr>
           <a:xfrm>
-            <a:off x="7353300" y="6219825"/>
-            <a:ext cx="1333500" cy="612648"/>
-          </a:xfrm>
-          <a:prstGeom prst="wedgeRoundRectCallout">
-            <a:avLst>
-              <a:gd name="adj1" fmla="val -144077"/>
-              <a:gd name="adj2" fmla="val -50996"/>
-              <a:gd name="adj3" fmla="val 16667"/>
-            </a:avLst>
+            <a:off x="7629493" y="5450724"/>
+            <a:ext cx="1458688" cy="923330"/>
+          </a:xfrm>
+          <a:prstGeom prst="rect">
+            <a:avLst/>
           </a:prstGeom>
-          <a:ln>
-            <a:solidFill>
-              <a:srgbClr val="FF0000"/>
-            </a:solidFill>
-          </a:ln>
-        </p:spPr>
-        <p:style>
-          <a:lnRef idx="2">
-            <a:schemeClr val="accent6"/>
-          </a:lnRef>
-          <a:fillRef idx="1">
-            <a:schemeClr val="lt1"/>
-          </a:fillRef>
-          <a:effectRef idx="0">
-            <a:schemeClr val="accent6"/>
-          </a:effectRef>
-          <a:fontRef idx="minor">
-            <a:schemeClr val="dk1"/>
-          </a:fontRef>
-        </p:style>
-        <p:txBody>
-          <a:bodyPr rtlCol="0" anchor="ctr"/>
+          <a:noFill/>
+        </p:spPr>
+        <p:txBody>
+          <a:bodyPr wrap="square" rtlCol="0">
+            <a:spAutoFit/>
+          </a:bodyPr>
           <a:lstStyle/>
           <a:p>
-            <a:pPr algn="ctr"/>
             <a:r>
               <a:rPr lang="pt-BR" dirty="0" smtClean="0">
                 <a:solidFill>
                   <a:srgbClr val="FF0000"/>
                 </a:solidFill>
               </a:rPr>
-              <a:t>4,057m</a:t>
-            </a:r>
-            <a:endParaRPr lang="pt-BR" dirty="0">
-              <a:solidFill>
-                <a:srgbClr val="FF0000"/>
-              </a:solidFill>
-            </a:endParaRPr>
-          </a:p>
-        </p:txBody>
-      </p:sp>
-      <p:sp>
-        <p:nvSpPr>
-          <p:cNvPr id="13" name="CaixaDeTexto 12"/>
-          <p:cNvSpPr txBox="1"/>
-          <p:nvPr/>
-        </p:nvSpPr>
-        <p:spPr>
-          <a:xfrm>
-            <a:off x="7505700" y="3305175"/>
-            <a:ext cx="1458688" cy="646331"/>
-          </a:xfrm>
-          <a:prstGeom prst="rect">
-            <a:avLst/>
-          </a:prstGeom>
-          <a:noFill/>
-        </p:spPr>
-        <p:txBody>
-          <a:bodyPr wrap="square" rtlCol="0">
-            <a:spAutoFit/>
-          </a:bodyPr>
-          <a:lstStyle/>
+              <a:t>Erro:</a:t>
+            </a:r>
+          </a:p>
           <a:p>
             <a:r>
               <a:rPr lang="pt-BR" dirty="0" smtClean="0">
@@ -15075,7 +14983,15 @@
                   <a:srgbClr val="FF0000"/>
                 </a:solidFill>
               </a:rPr>
-              <a:t>&lt; 3,21mm</a:t>
+              <a:t>&lt; </a:t>
+            </a:r>
+            <a:r>
+              <a:rPr lang="pt-BR" dirty="0" smtClean="0">
+                <a:solidFill>
+                  <a:srgbClr val="FF0000"/>
+                </a:solidFill>
+              </a:rPr>
+              <a:t>3,21mm</a:t>
             </a:r>
           </a:p>
           <a:p>
@@ -15098,7 +15014,7 @@
     </p:spTree>
     <p:extLst>
       <p:ext uri="{BB962C8B-B14F-4D97-AF65-F5344CB8AC3E}">
-        <p14:creationId xmlns:p14="http://schemas.microsoft.com/office/powerpoint/2010/main" val="152253570"/>
+        <p14:creationId xmlns:p14="http://schemas.microsoft.com/office/powerpoint/2010/main" val="4224314302"/>
       </p:ext>
     </p:extLst>
   </p:cSld>
@@ -15126,7 +15042,7 @@
                             </p:stCondLst>
                             <p:childTnLst>
                               <p:par>
-                                <p:cTn id="5" presetID="22" presetClass="entr" presetSubtype="4" fill="hold" nodeType="clickEffect">
+                                <p:cTn id="5" presetID="10" presetClass="entr" presetSubtype="0" fill="hold" grpId="0" nodeType="clickEffect">
                                   <p:stCondLst>
                                     <p:cond delay="0"/>
                                   </p:stCondLst>
@@ -15139,42 +15055,7 @@
                                           </p:stCondLst>
                                         </p:cTn>
                                         <p:tgtEl>
-                                          <p:spTgt spid="3"/>
-                                        </p:tgtEl>
-                                        <p:attrNameLst>
-                                          <p:attrName>style.visibility</p:attrName>
-                                        </p:attrNameLst>
-                                      </p:cBhvr>
-                                      <p:to>
-                                        <p:strVal val="visible"/>
-                                      </p:to>
-                                    </p:set>
-                                    <p:animEffect transition="in" filter="wipe(down)">
-                                      <p:cBhvr>
-                                        <p:cTn id="7" dur="500"/>
-                                        <p:tgtEl>
-                                          <p:spTgt spid="3"/>
-                                        </p:tgtEl>
-                                      </p:cBhvr>
-                                    </p:animEffect>
-                                  </p:childTnLst>
-                                </p:cTn>
-                              </p:par>
-                              <p:par>
-                                <p:cTn id="8" presetID="10" presetClass="entr" presetSubtype="0" fill="hold" grpId="0" nodeType="withEffect">
-                                  <p:stCondLst>
-                                    <p:cond delay="0"/>
-                                  </p:stCondLst>
-                                  <p:childTnLst>
-                                    <p:set>
-                                      <p:cBhvr>
-                                        <p:cTn id="9" dur="1" fill="hold">
-                                          <p:stCondLst>
-                                            <p:cond delay="0"/>
-                                          </p:stCondLst>
-                                        </p:cTn>
-                                        <p:tgtEl>
-                                          <p:spTgt spid="12"/>
+                                          <p:spTgt spid="7"/>
                                         </p:tgtEl>
                                         <p:attrNameLst>
                                           <p:attrName>style.visibility</p:attrName>
@@ -15186,62 +15067,9 @@
                                     </p:set>
                                     <p:animEffect transition="in" filter="fade">
                                       <p:cBhvr>
-                                        <p:cTn id="10" dur="500"/>
+                                        <p:cTn id="7" dur="500"/>
                                         <p:tgtEl>
-                                          <p:spTgt spid="12"/>
-                                        </p:tgtEl>
-                                      </p:cBhvr>
-                                    </p:animEffect>
-                                  </p:childTnLst>
-                                </p:cTn>
-                              </p:par>
-                            </p:childTnLst>
-                          </p:cTn>
-                        </p:par>
-                      </p:childTnLst>
-                    </p:cTn>
-                  </p:par>
-                  <p:par>
-                    <p:cTn id="11" fill="hold">
-                      <p:stCondLst>
-                        <p:cond delay="indefinite"/>
-                      </p:stCondLst>
-                      <p:childTnLst>
-                        <p:par>
-                          <p:cTn id="12" fill="hold">
-                            <p:stCondLst>
-                              <p:cond delay="0"/>
-                            </p:stCondLst>
-                            <p:childTnLst>
-                              <p:par>
-                                <p:cTn id="13" presetID="10" presetClass="entr" presetSubtype="0" fill="hold" grpId="0" nodeType="clickEffect">
-                                  <p:stCondLst>
-                                    <p:cond delay="0"/>
-                                  </p:stCondLst>
-                                  <p:childTnLst>
-                                    <p:set>
-                                      <p:cBhvr>
-                                        <p:cTn id="14" dur="1" fill="hold">
-                                          <p:stCondLst>
-                                            <p:cond delay="0"/>
-                                          </p:stCondLst>
-                                        </p:cTn>
-                                        <p:tgtEl>
-                                          <p:spTgt spid="13"/>
-                                        </p:tgtEl>
-                                        <p:attrNameLst>
-                                          <p:attrName>style.visibility</p:attrName>
-                                        </p:attrNameLst>
-                                      </p:cBhvr>
-                                      <p:to>
-                                        <p:strVal val="visible"/>
-                                      </p:to>
-                                    </p:set>
-                                    <p:animEffect transition="in" filter="fade">
-                                      <p:cBhvr>
-                                        <p:cTn id="15" dur="500"/>
-                                        <p:tgtEl>
-                                          <p:spTgt spid="13"/>
+                                          <p:spTgt spid="7"/>
                                         </p:tgtEl>
                                       </p:cBhvr>
                                     </p:animEffect>
@@ -15276,8 +15104,7 @@
       </p:par>
     </p:tnLst>
     <p:bldLst>
-      <p:bldP spid="12" grpId="0" animBg="1"/>
-      <p:bldP spid="13" grpId="0"/>
+      <p:bldP spid="7" grpId="0"/>
     </p:bldLst>
   </p:timing>
 </p:sld>
@@ -15339,7 +15166,7 @@
               </a14:hiddenLine>
             </a:ext>
             <a:ext uri="{FAA26D3D-D897-4be2-8F04-BA451C77F1D7}">
-              <ma14:placeholderFlag xmlns:ma14="http://schemas.microsoft.com/office/mac/drawingml/2011/main" xmlns="" val="1"/>
+              <ma14:placeholderFlag xmlns="" xmlns:ma14="http://schemas.microsoft.com/office/mac/drawingml/2011/main" val="1"/>
             </a:ext>
           </a:extLst>
         </p:spPr>
@@ -15584,297 +15411,6 @@
           </a:prstGeom>
         </p:spPr>
       </p:pic>
-    </p:spTree>
-    <p:extLst>
-      <p:ext uri="{BB962C8B-B14F-4D97-AF65-F5344CB8AC3E}">
-        <p14:creationId xmlns:p14="http://schemas.microsoft.com/office/powerpoint/2010/main" val="3159053500"/>
-      </p:ext>
-    </p:extLst>
-  </p:cSld>
-  <p:clrMapOvr>
-    <a:masterClrMapping/>
-  </p:clrMapOvr>
-  <p:timing>
-    <p:tnLst>
-      <p:par>
-        <p:cTn id="1" dur="indefinite" restart="never" nodeType="tmRoot"/>
-      </p:par>
-    </p:tnLst>
-  </p:timing>
-</p:sld>
-</file>
-
-<file path=ppt/slides/slide42.xml><?xml version="1.0" encoding="utf-8"?>
-<p:sld xmlns:a="http://schemas.openxmlformats.org/drawingml/2006/main" xmlns:r="http://schemas.openxmlformats.org/officeDocument/2006/relationships" xmlns:p="http://schemas.openxmlformats.org/presentationml/2006/main">
-  <p:cSld>
-    <p:spTree>
-      <p:nvGrpSpPr>
-        <p:cNvPr id="1" name=""/>
-        <p:cNvGrpSpPr/>
-        <p:nvPr/>
-      </p:nvGrpSpPr>
-      <p:grpSpPr>
-        <a:xfrm>
-          <a:off x="0" y="0"/>
-          <a:ext cx="0" cy="0"/>
-          <a:chOff x="0" y="0"/>
-          <a:chExt cx="0" cy="0"/>
-        </a:xfrm>
-      </p:grpSpPr>
-      <p:pic>
-        <p:nvPicPr>
-          <p:cNvPr id="5" name="Content Placeholder 4" descr="grafico-eixo-x.png"/>
-          <p:cNvPicPr>
-            <a:picLocks noGrp="1" noChangeAspect="1"/>
-          </p:cNvPicPr>
-          <p:nvPr>
-            <p:ph idx="1"/>
-          </p:nvPr>
-        </p:nvPicPr>
-        <p:blipFill>
-          <a:blip r:embed="rId2" cstate="email">
-            <a:extLst>
-              <a:ext uri="{28A0092B-C50C-407E-A947-70E740481C1C}">
-                <a14:useLocalDpi xmlns:a14="http://schemas.microsoft.com/office/drawing/2010/main" val="0"/>
-              </a:ext>
-            </a:extLst>
-          </a:blip>
-          <a:srcRect l="-11425" r="-11425"/>
-          <a:stretch>
-            <a:fillRect/>
-          </a:stretch>
-        </p:blipFill>
-        <p:spPr>
-          <a:xfrm>
-            <a:off x="457200" y="1353522"/>
-            <a:ext cx="8229600" cy="5220316"/>
-          </a:xfrm>
-        </p:spPr>
-      </p:pic>
-      <p:sp>
-        <p:nvSpPr>
-          <p:cNvPr id="4" name="Title 1"/>
-          <p:cNvSpPr txBox="1">
-            <a:spLocks/>
-          </p:cNvSpPr>
-          <p:nvPr/>
-        </p:nvSpPr>
-        <p:spPr bwMode="auto">
-          <a:xfrm>
-            <a:off x="222487" y="484779"/>
-            <a:ext cx="8741901" cy="1066800"/>
-          </a:xfrm>
-          <a:prstGeom prst="rect">
-            <a:avLst/>
-          </a:prstGeom>
-          <a:noFill/>
-          <a:ln>
-            <a:noFill/>
-          </a:ln>
-          <a:extLst>
-            <a:ext uri="{909E8E84-426E-40DD-AFC4-6F175D3DCCD1}">
-              <a14:hiddenFill xmlns:a14="http://schemas.microsoft.com/office/drawing/2010/main">
-                <a:solidFill>
-                  <a:srgbClr val="FFFFFF"/>
-                </a:solidFill>
-              </a14:hiddenFill>
-            </a:ext>
-            <a:ext uri="{91240B29-F687-4F45-9708-019B960494DF}">
-              <a14:hiddenLine xmlns:a14="http://schemas.microsoft.com/office/drawing/2010/main" w="9525">
-                <a:solidFill>
-                  <a:srgbClr val="000000"/>
-                </a:solidFill>
-                <a:miter lim="800000"/>
-                <a:headEnd/>
-                <a:tailEnd/>
-              </a14:hiddenLine>
-            </a:ext>
-            <a:ext uri="{FAA26D3D-D897-4be2-8F04-BA451C77F1D7}">
-              <ma14:placeholderFlag xmlns:ma14="http://schemas.microsoft.com/office/mac/drawingml/2011/main" xmlns="" val="1"/>
-            </a:ext>
-          </a:extLst>
-        </p:spPr>
-        <p:txBody>
-          <a:bodyPr vert="horz" wrap="square" lIns="91440" tIns="45720" rIns="91440" bIns="45720" numCol="1" anchor="ctr" anchorCtr="0" compatLnSpc="1">
-            <a:prstTxWarp prst="textNoShape">
-              <a:avLst/>
-            </a:prstTxWarp>
-          </a:bodyPr>
-          <a:lstStyle>
-            <a:lvl1pPr algn="l" rtl="0" eaLnBrk="1" fontAlgn="base" hangingPunct="1">
-              <a:spcBef>
-                <a:spcPct val="0"/>
-              </a:spcBef>
-              <a:spcAft>
-                <a:spcPct val="0"/>
-              </a:spcAft>
-              <a:defRPr sz="4000" kern="1200">
-                <a:solidFill>
-                  <a:schemeClr val="tx2"/>
-                </a:solidFill>
-                <a:latin typeface="+mj-lt"/>
-                <a:ea typeface="ＭＳ Ｐゴシック" pitchFamily="-107" charset="-128"/>
-                <a:cs typeface="ＭＳ Ｐゴシック" pitchFamily="-107" charset="-128"/>
-              </a:defRPr>
-            </a:lvl1pPr>
-            <a:lvl2pPr algn="l" rtl="0" eaLnBrk="1" fontAlgn="base" hangingPunct="1">
-              <a:spcBef>
-                <a:spcPct val="0"/>
-              </a:spcBef>
-              <a:spcAft>
-                <a:spcPct val="0"/>
-              </a:spcAft>
-              <a:defRPr sz="4000">
-                <a:solidFill>
-                  <a:schemeClr val="tx2"/>
-                </a:solidFill>
-                <a:latin typeface="Trebuchet MS" pitchFamily="-107" charset="0"/>
-                <a:ea typeface="ＭＳ Ｐゴシック" pitchFamily="-107" charset="-128"/>
-                <a:cs typeface="ＭＳ Ｐゴシック" pitchFamily="-107" charset="-128"/>
-              </a:defRPr>
-            </a:lvl2pPr>
-            <a:lvl3pPr algn="l" rtl="0" eaLnBrk="1" fontAlgn="base" hangingPunct="1">
-              <a:spcBef>
-                <a:spcPct val="0"/>
-              </a:spcBef>
-              <a:spcAft>
-                <a:spcPct val="0"/>
-              </a:spcAft>
-              <a:defRPr sz="4000">
-                <a:solidFill>
-                  <a:schemeClr val="tx2"/>
-                </a:solidFill>
-                <a:latin typeface="Trebuchet MS" pitchFamily="-107" charset="0"/>
-                <a:ea typeface="ＭＳ Ｐゴシック" pitchFamily="-107" charset="-128"/>
-                <a:cs typeface="ＭＳ Ｐゴシック" pitchFamily="-107" charset="-128"/>
-              </a:defRPr>
-            </a:lvl3pPr>
-            <a:lvl4pPr algn="l" rtl="0" eaLnBrk="1" fontAlgn="base" hangingPunct="1">
-              <a:spcBef>
-                <a:spcPct val="0"/>
-              </a:spcBef>
-              <a:spcAft>
-                <a:spcPct val="0"/>
-              </a:spcAft>
-              <a:defRPr sz="4000">
-                <a:solidFill>
-                  <a:schemeClr val="tx2"/>
-                </a:solidFill>
-                <a:latin typeface="Trebuchet MS" pitchFamily="-107" charset="0"/>
-                <a:ea typeface="ＭＳ Ｐゴシック" pitchFamily="-107" charset="-128"/>
-                <a:cs typeface="ＭＳ Ｐゴシック" pitchFamily="-107" charset="-128"/>
-              </a:defRPr>
-            </a:lvl4pPr>
-            <a:lvl5pPr algn="l" rtl="0" eaLnBrk="1" fontAlgn="base" hangingPunct="1">
-              <a:spcBef>
-                <a:spcPct val="0"/>
-              </a:spcBef>
-              <a:spcAft>
-                <a:spcPct val="0"/>
-              </a:spcAft>
-              <a:defRPr sz="4000">
-                <a:solidFill>
-                  <a:schemeClr val="tx2"/>
-                </a:solidFill>
-                <a:latin typeface="Trebuchet MS" pitchFamily="-107" charset="0"/>
-                <a:ea typeface="ＭＳ Ｐゴシック" pitchFamily="-107" charset="-128"/>
-                <a:cs typeface="ＭＳ Ｐゴシック" pitchFamily="-107" charset="-128"/>
-              </a:defRPr>
-            </a:lvl5pPr>
-            <a:lvl6pPr marL="457200" algn="l" rtl="0" eaLnBrk="1" fontAlgn="base" hangingPunct="1">
-              <a:spcBef>
-                <a:spcPct val="0"/>
-              </a:spcBef>
-              <a:spcAft>
-                <a:spcPct val="0"/>
-              </a:spcAft>
-              <a:defRPr sz="4000">
-                <a:solidFill>
-                  <a:schemeClr val="tx2"/>
-                </a:solidFill>
-                <a:latin typeface="Trebuchet MS" pitchFamily="-107" charset="0"/>
-                <a:ea typeface="ＭＳ Ｐゴシック" pitchFamily="-107" charset="-128"/>
-                <a:cs typeface="ＭＳ Ｐゴシック" pitchFamily="-107" charset="-128"/>
-              </a:defRPr>
-            </a:lvl6pPr>
-            <a:lvl7pPr marL="914400" algn="l" rtl="0" eaLnBrk="1" fontAlgn="base" hangingPunct="1">
-              <a:spcBef>
-                <a:spcPct val="0"/>
-              </a:spcBef>
-              <a:spcAft>
-                <a:spcPct val="0"/>
-              </a:spcAft>
-              <a:defRPr sz="4000">
-                <a:solidFill>
-                  <a:schemeClr val="tx2"/>
-                </a:solidFill>
-                <a:latin typeface="Trebuchet MS" pitchFamily="-107" charset="0"/>
-                <a:ea typeface="ＭＳ Ｐゴシック" pitchFamily="-107" charset="-128"/>
-                <a:cs typeface="ＭＳ Ｐゴシック" pitchFamily="-107" charset="-128"/>
-              </a:defRPr>
-            </a:lvl7pPr>
-            <a:lvl8pPr marL="1371600" algn="l" rtl="0" eaLnBrk="1" fontAlgn="base" hangingPunct="1">
-              <a:spcBef>
-                <a:spcPct val="0"/>
-              </a:spcBef>
-              <a:spcAft>
-                <a:spcPct val="0"/>
-              </a:spcAft>
-              <a:defRPr sz="4000">
-                <a:solidFill>
-                  <a:schemeClr val="tx2"/>
-                </a:solidFill>
-                <a:latin typeface="Trebuchet MS" pitchFamily="-107" charset="0"/>
-                <a:ea typeface="ＭＳ Ｐゴシック" pitchFamily="-107" charset="-128"/>
-                <a:cs typeface="ＭＳ Ｐゴシック" pitchFamily="-107" charset="-128"/>
-              </a:defRPr>
-            </a:lvl8pPr>
-            <a:lvl9pPr marL="1828800" algn="l" rtl="0" eaLnBrk="1" fontAlgn="base" hangingPunct="1">
-              <a:spcBef>
-                <a:spcPct val="0"/>
-              </a:spcBef>
-              <a:spcAft>
-                <a:spcPct val="0"/>
-              </a:spcAft>
-              <a:defRPr sz="4000">
-                <a:solidFill>
-                  <a:schemeClr val="tx2"/>
-                </a:solidFill>
-                <a:latin typeface="Trebuchet MS" pitchFamily="-107" charset="0"/>
-                <a:ea typeface="ＭＳ Ｐゴシック" pitchFamily="-107" charset="-128"/>
-                <a:cs typeface="ＭＳ Ｐゴシック" pitchFamily="-107" charset="-128"/>
-              </a:defRPr>
-            </a:lvl9pPr>
-          </a:lstStyle>
-          <a:p>
-            <a:r>
-              <a:rPr lang="en-US" dirty="0" smtClean="0"/>
-              <a:t>Testes – </a:t>
-            </a:r>
-            <a:r>
-              <a:rPr lang="en-US" dirty="0" err="1" smtClean="0"/>
-              <a:t>Localização</a:t>
-            </a:r>
-            <a:r>
-              <a:rPr lang="en-US" dirty="0" smtClean="0"/>
-              <a:t> </a:t>
-            </a:r>
-            <a:r>
-              <a:rPr lang="en-US" sz="3600" b="1" dirty="0" smtClean="0"/>
-              <a:t>– </a:t>
-            </a:r>
-            <a:r>
-              <a:rPr lang="en-US" sz="3600" b="1" dirty="0" err="1" smtClean="0"/>
-              <a:t>eixo</a:t>
-            </a:r>
-            <a:r>
-              <a:rPr lang="en-US" sz="3600" b="1" dirty="0" smtClean="0"/>
-              <a:t> x</a:t>
-            </a:r>
-            <a:endParaRPr lang="en-US" sz="3600" b="1" dirty="0"/>
-          </a:p>
-        </p:txBody>
-      </p:sp>
       <p:sp>
         <p:nvSpPr>
           <p:cNvPr id="6" name="CaixaDeTexto 5"/>
@@ -15883,8 +15419,8 @@
         </p:nvSpPr>
         <p:spPr>
           <a:xfrm>
-            <a:off x="7505700" y="3305175"/>
-            <a:ext cx="1458688" cy="646331"/>
+            <a:off x="7437759" y="4688488"/>
+            <a:ext cx="1458688" cy="923330"/>
           </a:xfrm>
           <a:prstGeom prst="rect">
             <a:avLst/>
@@ -15903,7 +15439,25 @@
                   <a:srgbClr val="FF0000"/>
                 </a:solidFill>
               </a:rPr>
-              <a:t>&lt; 27,19mm</a:t>
+              <a:t>Erro:</a:t>
+            </a:r>
+          </a:p>
+          <a:p>
+            <a:r>
+              <a:rPr lang="pt-BR" dirty="0" smtClean="0">
+                <a:solidFill>
+                  <a:srgbClr val="FF0000"/>
+                </a:solidFill>
+              </a:rPr>
+              <a:t>&lt; </a:t>
+            </a:r>
+            <a:r>
+              <a:rPr lang="pt-BR" dirty="0" smtClean="0">
+                <a:solidFill>
+                  <a:srgbClr val="FF0000"/>
+                </a:solidFill>
+              </a:rPr>
+              <a:t>27,19mm</a:t>
             </a:r>
           </a:p>
           <a:p>
@@ -15926,7 +15480,7 @@
     </p:spTree>
     <p:extLst>
       <p:ext uri="{BB962C8B-B14F-4D97-AF65-F5344CB8AC3E}">
-        <p14:creationId xmlns:p14="http://schemas.microsoft.com/office/powerpoint/2010/main" val="937207552"/>
+        <p14:creationId xmlns:p14="http://schemas.microsoft.com/office/powerpoint/2010/main" val="3159053500"/>
       </p:ext>
     </p:extLst>
   </p:cSld>
@@ -16022,7 +15576,7 @@
 </p:sld>
 </file>
 
-<file path=ppt/slides/slide43.xml><?xml version="1.0" encoding="utf-8"?>
+<file path=ppt/slides/slide42.xml><?xml version="1.0" encoding="utf-8"?>
 <p:sld xmlns:a="http://schemas.openxmlformats.org/drawingml/2006/main" xmlns:r="http://schemas.openxmlformats.org/officeDocument/2006/relationships" xmlns:p="http://schemas.openxmlformats.org/presentationml/2006/main">
   <p:cSld>
     <p:spTree>
@@ -16199,7 +15753,6 @@
               <a:rPr lang="pt-BR" sz="900" dirty="0" smtClean="0"/>
               <a:t>95% </a:t>
             </a:r>
-            <a:endParaRPr lang="pt-BR" sz="900" dirty="0" smtClean="0"/>
           </a:p>
         </p:txBody>
       </p:sp>
@@ -16356,7 +15909,7 @@
 </p:sld>
 </file>
 
-<file path=ppt/slides/slide44.xml><?xml version="1.0" encoding="utf-8"?>
+<file path=ppt/slides/slide43.xml><?xml version="1.0" encoding="utf-8"?>
 <p:sld xmlns:a="http://schemas.openxmlformats.org/drawingml/2006/main" xmlns:r="http://schemas.openxmlformats.org/officeDocument/2006/relationships" xmlns:p="http://schemas.openxmlformats.org/presentationml/2006/main">
   <p:cSld>
     <p:spTree>
@@ -16955,7 +16508,7 @@
 </p:sld>
 </file>
 
-<file path=ppt/slides/slide45.xml><?xml version="1.0" encoding="utf-8"?>
+<file path=ppt/slides/slide44.xml><?xml version="1.0" encoding="utf-8"?>
 <p:sld xmlns:a="http://schemas.openxmlformats.org/drawingml/2006/main" xmlns:r="http://schemas.openxmlformats.org/officeDocument/2006/relationships" xmlns:p="http://schemas.openxmlformats.org/presentationml/2006/main">
   <p:cSld>
     <p:spTree>
@@ -17410,7 +16963,7 @@
 </p:sld>
 </file>
 
-<file path=ppt/slides/slide46.xml><?xml version="1.0" encoding="utf-8"?>
+<file path=ppt/slides/slide45.xml><?xml version="1.0" encoding="utf-8"?>
 <p:sld xmlns:a="http://schemas.openxmlformats.org/drawingml/2006/main" xmlns:r="http://schemas.openxmlformats.org/officeDocument/2006/relationships" xmlns:p="http://schemas.openxmlformats.org/presentationml/2006/main">
   <p:cSld>
     <p:spTree>
@@ -17509,7 +17062,7 @@
 </p:sld>
 </file>
 
-<file path=ppt/slides/slide47.xml><?xml version="1.0" encoding="utf-8"?>
+<file path=ppt/slides/slide46.xml><?xml version="1.0" encoding="utf-8"?>
 <p:sld xmlns:a="http://schemas.openxmlformats.org/drawingml/2006/main" xmlns:r="http://schemas.openxmlformats.org/officeDocument/2006/relationships" xmlns:p="http://schemas.openxmlformats.org/presentationml/2006/main">
   <p:cSld>
     <p:spTree>
@@ -17654,6 +17207,399 @@
 </p:sld>
 </file>
 
+<file path=ppt/slides/slide47.xml><?xml version="1.0" encoding="utf-8"?>
+<p:sld xmlns:a="http://schemas.openxmlformats.org/drawingml/2006/main" xmlns:r="http://schemas.openxmlformats.org/officeDocument/2006/relationships" xmlns:p="http://schemas.openxmlformats.org/presentationml/2006/main">
+  <p:cSld>
+    <p:spTree>
+      <p:nvGrpSpPr>
+        <p:cNvPr id="1" name=""/>
+        <p:cNvGrpSpPr/>
+        <p:nvPr/>
+      </p:nvGrpSpPr>
+      <p:grpSpPr>
+        <a:xfrm>
+          <a:off x="0" y="0"/>
+          <a:ext cx="0" cy="0"/>
+          <a:chOff x="0" y="0"/>
+          <a:chExt cx="0" cy="0"/>
+        </a:xfrm>
+      </p:grpSpPr>
+      <p:sp>
+        <p:nvSpPr>
+          <p:cNvPr id="4" name="Title 1"/>
+          <p:cNvSpPr>
+            <a:spLocks noGrp="1"/>
+          </p:cNvSpPr>
+          <p:nvPr>
+            <p:ph type="title"/>
+          </p:nvPr>
+        </p:nvSpPr>
+        <p:spPr>
+          <a:xfrm>
+            <a:off x="457200" y="558946"/>
+            <a:ext cx="8229600" cy="1066800"/>
+          </a:xfrm>
+        </p:spPr>
+        <p:txBody>
+          <a:bodyPr/>
+          <a:lstStyle/>
+          <a:p>
+            <a:r>
+              <a:rPr lang="en-US" dirty="0" err="1" smtClean="0"/>
+              <a:t>Conclusão</a:t>
+            </a:r>
+            <a:endParaRPr lang="en-US" dirty="0"/>
+          </a:p>
+        </p:txBody>
+      </p:sp>
+      <p:sp>
+        <p:nvSpPr>
+          <p:cNvPr id="14" name="Rounded Rectangle 3"/>
+          <p:cNvSpPr/>
+          <p:nvPr/>
+        </p:nvSpPr>
+        <p:spPr>
+          <a:xfrm>
+            <a:off x="6882547" y="1126236"/>
+            <a:ext cx="1984368" cy="1253931"/>
+          </a:xfrm>
+          <a:prstGeom prst="roundRect">
+            <a:avLst/>
+          </a:prstGeom>
+          <a:solidFill>
+            <a:srgbClr val="FFFFFF"/>
+          </a:solidFill>
+        </p:spPr>
+        <p:style>
+          <a:lnRef idx="1">
+            <a:schemeClr val="accent6"/>
+          </a:lnRef>
+          <a:fillRef idx="3">
+            <a:schemeClr val="accent6"/>
+          </a:fillRef>
+          <a:effectRef idx="2">
+            <a:schemeClr val="accent6"/>
+          </a:effectRef>
+          <a:fontRef idx="minor">
+            <a:schemeClr val="lt1"/>
+          </a:fontRef>
+        </p:style>
+        <p:txBody>
+          <a:bodyPr rtlCol="0" anchor="t"/>
+          <a:lstStyle/>
+          <a:p>
+            <a:pPr algn="ctr"/>
+            <a:r>
+              <a:rPr lang="pt-BR" dirty="0" smtClean="0">
+                <a:solidFill>
+                  <a:schemeClr val="tx1"/>
+                </a:solidFill>
+              </a:rPr>
+              <a:t>Middleware </a:t>
+            </a:r>
+            <a:endParaRPr lang="pt-BR" dirty="0">
+              <a:solidFill>
+                <a:schemeClr val="tx1"/>
+              </a:solidFill>
+            </a:endParaRPr>
+          </a:p>
+          <a:p>
+            <a:pPr algn="ctr"/>
+            <a:endParaRPr lang="pt-BR" dirty="0">
+              <a:solidFill>
+                <a:schemeClr val="tx1"/>
+              </a:solidFill>
+            </a:endParaRPr>
+          </a:p>
+        </p:txBody>
+      </p:sp>
+      <p:sp>
+        <p:nvSpPr>
+          <p:cNvPr id="15" name="Trapezóide 23"/>
+          <p:cNvSpPr/>
+          <p:nvPr/>
+        </p:nvSpPr>
+        <p:spPr>
+          <a:xfrm rot="3758356">
+            <a:off x="4724745" y="782502"/>
+            <a:ext cx="2001555" cy="4294775"/>
+          </a:xfrm>
+          <a:prstGeom prst="trapezoid">
+            <a:avLst>
+              <a:gd name="adj" fmla="val 50000"/>
+            </a:avLst>
+          </a:prstGeom>
+          <a:solidFill>
+            <a:schemeClr val="accent1">
+              <a:alpha val="73000"/>
+            </a:schemeClr>
+          </a:solidFill>
+        </p:spPr>
+        <p:style>
+          <a:lnRef idx="2">
+            <a:schemeClr val="accent1">
+              <a:shade val="50000"/>
+            </a:schemeClr>
+          </a:lnRef>
+          <a:fillRef idx="1">
+            <a:schemeClr val="accent1"/>
+          </a:fillRef>
+          <a:effectRef idx="0">
+            <a:schemeClr val="accent1"/>
+          </a:effectRef>
+          <a:fontRef idx="minor">
+            <a:schemeClr val="lt1"/>
+          </a:fontRef>
+        </p:style>
+        <p:txBody>
+          <a:bodyPr anchor="ctr"/>
+          <a:lstStyle/>
+          <a:p>
+            <a:pPr algn="ctr"/>
+            <a:endParaRPr lang="pt-BR">
+              <a:solidFill>
+                <a:srgbClr val="FFFFFF"/>
+              </a:solidFill>
+              <a:latin typeface="Georgia" charset="0"/>
+              <a:ea typeface="ＭＳ Ｐゴシック" charset="0"/>
+              <a:cs typeface="ＭＳ Ｐゴシック" charset="0"/>
+            </a:endParaRPr>
+          </a:p>
+        </p:txBody>
+      </p:sp>
+      <p:sp>
+        <p:nvSpPr>
+          <p:cNvPr id="16" name="Rounded Rectangle 4"/>
+          <p:cNvSpPr/>
+          <p:nvPr/>
+        </p:nvSpPr>
+        <p:spPr>
+          <a:xfrm>
+            <a:off x="3235336" y="2952768"/>
+            <a:ext cx="3096192" cy="1893878"/>
+          </a:xfrm>
+          <a:prstGeom prst="roundRect">
+            <a:avLst/>
+          </a:prstGeom>
+          <a:solidFill>
+            <a:schemeClr val="bg1"/>
+          </a:solidFill>
+        </p:spPr>
+        <p:style>
+          <a:lnRef idx="1">
+            <a:schemeClr val="accent2"/>
+          </a:lnRef>
+          <a:fillRef idx="3">
+            <a:schemeClr val="accent2"/>
+          </a:fillRef>
+          <a:effectRef idx="2">
+            <a:schemeClr val="accent2"/>
+          </a:effectRef>
+          <a:fontRef idx="minor">
+            <a:schemeClr val="lt1"/>
+          </a:fontRef>
+        </p:style>
+        <p:txBody>
+          <a:bodyPr rtlCol="0" anchor="ctr"/>
+          <a:lstStyle/>
+          <a:p>
+            <a:pPr algn="ctr"/>
+            <a:r>
+              <a:rPr lang="pt-BR" dirty="0" smtClean="0">
+                <a:solidFill>
+                  <a:schemeClr val="tx1"/>
+                </a:solidFill>
+              </a:rPr>
+              <a:t>Sistema </a:t>
+            </a:r>
+            <a:r>
+              <a:rPr lang="pt-BR" b="1" dirty="0" smtClean="0">
+                <a:solidFill>
+                  <a:srgbClr val="000000"/>
+                </a:solidFill>
+              </a:rPr>
+              <a:t>TRUE</a:t>
+            </a:r>
+          </a:p>
+          <a:p>
+            <a:pPr algn="ctr"/>
+            <a:endParaRPr lang="pt-BR" b="1" dirty="0" smtClean="0">
+              <a:solidFill>
+                <a:srgbClr val="000000"/>
+              </a:solidFill>
+            </a:endParaRPr>
+          </a:p>
+          <a:p>
+            <a:pPr algn="ctr"/>
+            <a:r>
+              <a:rPr lang="en-GB" sz="1600" dirty="0" smtClean="0">
+                <a:solidFill>
+                  <a:srgbClr val="000000"/>
+                </a:solidFill>
+              </a:rPr>
+              <a:t>(Tracking </a:t>
+            </a:r>
+            <a:r>
+              <a:rPr lang="en-GB" sz="1600" dirty="0">
+                <a:solidFill>
+                  <a:srgbClr val="000000"/>
+                </a:solidFill>
+              </a:rPr>
+              <a:t>and Recognizing Users in the </a:t>
+            </a:r>
+            <a:r>
+              <a:rPr lang="en-GB" sz="1600" dirty="0" smtClean="0">
+                <a:solidFill>
+                  <a:srgbClr val="000000"/>
+                </a:solidFill>
+              </a:rPr>
+              <a:t>Environment)</a:t>
+            </a:r>
+            <a:endParaRPr lang="en-GB" sz="1600" dirty="0">
+              <a:solidFill>
+                <a:srgbClr val="000000"/>
+              </a:solidFill>
+            </a:endParaRPr>
+          </a:p>
+        </p:txBody>
+      </p:sp>
+      <p:pic>
+        <p:nvPicPr>
+          <p:cNvPr id="17" name="Picture 2" descr="I:\Nova pasta\Sem-Título-1.gif"/>
+          <p:cNvPicPr>
+            <a:picLocks noChangeAspect="1" noChangeArrowheads="1"/>
+          </p:cNvPicPr>
+          <p:nvPr/>
+        </p:nvPicPr>
+        <p:blipFill>
+          <a:blip r:embed="rId2" cstate="print"/>
+          <a:stretch>
+            <a:fillRect/>
+          </a:stretch>
+        </p:blipFill>
+        <p:spPr bwMode="auto">
+          <a:xfrm>
+            <a:off x="7664916" y="1581036"/>
+            <a:ext cx="855431" cy="769767"/>
+          </a:xfrm>
+          <a:prstGeom prst="rect">
+            <a:avLst/>
+          </a:prstGeom>
+          <a:noFill/>
+        </p:spPr>
+      </p:pic>
+      <p:pic>
+        <p:nvPicPr>
+          <p:cNvPr id="18" name="Picture 9"/>
+          <p:cNvPicPr>
+            <a:picLocks noChangeAspect="1"/>
+          </p:cNvPicPr>
+          <p:nvPr/>
+        </p:nvPicPr>
+        <p:blipFill>
+          <a:blip r:embed="rId3"/>
+          <a:stretch>
+            <a:fillRect/>
+          </a:stretch>
+        </p:blipFill>
+        <p:spPr>
+          <a:xfrm>
+            <a:off x="78243" y="2966623"/>
+            <a:ext cx="1892826" cy="1143318"/>
+          </a:xfrm>
+          <a:prstGeom prst="rect">
+            <a:avLst/>
+          </a:prstGeom>
+        </p:spPr>
+      </p:pic>
+      <p:sp>
+        <p:nvSpPr>
+          <p:cNvPr id="19" name="Striped Right Arrow 10"/>
+          <p:cNvSpPr/>
+          <p:nvPr/>
+        </p:nvSpPr>
+        <p:spPr>
+          <a:xfrm>
+            <a:off x="2122900" y="3216932"/>
+            <a:ext cx="978408" cy="484632"/>
+          </a:xfrm>
+          <a:prstGeom prst="stripedRightArrow">
+            <a:avLst/>
+          </a:prstGeom>
+        </p:spPr>
+        <p:style>
+          <a:lnRef idx="1">
+            <a:schemeClr val="accent1"/>
+          </a:lnRef>
+          <a:fillRef idx="3">
+            <a:schemeClr val="accent1"/>
+          </a:fillRef>
+          <a:effectRef idx="2">
+            <a:schemeClr val="accent1"/>
+          </a:effectRef>
+          <a:fontRef idx="minor">
+            <a:schemeClr val="lt1"/>
+          </a:fontRef>
+        </p:style>
+        <p:txBody>
+          <a:bodyPr rtlCol="0" anchor="ctr"/>
+          <a:lstStyle/>
+          <a:p>
+            <a:pPr algn="ctr"/>
+            <a:endParaRPr lang="pt-BR"/>
+          </a:p>
+        </p:txBody>
+      </p:sp>
+      <p:sp>
+        <p:nvSpPr>
+          <p:cNvPr id="20" name="TextBox 11"/>
+          <p:cNvSpPr txBox="1"/>
+          <p:nvPr/>
+        </p:nvSpPr>
+        <p:spPr>
+          <a:xfrm>
+            <a:off x="630381" y="3844838"/>
+            <a:ext cx="845041" cy="369332"/>
+          </a:xfrm>
+          <a:prstGeom prst="rect">
+            <a:avLst/>
+          </a:prstGeom>
+          <a:noFill/>
+        </p:spPr>
+        <p:txBody>
+          <a:bodyPr wrap="none" rtlCol="0">
+            <a:spAutoFit/>
+          </a:bodyPr>
+          <a:lstStyle/>
+          <a:p>
+            <a:r>
+              <a:rPr lang="pt-BR" dirty="0" err="1" smtClean="0"/>
+              <a:t>Kinect</a:t>
+            </a:r>
+            <a:endParaRPr lang="pt-BR" dirty="0"/>
+          </a:p>
+        </p:txBody>
+      </p:sp>
+    </p:spTree>
+    <p:extLst>
+      <p:ext uri="{BB962C8B-B14F-4D97-AF65-F5344CB8AC3E}">
+        <p14:creationId xmlns:p14="http://schemas.microsoft.com/office/powerpoint/2010/main" val="3410668888"/>
+      </p:ext>
+    </p:extLst>
+  </p:cSld>
+  <p:clrMapOvr>
+    <a:masterClrMapping/>
+  </p:clrMapOvr>
+  <p:timing>
+    <p:tnLst>
+      <p:par>
+        <p:cTn id="1" dur="indefinite" restart="never" nodeType="tmRoot"/>
+      </p:par>
+    </p:tnLst>
+  </p:timing>
+</p:sld>
+</file>
+
 <file path=ppt/slides/slide48.xml><?xml version="1.0" encoding="utf-8"?>
 <p:sld xmlns:a="http://schemas.openxmlformats.org/drawingml/2006/main" xmlns:r="http://schemas.openxmlformats.org/officeDocument/2006/relationships" xmlns:p="http://schemas.openxmlformats.org/presentationml/2006/main">
   <p:cSld>
@@ -17693,307 +17639,65 @@
           <a:p>
             <a:r>
               <a:rPr lang="en-US" dirty="0" err="1" smtClean="0"/>
-              <a:t>Conclusão</a:t>
+              <a:t>Trabalhos</a:t>
+            </a:r>
+            <a:r>
+              <a:rPr lang="en-US" dirty="0" smtClean="0"/>
+              <a:t> </a:t>
+            </a:r>
+            <a:r>
+              <a:rPr lang="en-US" dirty="0" err="1" smtClean="0"/>
+              <a:t>Futuros</a:t>
             </a:r>
             <a:endParaRPr lang="en-US" dirty="0"/>
           </a:p>
         </p:txBody>
       </p:sp>
-      <p:sp>
-        <p:nvSpPr>
-          <p:cNvPr id="7" name="Rounded Rectangle 6"/>
-          <p:cNvSpPr/>
+      <p:pic>
+        <p:nvPicPr>
+          <p:cNvPr id="1026" name="Picture 2" descr="C:\Users\Tales\Documents\GitHub\Artigo-TRUE-SBCUP\img\multiples_kinects.jpg"/>
+          <p:cNvPicPr>
+            <a:picLocks noChangeAspect="1" noChangeArrowheads="1"/>
+          </p:cNvPicPr>
           <p:nvPr/>
-        </p:nvSpPr>
-        <p:spPr>
-          <a:xfrm>
-            <a:off x="3606149" y="2252780"/>
-            <a:ext cx="1915593" cy="914400"/>
-          </a:xfrm>
-          <a:prstGeom prst="roundRect">
+        </p:nvPicPr>
+        <p:blipFill>
+          <a:blip r:embed="rId2">
+            <a:extLst>
+              <a:ext uri="{28A0092B-C50C-407E-A947-70E740481C1C}">
+                <a14:useLocalDpi xmlns:a14="http://schemas.microsoft.com/office/drawing/2010/main" val="0"/>
+              </a:ext>
+            </a:extLst>
+          </a:blip>
+          <a:srcRect/>
+          <a:stretch>
+            <a:fillRect/>
+          </a:stretch>
+        </p:blipFill>
+        <p:spPr bwMode="auto">
+          <a:xfrm>
+            <a:off x="457199" y="2295966"/>
+            <a:ext cx="8269169" cy="3509096"/>
+          </a:xfrm>
+          <a:prstGeom prst="rect">
             <a:avLst/>
           </a:prstGeom>
-        </p:spPr>
-        <p:style>
-          <a:lnRef idx="1">
-            <a:schemeClr val="accent6"/>
-          </a:lnRef>
-          <a:fillRef idx="3">
-            <a:schemeClr val="accent6"/>
-          </a:fillRef>
-          <a:effectRef idx="2">
-            <a:schemeClr val="accent6"/>
-          </a:effectRef>
-          <a:fontRef idx="minor">
-            <a:schemeClr val="lt1"/>
-          </a:fontRef>
-        </p:style>
-        <p:txBody>
-          <a:bodyPr rtlCol="0" anchor="ctr"/>
-          <a:lstStyle/>
-          <a:p>
-            <a:pPr algn="ctr"/>
-            <a:r>
-              <a:rPr lang="pt-BR" b="1" dirty="0" smtClean="0"/>
-              <a:t>Sistema TRUE</a:t>
-            </a:r>
-            <a:endParaRPr lang="pt-BR" b="1" dirty="0"/>
-          </a:p>
-        </p:txBody>
-      </p:sp>
-      <p:sp>
-        <p:nvSpPr>
-          <p:cNvPr id="8" name="Rounded Rectangle 7"/>
-          <p:cNvSpPr/>
-          <p:nvPr/>
-        </p:nvSpPr>
-        <p:spPr>
-          <a:xfrm>
-            <a:off x="708617" y="4360165"/>
-            <a:ext cx="1915593" cy="914400"/>
-          </a:xfrm>
-          <a:prstGeom prst="roundRect">
-            <a:avLst/>
-          </a:prstGeom>
-        </p:spPr>
-        <p:style>
-          <a:lnRef idx="1">
-            <a:schemeClr val="dk1"/>
-          </a:lnRef>
-          <a:fillRef idx="3">
-            <a:schemeClr val="dk1"/>
-          </a:fillRef>
-          <a:effectRef idx="2">
-            <a:schemeClr val="dk1"/>
-          </a:effectRef>
-          <a:fontRef idx="minor">
-            <a:schemeClr val="lt1"/>
-          </a:fontRef>
-        </p:style>
-        <p:txBody>
-          <a:bodyPr rtlCol="0" anchor="ctr"/>
-          <a:lstStyle/>
-          <a:p>
-            <a:pPr algn="ctr"/>
-            <a:r>
-              <a:rPr lang="pt-BR" dirty="0" smtClean="0"/>
-              <a:t>Rastreamento</a:t>
-            </a:r>
-            <a:endParaRPr lang="pt-BR" dirty="0"/>
-          </a:p>
-        </p:txBody>
-      </p:sp>
-      <p:sp>
-        <p:nvSpPr>
-          <p:cNvPr id="9" name="Rounded Rectangle 8"/>
-          <p:cNvSpPr/>
-          <p:nvPr/>
-        </p:nvSpPr>
-        <p:spPr>
-          <a:xfrm>
-            <a:off x="3606149" y="4360165"/>
-            <a:ext cx="1915593" cy="914400"/>
-          </a:xfrm>
-          <a:prstGeom prst="roundRect">
-            <a:avLst/>
-          </a:prstGeom>
-        </p:spPr>
-        <p:style>
-          <a:lnRef idx="1">
-            <a:schemeClr val="dk1"/>
-          </a:lnRef>
-          <a:fillRef idx="3">
-            <a:schemeClr val="dk1"/>
-          </a:fillRef>
-          <a:effectRef idx="2">
-            <a:schemeClr val="dk1"/>
-          </a:effectRef>
-          <a:fontRef idx="minor">
-            <a:schemeClr val="lt1"/>
-          </a:fontRef>
-        </p:style>
-        <p:txBody>
-          <a:bodyPr rtlCol="0" anchor="ctr"/>
-          <a:lstStyle/>
-          <a:p>
-            <a:pPr algn="ctr"/>
-            <a:r>
-              <a:rPr lang="en-US" dirty="0" err="1" smtClean="0"/>
-              <a:t>Localização</a:t>
-            </a:r>
-            <a:endParaRPr lang="pt-BR" dirty="0"/>
-          </a:p>
-        </p:txBody>
-      </p:sp>
-      <p:sp>
-        <p:nvSpPr>
-          <p:cNvPr id="10" name="Rounded Rectangle 9"/>
-          <p:cNvSpPr/>
-          <p:nvPr/>
-        </p:nvSpPr>
-        <p:spPr>
-          <a:xfrm>
-            <a:off x="6678696" y="4360165"/>
-            <a:ext cx="1915593" cy="914400"/>
-          </a:xfrm>
-          <a:prstGeom prst="roundRect">
-            <a:avLst/>
-          </a:prstGeom>
-        </p:spPr>
-        <p:style>
-          <a:lnRef idx="1">
-            <a:schemeClr val="dk1"/>
-          </a:lnRef>
-          <a:fillRef idx="3">
-            <a:schemeClr val="dk1"/>
-          </a:fillRef>
-          <a:effectRef idx="2">
-            <a:schemeClr val="dk1"/>
-          </a:effectRef>
-          <a:fontRef idx="minor">
-            <a:schemeClr val="lt1"/>
-          </a:fontRef>
-        </p:style>
-        <p:txBody>
-          <a:bodyPr rtlCol="0" anchor="ctr"/>
-          <a:lstStyle/>
-          <a:p>
-            <a:pPr algn="ctr"/>
-            <a:r>
-              <a:rPr lang="en-US" dirty="0" err="1" smtClean="0"/>
-              <a:t>Identificação</a:t>
-            </a:r>
-            <a:endParaRPr lang="pt-BR" dirty="0"/>
-          </a:p>
-        </p:txBody>
-      </p:sp>
-      <p:sp>
-        <p:nvSpPr>
-          <p:cNvPr id="11" name="Right Arrow 10"/>
-          <p:cNvSpPr/>
-          <p:nvPr/>
-        </p:nvSpPr>
-        <p:spPr>
-          <a:xfrm rot="8550772">
-            <a:off x="2114084" y="3625618"/>
-            <a:ext cx="1585223" cy="231767"/>
-          </a:xfrm>
-          <a:prstGeom prst="rightArrow">
-            <a:avLst>
-              <a:gd name="adj1" fmla="val 50001"/>
-              <a:gd name="adj2" fmla="val 97998"/>
-            </a:avLst>
-          </a:prstGeom>
-        </p:spPr>
-        <p:style>
-          <a:lnRef idx="1">
-            <a:schemeClr val="dk1"/>
-          </a:lnRef>
-          <a:fillRef idx="3">
-            <a:schemeClr val="dk1"/>
-          </a:fillRef>
-          <a:effectRef idx="2">
-            <a:schemeClr val="dk1"/>
-          </a:effectRef>
-          <a:fontRef idx="minor">
-            <a:schemeClr val="lt1"/>
-          </a:fontRef>
-        </p:style>
-        <p:txBody>
-          <a:bodyPr rtlCol="0" anchor="ctr"/>
-          <a:lstStyle/>
-          <a:p>
-            <a:pPr algn="ctr"/>
-            <a:endParaRPr lang="pt-BR"/>
-          </a:p>
-        </p:txBody>
-      </p:sp>
-      <p:sp>
-        <p:nvSpPr>
-          <p:cNvPr id="12" name="Right Arrow 11"/>
-          <p:cNvSpPr/>
-          <p:nvPr/>
-        </p:nvSpPr>
-        <p:spPr>
-          <a:xfrm rot="2616808">
-            <a:off x="5382924" y="3681934"/>
-            <a:ext cx="1585223" cy="231767"/>
-          </a:xfrm>
-          <a:prstGeom prst="rightArrow">
-            <a:avLst>
-              <a:gd name="adj1" fmla="val 50001"/>
-              <a:gd name="adj2" fmla="val 97998"/>
-            </a:avLst>
-          </a:prstGeom>
-        </p:spPr>
-        <p:style>
-          <a:lnRef idx="1">
-            <a:schemeClr val="dk1"/>
-          </a:lnRef>
-          <a:fillRef idx="3">
-            <a:schemeClr val="dk1"/>
-          </a:fillRef>
-          <a:effectRef idx="2">
-            <a:schemeClr val="dk1"/>
-          </a:effectRef>
-          <a:fontRef idx="minor">
-            <a:schemeClr val="lt1"/>
-          </a:fontRef>
-        </p:style>
-        <p:txBody>
-          <a:bodyPr rtlCol="0" anchor="ctr"/>
-          <a:lstStyle/>
-          <a:p>
-            <a:pPr algn="ctr"/>
-            <a:endParaRPr lang="pt-BR"/>
-          </a:p>
-        </p:txBody>
-      </p:sp>
-      <p:sp>
-        <p:nvSpPr>
-          <p:cNvPr id="13" name="Right Arrow 12"/>
-          <p:cNvSpPr/>
-          <p:nvPr/>
-        </p:nvSpPr>
-        <p:spPr>
-          <a:xfrm rot="5400000">
-            <a:off x="4058839" y="3692213"/>
-            <a:ext cx="1015455" cy="231767"/>
-          </a:xfrm>
-          <a:prstGeom prst="rightArrow">
-            <a:avLst>
-              <a:gd name="adj1" fmla="val 50001"/>
-              <a:gd name="adj2" fmla="val 97998"/>
-            </a:avLst>
-          </a:prstGeom>
-        </p:spPr>
-        <p:style>
-          <a:lnRef idx="1">
-            <a:schemeClr val="dk1"/>
-          </a:lnRef>
-          <a:fillRef idx="3">
-            <a:schemeClr val="dk1"/>
-          </a:fillRef>
-          <a:effectRef idx="2">
-            <a:schemeClr val="dk1"/>
-          </a:effectRef>
-          <a:fontRef idx="minor">
-            <a:schemeClr val="lt1"/>
-          </a:fontRef>
-        </p:style>
-        <p:txBody>
-          <a:bodyPr rtlCol="0" anchor="ctr"/>
-          <a:lstStyle/>
-          <a:p>
-            <a:pPr algn="ctr"/>
-            <a:endParaRPr lang="pt-BR"/>
-          </a:p>
-        </p:txBody>
-      </p:sp>
+          <a:noFill/>
+          <a:extLst>
+            <a:ext uri="{909E8E84-426E-40DD-AFC4-6F175D3DCCD1}">
+              <a14:hiddenFill xmlns:a14="http://schemas.microsoft.com/office/drawing/2010/main">
+                <a:solidFill>
+                  <a:srgbClr val="FFFFFF"/>
+                </a:solidFill>
+              </a14:hiddenFill>
+            </a:ext>
+          </a:extLst>
+        </p:spPr>
+      </p:pic>
     </p:spTree>
     <p:extLst>
       <p:ext uri="{BB962C8B-B14F-4D97-AF65-F5344CB8AC3E}">
-        <p14:creationId xmlns:p14="http://schemas.microsoft.com/office/powerpoint/2010/main" val="3410668888"/>
+        <p14:creationId xmlns:p14="http://schemas.microsoft.com/office/powerpoint/2010/main" val="1118801349"/>
       </p:ext>
     </p:extLst>
   </p:cSld>
@@ -18003,304 +17707,9 @@
   <p:timing>
     <p:tnLst>
       <p:par>
-        <p:cTn id="1" dur="indefinite" restart="never" nodeType="tmRoot">
-          <p:childTnLst>
-            <p:seq concurrent="1" nextAc="seek">
-              <p:cTn id="2" dur="indefinite" nodeType="mainSeq">
-                <p:childTnLst>
-                  <p:par>
-                    <p:cTn id="3" fill="hold">
-                      <p:stCondLst>
-                        <p:cond delay="indefinite"/>
-                      </p:stCondLst>
-                      <p:childTnLst>
-                        <p:par>
-                          <p:cTn id="4" fill="hold">
-                            <p:stCondLst>
-                              <p:cond delay="0"/>
-                            </p:stCondLst>
-                            <p:childTnLst>
-                              <p:par>
-                                <p:cTn id="5" presetID="10" presetClass="entr" presetSubtype="0" fill="hold" grpId="0" nodeType="clickEffect">
-                                  <p:stCondLst>
-                                    <p:cond delay="0"/>
-                                  </p:stCondLst>
-                                  <p:childTnLst>
-                                    <p:set>
-                                      <p:cBhvr>
-                                        <p:cTn id="6" dur="1" fill="hold">
-                                          <p:stCondLst>
-                                            <p:cond delay="0"/>
-                                          </p:stCondLst>
-                                        </p:cTn>
-                                        <p:tgtEl>
-                                          <p:spTgt spid="8"/>
-                                        </p:tgtEl>
-                                        <p:attrNameLst>
-                                          <p:attrName>style.visibility</p:attrName>
-                                        </p:attrNameLst>
-                                      </p:cBhvr>
-                                      <p:to>
-                                        <p:strVal val="visible"/>
-                                      </p:to>
-                                    </p:set>
-                                    <p:animEffect transition="in" filter="fade">
-                                      <p:cBhvr>
-                                        <p:cTn id="7" dur="500"/>
-                                        <p:tgtEl>
-                                          <p:spTgt spid="8"/>
-                                        </p:tgtEl>
-                                      </p:cBhvr>
-                                    </p:animEffect>
-                                  </p:childTnLst>
-                                </p:cTn>
-                              </p:par>
-                              <p:par>
-                                <p:cTn id="8" presetID="10" presetClass="entr" presetSubtype="0" fill="hold" grpId="0" nodeType="withEffect">
-                                  <p:stCondLst>
-                                    <p:cond delay="0"/>
-                                  </p:stCondLst>
-                                  <p:childTnLst>
-                                    <p:set>
-                                      <p:cBhvr>
-                                        <p:cTn id="9" dur="1" fill="hold">
-                                          <p:stCondLst>
-                                            <p:cond delay="0"/>
-                                          </p:stCondLst>
-                                        </p:cTn>
-                                        <p:tgtEl>
-                                          <p:spTgt spid="11"/>
-                                        </p:tgtEl>
-                                        <p:attrNameLst>
-                                          <p:attrName>style.visibility</p:attrName>
-                                        </p:attrNameLst>
-                                      </p:cBhvr>
-                                      <p:to>
-                                        <p:strVal val="visible"/>
-                                      </p:to>
-                                    </p:set>
-                                    <p:animEffect transition="in" filter="fade">
-                                      <p:cBhvr>
-                                        <p:cTn id="10" dur="500"/>
-                                        <p:tgtEl>
-                                          <p:spTgt spid="11"/>
-                                        </p:tgtEl>
-                                      </p:cBhvr>
-                                    </p:animEffect>
-                                  </p:childTnLst>
-                                </p:cTn>
-                              </p:par>
-                            </p:childTnLst>
-                          </p:cTn>
-                        </p:par>
-                      </p:childTnLst>
-                    </p:cTn>
-                  </p:par>
-                  <p:par>
-                    <p:cTn id="11" fill="hold">
-                      <p:stCondLst>
-                        <p:cond delay="indefinite"/>
-                      </p:stCondLst>
-                      <p:childTnLst>
-                        <p:par>
-                          <p:cTn id="12" fill="hold">
-                            <p:stCondLst>
-                              <p:cond delay="0"/>
-                            </p:stCondLst>
-                            <p:childTnLst>
-                              <p:par>
-                                <p:cTn id="13" presetID="10" presetClass="entr" presetSubtype="0" fill="hold" grpId="0" nodeType="clickEffect">
-                                  <p:stCondLst>
-                                    <p:cond delay="0"/>
-                                  </p:stCondLst>
-                                  <p:childTnLst>
-                                    <p:set>
-                                      <p:cBhvr>
-                                        <p:cTn id="14" dur="1" fill="hold">
-                                          <p:stCondLst>
-                                            <p:cond delay="0"/>
-                                          </p:stCondLst>
-                                        </p:cTn>
-                                        <p:tgtEl>
-                                          <p:spTgt spid="13"/>
-                                        </p:tgtEl>
-                                        <p:attrNameLst>
-                                          <p:attrName>style.visibility</p:attrName>
-                                        </p:attrNameLst>
-                                      </p:cBhvr>
-                                      <p:to>
-                                        <p:strVal val="visible"/>
-                                      </p:to>
-                                    </p:set>
-                                    <p:animEffect transition="in" filter="fade">
-                                      <p:cBhvr>
-                                        <p:cTn id="15" dur="500"/>
-                                        <p:tgtEl>
-                                          <p:spTgt spid="13"/>
-                                        </p:tgtEl>
-                                      </p:cBhvr>
-                                    </p:animEffect>
-                                  </p:childTnLst>
-                                </p:cTn>
-                              </p:par>
-                              <p:par>
-                                <p:cTn id="16" presetID="10" presetClass="entr" presetSubtype="0" fill="hold" grpId="0" nodeType="withEffect">
-                                  <p:stCondLst>
-                                    <p:cond delay="0"/>
-                                  </p:stCondLst>
-                                  <p:childTnLst>
-                                    <p:set>
-                                      <p:cBhvr>
-                                        <p:cTn id="17" dur="1" fill="hold">
-                                          <p:stCondLst>
-                                            <p:cond delay="0"/>
-                                          </p:stCondLst>
-                                        </p:cTn>
-                                        <p:tgtEl>
-                                          <p:spTgt spid="9"/>
-                                        </p:tgtEl>
-                                        <p:attrNameLst>
-                                          <p:attrName>style.visibility</p:attrName>
-                                        </p:attrNameLst>
-                                      </p:cBhvr>
-                                      <p:to>
-                                        <p:strVal val="visible"/>
-                                      </p:to>
-                                    </p:set>
-                                    <p:animEffect transition="in" filter="fade">
-                                      <p:cBhvr>
-                                        <p:cTn id="18" dur="500"/>
-                                        <p:tgtEl>
-                                          <p:spTgt spid="9"/>
-                                        </p:tgtEl>
-                                      </p:cBhvr>
-                                    </p:animEffect>
-                                  </p:childTnLst>
-                                </p:cTn>
-                              </p:par>
-                            </p:childTnLst>
-                          </p:cTn>
-                        </p:par>
-                      </p:childTnLst>
-                    </p:cTn>
-                  </p:par>
-                  <p:par>
-                    <p:cTn id="19" fill="hold">
-                      <p:stCondLst>
-                        <p:cond delay="indefinite"/>
-                      </p:stCondLst>
-                      <p:childTnLst>
-                        <p:par>
-                          <p:cTn id="20" fill="hold">
-                            <p:stCondLst>
-                              <p:cond delay="0"/>
-                            </p:stCondLst>
-                            <p:childTnLst>
-                              <p:par>
-                                <p:cTn id="21" presetID="10" presetClass="entr" presetSubtype="0" fill="hold" grpId="0" nodeType="clickEffect">
-                                  <p:stCondLst>
-                                    <p:cond delay="0"/>
-                                  </p:stCondLst>
-                                  <p:childTnLst>
-                                    <p:set>
-                                      <p:cBhvr>
-                                        <p:cTn id="22" dur="1" fill="hold">
-                                          <p:stCondLst>
-                                            <p:cond delay="0"/>
-                                          </p:stCondLst>
-                                        </p:cTn>
-                                        <p:tgtEl>
-                                          <p:spTgt spid="12"/>
-                                        </p:tgtEl>
-                                        <p:attrNameLst>
-                                          <p:attrName>style.visibility</p:attrName>
-                                        </p:attrNameLst>
-                                      </p:cBhvr>
-                                      <p:to>
-                                        <p:strVal val="visible"/>
-                                      </p:to>
-                                    </p:set>
-                                    <p:animEffect transition="in" filter="fade">
-                                      <p:cBhvr>
-                                        <p:cTn id="23" dur="500"/>
-                                        <p:tgtEl>
-                                          <p:spTgt spid="12"/>
-                                        </p:tgtEl>
-                                      </p:cBhvr>
-                                    </p:animEffect>
-                                  </p:childTnLst>
-                                </p:cTn>
-                              </p:par>
-                              <p:par>
-                                <p:cTn id="24" presetID="10" presetClass="entr" presetSubtype="0" fill="hold" grpId="0" nodeType="withEffect">
-                                  <p:stCondLst>
-                                    <p:cond delay="0"/>
-                                  </p:stCondLst>
-                                  <p:childTnLst>
-                                    <p:set>
-                                      <p:cBhvr>
-                                        <p:cTn id="25" dur="1" fill="hold">
-                                          <p:stCondLst>
-                                            <p:cond delay="0"/>
-                                          </p:stCondLst>
-                                        </p:cTn>
-                                        <p:tgtEl>
-                                          <p:spTgt spid="10"/>
-                                        </p:tgtEl>
-                                        <p:attrNameLst>
-                                          <p:attrName>style.visibility</p:attrName>
-                                        </p:attrNameLst>
-                                      </p:cBhvr>
-                                      <p:to>
-                                        <p:strVal val="visible"/>
-                                      </p:to>
-                                    </p:set>
-                                    <p:animEffect transition="in" filter="fade">
-                                      <p:cBhvr>
-                                        <p:cTn id="26" dur="500"/>
-                                        <p:tgtEl>
-                                          <p:spTgt spid="10"/>
-                                        </p:tgtEl>
-                                      </p:cBhvr>
-                                    </p:animEffect>
-                                  </p:childTnLst>
-                                </p:cTn>
-                              </p:par>
-                            </p:childTnLst>
-                          </p:cTn>
-                        </p:par>
-                      </p:childTnLst>
-                    </p:cTn>
-                  </p:par>
-                </p:childTnLst>
-              </p:cTn>
-              <p:prevCondLst>
-                <p:cond evt="onPrev" delay="0">
-                  <p:tgtEl>
-                    <p:sldTgt/>
-                  </p:tgtEl>
-                </p:cond>
-              </p:prevCondLst>
-              <p:nextCondLst>
-                <p:cond evt="onNext" delay="0">
-                  <p:tgtEl>
-                    <p:sldTgt/>
-                  </p:tgtEl>
-                </p:cond>
-              </p:nextCondLst>
-            </p:seq>
-          </p:childTnLst>
-        </p:cTn>
+        <p:cTn id="1" dur="indefinite" restart="never" nodeType="tmRoot"/>
       </p:par>
     </p:tnLst>
-    <p:bldLst>
-      <p:bldP spid="8" grpId="0" animBg="1"/>
-      <p:bldP spid="9" grpId="0" animBg="1"/>
-      <p:bldP spid="10" grpId="0" animBg="1"/>
-      <p:bldP spid="11" grpId="0" animBg="1"/>
-      <p:bldP spid="12" grpId="0" animBg="1"/>
-      <p:bldP spid="13" grpId="0" animBg="1"/>
-    </p:bldLst>
   </p:timing>
 </p:sld>
 </file>
@@ -18324,13 +17733,11 @@
       </p:grpSpPr>
       <p:pic>
         <p:nvPicPr>
-          <p:cNvPr id="4" name="Picture 2" descr="3D Character and Blank Board by catheryn.carcamo."/>
+          <p:cNvPr id="4" name="Picture 3" descr="sorriso.png"/>
           <p:cNvPicPr>
-            <a:picLocks noGrp="1" noChangeAspect="1" noChangeArrowheads="1"/>
+            <a:picLocks noChangeAspect="1"/>
           </p:cNvPicPr>
-          <p:nvPr>
-            <p:ph idx="1"/>
-          </p:nvPr>
+          <p:nvPr/>
         </p:nvPicPr>
         <p:blipFill>
           <a:blip r:embed="rId2">
@@ -18340,42 +17747,18 @@
               </a:ext>
             </a:extLst>
           </a:blip>
-          <a:srcRect l="-43786" r="-43786"/>
           <a:stretch>
             <a:fillRect/>
           </a:stretch>
         </p:blipFill>
-        <p:spPr bwMode="auto">
-          <a:xfrm>
-            <a:off x="457200" y="723900"/>
-            <a:ext cx="8229600" cy="5849938"/>
+        <p:spPr>
+          <a:xfrm>
+            <a:off x="2296414" y="812801"/>
+            <a:ext cx="4381500" cy="5842000"/>
           </a:xfrm>
           <a:prstGeom prst="rect">
             <a:avLst/>
           </a:prstGeom>
-          <a:noFill/>
-          <a:ln>
-            <a:noFill/>
-          </a:ln>
-          <a:extLst>
-            <a:ext uri="{909E8E84-426E-40DD-AFC4-6F175D3DCCD1}">
-              <a14:hiddenFill xmlns:a14="http://schemas.microsoft.com/office/drawing/2010/main">
-                <a:solidFill>
-                  <a:srgbClr val="FFFFFF"/>
-                </a:solidFill>
-              </a14:hiddenFill>
-            </a:ext>
-            <a:ext uri="{91240B29-F687-4F45-9708-019B960494DF}">
-              <a14:hiddenLine xmlns:a14="http://schemas.microsoft.com/office/drawing/2010/main" w="9525">
-                <a:solidFill>
-                  <a:srgbClr val="000000"/>
-                </a:solidFill>
-                <a:miter lim="800000"/>
-                <a:headEnd/>
-                <a:tailEnd/>
-              </a14:hiddenLine>
-            </a:ext>
-          </a:extLst>
         </p:spPr>
       </p:pic>
       <p:sp>
@@ -18386,8 +17769,8 @@
         </p:nvSpPr>
         <p:spPr>
           <a:xfrm rot="20572439">
-            <a:off x="3561291" y="2830858"/>
-            <a:ext cx="2056648" cy="954107"/>
+            <a:off x="3451815" y="3186003"/>
+            <a:ext cx="2047005" cy="523220"/>
           </a:xfrm>
           <a:prstGeom prst="rect">
             <a:avLst/>
@@ -18424,36 +17807,7 @@
                   </a:outerShdw>
                 </a:effectLst>
               </a:rPr>
-              <a:t>Trabalhos</a:t>
-            </a:r>
-          </a:p>
-          <a:p>
-            <a:pPr algn="ctr"/>
-            <a:r>
-              <a:rPr lang="pt-BR" sz="2800" b="1" dirty="0" smtClean="0">
-                <a:ln w="12700">
-                  <a:solidFill>
-                    <a:schemeClr val="tx2">
-                      <a:satMod val="155000"/>
-                    </a:schemeClr>
-                  </a:solidFill>
-                  <a:prstDash val="solid"/>
-                </a:ln>
-                <a:solidFill>
-                  <a:schemeClr val="bg2">
-                    <a:tint val="85000"/>
-                    <a:satMod val="155000"/>
-                  </a:schemeClr>
-                </a:solidFill>
-                <a:effectLst>
-                  <a:outerShdw blurRad="41275" dist="20320" dir="1800000" algn="tl" rotWithShape="0">
-                    <a:srgbClr val="000000">
-                      <a:alpha val="40000"/>
-                    </a:srgbClr>
-                  </a:outerShdw>
-                </a:effectLst>
-              </a:rPr>
-              <a:t>Futuros</a:t>
+              <a:t>Obrigado!</a:t>
             </a:r>
             <a:endParaRPr lang="en-US" sz="2800" dirty="0"/>
           </a:p>
@@ -18462,7 +17816,7 @@
     </p:spTree>
     <p:extLst>
       <p:ext uri="{BB962C8B-B14F-4D97-AF65-F5344CB8AC3E}">
-        <p14:creationId xmlns:p14="http://schemas.microsoft.com/office/powerpoint/2010/main" val="2963444719"/>
+        <p14:creationId xmlns:p14="http://schemas.microsoft.com/office/powerpoint/2010/main" val="3363907484"/>
       </p:ext>
     </p:extLst>
   </p:cSld>
@@ -19108,87 +18462,10 @@
           <a:chExt cx="0" cy="0"/>
         </a:xfrm>
       </p:grpSpPr>
-      <p:sp>
-        <p:nvSpPr>
-          <p:cNvPr id="4" name="Title 1"/>
-          <p:cNvSpPr>
-            <a:spLocks noGrp="1"/>
-          </p:cNvSpPr>
-          <p:nvPr>
-            <p:ph type="title"/>
-          </p:nvPr>
-        </p:nvSpPr>
-        <p:spPr>
-          <a:xfrm>
-            <a:off x="457200" y="558946"/>
-            <a:ext cx="8229600" cy="1066800"/>
-          </a:xfrm>
-        </p:spPr>
-        <p:txBody>
-          <a:bodyPr/>
-          <a:lstStyle/>
-          <a:p>
-            <a:r>
-              <a:rPr lang="en-US" dirty="0" err="1" smtClean="0"/>
-              <a:t>Trabalhos</a:t>
-            </a:r>
-            <a:r>
-              <a:rPr lang="en-US" dirty="0" smtClean="0"/>
-              <a:t> </a:t>
-            </a:r>
-            <a:r>
-              <a:rPr lang="en-US" dirty="0" err="1" smtClean="0"/>
-              <a:t>Futuros</a:t>
-            </a:r>
-            <a:endParaRPr lang="en-US" dirty="0"/>
-          </a:p>
-        </p:txBody>
-      </p:sp>
-      <p:pic>
-        <p:nvPicPr>
-          <p:cNvPr id="1026" name="Picture 2" descr="C:\Users\Tales\Documents\GitHub\Artigo-TRUE-SBCUP\img\multiples_kinects.jpg"/>
-          <p:cNvPicPr>
-            <a:picLocks noChangeAspect="1" noChangeArrowheads="1"/>
-          </p:cNvPicPr>
-          <p:nvPr/>
-        </p:nvPicPr>
-        <p:blipFill>
-          <a:blip r:embed="rId2">
-            <a:extLst>
-              <a:ext uri="{28A0092B-C50C-407E-A947-70E740481C1C}">
-                <a14:useLocalDpi xmlns:a14="http://schemas.microsoft.com/office/drawing/2010/main" val="0"/>
-              </a:ext>
-            </a:extLst>
-          </a:blip>
-          <a:srcRect/>
-          <a:stretch>
-            <a:fillRect/>
-          </a:stretch>
-        </p:blipFill>
-        <p:spPr bwMode="auto">
-          <a:xfrm>
-            <a:off x="457199" y="2295966"/>
-            <a:ext cx="8269169" cy="3509096"/>
-          </a:xfrm>
-          <a:prstGeom prst="rect">
-            <a:avLst/>
-          </a:prstGeom>
-          <a:noFill/>
-          <a:extLst>
-            <a:ext uri="{909E8E84-426E-40DD-AFC4-6F175D3DCCD1}">
-              <a14:hiddenFill xmlns:a14="http://schemas.microsoft.com/office/drawing/2010/main">
-                <a:solidFill>
-                  <a:srgbClr val="FFFFFF"/>
-                </a:solidFill>
-              </a14:hiddenFill>
-            </a:ext>
-          </a:extLst>
-        </p:spPr>
-      </p:pic>
     </p:spTree>
     <p:extLst>
       <p:ext uri="{BB962C8B-B14F-4D97-AF65-F5344CB8AC3E}">
-        <p14:creationId xmlns:p14="http://schemas.microsoft.com/office/powerpoint/2010/main" val="1118801349"/>
+        <p14:creationId xmlns:p14="http://schemas.microsoft.com/office/powerpoint/2010/main" val="2832693405"/>
       </p:ext>
     </p:extLst>
   </p:cSld>
@@ -19222,16 +18499,56 @@
           <a:chExt cx="0" cy="0"/>
         </a:xfrm>
       </p:grpSpPr>
+      <p:sp>
+        <p:nvSpPr>
+          <p:cNvPr id="2" name="Title 1"/>
+          <p:cNvSpPr>
+            <a:spLocks noGrp="1"/>
+          </p:cNvSpPr>
+          <p:nvPr>
+            <p:ph type="title"/>
+          </p:nvPr>
+        </p:nvSpPr>
+        <p:spPr>
+          <a:xfrm>
+            <a:off x="457200" y="679465"/>
+            <a:ext cx="8229600" cy="1066800"/>
+          </a:xfrm>
+        </p:spPr>
+        <p:txBody>
+          <a:bodyPr/>
+          <a:lstStyle/>
+          <a:p>
+            <a:r>
+              <a:rPr lang="en-US" dirty="0" err="1"/>
+              <a:t>Rastreamento</a:t>
+            </a:r>
+            <a:r>
+              <a:rPr lang="en-US" dirty="0"/>
+              <a:t> - </a:t>
+            </a:r>
+            <a:r>
+              <a:rPr lang="en-US" dirty="0" err="1"/>
+              <a:t>R</a:t>
+            </a:r>
+            <a:r>
+              <a:rPr lang="en-US" dirty="0" err="1" smtClean="0"/>
+              <a:t>epresentação</a:t>
+            </a:r>
+            <a:endParaRPr lang="en-US" dirty="0"/>
+          </a:p>
+        </p:txBody>
+      </p:sp>
       <p:pic>
         <p:nvPicPr>
-          <p:cNvPr id="4" name="Picture 3" descr="sorriso.png"/>
+          <p:cNvPr id="12" name="Picture 11" descr="representacao.png"/>
           <p:cNvPicPr>
             <a:picLocks noChangeAspect="1"/>
           </p:cNvPicPr>
           <p:nvPr/>
         </p:nvPicPr>
         <p:blipFill>
-          <a:blip r:embed="rId2">
+          <a:blip r:embed="rId2" cstate="email">
             <a:extLst>
               <a:ext uri="{28A0092B-C50C-407E-A947-70E740481C1C}">
                 <a14:useLocalDpi xmlns:a14="http://schemas.microsoft.com/office/drawing/2010/main" val="0"/>
@@ -19244,70 +18561,18 @@
         </p:blipFill>
         <p:spPr>
           <a:xfrm>
-            <a:off x="2296414" y="812801"/>
-            <a:ext cx="4381500" cy="5842000"/>
+            <a:off x="787975" y="1856621"/>
+            <a:ext cx="7475345" cy="3955963"/>
           </a:xfrm>
           <a:prstGeom prst="rect">
             <a:avLst/>
           </a:prstGeom>
         </p:spPr>
       </p:pic>
-      <p:sp>
-        <p:nvSpPr>
-          <p:cNvPr id="5" name="Rectangle 4"/>
-          <p:cNvSpPr/>
-          <p:nvPr/>
-        </p:nvSpPr>
-        <p:spPr>
-          <a:xfrm rot="20572439">
-            <a:off x="3451815" y="3186003"/>
-            <a:ext cx="2047005" cy="523220"/>
-          </a:xfrm>
-          <a:prstGeom prst="rect">
-            <a:avLst/>
-          </a:prstGeom>
-        </p:spPr>
-        <p:txBody>
-          <a:bodyPr wrap="none">
-            <a:spAutoFit/>
-          </a:bodyPr>
-          <a:lstStyle/>
-          <a:p>
-            <a:pPr algn="ctr"/>
-            <a:r>
-              <a:rPr lang="pt-BR" sz="2800" b="1" dirty="0" smtClean="0">
-                <a:ln w="12700">
-                  <a:solidFill>
-                    <a:schemeClr val="tx2">
-                      <a:satMod val="155000"/>
-                    </a:schemeClr>
-                  </a:solidFill>
-                  <a:prstDash val="solid"/>
-                </a:ln>
-                <a:solidFill>
-                  <a:schemeClr val="bg2">
-                    <a:tint val="85000"/>
-                    <a:satMod val="155000"/>
-                  </a:schemeClr>
-                </a:solidFill>
-                <a:effectLst>
-                  <a:outerShdw blurRad="41275" dist="20320" dir="1800000" algn="tl" rotWithShape="0">
-                    <a:srgbClr val="000000">
-                      <a:alpha val="40000"/>
-                    </a:srgbClr>
-                  </a:outerShdw>
-                </a:effectLst>
-              </a:rPr>
-              <a:t>Obrigado!</a:t>
-            </a:r>
-            <a:endParaRPr lang="en-US" sz="2800" dirty="0"/>
-          </a:p>
-        </p:txBody>
-      </p:sp>
     </p:spTree>
     <p:extLst>
       <p:ext uri="{BB962C8B-B14F-4D97-AF65-F5344CB8AC3E}">
-        <p14:creationId xmlns:p14="http://schemas.microsoft.com/office/powerpoint/2010/main" val="3363907484"/>
+        <p14:creationId xmlns:p14="http://schemas.microsoft.com/office/powerpoint/2010/main" val="530005072"/>
       </p:ext>
     </p:extLst>
   </p:cSld>
@@ -19341,150 +18606,6 @@
           <a:chExt cx="0" cy="0"/>
         </a:xfrm>
       </p:grpSpPr>
-    </p:spTree>
-    <p:extLst>
-      <p:ext uri="{BB962C8B-B14F-4D97-AF65-F5344CB8AC3E}">
-        <p14:creationId xmlns:p14="http://schemas.microsoft.com/office/powerpoint/2010/main" val="2832693405"/>
-      </p:ext>
-    </p:extLst>
-  </p:cSld>
-  <p:clrMapOvr>
-    <a:masterClrMapping/>
-  </p:clrMapOvr>
-  <p:timing>
-    <p:tnLst>
-      <p:par>
-        <p:cTn id="1" dur="indefinite" restart="never" nodeType="tmRoot"/>
-      </p:par>
-    </p:tnLst>
-  </p:timing>
-</p:sld>
-</file>
-
-<file path=ppt/slides/slide53.xml><?xml version="1.0" encoding="utf-8"?>
-<p:sld xmlns:a="http://schemas.openxmlformats.org/drawingml/2006/main" xmlns:r="http://schemas.openxmlformats.org/officeDocument/2006/relationships" xmlns:p="http://schemas.openxmlformats.org/presentationml/2006/main">
-  <p:cSld>
-    <p:spTree>
-      <p:nvGrpSpPr>
-        <p:cNvPr id="1" name=""/>
-        <p:cNvGrpSpPr/>
-        <p:nvPr/>
-      </p:nvGrpSpPr>
-      <p:grpSpPr>
-        <a:xfrm>
-          <a:off x="0" y="0"/>
-          <a:ext cx="0" cy="0"/>
-          <a:chOff x="0" y="0"/>
-          <a:chExt cx="0" cy="0"/>
-        </a:xfrm>
-      </p:grpSpPr>
-      <p:sp>
-        <p:nvSpPr>
-          <p:cNvPr id="2" name="Title 1"/>
-          <p:cNvSpPr>
-            <a:spLocks noGrp="1"/>
-          </p:cNvSpPr>
-          <p:nvPr>
-            <p:ph type="title"/>
-          </p:nvPr>
-        </p:nvSpPr>
-        <p:spPr>
-          <a:xfrm>
-            <a:off x="457200" y="679465"/>
-            <a:ext cx="8229600" cy="1066800"/>
-          </a:xfrm>
-        </p:spPr>
-        <p:txBody>
-          <a:bodyPr/>
-          <a:lstStyle/>
-          <a:p>
-            <a:r>
-              <a:rPr lang="en-US" dirty="0" err="1"/>
-              <a:t>Rastreamento</a:t>
-            </a:r>
-            <a:r>
-              <a:rPr lang="en-US" dirty="0"/>
-              <a:t> - </a:t>
-            </a:r>
-            <a:r>
-              <a:rPr lang="en-US" dirty="0" err="1"/>
-              <a:t>R</a:t>
-            </a:r>
-            <a:r>
-              <a:rPr lang="en-US" dirty="0" err="1" smtClean="0"/>
-              <a:t>epresentação</a:t>
-            </a:r>
-            <a:endParaRPr lang="en-US" dirty="0"/>
-          </a:p>
-        </p:txBody>
-      </p:sp>
-      <p:pic>
-        <p:nvPicPr>
-          <p:cNvPr id="12" name="Picture 11" descr="representacao.png"/>
-          <p:cNvPicPr>
-            <a:picLocks noChangeAspect="1"/>
-          </p:cNvPicPr>
-          <p:nvPr/>
-        </p:nvPicPr>
-        <p:blipFill>
-          <a:blip r:embed="rId2" cstate="email">
-            <a:extLst>
-              <a:ext uri="{28A0092B-C50C-407E-A947-70E740481C1C}">
-                <a14:useLocalDpi xmlns:a14="http://schemas.microsoft.com/office/drawing/2010/main" val="0"/>
-              </a:ext>
-            </a:extLst>
-          </a:blip>
-          <a:stretch>
-            <a:fillRect/>
-          </a:stretch>
-        </p:blipFill>
-        <p:spPr>
-          <a:xfrm>
-            <a:off x="787975" y="1856621"/>
-            <a:ext cx="7475345" cy="3955963"/>
-          </a:xfrm>
-          <a:prstGeom prst="rect">
-            <a:avLst/>
-          </a:prstGeom>
-        </p:spPr>
-      </p:pic>
-    </p:spTree>
-    <p:extLst>
-      <p:ext uri="{BB962C8B-B14F-4D97-AF65-F5344CB8AC3E}">
-        <p14:creationId xmlns:p14="http://schemas.microsoft.com/office/powerpoint/2010/main" val="530005072"/>
-      </p:ext>
-    </p:extLst>
-  </p:cSld>
-  <p:clrMapOvr>
-    <a:masterClrMapping/>
-  </p:clrMapOvr>
-  <p:timing>
-    <p:tnLst>
-      <p:par>
-        <p:cTn id="1" dur="indefinite" restart="never" nodeType="tmRoot"/>
-      </p:par>
-    </p:tnLst>
-  </p:timing>
-</p:sld>
-</file>
-
-<file path=ppt/slides/slide54.xml><?xml version="1.0" encoding="utf-8"?>
-<p:sld xmlns:a="http://schemas.openxmlformats.org/drawingml/2006/main" xmlns:r="http://schemas.openxmlformats.org/officeDocument/2006/relationships" xmlns:p="http://schemas.openxmlformats.org/presentationml/2006/main">
-  <p:cSld>
-    <p:spTree>
-      <p:nvGrpSpPr>
-        <p:cNvPr id="1" name=""/>
-        <p:cNvGrpSpPr/>
-        <p:nvPr/>
-      </p:nvGrpSpPr>
-      <p:grpSpPr>
-        <a:xfrm>
-          <a:off x="0" y="0"/>
-          <a:ext cx="0" cy="0"/>
-          <a:chOff x="0" y="0"/>
-          <a:chExt cx="0" cy="0"/>
-        </a:xfrm>
-      </p:grpSpPr>
       <p:sp>
         <p:nvSpPr>
           <p:cNvPr id="2" name="Title 1"/>
@@ -19652,7 +18773,7 @@
 </p:sld>
 </file>
 
-<file path=ppt/slides/slide55.xml><?xml version="1.0" encoding="utf-8"?>
+<file path=ppt/slides/slide53.xml><?xml version="1.0" encoding="utf-8"?>
 <p:sld xmlns:a="http://schemas.openxmlformats.org/drawingml/2006/main" xmlns:r="http://schemas.openxmlformats.org/officeDocument/2006/relationships" xmlns:p="http://schemas.openxmlformats.org/presentationml/2006/main">
   <p:cSld>
     <p:spTree>
@@ -19747,7 +18868,7 @@
 </p:sld>
 </file>
 
-<file path=ppt/slides/slide56.xml><?xml version="1.0" encoding="utf-8"?>
+<file path=ppt/slides/slide54.xml><?xml version="1.0" encoding="utf-8"?>
 <p:sld xmlns:a="http://schemas.openxmlformats.org/drawingml/2006/main" xmlns:r="http://schemas.openxmlformats.org/officeDocument/2006/relationships" xmlns:p="http://schemas.openxmlformats.org/presentationml/2006/main">
   <p:cSld>
     <p:spTree>
@@ -20013,7 +19134,7 @@
               </a14:hiddenLine>
             </a:ext>
             <a:ext uri="{FAA26D3D-D897-4be2-8F04-BA451C77F1D7}">
-              <ma14:placeholderFlag xmlns:ma14="http://schemas.microsoft.com/office/mac/drawingml/2011/main" xmlns="" val="1"/>
+              <ma14:placeholderFlag xmlns="" xmlns:ma14="http://schemas.microsoft.com/office/mac/drawingml/2011/main" val="1"/>
             </a:ext>
           </a:extLst>
         </p:spPr>
@@ -20248,7 +19369,7 @@
 </p:sld>
 </file>
 
-<file path=ppt/slides/slide57.xml><?xml version="1.0" encoding="utf-8"?>
+<file path=ppt/slides/slide55.xml><?xml version="1.0" encoding="utf-8"?>
 <p:sld xmlns:a="http://schemas.openxmlformats.org/drawingml/2006/main" xmlns:r="http://schemas.openxmlformats.org/officeDocument/2006/relationships" xmlns:p="http://schemas.openxmlformats.org/presentationml/2006/main">
   <p:cSld>
     <p:spTree>
@@ -20304,7 +19425,7 @@
               </a14:hiddenLine>
             </a:ext>
             <a:ext uri="{FAA26D3D-D897-4be2-8F04-BA451C77F1D7}">
-              <ma14:placeholderFlag xmlns:ma14="http://schemas.microsoft.com/office/mac/drawingml/2011/main" xmlns="" val="1"/>
+              <ma14:placeholderFlag xmlns="" xmlns:ma14="http://schemas.microsoft.com/office/mac/drawingml/2011/main" val="1"/>
             </a:ext>
           </a:extLst>
         </p:spPr>
@@ -22576,7 +21697,7 @@
               </a14:hiddenLine>
             </a:ext>
             <a:ext uri="{FAA26D3D-D897-4be2-8F04-BA451C77F1D7}">
-              <ma14:placeholderFlag xmlns:ma14="http://schemas.microsoft.com/office/mac/drawingml/2011/main" xmlns="" val="1"/>
+              <ma14:placeholderFlag xmlns="" xmlns:ma14="http://schemas.microsoft.com/office/mac/drawingml/2011/main" val="1"/>
             </a:ext>
           </a:extLst>
         </p:spPr>
@@ -23278,29 +22399,6 @@
               </a:rPr>
               <a:t>Identificação </a:t>
             </a:r>
-            <a:endParaRPr lang="pt-BR" sz="2200" b="1" dirty="0" smtClean="0">
-              <a:ln w="12700">
-                <a:solidFill>
-                  <a:schemeClr val="tx2">
-                    <a:satMod val="155000"/>
-                  </a:schemeClr>
-                </a:solidFill>
-                <a:prstDash val="solid"/>
-              </a:ln>
-              <a:solidFill>
-                <a:schemeClr val="bg2">
-                  <a:tint val="85000"/>
-                  <a:satMod val="155000"/>
-                </a:schemeClr>
-              </a:solidFill>
-              <a:effectLst>
-                <a:outerShdw blurRad="41275" dist="20320" dir="1800000" algn="tl" rotWithShape="0">
-                  <a:srgbClr val="000000">
-                    <a:alpha val="40000"/>
-                  </a:srgbClr>
-                </a:outerShdw>
-              </a:effectLst>
-            </a:endParaRPr>
           </a:p>
           <a:p>
             <a:pPr algn="ctr"/>

</xml_diff>

<commit_message>
Finalizando primeira revisão e alteração. v0.0.1
</commit_message>
<xml_diff>
--- a/apresentacao/ApresentacaoSBCUP.pptx
+++ b/apresentacao/ApresentacaoSBCUP.pptx
@@ -5,7 +5,7 @@
     <p:sldMasterId id="2147483855" r:id="rId1"/>
   </p:sldMasterIdLst>
   <p:notesMasterIdLst>
-    <p:notesMasterId r:id="rId57"/>
+    <p:notesMasterId r:id="rId56"/>
   </p:notesMasterIdLst>
   <p:sldIdLst>
     <p:sldId id="256" r:id="rId2"/>
@@ -39,30 +39,29 @@
     <p:sldId id="287" r:id="rId30"/>
     <p:sldId id="282" r:id="rId31"/>
     <p:sldId id="294" r:id="rId32"/>
-    <p:sldId id="295" r:id="rId33"/>
-    <p:sldId id="268" r:id="rId34"/>
-    <p:sldId id="296" r:id="rId35"/>
-    <p:sldId id="297" r:id="rId36"/>
-    <p:sldId id="298" r:id="rId37"/>
-    <p:sldId id="299" r:id="rId38"/>
-    <p:sldId id="300" r:id="rId39"/>
-    <p:sldId id="301" r:id="rId40"/>
-    <p:sldId id="325" r:id="rId41"/>
-    <p:sldId id="303" r:id="rId42"/>
-    <p:sldId id="305" r:id="rId43"/>
-    <p:sldId id="306" r:id="rId44"/>
-    <p:sldId id="307" r:id="rId45"/>
-    <p:sldId id="308" r:id="rId46"/>
-    <p:sldId id="270" r:id="rId47"/>
-    <p:sldId id="309" r:id="rId48"/>
-    <p:sldId id="310" r:id="rId49"/>
-    <p:sldId id="322" r:id="rId50"/>
-    <p:sldId id="323" r:id="rId51"/>
-    <p:sldId id="312" r:id="rId52"/>
-    <p:sldId id="320" r:id="rId53"/>
-    <p:sldId id="286" r:id="rId54"/>
-    <p:sldId id="290" r:id="rId55"/>
-    <p:sldId id="291" r:id="rId56"/>
+    <p:sldId id="268" r:id="rId33"/>
+    <p:sldId id="296" r:id="rId34"/>
+    <p:sldId id="297" r:id="rId35"/>
+    <p:sldId id="298" r:id="rId36"/>
+    <p:sldId id="299" r:id="rId37"/>
+    <p:sldId id="300" r:id="rId38"/>
+    <p:sldId id="301" r:id="rId39"/>
+    <p:sldId id="325" r:id="rId40"/>
+    <p:sldId id="303" r:id="rId41"/>
+    <p:sldId id="305" r:id="rId42"/>
+    <p:sldId id="306" r:id="rId43"/>
+    <p:sldId id="307" r:id="rId44"/>
+    <p:sldId id="308" r:id="rId45"/>
+    <p:sldId id="270" r:id="rId46"/>
+    <p:sldId id="309" r:id="rId47"/>
+    <p:sldId id="310" r:id="rId48"/>
+    <p:sldId id="322" r:id="rId49"/>
+    <p:sldId id="323" r:id="rId50"/>
+    <p:sldId id="312" r:id="rId51"/>
+    <p:sldId id="320" r:id="rId52"/>
+    <p:sldId id="286" r:id="rId53"/>
+    <p:sldId id="290" r:id="rId54"/>
+    <p:sldId id="291" r:id="rId55"/>
   </p:sldIdLst>
   <p:sldSz cx="9144000" cy="6858000" type="screen4x3"/>
   <p:notesSz cx="6858000" cy="9144000"/>
@@ -246,7 +245,7 @@
           <a:p>
             <a:fld id="{5FD99E58-1C9B-E44B-8998-0A321153317B}" type="datetimeFigureOut">
               <a:rPr lang="en-US" smtClean="0"/>
-              <a:t>6/28/2012</a:t>
+              <a:t>6/30/2012</a:t>
             </a:fld>
             <a:endParaRPr lang="en-US"/>
           </a:p>
@@ -1421,7 +1420,7 @@
           <a:p>
             <a:fld id="{7D290233-0DD1-4A80-BB1E-9ADC3556DBB6}" type="datetimeFigureOut">
               <a:rPr lang="en-US" smtClean="0"/>
-              <a:t>6/28/2012</a:t>
+              <a:t>6/30/2012</a:t>
             </a:fld>
             <a:endParaRPr lang="en-US"/>
           </a:p>
@@ -1617,7 +1616,7 @@
           <a:p>
             <a:fld id="{7D290233-0DD1-4A80-BB1E-9ADC3556DBB6}" type="datetimeFigureOut">
               <a:rPr lang="en-US" smtClean="0"/>
-              <a:t>6/28/2012</a:t>
+              <a:t>6/30/2012</a:t>
             </a:fld>
             <a:endParaRPr lang="en-US"/>
           </a:p>
@@ -1809,7 +1808,7 @@
           <a:p>
             <a:fld id="{7D290233-0DD1-4A80-BB1E-9ADC3556DBB6}" type="datetimeFigureOut">
               <a:rPr lang="en-US" smtClean="0"/>
-              <a:t>6/28/2012</a:t>
+              <a:t>6/30/2012</a:t>
             </a:fld>
             <a:endParaRPr lang="en-US"/>
           </a:p>
@@ -1991,7 +1990,7 @@
           <a:p>
             <a:fld id="{7D290233-0DD1-4A80-BB1E-9ADC3556DBB6}" type="datetimeFigureOut">
               <a:rPr lang="en-US" smtClean="0"/>
-              <a:t>6/28/2012</a:t>
+              <a:t>6/30/2012</a:t>
             </a:fld>
             <a:endParaRPr lang="en-US"/>
           </a:p>
@@ -2229,7 +2228,7 @@
           <a:p>
             <a:fld id="{7D290233-0DD1-4A80-BB1E-9ADC3556DBB6}" type="datetimeFigureOut">
               <a:rPr lang="en-US" smtClean="0"/>
-              <a:t>6/28/2012</a:t>
+              <a:t>6/30/2012</a:t>
             </a:fld>
             <a:endParaRPr lang="en-US"/>
           </a:p>
@@ -2505,7 +2504,7 @@
           <a:p>
             <a:fld id="{7D290233-0DD1-4A80-BB1E-9ADC3556DBB6}" type="datetimeFigureOut">
               <a:rPr lang="en-US" smtClean="0"/>
-              <a:t>6/28/2012</a:t>
+              <a:t>6/30/2012</a:t>
             </a:fld>
             <a:endParaRPr lang="en-US"/>
           </a:p>
@@ -2926,7 +2925,7 @@
           <a:p>
             <a:fld id="{7D290233-0DD1-4A80-BB1E-9ADC3556DBB6}" type="datetimeFigureOut">
               <a:rPr lang="en-US" smtClean="0"/>
-              <a:t>6/28/2012</a:t>
+              <a:t>6/30/2012</a:t>
             </a:fld>
             <a:endParaRPr lang="en-US"/>
           </a:p>
@@ -3074,7 +3073,7 @@
           <a:p>
             <a:fld id="{7D290233-0DD1-4A80-BB1E-9ADC3556DBB6}" type="datetimeFigureOut">
               <a:rPr lang="en-US" smtClean="0"/>
-              <a:t>6/28/2012</a:t>
+              <a:t>6/30/2012</a:t>
             </a:fld>
             <a:endParaRPr lang="en-US"/>
           </a:p>
@@ -3181,7 +3180,7 @@
           <a:p>
             <a:fld id="{7D290233-0DD1-4A80-BB1E-9ADC3556DBB6}" type="datetimeFigureOut">
               <a:rPr lang="en-US" smtClean="0"/>
-              <a:t>6/28/2012</a:t>
+              <a:t>6/30/2012</a:t>
             </a:fld>
             <a:endParaRPr lang="en-US"/>
           </a:p>
@@ -3443,7 +3442,7 @@
           <a:p>
             <a:fld id="{7D290233-0DD1-4A80-BB1E-9ADC3556DBB6}" type="datetimeFigureOut">
               <a:rPr lang="en-US" smtClean="0"/>
-              <a:t>6/28/2012</a:t>
+              <a:t>6/30/2012</a:t>
             </a:fld>
             <a:endParaRPr lang="en-US"/>
           </a:p>
@@ -3707,7 +3706,7 @@
           <a:p>
             <a:fld id="{7D290233-0DD1-4A80-BB1E-9ADC3556DBB6}" type="datetimeFigureOut">
               <a:rPr lang="en-US" smtClean="0"/>
-              <a:t>6/28/2012</a:t>
+              <a:t>6/30/2012</a:t>
             </a:fld>
             <a:endParaRPr lang="en-US"/>
           </a:p>
@@ -4548,7 +4547,7 @@
               </a14:hiddenLine>
             </a:ext>
             <a:ext uri="{FAA26D3D-D897-4be2-8F04-BA451C77F1D7}">
-              <ma14:placeholderFlag xmlns="" xmlns:ma14="http://schemas.microsoft.com/office/mac/drawingml/2011/main" val="1"/>
+              <ma14:placeholderFlag xmlns:ma14="http://schemas.microsoft.com/office/mac/drawingml/2011/main" xmlns="" val="1"/>
             </a:ext>
           </a:extLst>
         </p:spPr>
@@ -4610,7 +4609,7 @@
               </a14:hiddenLine>
             </a:ext>
             <a:ext uri="{FAA26D3D-D897-4be2-8F04-BA451C77F1D7}">
-              <ma14:placeholderFlag xmlns="" xmlns:ma14="http://schemas.microsoft.com/office/mac/drawingml/2011/main" val="1"/>
+              <ma14:placeholderFlag xmlns:ma14="http://schemas.microsoft.com/office/mac/drawingml/2011/main" xmlns="" val="1"/>
             </a:ext>
           </a:extLst>
         </p:spPr>
@@ -4697,7 +4696,7 @@
           <a:p>
             <a:fld id="{7D290233-0DD1-4A80-BB1E-9ADC3556DBB6}" type="datetimeFigureOut">
               <a:rPr lang="en-US" smtClean="0"/>
-              <a:t>6/28/2012</a:t>
+              <a:t>6/30/2012</a:t>
             </a:fld>
             <a:endParaRPr lang="en-US"/>
           </a:p>
@@ -8589,7 +8588,6 @@
               <a:rPr lang="pt-BR" dirty="0" smtClean="0"/>
               <a:t>Conclusão</a:t>
             </a:r>
-            <a:endParaRPr lang="pt-BR" dirty="0" smtClean="0"/>
           </a:p>
         </p:txBody>
       </p:sp>
@@ -11491,321 +11489,47 @@
           </a:p>
         </p:txBody>
       </p:sp>
-      <p:sp>
-        <p:nvSpPr>
-          <p:cNvPr id="5" name="Rounded Rectangle 4"/>
-          <p:cNvSpPr/>
+      <p:pic>
+        <p:nvPicPr>
+          <p:cNvPr id="1027" name="Picture 3" descr="C:\Users\Tales\Documents\GitHub\Projeto-Final\figuras\1.Introducao\dsoa.jpg"/>
+          <p:cNvPicPr>
+            <a:picLocks noChangeAspect="1" noChangeArrowheads="1"/>
+          </p:cNvPicPr>
           <p:nvPr/>
-        </p:nvSpPr>
-        <p:spPr>
-          <a:xfrm>
-            <a:off x="3606149" y="2252780"/>
-            <a:ext cx="1915593" cy="914400"/>
-          </a:xfrm>
-          <a:prstGeom prst="roundRect">
+        </p:nvPicPr>
+        <p:blipFill>
+          <a:blip r:embed="rId2" cstate="email">
+            <a:extLst>
+              <a:ext uri="{28A0092B-C50C-407E-A947-70E740481C1C}">
+                <a14:useLocalDpi xmlns:a14="http://schemas.microsoft.com/office/drawing/2010/main" val="0"/>
+              </a:ext>
+            </a:extLst>
+          </a:blip>
+          <a:srcRect/>
+          <a:stretch>
+            <a:fillRect/>
+          </a:stretch>
+        </p:blipFill>
+        <p:spPr bwMode="auto">
+          <a:xfrm>
+            <a:off x="2192629" y="2152734"/>
+            <a:ext cx="4302264" cy="4227945"/>
+          </a:xfrm>
+          <a:prstGeom prst="rect">
             <a:avLst/>
           </a:prstGeom>
-        </p:spPr>
-        <p:style>
-          <a:lnRef idx="1">
-            <a:schemeClr val="accent6"/>
-          </a:lnRef>
-          <a:fillRef idx="3">
-            <a:schemeClr val="accent6"/>
-          </a:fillRef>
-          <a:effectRef idx="2">
-            <a:schemeClr val="accent6"/>
-          </a:effectRef>
-          <a:fontRef idx="minor">
-            <a:schemeClr val="lt1"/>
-          </a:fontRef>
-        </p:style>
-        <p:txBody>
-          <a:bodyPr rtlCol="0" anchor="ctr"/>
-          <a:lstStyle/>
-          <a:p>
-            <a:pPr algn="ctr"/>
-            <a:r>
-              <a:rPr lang="pt-BR" b="1" dirty="0" err="1" smtClean="0"/>
-              <a:t>UserDriver</a:t>
-            </a:r>
-            <a:endParaRPr lang="pt-BR" b="1" dirty="0"/>
-          </a:p>
-        </p:txBody>
-      </p:sp>
-      <p:sp>
-        <p:nvSpPr>
-          <p:cNvPr id="6" name="Rounded Rectangle 5"/>
-          <p:cNvSpPr/>
-          <p:nvPr/>
-        </p:nvSpPr>
-        <p:spPr>
-          <a:xfrm>
-            <a:off x="708617" y="4360165"/>
-            <a:ext cx="1915593" cy="914400"/>
-          </a:xfrm>
-          <a:prstGeom prst="roundRect">
-            <a:avLst/>
-          </a:prstGeom>
-        </p:spPr>
-        <p:style>
-          <a:lnRef idx="1">
-            <a:schemeClr val="dk1"/>
-          </a:lnRef>
-          <a:fillRef idx="3">
-            <a:schemeClr val="dk1"/>
-          </a:fillRef>
-          <a:effectRef idx="2">
-            <a:schemeClr val="dk1"/>
-          </a:effectRef>
-          <a:fontRef idx="minor">
-            <a:schemeClr val="lt1"/>
-          </a:fontRef>
-        </p:style>
-        <p:txBody>
-          <a:bodyPr rtlCol="0" anchor="ctr"/>
-          <a:lstStyle/>
-          <a:p>
-            <a:pPr algn="ctr"/>
-            <a:r>
-              <a:rPr lang="en-US" dirty="0" err="1"/>
-              <a:t>Métodos</a:t>
-            </a:r>
-            <a:r>
-              <a:rPr lang="en-US" dirty="0"/>
-              <a:t> de </a:t>
-            </a:r>
-            <a:r>
-              <a:rPr lang="en-US" dirty="0" err="1"/>
-              <a:t>Inicialização</a:t>
-            </a:r>
-            <a:endParaRPr lang="pt-BR" dirty="0"/>
-          </a:p>
-        </p:txBody>
-      </p:sp>
-      <p:sp>
-        <p:nvSpPr>
-          <p:cNvPr id="7" name="Rounded Rectangle 6"/>
-          <p:cNvSpPr/>
-          <p:nvPr/>
-        </p:nvSpPr>
-        <p:spPr>
-          <a:xfrm>
-            <a:off x="3606149" y="4360165"/>
-            <a:ext cx="1915593" cy="914400"/>
-          </a:xfrm>
-          <a:prstGeom prst="roundRect">
-            <a:avLst/>
-          </a:prstGeom>
-        </p:spPr>
-        <p:style>
-          <a:lnRef idx="1">
-            <a:schemeClr val="dk1"/>
-          </a:lnRef>
-          <a:fillRef idx="3">
-            <a:schemeClr val="dk1"/>
-          </a:fillRef>
-          <a:effectRef idx="2">
-            <a:schemeClr val="dk1"/>
-          </a:effectRef>
-          <a:fontRef idx="minor">
-            <a:schemeClr val="lt1"/>
-          </a:fontRef>
-        </p:style>
-        <p:txBody>
-          <a:bodyPr rtlCol="0" anchor="ctr"/>
-          <a:lstStyle/>
-          <a:p>
-            <a:pPr algn="ctr"/>
-            <a:r>
-              <a:rPr lang="en-US" dirty="0" err="1"/>
-              <a:t>Métodos</a:t>
-            </a:r>
-            <a:r>
-              <a:rPr lang="en-US" dirty="0"/>
-              <a:t> </a:t>
-            </a:r>
-            <a:r>
-              <a:rPr lang="en-US" dirty="0" err="1"/>
-              <a:t>Nativos</a:t>
-            </a:r>
-            <a:endParaRPr lang="pt-BR" dirty="0"/>
-          </a:p>
-        </p:txBody>
-      </p:sp>
-      <p:sp>
-        <p:nvSpPr>
-          <p:cNvPr id="8" name="Rounded Rectangle 7"/>
-          <p:cNvSpPr/>
-          <p:nvPr/>
-        </p:nvSpPr>
-        <p:spPr>
-          <a:xfrm>
-            <a:off x="6678696" y="4360165"/>
-            <a:ext cx="1915593" cy="914400"/>
-          </a:xfrm>
-          <a:prstGeom prst="roundRect">
-            <a:avLst/>
-          </a:prstGeom>
-        </p:spPr>
-        <p:style>
-          <a:lnRef idx="1">
-            <a:schemeClr val="dk1"/>
-          </a:lnRef>
-          <a:fillRef idx="3">
-            <a:schemeClr val="dk1"/>
-          </a:fillRef>
-          <a:effectRef idx="2">
-            <a:schemeClr val="dk1"/>
-          </a:effectRef>
-          <a:fontRef idx="minor">
-            <a:schemeClr val="lt1"/>
-          </a:fontRef>
-        </p:style>
-        <p:txBody>
-          <a:bodyPr rtlCol="0" anchor="ctr"/>
-          <a:lstStyle/>
-          <a:p>
-            <a:pPr algn="ctr"/>
-            <a:r>
-              <a:rPr lang="en-US" dirty="0" err="1"/>
-              <a:t>Serviços</a:t>
-            </a:r>
-            <a:r>
-              <a:rPr lang="en-US" dirty="0"/>
-              <a:t> e </a:t>
-            </a:r>
-            <a:r>
-              <a:rPr lang="en-US" dirty="0" err="1"/>
-              <a:t>Eventos</a:t>
-            </a:r>
-            <a:endParaRPr lang="pt-BR" dirty="0"/>
-          </a:p>
-        </p:txBody>
-      </p:sp>
-      <p:sp>
-        <p:nvSpPr>
-          <p:cNvPr id="10" name="Right Arrow 9"/>
-          <p:cNvSpPr/>
-          <p:nvPr/>
-        </p:nvSpPr>
-        <p:spPr>
-          <a:xfrm rot="8550772">
-            <a:off x="2114084" y="3625618"/>
-            <a:ext cx="1585223" cy="231767"/>
-          </a:xfrm>
-          <a:prstGeom prst="rightArrow">
-            <a:avLst>
-              <a:gd name="adj1" fmla="val 50001"/>
-              <a:gd name="adj2" fmla="val 97998"/>
-            </a:avLst>
-          </a:prstGeom>
-        </p:spPr>
-        <p:style>
-          <a:lnRef idx="1">
-            <a:schemeClr val="dk1"/>
-          </a:lnRef>
-          <a:fillRef idx="3">
-            <a:schemeClr val="dk1"/>
-          </a:fillRef>
-          <a:effectRef idx="2">
-            <a:schemeClr val="dk1"/>
-          </a:effectRef>
-          <a:fontRef idx="minor">
-            <a:schemeClr val="lt1"/>
-          </a:fontRef>
-        </p:style>
-        <p:txBody>
-          <a:bodyPr rtlCol="0" anchor="ctr"/>
-          <a:lstStyle/>
-          <a:p>
-            <a:pPr algn="ctr"/>
-            <a:endParaRPr lang="pt-BR"/>
-          </a:p>
-        </p:txBody>
-      </p:sp>
-      <p:sp>
-        <p:nvSpPr>
-          <p:cNvPr id="11" name="Right Arrow 10"/>
-          <p:cNvSpPr/>
-          <p:nvPr/>
-        </p:nvSpPr>
-        <p:spPr>
-          <a:xfrm rot="2616808">
-            <a:off x="5382924" y="3681934"/>
-            <a:ext cx="1585223" cy="231767"/>
-          </a:xfrm>
-          <a:prstGeom prst="rightArrow">
-            <a:avLst>
-              <a:gd name="adj1" fmla="val 50001"/>
-              <a:gd name="adj2" fmla="val 97998"/>
-            </a:avLst>
-          </a:prstGeom>
-        </p:spPr>
-        <p:style>
-          <a:lnRef idx="1">
-            <a:schemeClr val="dk1"/>
-          </a:lnRef>
-          <a:fillRef idx="3">
-            <a:schemeClr val="dk1"/>
-          </a:fillRef>
-          <a:effectRef idx="2">
-            <a:schemeClr val="dk1"/>
-          </a:effectRef>
-          <a:fontRef idx="minor">
-            <a:schemeClr val="lt1"/>
-          </a:fontRef>
-        </p:style>
-        <p:txBody>
-          <a:bodyPr rtlCol="0" anchor="ctr"/>
-          <a:lstStyle/>
-          <a:p>
-            <a:pPr algn="ctr"/>
-            <a:endParaRPr lang="pt-BR"/>
-          </a:p>
-        </p:txBody>
-      </p:sp>
-      <p:sp>
-        <p:nvSpPr>
-          <p:cNvPr id="12" name="Right Arrow 11"/>
-          <p:cNvSpPr/>
-          <p:nvPr/>
-        </p:nvSpPr>
-        <p:spPr>
-          <a:xfrm rot="5400000">
-            <a:off x="4058839" y="3692213"/>
-            <a:ext cx="1015455" cy="231767"/>
-          </a:xfrm>
-          <a:prstGeom prst="rightArrow">
-            <a:avLst>
-              <a:gd name="adj1" fmla="val 50001"/>
-              <a:gd name="adj2" fmla="val 97998"/>
-            </a:avLst>
-          </a:prstGeom>
-        </p:spPr>
-        <p:style>
-          <a:lnRef idx="1">
-            <a:schemeClr val="dk1"/>
-          </a:lnRef>
-          <a:fillRef idx="3">
-            <a:schemeClr val="dk1"/>
-          </a:fillRef>
-          <a:effectRef idx="2">
-            <a:schemeClr val="dk1"/>
-          </a:effectRef>
-          <a:fontRef idx="minor">
-            <a:schemeClr val="lt1"/>
-          </a:fontRef>
-        </p:style>
-        <p:txBody>
-          <a:bodyPr rtlCol="0" anchor="ctr"/>
-          <a:lstStyle/>
-          <a:p>
-            <a:pPr algn="ctr"/>
-            <a:endParaRPr lang="pt-BR"/>
-          </a:p>
-        </p:txBody>
-      </p:sp>
+          <a:noFill/>
+          <a:extLst>
+            <a:ext uri="{909E8E84-426E-40DD-AFC4-6F175D3DCCD1}">
+              <a14:hiddenFill xmlns:a14="http://schemas.microsoft.com/office/drawing/2010/main">
+                <a:solidFill>
+                  <a:srgbClr val="FFFFFF"/>
+                </a:solidFill>
+              </a14:hiddenFill>
+            </a:ext>
+          </a:extLst>
+        </p:spPr>
+      </p:pic>
     </p:spTree>
     <p:extLst>
       <p:ext uri="{BB962C8B-B14F-4D97-AF65-F5344CB8AC3E}">
@@ -11827,748 +11551,6 @@
 </file>
 
 <file path=ppt/slides/slide32.xml><?xml version="1.0" encoding="utf-8"?>
-<p:sld xmlns:a="http://schemas.openxmlformats.org/drawingml/2006/main" xmlns:r="http://schemas.openxmlformats.org/officeDocument/2006/relationships" xmlns:p="http://schemas.openxmlformats.org/presentationml/2006/main">
-  <p:cSld>
-    <p:spTree>
-      <p:nvGrpSpPr>
-        <p:cNvPr id="1" name=""/>
-        <p:cNvGrpSpPr/>
-        <p:nvPr/>
-      </p:nvGrpSpPr>
-      <p:grpSpPr>
-        <a:xfrm>
-          <a:off x="0" y="0"/>
-          <a:ext cx="0" cy="0"/>
-          <a:chOff x="0" y="0"/>
-          <a:chExt cx="0" cy="0"/>
-        </a:xfrm>
-      </p:grpSpPr>
-      <p:sp>
-        <p:nvSpPr>
-          <p:cNvPr id="4" name="Title 1"/>
-          <p:cNvSpPr>
-            <a:spLocks noGrp="1"/>
-          </p:cNvSpPr>
-          <p:nvPr>
-            <p:ph type="title"/>
-          </p:nvPr>
-        </p:nvSpPr>
-        <p:spPr>
-          <a:xfrm>
-            <a:off x="457200" y="698006"/>
-            <a:ext cx="8229600" cy="1066800"/>
-          </a:xfrm>
-        </p:spPr>
-        <p:txBody>
-          <a:bodyPr/>
-          <a:lstStyle/>
-          <a:p>
-            <a:r>
-              <a:rPr lang="x-none" dirty="0" smtClean="0"/>
-              <a:t>TRUE – Módulo de Integração</a:t>
-            </a:r>
-            <a:endParaRPr lang="en-US" dirty="0"/>
-          </a:p>
-        </p:txBody>
-      </p:sp>
-      <p:sp>
-        <p:nvSpPr>
-          <p:cNvPr id="5" name="Rounded Rectangle 4"/>
-          <p:cNvSpPr/>
-          <p:nvPr/>
-        </p:nvSpPr>
-        <p:spPr>
-          <a:xfrm>
-            <a:off x="106048" y="3605597"/>
-            <a:ext cx="1288573" cy="664117"/>
-          </a:xfrm>
-          <a:prstGeom prst="roundRect">
-            <a:avLst/>
-          </a:prstGeom>
-        </p:spPr>
-        <p:style>
-          <a:lnRef idx="1">
-            <a:schemeClr val="accent2"/>
-          </a:lnRef>
-          <a:fillRef idx="3">
-            <a:schemeClr val="accent2"/>
-          </a:fillRef>
-          <a:effectRef idx="2">
-            <a:schemeClr val="accent2"/>
-          </a:effectRef>
-          <a:fontRef idx="minor">
-            <a:schemeClr val="lt1"/>
-          </a:fontRef>
-        </p:style>
-        <p:txBody>
-          <a:bodyPr rtlCol="0" anchor="ctr"/>
-          <a:lstStyle/>
-          <a:p>
-            <a:pPr algn="ctr"/>
-            <a:r>
-              <a:rPr lang="pt-BR" b="1" dirty="0" smtClean="0"/>
-              <a:t>Serviços</a:t>
-            </a:r>
-            <a:endParaRPr lang="pt-BR" b="1" dirty="0"/>
-          </a:p>
-        </p:txBody>
-      </p:sp>
-      <p:sp>
-        <p:nvSpPr>
-          <p:cNvPr id="6" name="Rounded Rectangle 5"/>
-          <p:cNvSpPr/>
-          <p:nvPr/>
-        </p:nvSpPr>
-        <p:spPr>
-          <a:xfrm>
-            <a:off x="2507058" y="2299218"/>
-            <a:ext cx="1293768" cy="720178"/>
-          </a:xfrm>
-          <a:prstGeom prst="roundRect">
-            <a:avLst/>
-          </a:prstGeom>
-        </p:spPr>
-        <p:style>
-          <a:lnRef idx="1">
-            <a:schemeClr val="accent2"/>
-          </a:lnRef>
-          <a:fillRef idx="3">
-            <a:schemeClr val="accent2"/>
-          </a:fillRef>
-          <a:effectRef idx="2">
-            <a:schemeClr val="accent2"/>
-          </a:effectRef>
-          <a:fontRef idx="minor">
-            <a:schemeClr val="lt1"/>
-          </a:fontRef>
-        </p:style>
-        <p:txBody>
-          <a:bodyPr rtlCol="0" anchor="ctr"/>
-          <a:lstStyle/>
-          <a:p>
-            <a:pPr algn="ctr"/>
-            <a:r>
-              <a:rPr lang="en-US" dirty="0" err="1" smtClean="0"/>
-              <a:t>Consultas</a:t>
-            </a:r>
-            <a:endParaRPr lang="pt-BR" dirty="0"/>
-          </a:p>
-        </p:txBody>
-      </p:sp>
-      <p:sp>
-        <p:nvSpPr>
-          <p:cNvPr id="9" name="Right Arrow 8"/>
-          <p:cNvSpPr/>
-          <p:nvPr/>
-        </p:nvSpPr>
-        <p:spPr>
-          <a:xfrm rot="19130701">
-            <a:off x="1222148" y="2991786"/>
-            <a:ext cx="1380758" cy="231767"/>
-          </a:xfrm>
-          <a:prstGeom prst="rightArrow">
-            <a:avLst>
-              <a:gd name="adj1" fmla="val 50001"/>
-              <a:gd name="adj2" fmla="val 97998"/>
-            </a:avLst>
-          </a:prstGeom>
-        </p:spPr>
-        <p:style>
-          <a:lnRef idx="1">
-            <a:schemeClr val="accent2"/>
-          </a:lnRef>
-          <a:fillRef idx="3">
-            <a:schemeClr val="accent2"/>
-          </a:fillRef>
-          <a:effectRef idx="2">
-            <a:schemeClr val="accent2"/>
-          </a:effectRef>
-          <a:fontRef idx="minor">
-            <a:schemeClr val="lt1"/>
-          </a:fontRef>
-        </p:style>
-        <p:txBody>
-          <a:bodyPr rtlCol="0" anchor="ctr"/>
-          <a:lstStyle/>
-          <a:p>
-            <a:pPr algn="ctr"/>
-            <a:endParaRPr lang="pt-BR"/>
-          </a:p>
-        </p:txBody>
-      </p:sp>
-      <p:sp>
-        <p:nvSpPr>
-          <p:cNvPr id="12" name="Rounded Rectangle 11"/>
-          <p:cNvSpPr/>
-          <p:nvPr/>
-        </p:nvSpPr>
-        <p:spPr>
-          <a:xfrm>
-            <a:off x="2507058" y="3176657"/>
-            <a:ext cx="1293768" cy="720178"/>
-          </a:xfrm>
-          <a:prstGeom prst="roundRect">
-            <a:avLst/>
-          </a:prstGeom>
-        </p:spPr>
-        <p:style>
-          <a:lnRef idx="1">
-            <a:schemeClr val="accent2"/>
-          </a:lnRef>
-          <a:fillRef idx="3">
-            <a:schemeClr val="accent2"/>
-          </a:fillRef>
-          <a:effectRef idx="2">
-            <a:schemeClr val="accent2"/>
-          </a:effectRef>
-          <a:fontRef idx="minor">
-            <a:schemeClr val="lt1"/>
-          </a:fontRef>
-        </p:style>
-        <p:txBody>
-          <a:bodyPr rtlCol="0" anchor="ctr"/>
-          <a:lstStyle/>
-          <a:p>
-            <a:pPr algn="ctr"/>
-            <a:r>
-              <a:rPr lang="en-US" dirty="0" err="1" smtClean="0"/>
-              <a:t>Cadastro</a:t>
-            </a:r>
-            <a:endParaRPr lang="pt-BR" dirty="0"/>
-          </a:p>
-        </p:txBody>
-      </p:sp>
-      <p:sp>
-        <p:nvSpPr>
-          <p:cNvPr id="13" name="Rounded Rectangle 12"/>
-          <p:cNvSpPr/>
-          <p:nvPr/>
-        </p:nvSpPr>
-        <p:spPr>
-          <a:xfrm>
-            <a:off x="2507058" y="4043607"/>
-            <a:ext cx="1293768" cy="720178"/>
-          </a:xfrm>
-          <a:prstGeom prst="roundRect">
-            <a:avLst/>
-          </a:prstGeom>
-        </p:spPr>
-        <p:style>
-          <a:lnRef idx="1">
-            <a:schemeClr val="accent2"/>
-          </a:lnRef>
-          <a:fillRef idx="3">
-            <a:schemeClr val="accent2"/>
-          </a:fillRef>
-          <a:effectRef idx="2">
-            <a:schemeClr val="accent2"/>
-          </a:effectRef>
-          <a:fontRef idx="minor">
-            <a:schemeClr val="lt1"/>
-          </a:fontRef>
-        </p:style>
-        <p:txBody>
-          <a:bodyPr rtlCol="0" anchor="ctr"/>
-          <a:lstStyle/>
-          <a:p>
-            <a:pPr algn="ctr"/>
-            <a:r>
-              <a:rPr lang="en-US" dirty="0" err="1" smtClean="0"/>
-              <a:t>Remoção</a:t>
-            </a:r>
-            <a:endParaRPr lang="pt-BR" dirty="0"/>
-          </a:p>
-        </p:txBody>
-      </p:sp>
-      <p:sp>
-        <p:nvSpPr>
-          <p:cNvPr id="14" name="Rounded Rectangle 13"/>
-          <p:cNvSpPr/>
-          <p:nvPr/>
-        </p:nvSpPr>
-        <p:spPr>
-          <a:xfrm>
-            <a:off x="2507058" y="4887240"/>
-            <a:ext cx="1293768" cy="720178"/>
-          </a:xfrm>
-          <a:prstGeom prst="roundRect">
-            <a:avLst/>
-          </a:prstGeom>
-        </p:spPr>
-        <p:style>
-          <a:lnRef idx="1">
-            <a:schemeClr val="accent2"/>
-          </a:lnRef>
-          <a:fillRef idx="3">
-            <a:schemeClr val="accent2"/>
-          </a:fillRef>
-          <a:effectRef idx="2">
-            <a:schemeClr val="accent2"/>
-          </a:effectRef>
-          <a:fontRef idx="minor">
-            <a:schemeClr val="lt1"/>
-          </a:fontRef>
-        </p:style>
-        <p:txBody>
-          <a:bodyPr rtlCol="0" anchor="ctr"/>
-          <a:lstStyle/>
-          <a:p>
-            <a:pPr algn="ctr"/>
-            <a:r>
-              <a:rPr lang="en-US" dirty="0" err="1" smtClean="0"/>
-              <a:t>Treino</a:t>
-            </a:r>
-            <a:endParaRPr lang="pt-BR" dirty="0"/>
-          </a:p>
-        </p:txBody>
-      </p:sp>
-      <p:sp>
-        <p:nvSpPr>
-          <p:cNvPr id="15" name="Rounded Rectangle 14"/>
-          <p:cNvSpPr/>
-          <p:nvPr/>
-        </p:nvSpPr>
-        <p:spPr>
-          <a:xfrm>
-            <a:off x="4537255" y="2603251"/>
-            <a:ext cx="1293768" cy="720178"/>
-          </a:xfrm>
-          <a:prstGeom prst="roundRect">
-            <a:avLst/>
-          </a:prstGeom>
-        </p:spPr>
-        <p:style>
-          <a:lnRef idx="1">
-            <a:schemeClr val="accent1"/>
-          </a:lnRef>
-          <a:fillRef idx="3">
-            <a:schemeClr val="accent1"/>
-          </a:fillRef>
-          <a:effectRef idx="2">
-            <a:schemeClr val="accent1"/>
-          </a:effectRef>
-          <a:fontRef idx="minor">
-            <a:schemeClr val="lt1"/>
-          </a:fontRef>
-        </p:style>
-        <p:txBody>
-          <a:bodyPr rtlCol="0" anchor="ctr"/>
-          <a:lstStyle/>
-          <a:p>
-            <a:pPr algn="ctr"/>
-            <a:r>
-              <a:rPr lang="en-US" dirty="0" smtClean="0"/>
-              <a:t>Novo </a:t>
-            </a:r>
-            <a:r>
-              <a:rPr lang="en-US" dirty="0" err="1" smtClean="0"/>
-              <a:t>usuário</a:t>
-            </a:r>
-            <a:endParaRPr lang="pt-BR" dirty="0"/>
-          </a:p>
-        </p:txBody>
-      </p:sp>
-      <p:sp>
-        <p:nvSpPr>
-          <p:cNvPr id="16" name="Rounded Rectangle 15"/>
-          <p:cNvSpPr/>
-          <p:nvPr/>
-        </p:nvSpPr>
-        <p:spPr>
-          <a:xfrm>
-            <a:off x="4453822" y="4520704"/>
-            <a:ext cx="1492520" cy="722434"/>
-          </a:xfrm>
-          <a:prstGeom prst="roundRect">
-            <a:avLst/>
-          </a:prstGeom>
-        </p:spPr>
-        <p:style>
-          <a:lnRef idx="1">
-            <a:schemeClr val="accent1"/>
-          </a:lnRef>
-          <a:fillRef idx="3">
-            <a:schemeClr val="accent1"/>
-          </a:fillRef>
-          <a:effectRef idx="2">
-            <a:schemeClr val="accent1"/>
-          </a:effectRef>
-          <a:fontRef idx="minor">
-            <a:schemeClr val="lt1"/>
-          </a:fontRef>
-        </p:style>
-        <p:txBody>
-          <a:bodyPr rtlCol="0" anchor="ctr"/>
-          <a:lstStyle/>
-          <a:p>
-            <a:pPr algn="ctr"/>
-            <a:r>
-              <a:rPr lang="en-US" dirty="0" err="1" smtClean="0"/>
-              <a:t>Atualização</a:t>
-            </a:r>
-            <a:endParaRPr lang="pt-BR" dirty="0"/>
-          </a:p>
-        </p:txBody>
-      </p:sp>
-      <p:sp>
-        <p:nvSpPr>
-          <p:cNvPr id="17" name="Rounded Rectangle 16"/>
-          <p:cNvSpPr/>
-          <p:nvPr/>
-        </p:nvSpPr>
-        <p:spPr>
-          <a:xfrm>
-            <a:off x="4537255" y="3549536"/>
-            <a:ext cx="1293768" cy="720178"/>
-          </a:xfrm>
-          <a:prstGeom prst="roundRect">
-            <a:avLst/>
-          </a:prstGeom>
-        </p:spPr>
-        <p:style>
-          <a:lnRef idx="1">
-            <a:schemeClr val="accent1"/>
-          </a:lnRef>
-          <a:fillRef idx="3">
-            <a:schemeClr val="accent1"/>
-          </a:fillRef>
-          <a:effectRef idx="2">
-            <a:schemeClr val="accent1"/>
-          </a:effectRef>
-          <a:fontRef idx="minor">
-            <a:schemeClr val="lt1"/>
-          </a:fontRef>
-        </p:style>
-        <p:txBody>
-          <a:bodyPr rtlCol="0" anchor="ctr"/>
-          <a:lstStyle/>
-          <a:p>
-            <a:pPr algn="ctr"/>
-            <a:r>
-              <a:rPr lang="en-US" dirty="0" err="1" smtClean="0"/>
-              <a:t>Usuário</a:t>
-            </a:r>
-            <a:r>
-              <a:rPr lang="en-US" dirty="0" smtClean="0"/>
-              <a:t> </a:t>
-            </a:r>
-            <a:r>
-              <a:rPr lang="en-US" dirty="0" err="1" smtClean="0"/>
-              <a:t>perdido</a:t>
-            </a:r>
-            <a:endParaRPr lang="pt-BR" dirty="0"/>
-          </a:p>
-        </p:txBody>
-      </p:sp>
-      <p:sp>
-        <p:nvSpPr>
-          <p:cNvPr id="18" name="Right Arrow 17"/>
-          <p:cNvSpPr/>
-          <p:nvPr/>
-        </p:nvSpPr>
-        <p:spPr>
-          <a:xfrm rot="1853885">
-            <a:off x="1253140" y="4795778"/>
-            <a:ext cx="1285637" cy="231767"/>
-          </a:xfrm>
-          <a:prstGeom prst="rightArrow">
-            <a:avLst>
-              <a:gd name="adj1" fmla="val 50001"/>
-              <a:gd name="adj2" fmla="val 97998"/>
-            </a:avLst>
-          </a:prstGeom>
-        </p:spPr>
-        <p:style>
-          <a:lnRef idx="1">
-            <a:schemeClr val="accent2"/>
-          </a:lnRef>
-          <a:fillRef idx="3">
-            <a:schemeClr val="accent2"/>
-          </a:fillRef>
-          <a:effectRef idx="2">
-            <a:schemeClr val="accent2"/>
-          </a:effectRef>
-          <a:fontRef idx="minor">
-            <a:schemeClr val="lt1"/>
-          </a:fontRef>
-        </p:style>
-        <p:txBody>
-          <a:bodyPr rtlCol="0" anchor="ctr"/>
-          <a:lstStyle/>
-          <a:p>
-            <a:pPr algn="ctr"/>
-            <a:endParaRPr lang="pt-BR"/>
-          </a:p>
-        </p:txBody>
-      </p:sp>
-      <p:sp>
-        <p:nvSpPr>
-          <p:cNvPr id="19" name="Right Arrow 18"/>
-          <p:cNvSpPr/>
-          <p:nvPr/>
-        </p:nvSpPr>
-        <p:spPr>
-          <a:xfrm rot="958046">
-            <a:off x="1503178" y="4239606"/>
-            <a:ext cx="991121" cy="231767"/>
-          </a:xfrm>
-          <a:prstGeom prst="rightArrow">
-            <a:avLst>
-              <a:gd name="adj1" fmla="val 50001"/>
-              <a:gd name="adj2" fmla="val 97998"/>
-            </a:avLst>
-          </a:prstGeom>
-        </p:spPr>
-        <p:style>
-          <a:lnRef idx="1">
-            <a:schemeClr val="accent2"/>
-          </a:lnRef>
-          <a:fillRef idx="3">
-            <a:schemeClr val="accent2"/>
-          </a:fillRef>
-          <a:effectRef idx="2">
-            <a:schemeClr val="accent2"/>
-          </a:effectRef>
-          <a:fontRef idx="minor">
-            <a:schemeClr val="lt1"/>
-          </a:fontRef>
-        </p:style>
-        <p:txBody>
-          <a:bodyPr rtlCol="0" anchor="ctr"/>
-          <a:lstStyle/>
-          <a:p>
-            <a:pPr algn="ctr"/>
-            <a:endParaRPr lang="pt-BR"/>
-          </a:p>
-        </p:txBody>
-      </p:sp>
-      <p:sp>
-        <p:nvSpPr>
-          <p:cNvPr id="20" name="Right Arrow 19"/>
-          <p:cNvSpPr/>
-          <p:nvPr/>
-        </p:nvSpPr>
-        <p:spPr>
-          <a:xfrm rot="20279744">
-            <a:off x="1503176" y="3634607"/>
-            <a:ext cx="991121" cy="231767"/>
-          </a:xfrm>
-          <a:prstGeom prst="rightArrow">
-            <a:avLst>
-              <a:gd name="adj1" fmla="val 50001"/>
-              <a:gd name="adj2" fmla="val 97998"/>
-            </a:avLst>
-          </a:prstGeom>
-        </p:spPr>
-        <p:style>
-          <a:lnRef idx="1">
-            <a:schemeClr val="accent2"/>
-          </a:lnRef>
-          <a:fillRef idx="3">
-            <a:schemeClr val="accent2"/>
-          </a:fillRef>
-          <a:effectRef idx="2">
-            <a:schemeClr val="accent2"/>
-          </a:effectRef>
-          <a:fontRef idx="minor">
-            <a:schemeClr val="lt1"/>
-          </a:fontRef>
-        </p:style>
-        <p:txBody>
-          <a:bodyPr rtlCol="0" anchor="ctr"/>
-          <a:lstStyle/>
-          <a:p>
-            <a:pPr algn="ctr"/>
-            <a:endParaRPr lang="pt-BR"/>
-          </a:p>
-        </p:txBody>
-      </p:sp>
-      <p:sp>
-        <p:nvSpPr>
-          <p:cNvPr id="21" name="Rounded Rectangle 20"/>
-          <p:cNvSpPr/>
-          <p:nvPr/>
-        </p:nvSpPr>
-        <p:spPr>
-          <a:xfrm>
-            <a:off x="7517099" y="3543406"/>
-            <a:ext cx="1288573" cy="664117"/>
-          </a:xfrm>
-          <a:prstGeom prst="roundRect">
-            <a:avLst/>
-          </a:prstGeom>
-        </p:spPr>
-        <p:style>
-          <a:lnRef idx="1">
-            <a:schemeClr val="accent1"/>
-          </a:lnRef>
-          <a:fillRef idx="3">
-            <a:schemeClr val="accent1"/>
-          </a:fillRef>
-          <a:effectRef idx="2">
-            <a:schemeClr val="accent1"/>
-          </a:effectRef>
-          <a:fontRef idx="minor">
-            <a:schemeClr val="lt1"/>
-          </a:fontRef>
-        </p:style>
-        <p:txBody>
-          <a:bodyPr rtlCol="0" anchor="ctr"/>
-          <a:lstStyle/>
-          <a:p>
-            <a:pPr algn="ctr"/>
-            <a:r>
-              <a:rPr lang="pt-BR" b="1" dirty="0" smtClean="0"/>
-              <a:t>Eventos</a:t>
-            </a:r>
-            <a:endParaRPr lang="pt-BR" b="1" dirty="0"/>
-          </a:p>
-        </p:txBody>
-      </p:sp>
-      <p:sp>
-        <p:nvSpPr>
-          <p:cNvPr id="22" name="Right Arrow 21"/>
-          <p:cNvSpPr/>
-          <p:nvPr/>
-        </p:nvSpPr>
-        <p:spPr>
-          <a:xfrm rot="12593812">
-            <a:off x="6007007" y="3254562"/>
-            <a:ext cx="1421238" cy="231767"/>
-          </a:xfrm>
-          <a:prstGeom prst="rightArrow">
-            <a:avLst>
-              <a:gd name="adj1" fmla="val 50001"/>
-              <a:gd name="adj2" fmla="val 97998"/>
-            </a:avLst>
-          </a:prstGeom>
-        </p:spPr>
-        <p:style>
-          <a:lnRef idx="1">
-            <a:schemeClr val="accent1"/>
-          </a:lnRef>
-          <a:fillRef idx="3">
-            <a:schemeClr val="accent1"/>
-          </a:fillRef>
-          <a:effectRef idx="2">
-            <a:schemeClr val="accent1"/>
-          </a:effectRef>
-          <a:fontRef idx="minor">
-            <a:schemeClr val="lt1"/>
-          </a:fontRef>
-        </p:style>
-        <p:txBody>
-          <a:bodyPr rtlCol="0" anchor="ctr"/>
-          <a:lstStyle/>
-          <a:p>
-            <a:pPr algn="ctr"/>
-            <a:endParaRPr lang="pt-BR"/>
-          </a:p>
-        </p:txBody>
-      </p:sp>
-      <p:sp>
-        <p:nvSpPr>
-          <p:cNvPr id="23" name="Right Arrow 22"/>
-          <p:cNvSpPr/>
-          <p:nvPr/>
-        </p:nvSpPr>
-        <p:spPr>
-          <a:xfrm rot="9482775">
-            <a:off x="6037074" y="4434372"/>
-            <a:ext cx="1380758" cy="231767"/>
-          </a:xfrm>
-          <a:prstGeom prst="rightArrow">
-            <a:avLst>
-              <a:gd name="adj1" fmla="val 50001"/>
-              <a:gd name="adj2" fmla="val 97998"/>
-            </a:avLst>
-          </a:prstGeom>
-        </p:spPr>
-        <p:style>
-          <a:lnRef idx="1">
-            <a:schemeClr val="accent1"/>
-          </a:lnRef>
-          <a:fillRef idx="3">
-            <a:schemeClr val="accent1"/>
-          </a:fillRef>
-          <a:effectRef idx="2">
-            <a:schemeClr val="accent1"/>
-          </a:effectRef>
-          <a:fontRef idx="minor">
-            <a:schemeClr val="lt1"/>
-          </a:fontRef>
-        </p:style>
-        <p:txBody>
-          <a:bodyPr rtlCol="0" anchor="ctr"/>
-          <a:lstStyle/>
-          <a:p>
-            <a:pPr algn="ctr"/>
-            <a:endParaRPr lang="pt-BR"/>
-          </a:p>
-        </p:txBody>
-      </p:sp>
-      <p:sp>
-        <p:nvSpPr>
-          <p:cNvPr id="25" name="Right Arrow 24"/>
-          <p:cNvSpPr/>
-          <p:nvPr/>
-        </p:nvSpPr>
-        <p:spPr>
-          <a:xfrm rot="10800000">
-            <a:off x="5946342" y="3875985"/>
-            <a:ext cx="1380758" cy="231767"/>
-          </a:xfrm>
-          <a:prstGeom prst="rightArrow">
-            <a:avLst>
-              <a:gd name="adj1" fmla="val 50001"/>
-              <a:gd name="adj2" fmla="val 97998"/>
-            </a:avLst>
-          </a:prstGeom>
-        </p:spPr>
-        <p:style>
-          <a:lnRef idx="1">
-            <a:schemeClr val="accent1"/>
-          </a:lnRef>
-          <a:fillRef idx="3">
-            <a:schemeClr val="accent1"/>
-          </a:fillRef>
-          <a:effectRef idx="2">
-            <a:schemeClr val="accent1"/>
-          </a:effectRef>
-          <a:fontRef idx="minor">
-            <a:schemeClr val="lt1"/>
-          </a:fontRef>
-        </p:style>
-        <p:txBody>
-          <a:bodyPr rtlCol="0" anchor="ctr"/>
-          <a:lstStyle/>
-          <a:p>
-            <a:pPr algn="ctr"/>
-            <a:endParaRPr lang="pt-BR"/>
-          </a:p>
-        </p:txBody>
-      </p:sp>
-    </p:spTree>
-    <p:extLst>
-      <p:ext uri="{BB962C8B-B14F-4D97-AF65-F5344CB8AC3E}">
-        <p14:creationId xmlns:p14="http://schemas.microsoft.com/office/powerpoint/2010/main" val="25059193"/>
-      </p:ext>
-    </p:extLst>
-  </p:cSld>
-  <p:clrMapOvr>
-    <a:masterClrMapping/>
-  </p:clrMapOvr>
-  <p:timing>
-    <p:tnLst>
-      <p:par>
-        <p:cTn id="1" dur="indefinite" restart="never" nodeType="tmRoot"/>
-      </p:par>
-    </p:tnLst>
-  </p:timing>
-</p:sld>
-</file>
-
-<file path=ppt/slides/slide33.xml><?xml version="1.0" encoding="utf-8"?>
 <p:sld xmlns:a="http://schemas.openxmlformats.org/drawingml/2006/main" xmlns:r="http://schemas.openxmlformats.org/officeDocument/2006/relationships" xmlns:p="http://schemas.openxmlformats.org/presentationml/2006/main">
   <p:cSld>
     <p:spTree>
@@ -12771,7 +11753,7 @@
 </p:sld>
 </file>
 
-<file path=ppt/slides/slide34.xml><?xml version="1.0" encoding="utf-8"?>
+<file path=ppt/slides/slide33.xml><?xml version="1.0" encoding="utf-8"?>
 <p:sld xmlns:a="http://schemas.openxmlformats.org/drawingml/2006/main" xmlns:r="http://schemas.openxmlformats.org/officeDocument/2006/relationships" xmlns:p="http://schemas.openxmlformats.org/presentationml/2006/main">
   <p:cSld>
     <p:spTree>
@@ -12944,6 +11926,233 @@
     <p:extLst>
       <p:ext uri="{BB962C8B-B14F-4D97-AF65-F5344CB8AC3E}">
         <p14:creationId xmlns:p14="http://schemas.microsoft.com/office/powerpoint/2010/main" val="1499724724"/>
+      </p:ext>
+    </p:extLst>
+  </p:cSld>
+  <p:clrMapOvr>
+    <a:masterClrMapping/>
+  </p:clrMapOvr>
+  <p:timing>
+    <p:tnLst>
+      <p:par>
+        <p:cTn id="1" dur="indefinite" restart="never" nodeType="tmRoot"/>
+      </p:par>
+    </p:tnLst>
+  </p:timing>
+</p:sld>
+</file>
+
+<file path=ppt/slides/slide34.xml><?xml version="1.0" encoding="utf-8"?>
+<p:sld xmlns:a="http://schemas.openxmlformats.org/drawingml/2006/main" xmlns:r="http://schemas.openxmlformats.org/officeDocument/2006/relationships" xmlns:p="http://schemas.openxmlformats.org/presentationml/2006/main">
+  <p:cSld>
+    <p:spTree>
+      <p:nvGrpSpPr>
+        <p:cNvPr id="1" name=""/>
+        <p:cNvGrpSpPr/>
+        <p:nvPr/>
+      </p:nvGrpSpPr>
+      <p:grpSpPr>
+        <a:xfrm>
+          <a:off x="0" y="0"/>
+          <a:ext cx="0" cy="0"/>
+          <a:chOff x="0" y="0"/>
+          <a:chExt cx="0" cy="0"/>
+        </a:xfrm>
+      </p:grpSpPr>
+      <p:sp>
+        <p:nvSpPr>
+          <p:cNvPr id="2" name="Title 1"/>
+          <p:cNvSpPr>
+            <a:spLocks noGrp="1"/>
+          </p:cNvSpPr>
+          <p:nvPr>
+            <p:ph type="title"/>
+          </p:nvPr>
+        </p:nvSpPr>
+        <p:spPr>
+          <a:xfrm>
+            <a:off x="457200" y="707277"/>
+            <a:ext cx="8229600" cy="1066800"/>
+          </a:xfrm>
+        </p:spPr>
+        <p:txBody>
+          <a:bodyPr/>
+          <a:lstStyle/>
+          <a:p>
+            <a:r>
+              <a:rPr lang="en-US" dirty="0" smtClean="0"/>
+              <a:t>Testes – </a:t>
+            </a:r>
+            <a:r>
+              <a:rPr lang="en-US" dirty="0" err="1" smtClean="0"/>
+              <a:t>Rastreamento</a:t>
+            </a:r>
+            <a:r>
+              <a:rPr lang="en-US" dirty="0" smtClean="0"/>
+              <a:t> - </a:t>
+            </a:r>
+            <a:r>
+              <a:rPr lang="en-US" sz="3200" b="1" dirty="0" err="1" smtClean="0"/>
+              <a:t>Detecção</a:t>
+            </a:r>
+            <a:endParaRPr lang="en-US" sz="3200" b="1" dirty="0"/>
+          </a:p>
+        </p:txBody>
+      </p:sp>
+      <p:pic>
+        <p:nvPicPr>
+          <p:cNvPr id="5" name="Picture 4" descr="1.png"/>
+          <p:cNvPicPr>
+            <a:picLocks noChangeAspect="1"/>
+          </p:cNvPicPr>
+          <p:nvPr/>
+        </p:nvPicPr>
+        <p:blipFill>
+          <a:blip r:embed="rId2" cstate="email">
+            <a:extLst>
+              <a:ext uri="{28A0092B-C50C-407E-A947-70E740481C1C}">
+                <a14:useLocalDpi xmlns:a14="http://schemas.microsoft.com/office/drawing/2010/main" val="0"/>
+              </a:ext>
+            </a:extLst>
+          </a:blip>
+          <a:stretch>
+            <a:fillRect/>
+          </a:stretch>
+        </p:blipFill>
+        <p:spPr>
+          <a:xfrm>
+            <a:off x="97075" y="4992759"/>
+            <a:ext cx="2156174" cy="1459657"/>
+          </a:xfrm>
+          <a:prstGeom prst="rect">
+            <a:avLst/>
+          </a:prstGeom>
+        </p:spPr>
+      </p:pic>
+      <p:pic>
+        <p:nvPicPr>
+          <p:cNvPr id="6" name="Picture 5" descr="2.png"/>
+          <p:cNvPicPr>
+            <a:picLocks noChangeAspect="1"/>
+          </p:cNvPicPr>
+          <p:nvPr/>
+        </p:nvPicPr>
+        <p:blipFill>
+          <a:blip r:embed="rId3" cstate="email">
+            <a:extLst>
+              <a:ext uri="{28A0092B-C50C-407E-A947-70E740481C1C}">
+                <a14:useLocalDpi xmlns:a14="http://schemas.microsoft.com/office/drawing/2010/main" val="0"/>
+              </a:ext>
+            </a:extLst>
+          </a:blip>
+          <a:stretch>
+            <a:fillRect/>
+          </a:stretch>
+        </p:blipFill>
+        <p:spPr>
+          <a:xfrm>
+            <a:off x="2378936" y="4992758"/>
+            <a:ext cx="2156174" cy="1459657"/>
+          </a:xfrm>
+          <a:prstGeom prst="rect">
+            <a:avLst/>
+          </a:prstGeom>
+        </p:spPr>
+      </p:pic>
+      <p:pic>
+        <p:nvPicPr>
+          <p:cNvPr id="7" name="Picture 6" descr="3.png"/>
+          <p:cNvPicPr>
+            <a:picLocks noChangeAspect="1"/>
+          </p:cNvPicPr>
+          <p:nvPr/>
+        </p:nvPicPr>
+        <p:blipFill>
+          <a:blip r:embed="rId4" cstate="email">
+            <a:extLst>
+              <a:ext uri="{28A0092B-C50C-407E-A947-70E740481C1C}">
+                <a14:useLocalDpi xmlns:a14="http://schemas.microsoft.com/office/drawing/2010/main" val="0"/>
+              </a:ext>
+            </a:extLst>
+          </a:blip>
+          <a:stretch>
+            <a:fillRect/>
+          </a:stretch>
+        </p:blipFill>
+        <p:spPr>
+          <a:xfrm>
+            <a:off x="4653693" y="4992758"/>
+            <a:ext cx="2166727" cy="1459658"/>
+          </a:xfrm>
+          <a:prstGeom prst="rect">
+            <a:avLst/>
+          </a:prstGeom>
+        </p:spPr>
+      </p:pic>
+      <p:pic>
+        <p:nvPicPr>
+          <p:cNvPr id="8" name="Picture 7" descr="4.png"/>
+          <p:cNvPicPr>
+            <a:picLocks noChangeAspect="1"/>
+          </p:cNvPicPr>
+          <p:nvPr/>
+        </p:nvPicPr>
+        <p:blipFill>
+          <a:blip r:embed="rId5" cstate="email">
+            <a:extLst>
+              <a:ext uri="{28A0092B-C50C-407E-A947-70E740481C1C}">
+                <a14:useLocalDpi xmlns:a14="http://schemas.microsoft.com/office/drawing/2010/main" val="0"/>
+              </a:ext>
+            </a:extLst>
+          </a:blip>
+          <a:stretch>
+            <a:fillRect/>
+          </a:stretch>
+        </p:blipFill>
+        <p:spPr>
+          <a:xfrm>
+            <a:off x="6931235" y="4992758"/>
+            <a:ext cx="2160656" cy="1459657"/>
+          </a:xfrm>
+          <a:prstGeom prst="rect">
+            <a:avLst/>
+          </a:prstGeom>
+        </p:spPr>
+      </p:pic>
+      <p:pic>
+        <p:nvPicPr>
+          <p:cNvPr id="3" name="Picture 2" descr="laico-teste-deteccao.png"/>
+          <p:cNvPicPr>
+            <a:picLocks noChangeAspect="1"/>
+          </p:cNvPicPr>
+          <p:nvPr/>
+        </p:nvPicPr>
+        <p:blipFill>
+          <a:blip r:embed="rId6" cstate="email">
+            <a:extLst>
+              <a:ext uri="{28A0092B-C50C-407E-A947-70E740481C1C}">
+                <a14:useLocalDpi xmlns:a14="http://schemas.microsoft.com/office/drawing/2010/main" val="0"/>
+              </a:ext>
+            </a:extLst>
+          </a:blip>
+          <a:stretch>
+            <a:fillRect/>
+          </a:stretch>
+        </p:blipFill>
+        <p:spPr>
+          <a:xfrm>
+            <a:off x="2698901" y="1462158"/>
+            <a:ext cx="4232334" cy="3530600"/>
+          </a:xfrm>
+          <a:prstGeom prst="rect">
+            <a:avLst/>
+          </a:prstGeom>
+        </p:spPr>
+      </p:pic>
+    </p:spTree>
+    <p:extLst>
+      <p:ext uri="{BB962C8B-B14F-4D97-AF65-F5344CB8AC3E}">
+        <p14:creationId xmlns:p14="http://schemas.microsoft.com/office/powerpoint/2010/main" val="1852737627"/>
       </p:ext>
     </p:extLst>
   </p:cSld>
@@ -12979,7 +12188,7 @@
       </p:grpSpPr>
       <p:sp>
         <p:nvSpPr>
-          <p:cNvPr id="2" name="Title 1"/>
+          <p:cNvPr id="4" name="Title 1"/>
           <p:cNvSpPr>
             <a:spLocks noGrp="1"/>
           </p:cNvSpPr>
@@ -12989,7 +12198,7 @@
         </p:nvSpPr>
         <p:spPr>
           <a:xfrm>
-            <a:off x="457200" y="707277"/>
+            <a:off x="457200" y="725488"/>
             <a:ext cx="8229600" cy="1066800"/>
           </a:xfrm>
         </p:spPr>
@@ -13011,7 +12220,7 @@
             </a:r>
             <a:r>
               <a:rPr lang="en-US" sz="3200" b="1" dirty="0" err="1" smtClean="0"/>
-              <a:t>Detecção</a:t>
+              <a:t>Oclusão</a:t>
             </a:r>
             <a:endParaRPr lang="en-US" sz="3200" b="1" dirty="0"/>
           </a:p>
@@ -13019,7 +12228,7 @@
       </p:sp>
       <p:pic>
         <p:nvPicPr>
-          <p:cNvPr id="5" name="Picture 4" descr="1.png"/>
+          <p:cNvPr id="5" name="Picture 4" descr="oclusao_corretamente.png"/>
           <p:cNvPicPr>
             <a:picLocks noChangeAspect="1"/>
           </p:cNvPicPr>
@@ -13039,17 +12248,47 @@
         </p:blipFill>
         <p:spPr>
           <a:xfrm>
-            <a:off x="97075" y="4992759"/>
-            <a:ext cx="2156174" cy="1459657"/>
+            <a:off x="325497" y="1915762"/>
+            <a:ext cx="3243571" cy="2160865"/>
           </a:xfrm>
           <a:prstGeom prst="rect">
             <a:avLst/>
           </a:prstGeom>
         </p:spPr>
       </p:pic>
+      <p:sp>
+        <p:nvSpPr>
+          <p:cNvPr id="6" name="TextBox 5"/>
+          <p:cNvSpPr txBox="1"/>
+          <p:nvPr/>
+        </p:nvSpPr>
+        <p:spPr>
+          <a:xfrm>
+            <a:off x="954842" y="4126209"/>
+            <a:ext cx="1753830" cy="369332"/>
+          </a:xfrm>
+          <a:prstGeom prst="rect">
+            <a:avLst/>
+          </a:prstGeom>
+          <a:noFill/>
+        </p:spPr>
+        <p:txBody>
+          <a:bodyPr wrap="none" rtlCol="0">
+            <a:spAutoFit/>
+          </a:bodyPr>
+          <a:lstStyle/>
+          <a:p>
+            <a:r>
+              <a:rPr lang="pt-BR" dirty="0" smtClean="0"/>
+              <a:t>Oclusão parcial</a:t>
+            </a:r>
+            <a:endParaRPr lang="pt-BR" dirty="0"/>
+          </a:p>
+        </p:txBody>
+      </p:sp>
       <p:pic>
         <p:nvPicPr>
-          <p:cNvPr id="6" name="Picture 5" descr="2.png"/>
+          <p:cNvPr id="7" name="Picture 6" descr="1.png"/>
           <p:cNvPicPr>
             <a:picLocks noChangeAspect="1"/>
           </p:cNvPicPr>
@@ -13069,8 +12308,8 @@
         </p:blipFill>
         <p:spPr>
           <a:xfrm>
-            <a:off x="2378936" y="4992758"/>
-            <a:ext cx="2156174" cy="1459657"/>
+            <a:off x="4560992" y="1915762"/>
+            <a:ext cx="1829725" cy="1227504"/>
           </a:xfrm>
           <a:prstGeom prst="rect">
             <a:avLst/>
@@ -13079,7 +12318,7 @@
       </p:pic>
       <p:pic>
         <p:nvPicPr>
-          <p:cNvPr id="7" name="Picture 6" descr="3.png"/>
+          <p:cNvPr id="8" name="Picture 7" descr="2.png"/>
           <p:cNvPicPr>
             <a:picLocks noChangeAspect="1"/>
           </p:cNvPicPr>
@@ -13099,8 +12338,8 @@
         </p:blipFill>
         <p:spPr>
           <a:xfrm>
-            <a:off x="4653693" y="4992758"/>
-            <a:ext cx="2166727" cy="1459658"/>
+            <a:off x="6647703" y="1915762"/>
+            <a:ext cx="1819564" cy="1227504"/>
           </a:xfrm>
           <a:prstGeom prst="rect">
             <a:avLst/>
@@ -13109,7 +12348,7 @@
       </p:pic>
       <p:pic>
         <p:nvPicPr>
-          <p:cNvPr id="8" name="Picture 7" descr="4.png"/>
+          <p:cNvPr id="9" name="Picture 8" descr="3.png"/>
           <p:cNvPicPr>
             <a:picLocks noChangeAspect="1"/>
           </p:cNvPicPr>
@@ -13129,8 +12368,8 @@
         </p:blipFill>
         <p:spPr>
           <a:xfrm>
-            <a:off x="6931235" y="4992758"/>
-            <a:ext cx="2160656" cy="1459657"/>
+            <a:off x="4560992" y="3288454"/>
+            <a:ext cx="1829725" cy="1238583"/>
           </a:xfrm>
           <a:prstGeom prst="rect">
             <a:avLst/>
@@ -13139,7 +12378,7 @@
       </p:pic>
       <p:pic>
         <p:nvPicPr>
-          <p:cNvPr id="3" name="Picture 2" descr="laico-teste-deteccao.png"/>
+          <p:cNvPr id="10" name="Picture 9" descr="4.png"/>
           <p:cNvPicPr>
             <a:picLocks noChangeAspect="1"/>
           </p:cNvPicPr>
@@ -13159,18 +12398,336 @@
         </p:blipFill>
         <p:spPr>
           <a:xfrm>
-            <a:off x="2698901" y="1462158"/>
-            <a:ext cx="4232334" cy="3530600"/>
+            <a:off x="6647703" y="3288453"/>
+            <a:ext cx="1819564" cy="1226673"/>
           </a:xfrm>
           <a:prstGeom prst="rect">
             <a:avLst/>
           </a:prstGeom>
         </p:spPr>
       </p:pic>
+      <p:pic>
+        <p:nvPicPr>
+          <p:cNvPr id="11" name="Picture 10" descr="5.png"/>
+          <p:cNvPicPr>
+            <a:picLocks noChangeAspect="1"/>
+          </p:cNvPicPr>
+          <p:nvPr/>
+        </p:nvPicPr>
+        <p:blipFill>
+          <a:blip r:embed="rId7" cstate="email">
+            <a:extLst>
+              <a:ext uri="{28A0092B-C50C-407E-A947-70E740481C1C}">
+                <a14:useLocalDpi xmlns:a14="http://schemas.microsoft.com/office/drawing/2010/main" val="0"/>
+              </a:ext>
+            </a:extLst>
+          </a:blip>
+          <a:stretch>
+            <a:fillRect/>
+          </a:stretch>
+        </p:blipFill>
+        <p:spPr>
+          <a:xfrm>
+            <a:off x="4560992" y="4692776"/>
+            <a:ext cx="1829725" cy="1230067"/>
+          </a:xfrm>
+          <a:prstGeom prst="rect">
+            <a:avLst/>
+          </a:prstGeom>
+        </p:spPr>
+      </p:pic>
+      <p:pic>
+        <p:nvPicPr>
+          <p:cNvPr id="12" name="Picture 11" descr="6.png"/>
+          <p:cNvPicPr>
+            <a:picLocks noChangeAspect="1"/>
+          </p:cNvPicPr>
+          <p:nvPr/>
+        </p:nvPicPr>
+        <p:blipFill>
+          <a:blip r:embed="rId8" cstate="email">
+            <a:extLst>
+              <a:ext uri="{28A0092B-C50C-407E-A947-70E740481C1C}">
+                <a14:useLocalDpi xmlns:a14="http://schemas.microsoft.com/office/drawing/2010/main" val="0"/>
+              </a:ext>
+            </a:extLst>
+          </a:blip>
+          <a:stretch>
+            <a:fillRect/>
+          </a:stretch>
+        </p:blipFill>
+        <p:spPr>
+          <a:xfrm>
+            <a:off x="6647702" y="4692775"/>
+            <a:ext cx="1823363" cy="1230067"/>
+          </a:xfrm>
+          <a:prstGeom prst="rect">
+            <a:avLst/>
+          </a:prstGeom>
+        </p:spPr>
+      </p:pic>
+      <p:sp>
+        <p:nvSpPr>
+          <p:cNvPr id="13" name="TextBox 12"/>
+          <p:cNvSpPr txBox="1"/>
+          <p:nvPr/>
+        </p:nvSpPr>
+        <p:spPr>
+          <a:xfrm>
+            <a:off x="5589995" y="6230658"/>
+            <a:ext cx="2395608" cy="369332"/>
+          </a:xfrm>
+          <a:prstGeom prst="rect">
+            <a:avLst/>
+          </a:prstGeom>
+          <a:noFill/>
+        </p:spPr>
+        <p:txBody>
+          <a:bodyPr wrap="none" rtlCol="0">
+            <a:spAutoFit/>
+          </a:bodyPr>
+          <a:lstStyle/>
+          <a:p>
+            <a:r>
+              <a:rPr lang="pt-BR" dirty="0" smtClean="0"/>
+              <a:t>Oclusão momentânea</a:t>
+            </a:r>
+            <a:endParaRPr lang="pt-BR" dirty="0"/>
+          </a:p>
+        </p:txBody>
+      </p:sp>
+      <p:sp>
+        <p:nvSpPr>
+          <p:cNvPr id="15" name="TextBox 14"/>
+          <p:cNvSpPr txBox="1"/>
+          <p:nvPr/>
+        </p:nvSpPr>
+        <p:spPr>
+          <a:xfrm>
+            <a:off x="4560992" y="1823052"/>
+            <a:ext cx="297715" cy="369332"/>
+          </a:xfrm>
+          <a:prstGeom prst="rect">
+            <a:avLst/>
+          </a:prstGeom>
+          <a:noFill/>
+        </p:spPr>
+        <p:txBody>
+          <a:bodyPr wrap="none" rtlCol="0">
+            <a:spAutoFit/>
+          </a:bodyPr>
+          <a:lstStyle/>
+          <a:p>
+            <a:r>
+              <a:rPr lang="pt-BR" b="1" dirty="0" smtClean="0">
+                <a:solidFill>
+                  <a:schemeClr val="bg1"/>
+                </a:solidFill>
+              </a:rPr>
+              <a:t>1</a:t>
+            </a:r>
+            <a:endParaRPr lang="pt-BR" b="1" dirty="0">
+              <a:solidFill>
+                <a:schemeClr val="bg1"/>
+              </a:solidFill>
+            </a:endParaRPr>
+          </a:p>
+        </p:txBody>
+      </p:sp>
+      <p:sp>
+        <p:nvSpPr>
+          <p:cNvPr id="16" name="TextBox 15"/>
+          <p:cNvSpPr txBox="1"/>
+          <p:nvPr/>
+        </p:nvSpPr>
+        <p:spPr>
+          <a:xfrm>
+            <a:off x="6631600" y="1823052"/>
+            <a:ext cx="329274" cy="369332"/>
+          </a:xfrm>
+          <a:prstGeom prst="rect">
+            <a:avLst/>
+          </a:prstGeom>
+          <a:noFill/>
+        </p:spPr>
+        <p:txBody>
+          <a:bodyPr wrap="none" rtlCol="0">
+            <a:spAutoFit/>
+          </a:bodyPr>
+          <a:lstStyle/>
+          <a:p>
+            <a:r>
+              <a:rPr lang="pt-BR" b="1" dirty="0" smtClean="0">
+                <a:solidFill>
+                  <a:schemeClr val="bg1"/>
+                </a:solidFill>
+              </a:rPr>
+              <a:t>2</a:t>
+            </a:r>
+            <a:endParaRPr lang="pt-BR" b="1" dirty="0">
+              <a:solidFill>
+                <a:schemeClr val="bg1"/>
+              </a:solidFill>
+            </a:endParaRPr>
+          </a:p>
+        </p:txBody>
+      </p:sp>
+      <p:sp>
+        <p:nvSpPr>
+          <p:cNvPr id="17" name="TextBox 16"/>
+          <p:cNvSpPr txBox="1"/>
+          <p:nvPr/>
+        </p:nvSpPr>
+        <p:spPr>
+          <a:xfrm>
+            <a:off x="4560992" y="3188123"/>
+            <a:ext cx="328823" cy="369332"/>
+          </a:xfrm>
+          <a:prstGeom prst="rect">
+            <a:avLst/>
+          </a:prstGeom>
+          <a:noFill/>
+        </p:spPr>
+        <p:txBody>
+          <a:bodyPr wrap="none" rtlCol="0">
+            <a:spAutoFit/>
+          </a:bodyPr>
+          <a:lstStyle/>
+          <a:p>
+            <a:r>
+              <a:rPr lang="pt-BR" b="1" dirty="0" smtClean="0">
+                <a:solidFill>
+                  <a:schemeClr val="bg1"/>
+                </a:solidFill>
+              </a:rPr>
+              <a:t>3</a:t>
+            </a:r>
+            <a:endParaRPr lang="pt-BR" b="1" dirty="0">
+              <a:solidFill>
+                <a:schemeClr val="bg1"/>
+              </a:solidFill>
+            </a:endParaRPr>
+          </a:p>
+        </p:txBody>
+      </p:sp>
+      <p:sp>
+        <p:nvSpPr>
+          <p:cNvPr id="18" name="TextBox 17"/>
+          <p:cNvSpPr txBox="1"/>
+          <p:nvPr/>
+        </p:nvSpPr>
+        <p:spPr>
+          <a:xfrm>
+            <a:off x="6630134" y="3194900"/>
+            <a:ext cx="334572" cy="369332"/>
+          </a:xfrm>
+          <a:prstGeom prst="rect">
+            <a:avLst/>
+          </a:prstGeom>
+          <a:noFill/>
+        </p:spPr>
+        <p:txBody>
+          <a:bodyPr wrap="none" rtlCol="0">
+            <a:spAutoFit/>
+          </a:bodyPr>
+          <a:lstStyle/>
+          <a:p>
+            <a:r>
+              <a:rPr lang="pt-BR" b="1" dirty="0" smtClean="0">
+                <a:solidFill>
+                  <a:schemeClr val="bg1"/>
+                </a:solidFill>
+              </a:rPr>
+              <a:t>4</a:t>
+            </a:r>
+            <a:endParaRPr lang="pt-BR" b="1" dirty="0">
+              <a:solidFill>
+                <a:schemeClr val="bg1"/>
+              </a:solidFill>
+            </a:endParaRPr>
+          </a:p>
+        </p:txBody>
+      </p:sp>
+      <p:sp>
+        <p:nvSpPr>
+          <p:cNvPr id="19" name="TextBox 18"/>
+          <p:cNvSpPr txBox="1"/>
+          <p:nvPr/>
+        </p:nvSpPr>
+        <p:spPr>
+          <a:xfrm>
+            <a:off x="4538225" y="4616809"/>
+            <a:ext cx="322963" cy="369332"/>
+          </a:xfrm>
+          <a:prstGeom prst="rect">
+            <a:avLst/>
+          </a:prstGeom>
+          <a:noFill/>
+        </p:spPr>
+        <p:txBody>
+          <a:bodyPr wrap="none" rtlCol="0">
+            <a:spAutoFit/>
+          </a:bodyPr>
+          <a:lstStyle/>
+          <a:p>
+            <a:r>
+              <a:rPr lang="pt-BR" b="1" dirty="0" smtClean="0">
+                <a:solidFill>
+                  <a:schemeClr val="bg1"/>
+                </a:solidFill>
+              </a:rPr>
+              <a:t>5</a:t>
+            </a:r>
+            <a:endParaRPr lang="pt-BR" b="1" dirty="0">
+              <a:solidFill>
+                <a:schemeClr val="bg1"/>
+              </a:solidFill>
+            </a:endParaRPr>
+          </a:p>
+        </p:txBody>
+      </p:sp>
+      <p:sp>
+        <p:nvSpPr>
+          <p:cNvPr id="20" name="TextBox 19"/>
+          <p:cNvSpPr txBox="1"/>
+          <p:nvPr/>
+        </p:nvSpPr>
+        <p:spPr>
+          <a:xfrm>
+            <a:off x="6620639" y="4616809"/>
+            <a:ext cx="334234" cy="369332"/>
+          </a:xfrm>
+          <a:prstGeom prst="rect">
+            <a:avLst/>
+          </a:prstGeom>
+          <a:noFill/>
+        </p:spPr>
+        <p:txBody>
+          <a:bodyPr wrap="none" rtlCol="0">
+            <a:spAutoFit/>
+          </a:bodyPr>
+          <a:lstStyle/>
+          <a:p>
+            <a:r>
+              <a:rPr lang="pt-BR" b="1" dirty="0" smtClean="0">
+                <a:solidFill>
+                  <a:schemeClr val="bg1"/>
+                </a:solidFill>
+              </a:rPr>
+              <a:t>6</a:t>
+            </a:r>
+            <a:endParaRPr lang="pt-BR" b="1" dirty="0">
+              <a:solidFill>
+                <a:schemeClr val="bg1"/>
+              </a:solidFill>
+            </a:endParaRPr>
+          </a:p>
+        </p:txBody>
+      </p:sp>
     </p:spTree>
     <p:extLst>
       <p:ext uri="{BB962C8B-B14F-4D97-AF65-F5344CB8AC3E}">
-        <p14:creationId xmlns:p14="http://schemas.microsoft.com/office/powerpoint/2010/main" val="1852737627"/>
+        <p14:creationId xmlns:p14="http://schemas.microsoft.com/office/powerpoint/2010/main" val="244544535"/>
       </p:ext>
     </p:extLst>
   </p:cSld>
@@ -13206,7 +12763,7 @@
       </p:grpSpPr>
       <p:sp>
         <p:nvSpPr>
-          <p:cNvPr id="4" name="Title 1"/>
+          <p:cNvPr id="2" name="Title 1"/>
           <p:cNvSpPr>
             <a:spLocks noGrp="1"/>
           </p:cNvSpPr>
@@ -13216,8 +12773,8 @@
         </p:nvSpPr>
         <p:spPr>
           <a:xfrm>
-            <a:off x="457200" y="725488"/>
-            <a:ext cx="8229600" cy="1066800"/>
+            <a:off x="222487" y="484779"/>
+            <a:ext cx="8741901" cy="1066800"/>
           </a:xfrm>
         </p:spPr>
         <p:txBody>
@@ -13225,28 +12782,32 @@
           <a:lstStyle/>
           <a:p>
             <a:r>
-              <a:rPr lang="en-US" dirty="0" smtClean="0"/>
+              <a:rPr lang="en-US" dirty="0"/>
               <a:t>Testes – </a:t>
             </a:r>
             <a:r>
-              <a:rPr lang="en-US" dirty="0" err="1" smtClean="0"/>
+              <a:rPr lang="en-US" dirty="0" err="1"/>
               <a:t>Rastreamento</a:t>
             </a:r>
             <a:r>
-              <a:rPr lang="en-US" dirty="0" smtClean="0"/>
-              <a:t> - </a:t>
-            </a:r>
-            <a:r>
-              <a:rPr lang="en-US" sz="3200" b="1" dirty="0" err="1" smtClean="0"/>
-              <a:t>Oclusão</a:t>
-            </a:r>
-            <a:endParaRPr lang="en-US" sz="3200" b="1" dirty="0"/>
+              <a:rPr lang="en-US" dirty="0"/>
+              <a:t> </a:t>
+            </a:r>
+            <a:r>
+              <a:rPr lang="en-US" b="1" dirty="0" smtClean="0"/>
+              <a:t>- </a:t>
+            </a:r>
+            <a:r>
+              <a:rPr lang="en-US" sz="3600" b="1" dirty="0" err="1" smtClean="0"/>
+              <a:t>Interferências</a:t>
+            </a:r>
+            <a:endParaRPr lang="en-US" sz="3600" dirty="0"/>
           </a:p>
         </p:txBody>
       </p:sp>
       <p:pic>
         <p:nvPicPr>
-          <p:cNvPr id="5" name="Picture 4" descr="oclusao_corretamente.png"/>
+          <p:cNvPr id="4" name="Picture 3" descr="2.png"/>
           <p:cNvPicPr>
             <a:picLocks noChangeAspect="1"/>
           </p:cNvPicPr>
@@ -13266,47 +12827,17 @@
         </p:blipFill>
         <p:spPr>
           <a:xfrm>
-            <a:off x="325497" y="1915762"/>
-            <a:ext cx="3243571" cy="2160865"/>
+            <a:off x="537678" y="2404483"/>
+            <a:ext cx="3640683" cy="2444094"/>
           </a:xfrm>
           <a:prstGeom prst="rect">
             <a:avLst/>
           </a:prstGeom>
         </p:spPr>
       </p:pic>
-      <p:sp>
-        <p:nvSpPr>
-          <p:cNvPr id="6" name="TextBox 5"/>
-          <p:cNvSpPr txBox="1"/>
-          <p:nvPr/>
-        </p:nvSpPr>
-        <p:spPr>
-          <a:xfrm>
-            <a:off x="954842" y="4126209"/>
-            <a:ext cx="1753830" cy="369332"/>
-          </a:xfrm>
-          <a:prstGeom prst="rect">
-            <a:avLst/>
-          </a:prstGeom>
-          <a:noFill/>
-        </p:spPr>
-        <p:txBody>
-          <a:bodyPr wrap="none" rtlCol="0">
-            <a:spAutoFit/>
-          </a:bodyPr>
-          <a:lstStyle/>
-          <a:p>
-            <a:r>
-              <a:rPr lang="pt-BR" dirty="0" smtClean="0"/>
-              <a:t>Oclusão parcial</a:t>
-            </a:r>
-            <a:endParaRPr lang="pt-BR" dirty="0"/>
-          </a:p>
-        </p:txBody>
-      </p:sp>
       <p:pic>
         <p:nvPicPr>
-          <p:cNvPr id="7" name="Picture 6" descr="1.png"/>
+          <p:cNvPr id="6" name="Picture 5" descr="2.png"/>
           <p:cNvPicPr>
             <a:picLocks noChangeAspect="1"/>
           </p:cNvPicPr>
@@ -13326,174 +12857,24 @@
         </p:blipFill>
         <p:spPr>
           <a:xfrm>
-            <a:off x="4560992" y="1915762"/>
-            <a:ext cx="1829725" cy="1227504"/>
+            <a:off x="4639706" y="2404483"/>
+            <a:ext cx="3645688" cy="2444094"/>
           </a:xfrm>
           <a:prstGeom prst="rect">
             <a:avLst/>
           </a:prstGeom>
         </p:spPr>
       </p:pic>
-      <p:pic>
-        <p:nvPicPr>
-          <p:cNvPr id="8" name="Picture 7" descr="2.png"/>
-          <p:cNvPicPr>
-            <a:picLocks noChangeAspect="1"/>
-          </p:cNvPicPr>
-          <p:nvPr/>
-        </p:nvPicPr>
-        <p:blipFill>
-          <a:blip r:embed="rId4" cstate="email">
-            <a:extLst>
-              <a:ext uri="{28A0092B-C50C-407E-A947-70E740481C1C}">
-                <a14:useLocalDpi xmlns:a14="http://schemas.microsoft.com/office/drawing/2010/main" val="0"/>
-              </a:ext>
-            </a:extLst>
-          </a:blip>
-          <a:stretch>
-            <a:fillRect/>
-          </a:stretch>
-        </p:blipFill>
-        <p:spPr>
-          <a:xfrm>
-            <a:off x="6647703" y="1915762"/>
-            <a:ext cx="1819564" cy="1227504"/>
-          </a:xfrm>
-          <a:prstGeom prst="rect">
-            <a:avLst/>
-          </a:prstGeom>
-        </p:spPr>
-      </p:pic>
-      <p:pic>
-        <p:nvPicPr>
-          <p:cNvPr id="9" name="Picture 8" descr="3.png"/>
-          <p:cNvPicPr>
-            <a:picLocks noChangeAspect="1"/>
-          </p:cNvPicPr>
-          <p:nvPr/>
-        </p:nvPicPr>
-        <p:blipFill>
-          <a:blip r:embed="rId5" cstate="email">
-            <a:extLst>
-              <a:ext uri="{28A0092B-C50C-407E-A947-70E740481C1C}">
-                <a14:useLocalDpi xmlns:a14="http://schemas.microsoft.com/office/drawing/2010/main" val="0"/>
-              </a:ext>
-            </a:extLst>
-          </a:blip>
-          <a:stretch>
-            <a:fillRect/>
-          </a:stretch>
-        </p:blipFill>
-        <p:spPr>
-          <a:xfrm>
-            <a:off x="4560992" y="3288454"/>
-            <a:ext cx="1829725" cy="1238583"/>
-          </a:xfrm>
-          <a:prstGeom prst="rect">
-            <a:avLst/>
-          </a:prstGeom>
-        </p:spPr>
-      </p:pic>
-      <p:pic>
-        <p:nvPicPr>
-          <p:cNvPr id="10" name="Picture 9" descr="4.png"/>
-          <p:cNvPicPr>
-            <a:picLocks noChangeAspect="1"/>
-          </p:cNvPicPr>
-          <p:nvPr/>
-        </p:nvPicPr>
-        <p:blipFill>
-          <a:blip r:embed="rId6" cstate="email">
-            <a:extLst>
-              <a:ext uri="{28A0092B-C50C-407E-A947-70E740481C1C}">
-                <a14:useLocalDpi xmlns:a14="http://schemas.microsoft.com/office/drawing/2010/main" val="0"/>
-              </a:ext>
-            </a:extLst>
-          </a:blip>
-          <a:stretch>
-            <a:fillRect/>
-          </a:stretch>
-        </p:blipFill>
-        <p:spPr>
-          <a:xfrm>
-            <a:off x="6647703" y="3288453"/>
-            <a:ext cx="1819564" cy="1226673"/>
-          </a:xfrm>
-          <a:prstGeom prst="rect">
-            <a:avLst/>
-          </a:prstGeom>
-        </p:spPr>
-      </p:pic>
-      <p:pic>
-        <p:nvPicPr>
-          <p:cNvPr id="11" name="Picture 10" descr="5.png"/>
-          <p:cNvPicPr>
-            <a:picLocks noChangeAspect="1"/>
-          </p:cNvPicPr>
-          <p:nvPr/>
-        </p:nvPicPr>
-        <p:blipFill>
-          <a:blip r:embed="rId7" cstate="email">
-            <a:extLst>
-              <a:ext uri="{28A0092B-C50C-407E-A947-70E740481C1C}">
-                <a14:useLocalDpi xmlns:a14="http://schemas.microsoft.com/office/drawing/2010/main" val="0"/>
-              </a:ext>
-            </a:extLst>
-          </a:blip>
-          <a:stretch>
-            <a:fillRect/>
-          </a:stretch>
-        </p:blipFill>
-        <p:spPr>
-          <a:xfrm>
-            <a:off x="4560992" y="4692776"/>
-            <a:ext cx="1829725" cy="1230067"/>
-          </a:xfrm>
-          <a:prstGeom prst="rect">
-            <a:avLst/>
-          </a:prstGeom>
-        </p:spPr>
-      </p:pic>
-      <p:pic>
-        <p:nvPicPr>
-          <p:cNvPr id="12" name="Picture 11" descr="6.png"/>
-          <p:cNvPicPr>
-            <a:picLocks noChangeAspect="1"/>
-          </p:cNvPicPr>
-          <p:nvPr/>
-        </p:nvPicPr>
-        <p:blipFill>
-          <a:blip r:embed="rId8" cstate="email">
-            <a:extLst>
-              <a:ext uri="{28A0092B-C50C-407E-A947-70E740481C1C}">
-                <a14:useLocalDpi xmlns:a14="http://schemas.microsoft.com/office/drawing/2010/main" val="0"/>
-              </a:ext>
-            </a:extLst>
-          </a:blip>
-          <a:stretch>
-            <a:fillRect/>
-          </a:stretch>
-        </p:blipFill>
-        <p:spPr>
-          <a:xfrm>
-            <a:off x="6647702" y="4692775"/>
-            <a:ext cx="1823363" cy="1230067"/>
-          </a:xfrm>
-          <a:prstGeom prst="rect">
-            <a:avLst/>
-          </a:prstGeom>
-        </p:spPr>
-      </p:pic>
-      <p:sp>
-        <p:nvSpPr>
-          <p:cNvPr id="13" name="TextBox 12"/>
+      <p:sp>
+        <p:nvSpPr>
+          <p:cNvPr id="7" name="TextBox 6"/>
           <p:cNvSpPr txBox="1"/>
           <p:nvPr/>
         </p:nvSpPr>
         <p:spPr>
           <a:xfrm>
-            <a:off x="5589995" y="6230658"/>
-            <a:ext cx="2395608" cy="369332"/>
+            <a:off x="1121705" y="4950554"/>
+            <a:ext cx="2439227" cy="369332"/>
           </a:xfrm>
           <a:prstGeom prst="rect">
             <a:avLst/>
@@ -13508,7 +12889,7 @@
           <a:p>
             <a:r>
               <a:rPr lang="pt-BR" dirty="0" smtClean="0"/>
-              <a:t>Oclusão momentânea</a:t>
+              <a:t>Interação com objetos</a:t>
             </a:r>
             <a:endParaRPr lang="pt-BR" dirty="0"/>
           </a:p>
@@ -13516,14 +12897,14 @@
       </p:sp>
       <p:sp>
         <p:nvSpPr>
-          <p:cNvPr id="15" name="TextBox 14"/>
+          <p:cNvPr id="8" name="TextBox 7"/>
           <p:cNvSpPr txBox="1"/>
           <p:nvPr/>
         </p:nvSpPr>
         <p:spPr>
           <a:xfrm>
-            <a:off x="4560992" y="1823052"/>
-            <a:ext cx="297715" cy="369332"/>
+            <a:off x="5154292" y="4950554"/>
+            <a:ext cx="2671863" cy="369332"/>
           </a:xfrm>
           <a:prstGeom prst="rect">
             <a:avLst/>
@@ -13537,215 +12918,17 @@
           <a:lstStyle/>
           <a:p>
             <a:r>
-              <a:rPr lang="pt-BR" b="1" dirty="0" smtClean="0">
-                <a:solidFill>
-                  <a:schemeClr val="bg1"/>
-                </a:solidFill>
-              </a:rPr>
-              <a:t>1</a:t>
-            </a:r>
-            <a:endParaRPr lang="pt-BR" b="1" dirty="0">
-              <a:solidFill>
-                <a:schemeClr val="bg1"/>
-              </a:solidFill>
-            </a:endParaRPr>
-          </a:p>
-        </p:txBody>
-      </p:sp>
-      <p:sp>
-        <p:nvSpPr>
-          <p:cNvPr id="16" name="TextBox 15"/>
-          <p:cNvSpPr txBox="1"/>
-          <p:nvPr/>
-        </p:nvSpPr>
-        <p:spPr>
-          <a:xfrm>
-            <a:off x="6631600" y="1823052"/>
-            <a:ext cx="329274" cy="369332"/>
-          </a:xfrm>
-          <a:prstGeom prst="rect">
-            <a:avLst/>
-          </a:prstGeom>
-          <a:noFill/>
-        </p:spPr>
-        <p:txBody>
-          <a:bodyPr wrap="none" rtlCol="0">
-            <a:spAutoFit/>
-          </a:bodyPr>
-          <a:lstStyle/>
-          <a:p>
-            <a:r>
-              <a:rPr lang="pt-BR" b="1" dirty="0" smtClean="0">
-                <a:solidFill>
-                  <a:schemeClr val="bg1"/>
-                </a:solidFill>
-              </a:rPr>
-              <a:t>2</a:t>
-            </a:r>
-            <a:endParaRPr lang="pt-BR" b="1" dirty="0">
-              <a:solidFill>
-                <a:schemeClr val="bg1"/>
-              </a:solidFill>
-            </a:endParaRPr>
-          </a:p>
-        </p:txBody>
-      </p:sp>
-      <p:sp>
-        <p:nvSpPr>
-          <p:cNvPr id="17" name="TextBox 16"/>
-          <p:cNvSpPr txBox="1"/>
-          <p:nvPr/>
-        </p:nvSpPr>
-        <p:spPr>
-          <a:xfrm>
-            <a:off x="4560992" y="3188123"/>
-            <a:ext cx="328823" cy="369332"/>
-          </a:xfrm>
-          <a:prstGeom prst="rect">
-            <a:avLst/>
-          </a:prstGeom>
-          <a:noFill/>
-        </p:spPr>
-        <p:txBody>
-          <a:bodyPr wrap="none" rtlCol="0">
-            <a:spAutoFit/>
-          </a:bodyPr>
-          <a:lstStyle/>
-          <a:p>
-            <a:r>
-              <a:rPr lang="pt-BR" b="1" dirty="0" smtClean="0">
-                <a:solidFill>
-                  <a:schemeClr val="bg1"/>
-                </a:solidFill>
-              </a:rPr>
-              <a:t>3</a:t>
-            </a:r>
-            <a:endParaRPr lang="pt-BR" b="1" dirty="0">
-              <a:solidFill>
-                <a:schemeClr val="bg1"/>
-              </a:solidFill>
-            </a:endParaRPr>
-          </a:p>
-        </p:txBody>
-      </p:sp>
-      <p:sp>
-        <p:nvSpPr>
-          <p:cNvPr id="18" name="TextBox 17"/>
-          <p:cNvSpPr txBox="1"/>
-          <p:nvPr/>
-        </p:nvSpPr>
-        <p:spPr>
-          <a:xfrm>
-            <a:off x="6630134" y="3194900"/>
-            <a:ext cx="334572" cy="369332"/>
-          </a:xfrm>
-          <a:prstGeom prst="rect">
-            <a:avLst/>
-          </a:prstGeom>
-          <a:noFill/>
-        </p:spPr>
-        <p:txBody>
-          <a:bodyPr wrap="none" rtlCol="0">
-            <a:spAutoFit/>
-          </a:bodyPr>
-          <a:lstStyle/>
-          <a:p>
-            <a:r>
-              <a:rPr lang="pt-BR" b="1" dirty="0" smtClean="0">
-                <a:solidFill>
-                  <a:schemeClr val="bg1"/>
-                </a:solidFill>
-              </a:rPr>
-              <a:t>4</a:t>
-            </a:r>
-            <a:endParaRPr lang="pt-BR" b="1" dirty="0">
-              <a:solidFill>
-                <a:schemeClr val="bg1"/>
-              </a:solidFill>
-            </a:endParaRPr>
-          </a:p>
-        </p:txBody>
-      </p:sp>
-      <p:sp>
-        <p:nvSpPr>
-          <p:cNvPr id="19" name="TextBox 18"/>
-          <p:cNvSpPr txBox="1"/>
-          <p:nvPr/>
-        </p:nvSpPr>
-        <p:spPr>
-          <a:xfrm>
-            <a:off x="4538225" y="4616809"/>
-            <a:ext cx="322963" cy="369332"/>
-          </a:xfrm>
-          <a:prstGeom prst="rect">
-            <a:avLst/>
-          </a:prstGeom>
-          <a:noFill/>
-        </p:spPr>
-        <p:txBody>
-          <a:bodyPr wrap="none" rtlCol="0">
-            <a:spAutoFit/>
-          </a:bodyPr>
-          <a:lstStyle/>
-          <a:p>
-            <a:r>
-              <a:rPr lang="pt-BR" b="1" dirty="0" smtClean="0">
-                <a:solidFill>
-                  <a:schemeClr val="bg1"/>
-                </a:solidFill>
-              </a:rPr>
-              <a:t>5</a:t>
-            </a:r>
-            <a:endParaRPr lang="pt-BR" b="1" dirty="0">
-              <a:solidFill>
-                <a:schemeClr val="bg1"/>
-              </a:solidFill>
-            </a:endParaRPr>
-          </a:p>
-        </p:txBody>
-      </p:sp>
-      <p:sp>
-        <p:nvSpPr>
-          <p:cNvPr id="20" name="TextBox 19"/>
-          <p:cNvSpPr txBox="1"/>
-          <p:nvPr/>
-        </p:nvSpPr>
-        <p:spPr>
-          <a:xfrm>
-            <a:off x="6620639" y="4616809"/>
-            <a:ext cx="334234" cy="369332"/>
-          </a:xfrm>
-          <a:prstGeom prst="rect">
-            <a:avLst/>
-          </a:prstGeom>
-          <a:noFill/>
-        </p:spPr>
-        <p:txBody>
-          <a:bodyPr wrap="none" rtlCol="0">
-            <a:spAutoFit/>
-          </a:bodyPr>
-          <a:lstStyle/>
-          <a:p>
-            <a:r>
-              <a:rPr lang="pt-BR" b="1" dirty="0" smtClean="0">
-                <a:solidFill>
-                  <a:schemeClr val="bg1"/>
-                </a:solidFill>
-              </a:rPr>
-              <a:t>6</a:t>
-            </a:r>
-            <a:endParaRPr lang="pt-BR" b="1" dirty="0">
-              <a:solidFill>
-                <a:schemeClr val="bg1"/>
-              </a:solidFill>
-            </a:endParaRPr>
+              <a:rPr lang="pt-BR" dirty="0" smtClean="0"/>
+              <a:t>Interação entre usuários</a:t>
+            </a:r>
+            <a:endParaRPr lang="pt-BR" dirty="0"/>
           </a:p>
         </p:txBody>
       </p:sp>
     </p:spTree>
     <p:extLst>
       <p:ext uri="{BB962C8B-B14F-4D97-AF65-F5344CB8AC3E}">
-        <p14:creationId xmlns:p14="http://schemas.microsoft.com/office/powerpoint/2010/main" val="244544535"/>
+        <p14:creationId xmlns:p14="http://schemas.microsoft.com/office/powerpoint/2010/main" val="2544787077"/>
       </p:ext>
     </p:extLst>
   </p:cSld>
@@ -13781,207 +12964,6 @@
       </p:grpSpPr>
       <p:sp>
         <p:nvSpPr>
-          <p:cNvPr id="2" name="Title 1"/>
-          <p:cNvSpPr>
-            <a:spLocks noGrp="1"/>
-          </p:cNvSpPr>
-          <p:nvPr>
-            <p:ph type="title"/>
-          </p:nvPr>
-        </p:nvSpPr>
-        <p:spPr>
-          <a:xfrm>
-            <a:off x="222487" y="484779"/>
-            <a:ext cx="8741901" cy="1066800"/>
-          </a:xfrm>
-        </p:spPr>
-        <p:txBody>
-          <a:bodyPr/>
-          <a:lstStyle/>
-          <a:p>
-            <a:r>
-              <a:rPr lang="en-US" dirty="0"/>
-              <a:t>Testes – </a:t>
-            </a:r>
-            <a:r>
-              <a:rPr lang="en-US" dirty="0" err="1"/>
-              <a:t>Rastreamento</a:t>
-            </a:r>
-            <a:r>
-              <a:rPr lang="en-US" dirty="0"/>
-              <a:t> </a:t>
-            </a:r>
-            <a:r>
-              <a:rPr lang="en-US" b="1" dirty="0" smtClean="0"/>
-              <a:t>- </a:t>
-            </a:r>
-            <a:r>
-              <a:rPr lang="en-US" sz="3600" b="1" dirty="0" err="1" smtClean="0"/>
-              <a:t>Interferências</a:t>
-            </a:r>
-            <a:endParaRPr lang="en-US" sz="3600" dirty="0"/>
-          </a:p>
-        </p:txBody>
-      </p:sp>
-      <p:pic>
-        <p:nvPicPr>
-          <p:cNvPr id="4" name="Picture 3" descr="2.png"/>
-          <p:cNvPicPr>
-            <a:picLocks noChangeAspect="1"/>
-          </p:cNvPicPr>
-          <p:nvPr/>
-        </p:nvPicPr>
-        <p:blipFill>
-          <a:blip r:embed="rId2" cstate="email">
-            <a:extLst>
-              <a:ext uri="{28A0092B-C50C-407E-A947-70E740481C1C}">
-                <a14:useLocalDpi xmlns:a14="http://schemas.microsoft.com/office/drawing/2010/main" val="0"/>
-              </a:ext>
-            </a:extLst>
-          </a:blip>
-          <a:stretch>
-            <a:fillRect/>
-          </a:stretch>
-        </p:blipFill>
-        <p:spPr>
-          <a:xfrm>
-            <a:off x="537678" y="2404483"/>
-            <a:ext cx="3640683" cy="2444094"/>
-          </a:xfrm>
-          <a:prstGeom prst="rect">
-            <a:avLst/>
-          </a:prstGeom>
-        </p:spPr>
-      </p:pic>
-      <p:pic>
-        <p:nvPicPr>
-          <p:cNvPr id="6" name="Picture 5" descr="2.png"/>
-          <p:cNvPicPr>
-            <a:picLocks noChangeAspect="1"/>
-          </p:cNvPicPr>
-          <p:nvPr/>
-        </p:nvPicPr>
-        <p:blipFill>
-          <a:blip r:embed="rId3" cstate="email">
-            <a:extLst>
-              <a:ext uri="{28A0092B-C50C-407E-A947-70E740481C1C}">
-                <a14:useLocalDpi xmlns:a14="http://schemas.microsoft.com/office/drawing/2010/main" val="0"/>
-              </a:ext>
-            </a:extLst>
-          </a:blip>
-          <a:stretch>
-            <a:fillRect/>
-          </a:stretch>
-        </p:blipFill>
-        <p:spPr>
-          <a:xfrm>
-            <a:off x="4639706" y="2404483"/>
-            <a:ext cx="3645688" cy="2444094"/>
-          </a:xfrm>
-          <a:prstGeom prst="rect">
-            <a:avLst/>
-          </a:prstGeom>
-        </p:spPr>
-      </p:pic>
-      <p:sp>
-        <p:nvSpPr>
-          <p:cNvPr id="7" name="TextBox 6"/>
-          <p:cNvSpPr txBox="1"/>
-          <p:nvPr/>
-        </p:nvSpPr>
-        <p:spPr>
-          <a:xfrm>
-            <a:off x="1121705" y="4950554"/>
-            <a:ext cx="2439227" cy="369332"/>
-          </a:xfrm>
-          <a:prstGeom prst="rect">
-            <a:avLst/>
-          </a:prstGeom>
-          <a:noFill/>
-        </p:spPr>
-        <p:txBody>
-          <a:bodyPr wrap="none" rtlCol="0">
-            <a:spAutoFit/>
-          </a:bodyPr>
-          <a:lstStyle/>
-          <a:p>
-            <a:r>
-              <a:rPr lang="pt-BR" dirty="0" smtClean="0"/>
-              <a:t>Interação com objetos</a:t>
-            </a:r>
-            <a:endParaRPr lang="pt-BR" dirty="0"/>
-          </a:p>
-        </p:txBody>
-      </p:sp>
-      <p:sp>
-        <p:nvSpPr>
-          <p:cNvPr id="8" name="TextBox 7"/>
-          <p:cNvSpPr txBox="1"/>
-          <p:nvPr/>
-        </p:nvSpPr>
-        <p:spPr>
-          <a:xfrm>
-            <a:off x="5154292" y="4950554"/>
-            <a:ext cx="2671863" cy="369332"/>
-          </a:xfrm>
-          <a:prstGeom prst="rect">
-            <a:avLst/>
-          </a:prstGeom>
-          <a:noFill/>
-        </p:spPr>
-        <p:txBody>
-          <a:bodyPr wrap="none" rtlCol="0">
-            <a:spAutoFit/>
-          </a:bodyPr>
-          <a:lstStyle/>
-          <a:p>
-            <a:r>
-              <a:rPr lang="pt-BR" dirty="0" smtClean="0"/>
-              <a:t>Interação entre usuários</a:t>
-            </a:r>
-            <a:endParaRPr lang="pt-BR" dirty="0"/>
-          </a:p>
-        </p:txBody>
-      </p:sp>
-    </p:spTree>
-    <p:extLst>
-      <p:ext uri="{BB962C8B-B14F-4D97-AF65-F5344CB8AC3E}">
-        <p14:creationId xmlns:p14="http://schemas.microsoft.com/office/powerpoint/2010/main" val="2544787077"/>
-      </p:ext>
-    </p:extLst>
-  </p:cSld>
-  <p:clrMapOvr>
-    <a:masterClrMapping/>
-  </p:clrMapOvr>
-  <p:timing>
-    <p:tnLst>
-      <p:par>
-        <p:cTn id="1" dur="indefinite" restart="never" nodeType="tmRoot"/>
-      </p:par>
-    </p:tnLst>
-  </p:timing>
-</p:sld>
-</file>
-
-<file path=ppt/slides/slide38.xml><?xml version="1.0" encoding="utf-8"?>
-<p:sld xmlns:a="http://schemas.openxmlformats.org/drawingml/2006/main" xmlns:r="http://schemas.openxmlformats.org/officeDocument/2006/relationships" xmlns:p="http://schemas.openxmlformats.org/presentationml/2006/main">
-  <p:cSld>
-    <p:spTree>
-      <p:nvGrpSpPr>
-        <p:cNvPr id="1" name=""/>
-        <p:cNvGrpSpPr/>
-        <p:nvPr/>
-      </p:nvGrpSpPr>
-      <p:grpSpPr>
-        <a:xfrm>
-          <a:off x="0" y="0"/>
-          <a:ext cx="0" cy="0"/>
-          <a:chOff x="0" y="0"/>
-          <a:chExt cx="0" cy="0"/>
-        </a:xfrm>
-      </p:grpSpPr>
-      <p:sp>
-        <p:nvSpPr>
           <p:cNvPr id="5" name="Title 1"/>
           <p:cNvSpPr txBox="1">
             <a:spLocks/>
@@ -14019,7 +13001,7 @@
               </a14:hiddenLine>
             </a:ext>
             <a:ext uri="{FAA26D3D-D897-4be2-8F04-BA451C77F1D7}">
-              <ma14:placeholderFlag xmlns="" xmlns:ma14="http://schemas.microsoft.com/office/mac/drawingml/2011/main" val="1"/>
+              <ma14:placeholderFlag xmlns:ma14="http://schemas.microsoft.com/office/mac/drawingml/2011/main" xmlns="" val="1"/>
             </a:ext>
           </a:extLst>
         </p:spPr>
@@ -14249,7 +13231,7 @@
 </p:sld>
 </file>
 
-<file path=ppt/slides/slide39.xml><?xml version="1.0" encoding="utf-8"?>
+<file path=ppt/slides/slide38.xml><?xml version="1.0" encoding="utf-8"?>
 <p:sld xmlns:a="http://schemas.openxmlformats.org/drawingml/2006/main" xmlns:r="http://schemas.openxmlformats.org/officeDocument/2006/relationships" xmlns:p="http://schemas.openxmlformats.org/presentationml/2006/main">
   <p:cSld>
     <p:spTree>
@@ -14266,6 +13248,129 @@
           <a:chExt cx="0" cy="0"/>
         </a:xfrm>
       </p:grpSpPr>
+      <p:pic>
+        <p:nvPicPr>
+          <p:cNvPr id="2051" name="Picture 3" descr="E:\Imagens\Imagem1.png"/>
+          <p:cNvPicPr>
+            <a:picLocks noChangeAspect="1" noChangeArrowheads="1"/>
+          </p:cNvPicPr>
+          <p:nvPr/>
+        </p:nvPicPr>
+        <p:blipFill>
+          <a:blip r:embed="rId2">
+            <a:extLst>
+              <a:ext uri="{28A0092B-C50C-407E-A947-70E740481C1C}">
+                <a14:useLocalDpi xmlns:a14="http://schemas.microsoft.com/office/drawing/2010/main" val="0"/>
+              </a:ext>
+            </a:extLst>
+          </a:blip>
+          <a:srcRect/>
+          <a:stretch>
+            <a:fillRect/>
+          </a:stretch>
+        </p:blipFill>
+        <p:spPr bwMode="auto">
+          <a:xfrm>
+            <a:off x="2409686" y="1413035"/>
+            <a:ext cx="4690273" cy="5202476"/>
+          </a:xfrm>
+          <a:prstGeom prst="rect">
+            <a:avLst/>
+          </a:prstGeom>
+          <a:noFill/>
+          <a:extLst>
+            <a:ext uri="{909E8E84-426E-40DD-AFC4-6F175D3DCCD1}">
+              <a14:hiddenFill xmlns:a14="http://schemas.microsoft.com/office/drawing/2010/main">
+                <a:solidFill>
+                  <a:srgbClr val="FFFFFF"/>
+                </a:solidFill>
+              </a14:hiddenFill>
+            </a:ext>
+          </a:extLst>
+        </p:spPr>
+      </p:pic>
+      <p:pic>
+        <p:nvPicPr>
+          <p:cNvPr id="2050" name="Picture 2" descr="E:\Imagens\Imagem1_2.png"/>
+          <p:cNvPicPr>
+            <a:picLocks noChangeAspect="1" noChangeArrowheads="1"/>
+          </p:cNvPicPr>
+          <p:nvPr/>
+        </p:nvPicPr>
+        <p:blipFill>
+          <a:blip r:embed="rId3">
+            <a:extLst>
+              <a:ext uri="{28A0092B-C50C-407E-A947-70E740481C1C}">
+                <a14:useLocalDpi xmlns:a14="http://schemas.microsoft.com/office/drawing/2010/main" val="0"/>
+              </a:ext>
+            </a:extLst>
+          </a:blip>
+          <a:srcRect/>
+          <a:stretch>
+            <a:fillRect/>
+          </a:stretch>
+        </p:blipFill>
+        <p:spPr bwMode="auto">
+          <a:xfrm>
+            <a:off x="2409686" y="1413035"/>
+            <a:ext cx="4690112" cy="5202476"/>
+          </a:xfrm>
+          <a:prstGeom prst="rect">
+            <a:avLst/>
+          </a:prstGeom>
+          <a:noFill/>
+          <a:extLst>
+            <a:ext uri="{909E8E84-426E-40DD-AFC4-6F175D3DCCD1}">
+              <a14:hiddenFill xmlns:a14="http://schemas.microsoft.com/office/drawing/2010/main">
+                <a:solidFill>
+                  <a:srgbClr val="FFFFFF"/>
+                </a:solidFill>
+              </a14:hiddenFill>
+            </a:ext>
+          </a:extLst>
+        </p:spPr>
+      </p:pic>
+      <p:pic>
+        <p:nvPicPr>
+          <p:cNvPr id="1028" name="Picture 4" descr="C:\Users\Tales\Downloads\IC534689.png"/>
+          <p:cNvPicPr>
+            <a:picLocks noChangeAspect="1" noChangeArrowheads="1"/>
+          </p:cNvPicPr>
+          <p:nvPr/>
+        </p:nvPicPr>
+        <p:blipFill>
+          <a:blip r:embed="rId4">
+            <a:extLst>
+              <a:ext uri="{28A0092B-C50C-407E-A947-70E740481C1C}">
+                <a14:useLocalDpi xmlns:a14="http://schemas.microsoft.com/office/drawing/2010/main" val="0"/>
+              </a:ext>
+            </a:extLst>
+          </a:blip>
+          <a:srcRect/>
+          <a:stretch>
+            <a:fillRect/>
+          </a:stretch>
+        </p:blipFill>
+        <p:spPr bwMode="auto">
+          <a:xfrm>
+            <a:off x="2409686" y="1413034"/>
+            <a:ext cx="4690111" cy="5202477"/>
+          </a:xfrm>
+          <a:prstGeom prst="rect">
+            <a:avLst/>
+          </a:prstGeom>
+          <a:noFill/>
+          <a:extLst>
+            <a:ext uri="{909E8E84-426E-40DD-AFC4-6F175D3DCCD1}">
+              <a14:hiddenFill xmlns:a14="http://schemas.microsoft.com/office/drawing/2010/main">
+                <a:solidFill>
+                  <a:srgbClr val="FFFFFF"/>
+                </a:solidFill>
+              </a14:hiddenFill>
+            </a:ext>
+          </a:extLst>
+        </p:spPr>
+      </p:pic>
       <p:sp>
         <p:nvSpPr>
           <p:cNvPr id="4" name="Title 1"/>
@@ -14305,7 +13410,7 @@
               </a14:hiddenLine>
             </a:ext>
             <a:ext uri="{FAA26D3D-D897-4be2-8F04-BA451C77F1D7}">
-              <ma14:placeholderFlag xmlns="" xmlns:ma14="http://schemas.microsoft.com/office/mac/drawingml/2011/main" val="1"/>
+              <ma14:placeholderFlag xmlns:ma14="http://schemas.microsoft.com/office/mac/drawingml/2011/main" xmlns="" val="1"/>
             </a:ext>
           </a:extLst>
         </p:spPr>
@@ -14474,47 +13579,6 @@
           </a:p>
         </p:txBody>
       </p:sp>
-      <p:pic>
-        <p:nvPicPr>
-          <p:cNvPr id="1028" name="Picture 4" descr="C:\Users\Tales\Downloads\IC534689.png"/>
-          <p:cNvPicPr>
-            <a:picLocks noChangeAspect="1" noChangeArrowheads="1"/>
-          </p:cNvPicPr>
-          <p:nvPr/>
-        </p:nvPicPr>
-        <p:blipFill>
-          <a:blip r:embed="rId2">
-            <a:extLst>
-              <a:ext uri="{28A0092B-C50C-407E-A947-70E740481C1C}">
-                <a14:useLocalDpi xmlns:a14="http://schemas.microsoft.com/office/drawing/2010/main" val="0"/>
-              </a:ext>
-            </a:extLst>
-          </a:blip>
-          <a:srcRect/>
-          <a:stretch>
-            <a:fillRect/>
-          </a:stretch>
-        </p:blipFill>
-        <p:spPr bwMode="auto">
-          <a:xfrm>
-            <a:off x="2537257" y="1413035"/>
-            <a:ext cx="4528559" cy="5023276"/>
-          </a:xfrm>
-          <a:prstGeom prst="rect">
-            <a:avLst/>
-          </a:prstGeom>
-          <a:noFill/>
-          <a:extLst>
-            <a:ext uri="{909E8E84-426E-40DD-AFC4-6F175D3DCCD1}">
-              <a14:hiddenFill xmlns:a14="http://schemas.microsoft.com/office/drawing/2010/main">
-                <a:solidFill>
-                  <a:srgbClr val="FFFFFF"/>
-                </a:solidFill>
-              </a14:hiddenFill>
-            </a:ext>
-          </a:extLst>
-        </p:spPr>
-      </p:pic>
     </p:spTree>
     <p:extLst>
       <p:ext uri="{BB962C8B-B14F-4D97-AF65-F5344CB8AC3E}">
@@ -14528,123 +13592,143 @@
   <p:timing>
     <p:tnLst>
       <p:par>
-        <p:cTn id="1" dur="indefinite" restart="never" nodeType="tmRoot"/>
+        <p:cTn id="1" dur="indefinite" restart="never" nodeType="tmRoot">
+          <p:childTnLst>
+            <p:seq concurrent="1" nextAc="seek">
+              <p:cTn id="2" dur="indefinite" nodeType="mainSeq">
+                <p:childTnLst>
+                  <p:par>
+                    <p:cTn id="3" fill="hold">
+                      <p:stCondLst>
+                        <p:cond delay="indefinite"/>
+                      </p:stCondLst>
+                      <p:childTnLst>
+                        <p:par>
+                          <p:cTn id="4" fill="hold">
+                            <p:stCondLst>
+                              <p:cond delay="0"/>
+                            </p:stCondLst>
+                            <p:childTnLst>
+                              <p:par>
+                                <p:cTn id="5" presetID="10" presetClass="exit" presetSubtype="0" fill="hold" nodeType="clickEffect">
+                                  <p:stCondLst>
+                                    <p:cond delay="0"/>
+                                  </p:stCondLst>
+                                  <p:childTnLst>
+                                    <p:animEffect transition="out" filter="fade">
+                                      <p:cBhvr>
+                                        <p:cTn id="6" dur="500"/>
+                                        <p:tgtEl>
+                                          <p:spTgt spid="1028"/>
+                                        </p:tgtEl>
+                                      </p:cBhvr>
+                                    </p:animEffect>
+                                    <p:set>
+                                      <p:cBhvr>
+                                        <p:cTn id="7" dur="1" fill="hold">
+                                          <p:stCondLst>
+                                            <p:cond delay="499"/>
+                                          </p:stCondLst>
+                                        </p:cTn>
+                                        <p:tgtEl>
+                                          <p:spTgt spid="1028"/>
+                                        </p:tgtEl>
+                                        <p:attrNameLst>
+                                          <p:attrName>style.visibility</p:attrName>
+                                        </p:attrNameLst>
+                                      </p:cBhvr>
+                                      <p:to>
+                                        <p:strVal val="hidden"/>
+                                      </p:to>
+                                    </p:set>
+                                  </p:childTnLst>
+                                </p:cTn>
+                              </p:par>
+                            </p:childTnLst>
+                          </p:cTn>
+                        </p:par>
+                      </p:childTnLst>
+                    </p:cTn>
+                  </p:par>
+                  <p:par>
+                    <p:cTn id="8" fill="hold">
+                      <p:stCondLst>
+                        <p:cond delay="indefinite"/>
+                      </p:stCondLst>
+                      <p:childTnLst>
+                        <p:par>
+                          <p:cTn id="9" fill="hold">
+                            <p:stCondLst>
+                              <p:cond delay="0"/>
+                            </p:stCondLst>
+                            <p:childTnLst>
+                              <p:par>
+                                <p:cTn id="10" presetID="10" presetClass="exit" presetSubtype="0" fill="hold" nodeType="clickEffect">
+                                  <p:stCondLst>
+                                    <p:cond delay="0"/>
+                                  </p:stCondLst>
+                                  <p:childTnLst>
+                                    <p:animEffect transition="out" filter="fade">
+                                      <p:cBhvr>
+                                        <p:cTn id="11" dur="500"/>
+                                        <p:tgtEl>
+                                          <p:spTgt spid="2050"/>
+                                        </p:tgtEl>
+                                      </p:cBhvr>
+                                    </p:animEffect>
+                                    <p:set>
+                                      <p:cBhvr>
+                                        <p:cTn id="12" dur="1" fill="hold">
+                                          <p:stCondLst>
+                                            <p:cond delay="499"/>
+                                          </p:stCondLst>
+                                        </p:cTn>
+                                        <p:tgtEl>
+                                          <p:spTgt spid="2050"/>
+                                        </p:tgtEl>
+                                        <p:attrNameLst>
+                                          <p:attrName>style.visibility</p:attrName>
+                                        </p:attrNameLst>
+                                      </p:cBhvr>
+                                      <p:to>
+                                        <p:strVal val="hidden"/>
+                                      </p:to>
+                                    </p:set>
+                                  </p:childTnLst>
+                                </p:cTn>
+                              </p:par>
+                            </p:childTnLst>
+                          </p:cTn>
+                        </p:par>
+                      </p:childTnLst>
+                    </p:cTn>
+                  </p:par>
+                </p:childTnLst>
+              </p:cTn>
+              <p:prevCondLst>
+                <p:cond evt="onPrev" delay="0">
+                  <p:tgtEl>
+                    <p:sldTgt/>
+                  </p:tgtEl>
+                </p:cond>
+              </p:prevCondLst>
+              <p:nextCondLst>
+                <p:cond evt="onNext" delay="0">
+                  <p:tgtEl>
+                    <p:sldTgt/>
+                  </p:tgtEl>
+                </p:cond>
+              </p:nextCondLst>
+            </p:seq>
+          </p:childTnLst>
+        </p:cTn>
       </p:par>
     </p:tnLst>
   </p:timing>
 </p:sld>
 </file>
 
-<file path=ppt/slides/slide4.xml><?xml version="1.0" encoding="utf-8"?>
-<p:sld xmlns:a="http://schemas.openxmlformats.org/drawingml/2006/main" xmlns:r="http://schemas.openxmlformats.org/officeDocument/2006/relationships" xmlns:p="http://schemas.openxmlformats.org/presentationml/2006/main">
-  <p:cSld>
-    <p:spTree>
-      <p:nvGrpSpPr>
-        <p:cNvPr id="1" name=""/>
-        <p:cNvGrpSpPr/>
-        <p:nvPr/>
-      </p:nvGrpSpPr>
-      <p:grpSpPr>
-        <a:xfrm>
-          <a:off x="0" y="0"/>
-          <a:ext cx="0" cy="0"/>
-          <a:chOff x="0" y="0"/>
-          <a:chExt cx="0" cy="0"/>
-        </a:xfrm>
-      </p:grpSpPr>
-      <p:sp>
-        <p:nvSpPr>
-          <p:cNvPr id="3" name="Content Placeholder 2"/>
-          <p:cNvSpPr>
-            <a:spLocks noGrp="1"/>
-          </p:cNvSpPr>
-          <p:nvPr>
-            <p:ph idx="1"/>
-          </p:nvPr>
-        </p:nvSpPr>
-        <p:spPr>
-          <a:xfrm>
-            <a:off x="457200" y="716643"/>
-            <a:ext cx="8229600" cy="5857195"/>
-          </a:xfrm>
-        </p:spPr>
-        <p:txBody>
-          <a:bodyPr/>
-          <a:lstStyle/>
-          <a:p>
-            <a:r>
-              <a:rPr lang="en-US" dirty="0" err="1" smtClean="0"/>
-              <a:t>Computação</a:t>
-            </a:r>
-            <a:r>
-              <a:rPr lang="en-US" dirty="0" smtClean="0"/>
-              <a:t> </a:t>
-            </a:r>
-            <a:r>
-              <a:rPr lang="en-US" dirty="0" err="1" smtClean="0"/>
-              <a:t>Ubíqua</a:t>
-            </a:r>
-            <a:endParaRPr lang="en-US" dirty="0" smtClean="0"/>
-          </a:p>
-          <a:p>
-            <a:endParaRPr lang="en-US" dirty="0"/>
-          </a:p>
-          <a:p>
-            <a:endParaRPr lang="en-US" dirty="0" smtClean="0"/>
-          </a:p>
-        </p:txBody>
-      </p:sp>
-      <p:pic>
-        <p:nvPicPr>
-          <p:cNvPr id="2" name="Picture 1" descr="FirefoxScreenSnapz001n (1).jpg"/>
-          <p:cNvPicPr>
-            <a:picLocks noChangeAspect="1"/>
-          </p:cNvPicPr>
-          <p:nvPr/>
-        </p:nvPicPr>
-        <p:blipFill>
-          <a:blip r:embed="rId2" cstate="email">
-            <a:extLst>
-              <a:ext uri="{28A0092B-C50C-407E-A947-70E740481C1C}">
-                <a14:useLocalDpi xmlns:a14="http://schemas.microsoft.com/office/drawing/2010/main" val="0"/>
-              </a:ext>
-            </a:extLst>
-          </a:blip>
-          <a:stretch>
-            <a:fillRect/>
-          </a:stretch>
-        </p:blipFill>
-        <p:spPr>
-          <a:xfrm>
-            <a:off x="457200" y="1856823"/>
-            <a:ext cx="7587171" cy="4016737"/>
-          </a:xfrm>
-          <a:prstGeom prst="rect">
-            <a:avLst/>
-          </a:prstGeom>
-        </p:spPr>
-      </p:pic>
-    </p:spTree>
-    <p:extLst>
-      <p:ext uri="{BB962C8B-B14F-4D97-AF65-F5344CB8AC3E}">
-        <p14:creationId xmlns:p14="http://schemas.microsoft.com/office/powerpoint/2010/main" val="4098789272"/>
-      </p:ext>
-    </p:extLst>
-  </p:cSld>
-  <p:clrMapOvr>
-    <a:masterClrMapping/>
-  </p:clrMapOvr>
-  <p:timing>
-    <p:tnLst>
-      <p:par>
-        <p:cTn id="1" dur="indefinite" restart="never" nodeType="tmRoot"/>
-      </p:par>
-    </p:tnLst>
-  </p:timing>
-</p:sld>
-</file>
-
-<file path=ppt/slides/slide40.xml><?xml version="1.0" encoding="utf-8"?>
+<file path=ppt/slides/slide39.xml><?xml version="1.0" encoding="utf-8"?>
 <p:sld xmlns:a="http://schemas.openxmlformats.org/drawingml/2006/main" xmlns:r="http://schemas.openxmlformats.org/officeDocument/2006/relationships" xmlns:p="http://schemas.openxmlformats.org/presentationml/2006/main">
   <p:cSld>
     <p:spTree>
@@ -14700,7 +13784,7 @@
               </a14:hiddenLine>
             </a:ext>
             <a:ext uri="{FAA26D3D-D897-4be2-8F04-BA451C77F1D7}">
-              <ma14:placeholderFlag xmlns="" xmlns:ma14="http://schemas.microsoft.com/office/mac/drawingml/2011/main" val="1"/>
+              <ma14:placeholderFlag xmlns:ma14="http://schemas.microsoft.com/office/mac/drawingml/2011/main" xmlns="" val="1"/>
             </a:ext>
           </a:extLst>
         </p:spPr>
@@ -14983,15 +14067,7 @@
                   <a:srgbClr val="FF0000"/>
                 </a:solidFill>
               </a:rPr>
-              <a:t>&lt; </a:t>
-            </a:r>
-            <a:r>
-              <a:rPr lang="pt-BR" dirty="0" smtClean="0">
-                <a:solidFill>
-                  <a:srgbClr val="FF0000"/>
-                </a:solidFill>
-              </a:rPr>
-              <a:t>3,21mm</a:t>
+              <a:t>&lt; 3,21mm</a:t>
             </a:r>
           </a:p>
           <a:p>
@@ -15110,7 +14186,116 @@
 </p:sld>
 </file>
 
-<file path=ppt/slides/slide41.xml><?xml version="1.0" encoding="utf-8"?>
+<file path=ppt/slides/slide4.xml><?xml version="1.0" encoding="utf-8"?>
+<p:sld xmlns:a="http://schemas.openxmlformats.org/drawingml/2006/main" xmlns:r="http://schemas.openxmlformats.org/officeDocument/2006/relationships" xmlns:p="http://schemas.openxmlformats.org/presentationml/2006/main">
+  <p:cSld>
+    <p:spTree>
+      <p:nvGrpSpPr>
+        <p:cNvPr id="1" name=""/>
+        <p:cNvGrpSpPr/>
+        <p:nvPr/>
+      </p:nvGrpSpPr>
+      <p:grpSpPr>
+        <a:xfrm>
+          <a:off x="0" y="0"/>
+          <a:ext cx="0" cy="0"/>
+          <a:chOff x="0" y="0"/>
+          <a:chExt cx="0" cy="0"/>
+        </a:xfrm>
+      </p:grpSpPr>
+      <p:sp>
+        <p:nvSpPr>
+          <p:cNvPr id="3" name="Content Placeholder 2"/>
+          <p:cNvSpPr>
+            <a:spLocks noGrp="1"/>
+          </p:cNvSpPr>
+          <p:nvPr>
+            <p:ph idx="1"/>
+          </p:nvPr>
+        </p:nvSpPr>
+        <p:spPr>
+          <a:xfrm>
+            <a:off x="457200" y="716643"/>
+            <a:ext cx="8229600" cy="5857195"/>
+          </a:xfrm>
+        </p:spPr>
+        <p:txBody>
+          <a:bodyPr/>
+          <a:lstStyle/>
+          <a:p>
+            <a:r>
+              <a:rPr lang="en-US" dirty="0" err="1" smtClean="0"/>
+              <a:t>Computação</a:t>
+            </a:r>
+            <a:r>
+              <a:rPr lang="en-US" dirty="0" smtClean="0"/>
+              <a:t> </a:t>
+            </a:r>
+            <a:r>
+              <a:rPr lang="en-US" dirty="0" err="1" smtClean="0"/>
+              <a:t>Ubíqua</a:t>
+            </a:r>
+            <a:endParaRPr lang="en-US" dirty="0" smtClean="0"/>
+          </a:p>
+          <a:p>
+            <a:endParaRPr lang="en-US" dirty="0"/>
+          </a:p>
+          <a:p>
+            <a:endParaRPr lang="en-US" dirty="0" smtClean="0"/>
+          </a:p>
+        </p:txBody>
+      </p:sp>
+      <p:pic>
+        <p:nvPicPr>
+          <p:cNvPr id="2" name="Picture 1" descr="FirefoxScreenSnapz001n (1).jpg"/>
+          <p:cNvPicPr>
+            <a:picLocks noChangeAspect="1"/>
+          </p:cNvPicPr>
+          <p:nvPr/>
+        </p:nvPicPr>
+        <p:blipFill>
+          <a:blip r:embed="rId2" cstate="email">
+            <a:extLst>
+              <a:ext uri="{28A0092B-C50C-407E-A947-70E740481C1C}">
+                <a14:useLocalDpi xmlns:a14="http://schemas.microsoft.com/office/drawing/2010/main" val="0"/>
+              </a:ext>
+            </a:extLst>
+          </a:blip>
+          <a:stretch>
+            <a:fillRect/>
+          </a:stretch>
+        </p:blipFill>
+        <p:spPr>
+          <a:xfrm>
+            <a:off x="457200" y="1856823"/>
+            <a:ext cx="7587171" cy="4016737"/>
+          </a:xfrm>
+          <a:prstGeom prst="rect">
+            <a:avLst/>
+          </a:prstGeom>
+        </p:spPr>
+      </p:pic>
+    </p:spTree>
+    <p:extLst>
+      <p:ext uri="{BB962C8B-B14F-4D97-AF65-F5344CB8AC3E}">
+        <p14:creationId xmlns:p14="http://schemas.microsoft.com/office/powerpoint/2010/main" val="4098789272"/>
+      </p:ext>
+    </p:extLst>
+  </p:cSld>
+  <p:clrMapOvr>
+    <a:masterClrMapping/>
+  </p:clrMapOvr>
+  <p:timing>
+    <p:tnLst>
+      <p:par>
+        <p:cTn id="1" dur="indefinite" restart="never" nodeType="tmRoot"/>
+      </p:par>
+    </p:tnLst>
+  </p:timing>
+</p:sld>
+</file>
+
+<file path=ppt/slides/slide40.xml><?xml version="1.0" encoding="utf-8"?>
 <p:sld xmlns:a="http://schemas.openxmlformats.org/drawingml/2006/main" xmlns:r="http://schemas.openxmlformats.org/officeDocument/2006/relationships" xmlns:p="http://schemas.openxmlformats.org/presentationml/2006/main">
   <p:cSld>
     <p:spTree>
@@ -15166,7 +14351,7 @@
               </a14:hiddenLine>
             </a:ext>
             <a:ext uri="{FAA26D3D-D897-4be2-8F04-BA451C77F1D7}">
-              <ma14:placeholderFlag xmlns="" xmlns:ma14="http://schemas.microsoft.com/office/mac/drawingml/2011/main" val="1"/>
+              <ma14:placeholderFlag xmlns:ma14="http://schemas.microsoft.com/office/mac/drawingml/2011/main" xmlns="" val="1"/>
             </a:ext>
           </a:extLst>
         </p:spPr>
@@ -15449,15 +14634,7 @@
                   <a:srgbClr val="FF0000"/>
                 </a:solidFill>
               </a:rPr>
-              <a:t>&lt; </a:t>
-            </a:r>
-            <a:r>
-              <a:rPr lang="pt-BR" dirty="0" smtClean="0">
-                <a:solidFill>
-                  <a:srgbClr val="FF0000"/>
-                </a:solidFill>
-              </a:rPr>
-              <a:t>27,19mm</a:t>
+              <a:t>&lt; 27,19mm</a:t>
             </a:r>
           </a:p>
           <a:p>
@@ -15576,7 +14753,7 @@
 </p:sld>
 </file>
 
-<file path=ppt/slides/slide42.xml><?xml version="1.0" encoding="utf-8"?>
+<file path=ppt/slides/slide41.xml><?xml version="1.0" encoding="utf-8"?>
 <p:sld xmlns:a="http://schemas.openxmlformats.org/drawingml/2006/main" xmlns:r="http://schemas.openxmlformats.org/officeDocument/2006/relationships" xmlns:p="http://schemas.openxmlformats.org/presentationml/2006/main">
   <p:cSld>
     <p:spTree>
@@ -15909,7 +15086,7 @@
 </p:sld>
 </file>
 
-<file path=ppt/slides/slide43.xml><?xml version="1.0" encoding="utf-8"?>
+<file path=ppt/slides/slide42.xml><?xml version="1.0" encoding="utf-8"?>
 <p:sld xmlns:a="http://schemas.openxmlformats.org/drawingml/2006/main" xmlns:r="http://schemas.openxmlformats.org/officeDocument/2006/relationships" xmlns:p="http://schemas.openxmlformats.org/presentationml/2006/main">
   <p:cSld>
     <p:spTree>
@@ -16508,7 +15685,7 @@
 </p:sld>
 </file>
 
-<file path=ppt/slides/slide44.xml><?xml version="1.0" encoding="utf-8"?>
+<file path=ppt/slides/slide43.xml><?xml version="1.0" encoding="utf-8"?>
 <p:sld xmlns:a="http://schemas.openxmlformats.org/drawingml/2006/main" xmlns:r="http://schemas.openxmlformats.org/officeDocument/2006/relationships" xmlns:p="http://schemas.openxmlformats.org/presentationml/2006/main">
   <p:cSld>
     <p:spTree>
@@ -16963,7 +16140,7 @@
 </p:sld>
 </file>
 
-<file path=ppt/slides/slide45.xml><?xml version="1.0" encoding="utf-8"?>
+<file path=ppt/slides/slide44.xml><?xml version="1.0" encoding="utf-8"?>
 <p:sld xmlns:a="http://schemas.openxmlformats.org/drawingml/2006/main" xmlns:r="http://schemas.openxmlformats.org/officeDocument/2006/relationships" xmlns:p="http://schemas.openxmlformats.org/presentationml/2006/main">
   <p:cSld>
     <p:spTree>
@@ -17062,7 +16239,7 @@
 </p:sld>
 </file>
 
-<file path=ppt/slides/slide46.xml><?xml version="1.0" encoding="utf-8"?>
+<file path=ppt/slides/slide45.xml><?xml version="1.0" encoding="utf-8"?>
 <p:sld xmlns:a="http://schemas.openxmlformats.org/drawingml/2006/main" xmlns:r="http://schemas.openxmlformats.org/officeDocument/2006/relationships" xmlns:p="http://schemas.openxmlformats.org/presentationml/2006/main">
   <p:cSld>
     <p:spTree>
@@ -17207,7 +16384,7 @@
 </p:sld>
 </file>
 
-<file path=ppt/slides/slide47.xml><?xml version="1.0" encoding="utf-8"?>
+<file path=ppt/slides/slide46.xml><?xml version="1.0" encoding="utf-8"?>
 <p:sld xmlns:a="http://schemas.openxmlformats.org/drawingml/2006/main" xmlns:r="http://schemas.openxmlformats.org/officeDocument/2006/relationships" xmlns:p="http://schemas.openxmlformats.org/presentationml/2006/main">
   <p:cSld>
     <p:spTree>
@@ -17600,7 +16777,7 @@
 </p:sld>
 </file>
 
-<file path=ppt/slides/slide48.xml><?xml version="1.0" encoding="utf-8"?>
+<file path=ppt/slides/slide47.xml><?xml version="1.0" encoding="utf-8"?>
 <p:sld xmlns:a="http://schemas.openxmlformats.org/drawingml/2006/main" xmlns:r="http://schemas.openxmlformats.org/officeDocument/2006/relationships" xmlns:p="http://schemas.openxmlformats.org/presentationml/2006/main">
   <p:cSld>
     <p:spTree>
@@ -17714,7 +16891,7 @@
 </p:sld>
 </file>
 
-<file path=ppt/slides/slide49.xml><?xml version="1.0" encoding="utf-8"?>
+<file path=ppt/slides/slide48.xml><?xml version="1.0" encoding="utf-8"?>
 <p:sld xmlns:a="http://schemas.openxmlformats.org/drawingml/2006/main" xmlns:r="http://schemas.openxmlformats.org/officeDocument/2006/relationships" xmlns:p="http://schemas.openxmlformats.org/presentationml/2006/main">
   <p:cSld>
     <p:spTree>
@@ -17817,6 +16994,43 @@
     <p:extLst>
       <p:ext uri="{BB962C8B-B14F-4D97-AF65-F5344CB8AC3E}">
         <p14:creationId xmlns:p14="http://schemas.microsoft.com/office/powerpoint/2010/main" val="3363907484"/>
+      </p:ext>
+    </p:extLst>
+  </p:cSld>
+  <p:clrMapOvr>
+    <a:masterClrMapping/>
+  </p:clrMapOvr>
+  <p:timing>
+    <p:tnLst>
+      <p:par>
+        <p:cTn id="1" dur="indefinite" restart="never" nodeType="tmRoot"/>
+      </p:par>
+    </p:tnLst>
+  </p:timing>
+</p:sld>
+</file>
+
+<file path=ppt/slides/slide49.xml><?xml version="1.0" encoding="utf-8"?>
+<p:sld xmlns:a="http://schemas.openxmlformats.org/drawingml/2006/main" xmlns:r="http://schemas.openxmlformats.org/officeDocument/2006/relationships" xmlns:p="http://schemas.openxmlformats.org/presentationml/2006/main">
+  <p:cSld>
+    <p:spTree>
+      <p:nvGrpSpPr>
+        <p:cNvPr id="1" name=""/>
+        <p:cNvGrpSpPr/>
+        <p:nvPr/>
+      </p:nvGrpSpPr>
+      <p:grpSpPr>
+        <a:xfrm>
+          <a:off x="0" y="0"/>
+          <a:ext cx="0" cy="0"/>
+          <a:chOff x="0" y="0"/>
+          <a:chExt cx="0" cy="0"/>
+        </a:xfrm>
+      </p:grpSpPr>
+    </p:spTree>
+    <p:extLst>
+      <p:ext uri="{BB962C8B-B14F-4D97-AF65-F5344CB8AC3E}">
+        <p14:creationId xmlns:p14="http://schemas.microsoft.com/office/powerpoint/2010/main" val="2832693405"/>
       </p:ext>
     </p:extLst>
   </p:cSld>
@@ -18462,10 +17676,80 @@
           <a:chExt cx="0" cy="0"/>
         </a:xfrm>
       </p:grpSpPr>
+      <p:sp>
+        <p:nvSpPr>
+          <p:cNvPr id="2" name="Title 1"/>
+          <p:cNvSpPr>
+            <a:spLocks noGrp="1"/>
+          </p:cNvSpPr>
+          <p:nvPr>
+            <p:ph type="title"/>
+          </p:nvPr>
+        </p:nvSpPr>
+        <p:spPr>
+          <a:xfrm>
+            <a:off x="457200" y="679465"/>
+            <a:ext cx="8229600" cy="1066800"/>
+          </a:xfrm>
+        </p:spPr>
+        <p:txBody>
+          <a:bodyPr/>
+          <a:lstStyle/>
+          <a:p>
+            <a:r>
+              <a:rPr lang="en-US" dirty="0" err="1"/>
+              <a:t>Rastreamento</a:t>
+            </a:r>
+            <a:r>
+              <a:rPr lang="en-US" dirty="0"/>
+              <a:t> - </a:t>
+            </a:r>
+            <a:r>
+              <a:rPr lang="en-US" dirty="0" err="1"/>
+              <a:t>R</a:t>
+            </a:r>
+            <a:r>
+              <a:rPr lang="en-US" dirty="0" err="1" smtClean="0"/>
+              <a:t>epresentação</a:t>
+            </a:r>
+            <a:endParaRPr lang="en-US" dirty="0"/>
+          </a:p>
+        </p:txBody>
+      </p:sp>
+      <p:pic>
+        <p:nvPicPr>
+          <p:cNvPr id="12" name="Picture 11" descr="representacao.png"/>
+          <p:cNvPicPr>
+            <a:picLocks noChangeAspect="1"/>
+          </p:cNvPicPr>
+          <p:nvPr/>
+        </p:nvPicPr>
+        <p:blipFill>
+          <a:blip r:embed="rId2" cstate="email">
+            <a:extLst>
+              <a:ext uri="{28A0092B-C50C-407E-A947-70E740481C1C}">
+                <a14:useLocalDpi xmlns:a14="http://schemas.microsoft.com/office/drawing/2010/main" val="0"/>
+              </a:ext>
+            </a:extLst>
+          </a:blip>
+          <a:stretch>
+            <a:fillRect/>
+          </a:stretch>
+        </p:blipFill>
+        <p:spPr>
+          <a:xfrm>
+            <a:off x="787975" y="1856621"/>
+            <a:ext cx="7475345" cy="3955963"/>
+          </a:xfrm>
+          <a:prstGeom prst="rect">
+            <a:avLst/>
+          </a:prstGeom>
+        </p:spPr>
+      </p:pic>
     </p:spTree>
     <p:extLst>
       <p:ext uri="{BB962C8B-B14F-4D97-AF65-F5344CB8AC3E}">
-        <p14:creationId xmlns:p14="http://schemas.microsoft.com/office/powerpoint/2010/main" val="2832693405"/>
+        <p14:creationId xmlns:p14="http://schemas.microsoft.com/office/powerpoint/2010/main" val="530005072"/>
       </p:ext>
     </p:extLst>
   </p:cSld>
@@ -18511,113 +17795,6 @@
         </p:nvSpPr>
         <p:spPr>
           <a:xfrm>
-            <a:off x="457200" y="679465"/>
-            <a:ext cx="8229600" cy="1066800"/>
-          </a:xfrm>
-        </p:spPr>
-        <p:txBody>
-          <a:bodyPr/>
-          <a:lstStyle/>
-          <a:p>
-            <a:r>
-              <a:rPr lang="en-US" dirty="0" err="1"/>
-              <a:t>Rastreamento</a:t>
-            </a:r>
-            <a:r>
-              <a:rPr lang="en-US" dirty="0"/>
-              <a:t> - </a:t>
-            </a:r>
-            <a:r>
-              <a:rPr lang="en-US" dirty="0" err="1"/>
-              <a:t>R</a:t>
-            </a:r>
-            <a:r>
-              <a:rPr lang="en-US" dirty="0" err="1" smtClean="0"/>
-              <a:t>epresentação</a:t>
-            </a:r>
-            <a:endParaRPr lang="en-US" dirty="0"/>
-          </a:p>
-        </p:txBody>
-      </p:sp>
-      <p:pic>
-        <p:nvPicPr>
-          <p:cNvPr id="12" name="Picture 11" descr="representacao.png"/>
-          <p:cNvPicPr>
-            <a:picLocks noChangeAspect="1"/>
-          </p:cNvPicPr>
-          <p:nvPr/>
-        </p:nvPicPr>
-        <p:blipFill>
-          <a:blip r:embed="rId2" cstate="email">
-            <a:extLst>
-              <a:ext uri="{28A0092B-C50C-407E-A947-70E740481C1C}">
-                <a14:useLocalDpi xmlns:a14="http://schemas.microsoft.com/office/drawing/2010/main" val="0"/>
-              </a:ext>
-            </a:extLst>
-          </a:blip>
-          <a:stretch>
-            <a:fillRect/>
-          </a:stretch>
-        </p:blipFill>
-        <p:spPr>
-          <a:xfrm>
-            <a:off x="787975" y="1856621"/>
-            <a:ext cx="7475345" cy="3955963"/>
-          </a:xfrm>
-          <a:prstGeom prst="rect">
-            <a:avLst/>
-          </a:prstGeom>
-        </p:spPr>
-      </p:pic>
-    </p:spTree>
-    <p:extLst>
-      <p:ext uri="{BB962C8B-B14F-4D97-AF65-F5344CB8AC3E}">
-        <p14:creationId xmlns:p14="http://schemas.microsoft.com/office/powerpoint/2010/main" val="530005072"/>
-      </p:ext>
-    </p:extLst>
-  </p:cSld>
-  <p:clrMapOvr>
-    <a:masterClrMapping/>
-  </p:clrMapOvr>
-  <p:timing>
-    <p:tnLst>
-      <p:par>
-        <p:cTn id="1" dur="indefinite" restart="never" nodeType="tmRoot"/>
-      </p:par>
-    </p:tnLst>
-  </p:timing>
-</p:sld>
-</file>
-
-<file path=ppt/slides/slide52.xml><?xml version="1.0" encoding="utf-8"?>
-<p:sld xmlns:a="http://schemas.openxmlformats.org/drawingml/2006/main" xmlns:r="http://schemas.openxmlformats.org/officeDocument/2006/relationships" xmlns:p="http://schemas.openxmlformats.org/presentationml/2006/main">
-  <p:cSld>
-    <p:spTree>
-      <p:nvGrpSpPr>
-        <p:cNvPr id="1" name=""/>
-        <p:cNvGrpSpPr/>
-        <p:nvPr/>
-      </p:nvGrpSpPr>
-      <p:grpSpPr>
-        <a:xfrm>
-          <a:off x="0" y="0"/>
-          <a:ext cx="0" cy="0"/>
-          <a:chOff x="0" y="0"/>
-          <a:chExt cx="0" cy="0"/>
-        </a:xfrm>
-      </p:grpSpPr>
-      <p:sp>
-        <p:nvSpPr>
-          <p:cNvPr id="2" name="Title 1"/>
-          <p:cNvSpPr>
-            <a:spLocks noGrp="1"/>
-          </p:cNvSpPr>
-          <p:nvPr>
-            <p:ph type="title"/>
-          </p:nvPr>
-        </p:nvSpPr>
-        <p:spPr>
-          <a:xfrm>
             <a:off x="365674" y="719649"/>
             <a:ext cx="8229600" cy="1066800"/>
           </a:xfrm>
@@ -18773,7 +17950,7 @@
 </p:sld>
 </file>
 
-<file path=ppt/slides/slide53.xml><?xml version="1.0" encoding="utf-8"?>
+<file path=ppt/slides/slide52.xml><?xml version="1.0" encoding="utf-8"?>
 <p:sld xmlns:a="http://schemas.openxmlformats.org/drawingml/2006/main" xmlns:r="http://schemas.openxmlformats.org/officeDocument/2006/relationships" xmlns:p="http://schemas.openxmlformats.org/presentationml/2006/main">
   <p:cSld>
     <p:spTree>
@@ -18868,7 +18045,7 @@
 </p:sld>
 </file>
 
-<file path=ppt/slides/slide54.xml><?xml version="1.0" encoding="utf-8"?>
+<file path=ppt/slides/slide53.xml><?xml version="1.0" encoding="utf-8"?>
 <p:sld xmlns:a="http://schemas.openxmlformats.org/drawingml/2006/main" xmlns:r="http://schemas.openxmlformats.org/officeDocument/2006/relationships" xmlns:p="http://schemas.openxmlformats.org/presentationml/2006/main">
   <p:cSld>
     <p:spTree>
@@ -19134,7 +18311,7 @@
               </a14:hiddenLine>
             </a:ext>
             <a:ext uri="{FAA26D3D-D897-4be2-8F04-BA451C77F1D7}">
-              <ma14:placeholderFlag xmlns="" xmlns:ma14="http://schemas.microsoft.com/office/mac/drawingml/2011/main" val="1"/>
+              <ma14:placeholderFlag xmlns:ma14="http://schemas.microsoft.com/office/mac/drawingml/2011/main" xmlns="" val="1"/>
             </a:ext>
           </a:extLst>
         </p:spPr>
@@ -19369,7 +18546,7 @@
 </p:sld>
 </file>
 
-<file path=ppt/slides/slide55.xml><?xml version="1.0" encoding="utf-8"?>
+<file path=ppt/slides/slide54.xml><?xml version="1.0" encoding="utf-8"?>
 <p:sld xmlns:a="http://schemas.openxmlformats.org/drawingml/2006/main" xmlns:r="http://schemas.openxmlformats.org/officeDocument/2006/relationships" xmlns:p="http://schemas.openxmlformats.org/presentationml/2006/main">
   <p:cSld>
     <p:spTree>
@@ -19425,7 +18602,7 @@
               </a14:hiddenLine>
             </a:ext>
             <a:ext uri="{FAA26D3D-D897-4be2-8F04-BA451C77F1D7}">
-              <ma14:placeholderFlag xmlns="" xmlns:ma14="http://schemas.microsoft.com/office/mac/drawingml/2011/main" val="1"/>
+              <ma14:placeholderFlag xmlns:ma14="http://schemas.microsoft.com/office/mac/drawingml/2011/main" xmlns="" val="1"/>
             </a:ext>
           </a:extLst>
         </p:spPr>
@@ -20543,6 +19720,9 @@
                     <p:cTn id="3" fill="hold">
                       <p:stCondLst>
                         <p:cond delay="indefinite"/>
+                        <p:cond evt="onBegin" delay="0">
+                          <p:tn val="2"/>
+                        </p:cond>
                       </p:stCondLst>
                       <p:childTnLst>
                         <p:par>
@@ -20552,9 +19732,9 @@
                             </p:stCondLst>
                             <p:childTnLst>
                               <p:par>
-                                <p:cTn id="5" presetID="10" presetClass="entr" presetSubtype="0" fill="hold" grpId="0" nodeType="clickEffect">
+                                <p:cTn id="5" presetID="10" presetClass="entr" presetSubtype="0" fill="hold" grpId="0" nodeType="withEffect">
                                   <p:stCondLst>
-                                    <p:cond delay="0"/>
+                                    <p:cond delay="250"/>
                                   </p:stCondLst>
                                   <p:childTnLst>
                                     <p:set>
@@ -20577,7 +19757,7 @@
                                     </p:set>
                                     <p:animEffect transition="in" filter="fade">
                                       <p:cBhvr>
-                                        <p:cTn id="7" dur="500"/>
+                                        <p:cTn id="7" dur="1000"/>
                                         <p:tgtEl>
                                           <p:spTgt spid="7"/>
                                         </p:tgtEl>
@@ -20586,33 +19766,15 @@
                                   </p:childTnLst>
                                 </p:cTn>
                               </p:par>
-                            </p:childTnLst>
-                          </p:cTn>
-                        </p:par>
-                      </p:childTnLst>
-                    </p:cTn>
-                  </p:par>
-                  <p:par>
-                    <p:cTn id="8" fill="hold">
-                      <p:stCondLst>
-                        <p:cond delay="indefinite"/>
-                      </p:stCondLst>
-                      <p:childTnLst>
-                        <p:par>
-                          <p:cTn id="9" fill="hold">
-                            <p:stCondLst>
-                              <p:cond delay="0"/>
-                            </p:stCondLst>
-                            <p:childTnLst>
                               <p:par>
-                                <p:cTn id="10" presetID="10" presetClass="entr" presetSubtype="0" fill="hold" grpId="0" nodeType="clickEffect">
+                                <p:cTn id="8" presetID="10" presetClass="entr" presetSubtype="0" fill="hold" grpId="0" nodeType="withEffect">
                                   <p:stCondLst>
-                                    <p:cond delay="0"/>
+                                    <p:cond delay="500"/>
                                   </p:stCondLst>
                                   <p:childTnLst>
                                     <p:set>
                                       <p:cBhvr>
-                                        <p:cTn id="11" dur="1" fill="hold">
+                                        <p:cTn id="9" dur="1" fill="hold">
                                           <p:stCondLst>
                                             <p:cond delay="0"/>
                                           </p:stCondLst>
@@ -20630,7 +19792,7 @@
                                     </p:set>
                                     <p:animEffect transition="in" filter="fade">
                                       <p:cBhvr>
-                                        <p:cTn id="12" dur="500"/>
+                                        <p:cTn id="10" dur="1000"/>
                                         <p:tgtEl>
                                           <p:spTgt spid="8"/>
                                         </p:tgtEl>
@@ -20639,33 +19801,15 @@
                                   </p:childTnLst>
                                 </p:cTn>
                               </p:par>
-                            </p:childTnLst>
-                          </p:cTn>
-                        </p:par>
-                      </p:childTnLst>
-                    </p:cTn>
-                  </p:par>
-                  <p:par>
-                    <p:cTn id="13" fill="hold">
-                      <p:stCondLst>
-                        <p:cond delay="indefinite"/>
-                      </p:stCondLst>
-                      <p:childTnLst>
-                        <p:par>
-                          <p:cTn id="14" fill="hold">
-                            <p:stCondLst>
-                              <p:cond delay="0"/>
-                            </p:stCondLst>
-                            <p:childTnLst>
                               <p:par>
-                                <p:cTn id="15" presetID="10" presetClass="entr" presetSubtype="0" fill="hold" grpId="0" nodeType="clickEffect">
+                                <p:cTn id="11" presetID="10" presetClass="entr" presetSubtype="0" fill="hold" grpId="0" nodeType="withEffect">
                                   <p:stCondLst>
-                                    <p:cond delay="0"/>
+                                    <p:cond delay="750"/>
                                   </p:stCondLst>
                                   <p:childTnLst>
                                     <p:set>
                                       <p:cBhvr>
-                                        <p:cTn id="16" dur="1" fill="hold">
+                                        <p:cTn id="12" dur="1" fill="hold">
                                           <p:stCondLst>
                                             <p:cond delay="0"/>
                                           </p:stCondLst>
@@ -20683,7 +19827,7 @@
                                     </p:set>
                                     <p:animEffect transition="in" filter="fade">
                                       <p:cBhvr>
-                                        <p:cTn id="17" dur="500"/>
+                                        <p:cTn id="13" dur="1000"/>
                                         <p:tgtEl>
                                           <p:spTgt spid="14"/>
                                         </p:tgtEl>
@@ -20692,33 +19836,15 @@
                                   </p:childTnLst>
                                 </p:cTn>
                               </p:par>
-                            </p:childTnLst>
-                          </p:cTn>
-                        </p:par>
-                      </p:childTnLst>
-                    </p:cTn>
-                  </p:par>
-                  <p:par>
-                    <p:cTn id="18" fill="hold">
-                      <p:stCondLst>
-                        <p:cond delay="indefinite"/>
-                      </p:stCondLst>
-                      <p:childTnLst>
-                        <p:par>
-                          <p:cTn id="19" fill="hold">
-                            <p:stCondLst>
-                              <p:cond delay="0"/>
-                            </p:stCondLst>
-                            <p:childTnLst>
                               <p:par>
-                                <p:cTn id="20" presetID="10" presetClass="entr" presetSubtype="0" fill="hold" grpId="0" nodeType="clickEffect">
+                                <p:cTn id="14" presetID="10" presetClass="entr" presetSubtype="0" fill="hold" grpId="0" nodeType="withEffect">
                                   <p:stCondLst>
-                                    <p:cond delay="0"/>
+                                    <p:cond delay="1000"/>
                                   </p:stCondLst>
                                   <p:childTnLst>
                                     <p:set>
                                       <p:cBhvr>
-                                        <p:cTn id="21" dur="1" fill="hold">
+                                        <p:cTn id="15" dur="1" fill="hold">
                                           <p:stCondLst>
                                             <p:cond delay="0"/>
                                           </p:stCondLst>
@@ -20736,7 +19862,7 @@
                                     </p:set>
                                     <p:animEffect transition="in" filter="fade">
                                       <p:cBhvr>
-                                        <p:cTn id="22" dur="500"/>
+                                        <p:cTn id="16" dur="1000"/>
                                         <p:tgtEl>
                                           <p:spTgt spid="16"/>
                                         </p:tgtEl>
@@ -20745,33 +19871,50 @@
                                   </p:childTnLst>
                                 </p:cTn>
                               </p:par>
-                            </p:childTnLst>
-                          </p:cTn>
-                        </p:par>
-                      </p:childTnLst>
-                    </p:cTn>
-                  </p:par>
-                  <p:par>
-                    <p:cTn id="23" fill="hold">
-                      <p:stCondLst>
-                        <p:cond delay="indefinite"/>
-                      </p:stCondLst>
-                      <p:childTnLst>
-                        <p:par>
-                          <p:cTn id="24" fill="hold">
-                            <p:stCondLst>
-                              <p:cond delay="0"/>
-                            </p:stCondLst>
-                            <p:childTnLst>
                               <p:par>
-                                <p:cTn id="25" presetID="10" presetClass="entr" presetSubtype="0" fill="hold" grpId="0" nodeType="clickEffect">
+                                <p:cTn id="17" presetID="10" presetClass="entr" presetSubtype="0" fill="hold" grpId="0" nodeType="withEffect">
                                   <p:stCondLst>
-                                    <p:cond delay="0"/>
+                                    <p:cond delay="1250"/>
                                   </p:stCondLst>
                                   <p:childTnLst>
                                     <p:set>
                                       <p:cBhvr>
-                                        <p:cTn id="26" dur="1" fill="hold">
+                                        <p:cTn id="18" dur="1" fill="hold">
+                                          <p:stCondLst>
+                                            <p:cond delay="0"/>
+                                          </p:stCondLst>
+                                        </p:cTn>
+                                        <p:tgtEl>
+                                          <p:spTgt spid="18"/>
+                                        </p:tgtEl>
+                                        <p:attrNameLst>
+                                          <p:attrName>style.visibility</p:attrName>
+                                        </p:attrNameLst>
+                                      </p:cBhvr>
+                                      <p:to>
+                                        <p:strVal val="visible"/>
+                                      </p:to>
+                                    </p:set>
+                                    <p:animEffect transition="in" filter="fade">
+                                      <p:cBhvr>
+                                        <p:cTn id="19" dur="1000"/>
+                                        <p:tgtEl>
+                                          <p:spTgt spid="18"/>
+                                        </p:tgtEl>
+                                      </p:cBhvr>
+                                    </p:animEffect>
+                                  </p:childTnLst>
+                                </p:cTn>
+                              </p:par>
+                              <p:par>
+                                <p:cTn id="20" presetID="10" presetClass="entr" presetSubtype="0" fill="hold" grpId="0" nodeType="withEffect">
+                                  <p:stCondLst>
+                                    <p:cond delay="1250"/>
+                                  </p:stCondLst>
+                                  <p:childTnLst>
+                                    <p:set>
+                                      <p:cBhvr>
+                                        <p:cTn id="21" dur="1" fill="hold">
                                           <p:stCondLst>
                                             <p:cond delay="0"/>
                                           </p:stCondLst>
@@ -20789,7 +19932,7 @@
                                     </p:set>
                                     <p:animEffect transition="in" filter="fade">
                                       <p:cBhvr>
-                                        <p:cTn id="27" dur="500"/>
+                                        <p:cTn id="22" dur="1000"/>
                                         <p:tgtEl>
                                           <p:spTgt spid="9"/>
                                         </p:tgtEl>
@@ -20799,20 +19942,20 @@
                                 </p:cTn>
                               </p:par>
                               <p:par>
-                                <p:cTn id="28" presetID="10" presetClass="entr" presetSubtype="0" fill="hold" grpId="0" nodeType="withEffect">
+                                <p:cTn id="23" presetID="10" presetClass="entr" presetSubtype="0" fill="hold" grpId="0" nodeType="withEffect">
                                   <p:stCondLst>
-                                    <p:cond delay="0"/>
+                                    <p:cond delay="1500"/>
                                   </p:stCondLst>
                                   <p:childTnLst>
                                     <p:set>
                                       <p:cBhvr>
-                                        <p:cTn id="29" dur="1" fill="hold">
+                                        <p:cTn id="24" dur="1" fill="hold">
                                           <p:stCondLst>
                                             <p:cond delay="0"/>
                                           </p:stCondLst>
                                         </p:cTn>
                                         <p:tgtEl>
-                                          <p:spTgt spid="18"/>
+                                          <p:spTgt spid="19"/>
                                         </p:tgtEl>
                                         <p:attrNameLst>
                                           <p:attrName>style.visibility</p:attrName>
@@ -20824,42 +19967,24 @@
                                     </p:set>
                                     <p:animEffect transition="in" filter="fade">
                                       <p:cBhvr>
-                                        <p:cTn id="30" dur="500"/>
+                                        <p:cTn id="25" dur="1000"/>
                                         <p:tgtEl>
-                                          <p:spTgt spid="18"/>
+                                          <p:spTgt spid="19"/>
                                         </p:tgtEl>
                                       </p:cBhvr>
                                     </p:animEffect>
                                   </p:childTnLst>
                                 </p:cTn>
                               </p:par>
-                            </p:childTnLst>
-                          </p:cTn>
-                        </p:par>
-                      </p:childTnLst>
-                    </p:cTn>
-                  </p:par>
-                  <p:par>
-                    <p:cTn id="31" fill="hold">
-                      <p:stCondLst>
-                        <p:cond delay="indefinite"/>
-                      </p:stCondLst>
-                      <p:childTnLst>
-                        <p:par>
-                          <p:cTn id="32" fill="hold">
-                            <p:stCondLst>
-                              <p:cond delay="0"/>
-                            </p:stCondLst>
-                            <p:childTnLst>
                               <p:par>
-                                <p:cTn id="33" presetID="10" presetClass="entr" presetSubtype="0" fill="hold" grpId="0" nodeType="clickEffect">
+                                <p:cTn id="26" presetID="10" presetClass="entr" presetSubtype="0" fill="hold" grpId="0" nodeType="withEffect">
                                   <p:stCondLst>
-                                    <p:cond delay="0"/>
+                                    <p:cond delay="1500"/>
                                   </p:stCondLst>
                                   <p:childTnLst>
                                     <p:set>
                                       <p:cBhvr>
-                                        <p:cTn id="34" dur="1" fill="hold">
+                                        <p:cTn id="27" dur="1" fill="hold">
                                           <p:stCondLst>
                                             <p:cond delay="0"/>
                                           </p:stCondLst>
@@ -20877,7 +20002,7 @@
                                     </p:set>
                                     <p:animEffect transition="in" filter="fade">
                                       <p:cBhvr>
-                                        <p:cTn id="35" dur="500"/>
+                                        <p:cTn id="28" dur="1000"/>
                                         <p:tgtEl>
                                           <p:spTgt spid="10"/>
                                         </p:tgtEl>
@@ -20887,20 +20012,20 @@
                                 </p:cTn>
                               </p:par>
                               <p:par>
-                                <p:cTn id="36" presetID="10" presetClass="entr" presetSubtype="0" fill="hold" grpId="0" nodeType="withEffect">
+                                <p:cTn id="29" presetID="10" presetClass="entr" presetSubtype="0" fill="hold" grpId="0" nodeType="withEffect">
                                   <p:stCondLst>
-                                    <p:cond delay="0"/>
+                                    <p:cond delay="1750"/>
                                   </p:stCondLst>
                                   <p:childTnLst>
                                     <p:set>
                                       <p:cBhvr>
-                                        <p:cTn id="37" dur="1" fill="hold">
+                                        <p:cTn id="30" dur="1" fill="hold">
                                           <p:stCondLst>
                                             <p:cond delay="0"/>
                                           </p:stCondLst>
                                         </p:cTn>
                                         <p:tgtEl>
-                                          <p:spTgt spid="19"/>
+                                          <p:spTgt spid="20"/>
                                         </p:tgtEl>
                                         <p:attrNameLst>
                                           <p:attrName>style.visibility</p:attrName>
@@ -20912,42 +20037,24 @@
                                     </p:set>
                                     <p:animEffect transition="in" filter="fade">
                                       <p:cBhvr>
-                                        <p:cTn id="38" dur="500"/>
+                                        <p:cTn id="31" dur="1000"/>
                                         <p:tgtEl>
-                                          <p:spTgt spid="19"/>
+                                          <p:spTgt spid="20"/>
                                         </p:tgtEl>
                                       </p:cBhvr>
                                     </p:animEffect>
                                   </p:childTnLst>
                                 </p:cTn>
                               </p:par>
-                            </p:childTnLst>
-                          </p:cTn>
-                        </p:par>
-                      </p:childTnLst>
-                    </p:cTn>
-                  </p:par>
-                  <p:par>
-                    <p:cTn id="39" fill="hold">
-                      <p:stCondLst>
-                        <p:cond delay="indefinite"/>
-                      </p:stCondLst>
-                      <p:childTnLst>
-                        <p:par>
-                          <p:cTn id="40" fill="hold">
-                            <p:stCondLst>
-                              <p:cond delay="0"/>
-                            </p:stCondLst>
-                            <p:childTnLst>
                               <p:par>
-                                <p:cTn id="41" presetID="10" presetClass="entr" presetSubtype="0" fill="hold" grpId="0" nodeType="clickEffect">
+                                <p:cTn id="32" presetID="10" presetClass="entr" presetSubtype="0" fill="hold" grpId="0" nodeType="withEffect">
                                   <p:stCondLst>
-                                    <p:cond delay="0"/>
+                                    <p:cond delay="1750"/>
                                   </p:stCondLst>
                                   <p:childTnLst>
                                     <p:set>
                                       <p:cBhvr>
-                                        <p:cTn id="42" dur="1" fill="hold">
+                                        <p:cTn id="33" dur="1" fill="hold">
                                           <p:stCondLst>
                                             <p:cond delay="0"/>
                                           </p:stCondLst>
@@ -20965,7 +20072,7 @@
                                     </p:set>
                                     <p:animEffect transition="in" filter="fade">
                                       <p:cBhvr>
-                                        <p:cTn id="43" dur="500"/>
+                                        <p:cTn id="34" dur="1000"/>
                                         <p:tgtEl>
                                           <p:spTgt spid="12"/>
                                         </p:tgtEl>
@@ -20975,20 +20082,20 @@
                                 </p:cTn>
                               </p:par>
                               <p:par>
-                                <p:cTn id="44" presetID="10" presetClass="entr" presetSubtype="0" fill="hold" grpId="0" nodeType="withEffect">
+                                <p:cTn id="35" presetID="10" presetClass="entr" presetSubtype="0" fill="hold" grpId="0" nodeType="withEffect">
                                   <p:stCondLst>
-                                    <p:cond delay="0"/>
+                                    <p:cond delay="2000"/>
                                   </p:stCondLst>
                                   <p:childTnLst>
                                     <p:set>
                                       <p:cBhvr>
-                                        <p:cTn id="45" dur="1" fill="hold">
+                                        <p:cTn id="36" dur="1" fill="hold">
                                           <p:stCondLst>
                                             <p:cond delay="0"/>
                                           </p:stCondLst>
                                         </p:cTn>
                                         <p:tgtEl>
-                                          <p:spTgt spid="20"/>
+                                          <p:spTgt spid="21"/>
                                         </p:tgtEl>
                                         <p:attrNameLst>
                                           <p:attrName>style.visibility</p:attrName>
@@ -21000,9 +20107,114 @@
                                     </p:set>
                                     <p:animEffect transition="in" filter="fade">
                                       <p:cBhvr>
-                                        <p:cTn id="46" dur="500"/>
+                                        <p:cTn id="37" dur="1000"/>
                                         <p:tgtEl>
-                                          <p:spTgt spid="20"/>
+                                          <p:spTgt spid="21"/>
+                                        </p:tgtEl>
+                                      </p:cBhvr>
+                                    </p:animEffect>
+                                  </p:childTnLst>
+                                </p:cTn>
+                              </p:par>
+                              <p:par>
+                                <p:cTn id="38" presetID="10" presetClass="entr" presetSubtype="0" fill="hold" grpId="0" nodeType="withEffect">
+                                  <p:stCondLst>
+                                    <p:cond delay="2000"/>
+                                  </p:stCondLst>
+                                  <p:childTnLst>
+                                    <p:set>
+                                      <p:cBhvr>
+                                        <p:cTn id="39" dur="1" fill="hold">
+                                          <p:stCondLst>
+                                            <p:cond delay="0"/>
+                                          </p:stCondLst>
+                                        </p:cTn>
+                                        <p:tgtEl>
+                                          <p:spTgt spid="11"/>
+                                        </p:tgtEl>
+                                        <p:attrNameLst>
+                                          <p:attrName>style.visibility</p:attrName>
+                                        </p:attrNameLst>
+                                      </p:cBhvr>
+                                      <p:to>
+                                        <p:strVal val="visible"/>
+                                      </p:to>
+                                    </p:set>
+                                    <p:animEffect transition="in" filter="fade">
+                                      <p:cBhvr>
+                                        <p:cTn id="40" dur="1000"/>
+                                        <p:tgtEl>
+                                          <p:spTgt spid="11"/>
+                                        </p:tgtEl>
+                                      </p:cBhvr>
+                                    </p:animEffect>
+                                  </p:childTnLst>
+                                </p:cTn>
+                              </p:par>
+                              <p:par>
+                                <p:cTn id="41" presetID="10" presetClass="entr" presetSubtype="0" fill="hold" grpId="0" nodeType="withEffect">
+                                  <p:stCondLst>
+                                    <p:cond delay="2250"/>
+                                  </p:stCondLst>
+                                  <p:childTnLst>
+                                    <p:set>
+                                      <p:cBhvr>
+                                        <p:cTn id="42" dur="1" fill="hold">
+                                          <p:stCondLst>
+                                            <p:cond delay="0"/>
+                                          </p:stCondLst>
+                                        </p:cTn>
+                                        <p:tgtEl>
+                                          <p:spTgt spid="22"/>
+                                        </p:tgtEl>
+                                        <p:attrNameLst>
+                                          <p:attrName>style.visibility</p:attrName>
+                                        </p:attrNameLst>
+                                      </p:cBhvr>
+                                      <p:to>
+                                        <p:strVal val="visible"/>
+                                      </p:to>
+                                    </p:set>
+                                    <p:animEffect transition="in" filter="fade">
+                                      <p:cBhvr>
+                                        <p:cTn id="43" dur="1000"/>
+                                        <p:tgtEl>
+                                          <p:spTgt spid="22"/>
+                                        </p:tgtEl>
+                                      </p:cBhvr>
+                                    </p:animEffect>
+                                  </p:childTnLst>
+                                </p:cTn>
+                              </p:par>
+                              <p:par>
+                                <p:cTn id="44" presetID="10" presetClass="entr" presetSubtype="0" fill="hold" grpId="0" nodeType="withEffect">
+                                  <p:stCondLst>
+                                    <p:cond delay="2250"/>
+                                  </p:stCondLst>
+                                  <p:childTnLst>
+                                    <p:set>
+                                      <p:cBhvr>
+                                        <p:cTn id="45" dur="1" fill="hold">
+                                          <p:stCondLst>
+                                            <p:cond delay="0"/>
+                                          </p:stCondLst>
+                                        </p:cTn>
+                                        <p:tgtEl>
+                                          <p:spTgt spid="13"/>
+                                        </p:tgtEl>
+                                        <p:attrNameLst>
+                                          <p:attrName>style.visibility</p:attrName>
+                                        </p:attrNameLst>
+                                      </p:cBhvr>
+                                      <p:to>
+                                        <p:strVal val="visible"/>
+                                      </p:to>
+                                    </p:set>
+                                    <p:animEffect transition="in" filter="fade">
+                                      <p:cBhvr>
+                                        <p:cTn id="46" dur="1000"/>
+                                        <p:tgtEl>
+                                          <p:spTgt spid="13"/>
                                         </p:tgtEl>
                                       </p:cBhvr>
                                     </p:animEffect>
@@ -21028,190 +20240,14 @@
                             </p:stCondLst>
                             <p:childTnLst>
                               <p:par>
-                                <p:cTn id="49" presetID="10" presetClass="entr" presetSubtype="0" fill="hold" grpId="0" nodeType="clickEffect">
-                                  <p:stCondLst>
-                                    <p:cond delay="0"/>
-                                  </p:stCondLst>
-                                  <p:childTnLst>
-                                    <p:set>
-                                      <p:cBhvr>
-                                        <p:cTn id="50" dur="1" fill="hold">
-                                          <p:stCondLst>
-                                            <p:cond delay="0"/>
-                                          </p:stCondLst>
-                                        </p:cTn>
-                                        <p:tgtEl>
-                                          <p:spTgt spid="11"/>
-                                        </p:tgtEl>
-                                        <p:attrNameLst>
-                                          <p:attrName>style.visibility</p:attrName>
-                                        </p:attrNameLst>
-                                      </p:cBhvr>
-                                      <p:to>
-                                        <p:strVal val="visible"/>
-                                      </p:to>
-                                    </p:set>
-                                    <p:animEffect transition="in" filter="fade">
-                                      <p:cBhvr>
-                                        <p:cTn id="51" dur="500"/>
-                                        <p:tgtEl>
-                                          <p:spTgt spid="11"/>
-                                        </p:tgtEl>
-                                      </p:cBhvr>
-                                    </p:animEffect>
-                                  </p:childTnLst>
-                                </p:cTn>
-                              </p:par>
-                              <p:par>
-                                <p:cTn id="52" presetID="10" presetClass="entr" presetSubtype="0" fill="hold" grpId="0" nodeType="withEffect">
-                                  <p:stCondLst>
-                                    <p:cond delay="0"/>
-                                  </p:stCondLst>
-                                  <p:childTnLst>
-                                    <p:set>
-                                      <p:cBhvr>
-                                        <p:cTn id="53" dur="1" fill="hold">
-                                          <p:stCondLst>
-                                            <p:cond delay="0"/>
-                                          </p:stCondLst>
-                                        </p:cTn>
-                                        <p:tgtEl>
-                                          <p:spTgt spid="21"/>
-                                        </p:tgtEl>
-                                        <p:attrNameLst>
-                                          <p:attrName>style.visibility</p:attrName>
-                                        </p:attrNameLst>
-                                      </p:cBhvr>
-                                      <p:to>
-                                        <p:strVal val="visible"/>
-                                      </p:to>
-                                    </p:set>
-                                    <p:animEffect transition="in" filter="fade">
-                                      <p:cBhvr>
-                                        <p:cTn id="54" dur="500"/>
-                                        <p:tgtEl>
-                                          <p:spTgt spid="21"/>
-                                        </p:tgtEl>
-                                      </p:cBhvr>
-                                    </p:animEffect>
-                                  </p:childTnLst>
-                                </p:cTn>
-                              </p:par>
-                            </p:childTnLst>
-                          </p:cTn>
-                        </p:par>
-                      </p:childTnLst>
-                    </p:cTn>
-                  </p:par>
-                  <p:par>
-                    <p:cTn id="55" fill="hold">
-                      <p:stCondLst>
-                        <p:cond delay="indefinite"/>
-                      </p:stCondLst>
-                      <p:childTnLst>
-                        <p:par>
-                          <p:cTn id="56" fill="hold">
-                            <p:stCondLst>
-                              <p:cond delay="0"/>
-                            </p:stCondLst>
-                            <p:childTnLst>
-                              <p:par>
-                                <p:cTn id="57" presetID="10" presetClass="entr" presetSubtype="0" fill="hold" grpId="0" nodeType="clickEffect">
-                                  <p:stCondLst>
-                                    <p:cond delay="0"/>
-                                  </p:stCondLst>
-                                  <p:childTnLst>
-                                    <p:set>
-                                      <p:cBhvr>
-                                        <p:cTn id="58" dur="1" fill="hold">
-                                          <p:stCondLst>
-                                            <p:cond delay="0"/>
-                                          </p:stCondLst>
-                                        </p:cTn>
-                                        <p:tgtEl>
-                                          <p:spTgt spid="13"/>
-                                        </p:tgtEl>
-                                        <p:attrNameLst>
-                                          <p:attrName>style.visibility</p:attrName>
-                                        </p:attrNameLst>
-                                      </p:cBhvr>
-                                      <p:to>
-                                        <p:strVal val="visible"/>
-                                      </p:to>
-                                    </p:set>
-                                    <p:animEffect transition="in" filter="fade">
-                                      <p:cBhvr>
-                                        <p:cTn id="59" dur="500"/>
-                                        <p:tgtEl>
-                                          <p:spTgt spid="13"/>
-                                        </p:tgtEl>
-                                      </p:cBhvr>
-                                    </p:animEffect>
-                                  </p:childTnLst>
-                                </p:cTn>
-                              </p:par>
-                              <p:par>
-                                <p:cTn id="60" presetID="10" presetClass="entr" presetSubtype="0" fill="hold" grpId="0" nodeType="withEffect">
-                                  <p:stCondLst>
-                                    <p:cond delay="0"/>
-                                  </p:stCondLst>
-                                  <p:childTnLst>
-                                    <p:set>
-                                      <p:cBhvr>
-                                        <p:cTn id="61" dur="1" fill="hold">
-                                          <p:stCondLst>
-                                            <p:cond delay="0"/>
-                                          </p:stCondLst>
-                                        </p:cTn>
-                                        <p:tgtEl>
-                                          <p:spTgt spid="22"/>
-                                        </p:tgtEl>
-                                        <p:attrNameLst>
-                                          <p:attrName>style.visibility</p:attrName>
-                                        </p:attrNameLst>
-                                      </p:cBhvr>
-                                      <p:to>
-                                        <p:strVal val="visible"/>
-                                      </p:to>
-                                    </p:set>
-                                    <p:animEffect transition="in" filter="fade">
-                                      <p:cBhvr>
-                                        <p:cTn id="62" dur="500"/>
-                                        <p:tgtEl>
-                                          <p:spTgt spid="22"/>
-                                        </p:tgtEl>
-                                      </p:cBhvr>
-                                    </p:animEffect>
-                                  </p:childTnLst>
-                                </p:cTn>
-                              </p:par>
-                            </p:childTnLst>
-                          </p:cTn>
-                        </p:par>
-                      </p:childTnLst>
-                    </p:cTn>
-                  </p:par>
-                  <p:par>
-                    <p:cTn id="63" fill="hold">
-                      <p:stCondLst>
-                        <p:cond delay="indefinite"/>
-                      </p:stCondLst>
-                      <p:childTnLst>
-                        <p:par>
-                          <p:cTn id="64" fill="hold">
-                            <p:stCondLst>
-                              <p:cond delay="0"/>
-                            </p:stCondLst>
-                            <p:childTnLst>
-                              <p:par>
-                                <p:cTn id="65" presetID="1" presetClass="emph" presetSubtype="2" fill="hold" nodeType="clickEffect">
+                                <p:cTn id="49" presetID="1" presetClass="emph" presetSubtype="2" fill="hold" nodeType="clickEffect">
                                   <p:stCondLst>
                                     <p:cond delay="0"/>
                                   </p:stCondLst>
                                   <p:childTnLst>
                                     <p:animClr clrSpc="rgb" dir="cw">
                                       <p:cBhvr>
-                                        <p:cTn id="66" dur="2000" fill="hold"/>
+                                        <p:cTn id="50" dur="2000" fill="hold"/>
                                         <p:tgtEl>
                                           <p:spTgt spid="11"/>
                                         </p:tgtEl>
@@ -21225,7 +20261,7 @@
                                     </p:animClr>
                                     <p:set>
                                       <p:cBhvr>
-                                        <p:cTn id="67" dur="2000" fill="hold"/>
+                                        <p:cTn id="51" dur="2000" fill="hold"/>
                                         <p:tgtEl>
                                           <p:spTgt spid="11"/>
                                         </p:tgtEl>
@@ -21239,7 +20275,7 @@
                                     </p:set>
                                     <p:set>
                                       <p:cBhvr>
-                                        <p:cTn id="68" dur="2000" fill="hold"/>
+                                        <p:cTn id="52" dur="2000" fill="hold"/>
                                         <p:tgtEl>
                                           <p:spTgt spid="11"/>
                                         </p:tgtEl>
@@ -21255,14 +20291,14 @@
                                 </p:cTn>
                               </p:par>
                               <p:par>
-                                <p:cTn id="69" presetID="1" presetClass="emph" presetSubtype="2" fill="hold" nodeType="withEffect">
+                                <p:cTn id="53" presetID="1" presetClass="emph" presetSubtype="2" fill="hold" nodeType="withEffect">
                                   <p:stCondLst>
                                     <p:cond delay="0"/>
                                   </p:stCondLst>
                                   <p:childTnLst>
                                     <p:animClr clrSpc="rgb" dir="cw">
                                       <p:cBhvr>
-                                        <p:cTn id="70" dur="2000" fill="hold"/>
+                                        <p:cTn id="54" dur="2000" fill="hold"/>
                                         <p:tgtEl>
                                           <p:spTgt spid="12"/>
                                         </p:tgtEl>
@@ -21276,7 +20312,7 @@
                                     </p:animClr>
                                     <p:set>
                                       <p:cBhvr>
-                                        <p:cTn id="71" dur="2000" fill="hold"/>
+                                        <p:cTn id="55" dur="2000" fill="hold"/>
                                         <p:tgtEl>
                                           <p:spTgt spid="12"/>
                                         </p:tgtEl>
@@ -21290,7 +20326,7 @@
                                     </p:set>
                                     <p:set>
                                       <p:cBhvr>
-                                        <p:cTn id="72" dur="2000" fill="hold"/>
+                                        <p:cTn id="56" dur="2000" fill="hold"/>
                                         <p:tgtEl>
                                           <p:spTgt spid="12"/>
                                         </p:tgtEl>
@@ -21697,7 +20733,7 @@
               </a14:hiddenLine>
             </a:ext>
             <a:ext uri="{FAA26D3D-D897-4be2-8F04-BA451C77F1D7}">
-              <ma14:placeholderFlag xmlns="" xmlns:ma14="http://schemas.microsoft.com/office/mac/drawingml/2011/main" val="1"/>
+              <ma14:placeholderFlag xmlns:ma14="http://schemas.microsoft.com/office/mac/drawingml/2011/main" xmlns="" val="1"/>
             </a:ext>
           </a:extLst>
         </p:spPr>

</xml_diff>

<commit_message>
Final release a ser apresentada para a carla.
</commit_message>
<xml_diff>
--- a/apresentacao/ApresentacaoSBCUP.pptx
+++ b/apresentacao/ApresentacaoSBCUP.pptx
@@ -245,7 +245,7 @@
           <a:p>
             <a:fld id="{5FD99E58-1C9B-E44B-8998-0A321153317B}" type="datetimeFigureOut">
               <a:rPr lang="en-US" smtClean="0"/>
-              <a:t>7/4/2012</a:t>
+              <a:t>7/5/2012</a:t>
             </a:fld>
             <a:endParaRPr lang="en-US"/>
           </a:p>
@@ -1420,7 +1420,7 @@
           <a:p>
             <a:fld id="{7D290233-0DD1-4A80-BB1E-9ADC3556DBB6}" type="datetimeFigureOut">
               <a:rPr lang="en-US" smtClean="0"/>
-              <a:t>7/4/2012</a:t>
+              <a:t>7/5/2012</a:t>
             </a:fld>
             <a:endParaRPr lang="en-US"/>
           </a:p>
@@ -1616,7 +1616,7 @@
           <a:p>
             <a:fld id="{7D290233-0DD1-4A80-BB1E-9ADC3556DBB6}" type="datetimeFigureOut">
               <a:rPr lang="en-US" smtClean="0"/>
-              <a:t>7/4/2012</a:t>
+              <a:t>7/5/2012</a:t>
             </a:fld>
             <a:endParaRPr lang="en-US"/>
           </a:p>
@@ -1808,7 +1808,7 @@
           <a:p>
             <a:fld id="{7D290233-0DD1-4A80-BB1E-9ADC3556DBB6}" type="datetimeFigureOut">
               <a:rPr lang="en-US" smtClean="0"/>
-              <a:t>7/4/2012</a:t>
+              <a:t>7/5/2012</a:t>
             </a:fld>
             <a:endParaRPr lang="en-US"/>
           </a:p>
@@ -1990,7 +1990,7 @@
           <a:p>
             <a:fld id="{7D290233-0DD1-4A80-BB1E-9ADC3556DBB6}" type="datetimeFigureOut">
               <a:rPr lang="en-US" smtClean="0"/>
-              <a:t>7/4/2012</a:t>
+              <a:t>7/5/2012</a:t>
             </a:fld>
             <a:endParaRPr lang="en-US"/>
           </a:p>
@@ -2228,7 +2228,7 @@
           <a:p>
             <a:fld id="{7D290233-0DD1-4A80-BB1E-9ADC3556DBB6}" type="datetimeFigureOut">
               <a:rPr lang="en-US" smtClean="0"/>
-              <a:t>7/4/2012</a:t>
+              <a:t>7/5/2012</a:t>
             </a:fld>
             <a:endParaRPr lang="en-US"/>
           </a:p>
@@ -2504,7 +2504,7 @@
           <a:p>
             <a:fld id="{7D290233-0DD1-4A80-BB1E-9ADC3556DBB6}" type="datetimeFigureOut">
               <a:rPr lang="en-US" smtClean="0"/>
-              <a:t>7/4/2012</a:t>
+              <a:t>7/5/2012</a:t>
             </a:fld>
             <a:endParaRPr lang="en-US"/>
           </a:p>
@@ -2925,7 +2925,7 @@
           <a:p>
             <a:fld id="{7D290233-0DD1-4A80-BB1E-9ADC3556DBB6}" type="datetimeFigureOut">
               <a:rPr lang="en-US" smtClean="0"/>
-              <a:t>7/4/2012</a:t>
+              <a:t>7/5/2012</a:t>
             </a:fld>
             <a:endParaRPr lang="en-US"/>
           </a:p>
@@ -3073,7 +3073,7 @@
           <a:p>
             <a:fld id="{7D290233-0DD1-4A80-BB1E-9ADC3556DBB6}" type="datetimeFigureOut">
               <a:rPr lang="en-US" smtClean="0"/>
-              <a:t>7/4/2012</a:t>
+              <a:t>7/5/2012</a:t>
             </a:fld>
             <a:endParaRPr lang="en-US"/>
           </a:p>
@@ -3180,7 +3180,7 @@
           <a:p>
             <a:fld id="{7D290233-0DD1-4A80-BB1E-9ADC3556DBB6}" type="datetimeFigureOut">
               <a:rPr lang="en-US" smtClean="0"/>
-              <a:t>7/4/2012</a:t>
+              <a:t>7/5/2012</a:t>
             </a:fld>
             <a:endParaRPr lang="en-US"/>
           </a:p>
@@ -3442,7 +3442,7 @@
           <a:p>
             <a:fld id="{7D290233-0DD1-4A80-BB1E-9ADC3556DBB6}" type="datetimeFigureOut">
               <a:rPr lang="en-US" smtClean="0"/>
-              <a:t>7/4/2012</a:t>
+              <a:t>7/5/2012</a:t>
             </a:fld>
             <a:endParaRPr lang="en-US"/>
           </a:p>
@@ -3706,7 +3706,7 @@
           <a:p>
             <a:fld id="{7D290233-0DD1-4A80-BB1E-9ADC3556DBB6}" type="datetimeFigureOut">
               <a:rPr lang="en-US" smtClean="0"/>
-              <a:t>7/4/2012</a:t>
+              <a:t>7/5/2012</a:t>
             </a:fld>
             <a:endParaRPr lang="en-US"/>
           </a:p>
@@ -4547,7 +4547,7 @@
               </a14:hiddenLine>
             </a:ext>
             <a:ext uri="{FAA26D3D-D897-4be2-8F04-BA451C77F1D7}">
-              <ma14:placeholderFlag xmlns="" xmlns:ma14="http://schemas.microsoft.com/office/mac/drawingml/2011/main" val="1"/>
+              <ma14:placeholderFlag xmlns:ma14="http://schemas.microsoft.com/office/mac/drawingml/2011/main" xmlns="" val="1"/>
             </a:ext>
           </a:extLst>
         </p:spPr>
@@ -4609,7 +4609,7 @@
               </a14:hiddenLine>
             </a:ext>
             <a:ext uri="{FAA26D3D-D897-4be2-8F04-BA451C77F1D7}">
-              <ma14:placeholderFlag xmlns="" xmlns:ma14="http://schemas.microsoft.com/office/mac/drawingml/2011/main" val="1"/>
+              <ma14:placeholderFlag xmlns:ma14="http://schemas.microsoft.com/office/mac/drawingml/2011/main" xmlns="" val="1"/>
             </a:ext>
           </a:extLst>
         </p:spPr>
@@ -4696,7 +4696,7 @@
           <a:p>
             <a:fld id="{7D290233-0DD1-4A80-BB1E-9ADC3556DBB6}" type="datetimeFigureOut">
               <a:rPr lang="en-US" smtClean="0"/>
-              <a:t>7/4/2012</a:t>
+              <a:t>7/5/2012</a:t>
             </a:fld>
             <a:endParaRPr lang="en-US"/>
           </a:p>
@@ -5519,11 +5519,7 @@
             <a:pPr lvl="1"/>
             <a:r>
               <a:rPr lang="en-US" dirty="0" smtClean="0"/>
-              <a:t>Poses</a:t>
-            </a:r>
-            <a:r>
-              <a:rPr lang="en-US" dirty="0" smtClean="0"/>
-              <a:t>;</a:t>
+              <a:t>Poses;</a:t>
             </a:r>
           </a:p>
           <a:p>
@@ -5728,8 +5724,12 @@
           <a:p>
             <a:pPr lvl="1"/>
             <a:r>
+              <a:rPr lang="en-US" dirty="0" smtClean="0"/>
+              <a:t>Um dos </a:t>
+            </a:r>
+            <a:r>
               <a:rPr lang="en-US" dirty="0" err="1" smtClean="0"/>
-              <a:t>Imagens</a:t>
+              <a:t>mais</a:t>
             </a:r>
             <a:r>
               <a:rPr lang="en-US" dirty="0" smtClean="0"/>
@@ -5737,27 +5737,34 @@
             </a:r>
             <a:r>
               <a:rPr lang="en-US" dirty="0" err="1" smtClean="0"/>
-              <a:t>em</a:t>
+              <a:t>utilizados</a:t>
             </a:r>
             <a:r>
               <a:rPr lang="en-US" dirty="0" smtClean="0"/>
-              <a:t> tons de </a:t>
+              <a:t>;</a:t>
+            </a:r>
+            <a:endParaRPr lang="en-US" dirty="0" smtClean="0"/>
+          </a:p>
+          <a:p>
+            <a:pPr lvl="1"/>
+            <a:r>
+              <a:rPr lang="en-US" dirty="0" smtClean="0"/>
+              <a:t>Alta </a:t>
             </a:r>
             <a:r>
               <a:rPr lang="en-US" dirty="0" err="1" smtClean="0"/>
-              <a:t>cinza</a:t>
-            </a:r>
-            <a:r>
-              <a:rPr lang="en-US" dirty="0"/>
+              <a:t>acurácia</a:t>
+            </a:r>
+            <a:r>
+              <a:rPr lang="en-US" dirty="0" smtClean="0"/>
               <a:t>;</a:t>
             </a:r>
-            <a:endParaRPr lang="en-US" dirty="0" smtClean="0"/>
           </a:p>
           <a:p>
             <a:pPr lvl="1"/>
             <a:r>
               <a:rPr lang="en-US" dirty="0" err="1" smtClean="0"/>
-              <a:t>Rápida</a:t>
+              <a:t>Detecção</a:t>
             </a:r>
             <a:r>
               <a:rPr lang="en-US" dirty="0" smtClean="0"/>
@@ -5765,38 +5772,11 @@
             </a:r>
             <a:r>
               <a:rPr lang="en-US" dirty="0" err="1" smtClean="0"/>
-              <a:t>detecção</a:t>
+              <a:t>em</a:t>
             </a:r>
             <a:r>
               <a:rPr lang="en-US" dirty="0" smtClean="0"/>
-              <a:t>;</a:t>
-            </a:r>
-          </a:p>
-          <a:p>
-            <a:pPr lvl="1"/>
-            <a:r>
-              <a:rPr lang="en-US" dirty="0" err="1" smtClean="0"/>
-              <a:t>Impelementado</a:t>
-            </a:r>
-            <a:r>
-              <a:rPr lang="en-US" dirty="0" smtClean="0"/>
-              <a:t> </a:t>
-            </a:r>
-            <a:r>
-              <a:rPr lang="en-US" dirty="0" err="1" smtClean="0"/>
-              <a:t>pela</a:t>
-            </a:r>
-            <a:r>
-              <a:rPr lang="en-US" dirty="0" smtClean="0"/>
-              <a:t> </a:t>
-            </a:r>
-            <a:r>
-              <a:rPr lang="en-US" dirty="0" err="1" smtClean="0"/>
-              <a:t>OpenCV</a:t>
-            </a:r>
-            <a:r>
-              <a:rPr lang="en-US" smtClean="0"/>
-              <a:t>.</a:t>
+              <a:t> tempo real;</a:t>
             </a:r>
             <a:endParaRPr lang="en-US" dirty="0" smtClean="0"/>
           </a:p>
@@ -8197,31 +8177,64 @@
           <a:p>
             <a:pPr lvl="1"/>
             <a:r>
+              <a:rPr lang="pt-BR" dirty="0" smtClean="0"/>
+              <a:t>Identificação facial.</a:t>
+            </a:r>
+          </a:p>
+          <a:p>
+            <a:pPr lvl="1"/>
+            <a:r>
+              <a:rPr lang="pt-BR" dirty="0" smtClean="0"/>
+              <a:t>Localização não implementada;</a:t>
+            </a:r>
+            <a:endParaRPr lang="pt-BR" dirty="0" smtClean="0"/>
+          </a:p>
+          <a:p>
+            <a:r>
+              <a:rPr lang="en-US" b="1" dirty="0"/>
+              <a:t>Smart </a:t>
+            </a:r>
+            <a:r>
+              <a:rPr lang="en-US" b="1" dirty="0" smtClean="0"/>
+              <a:t>Flow</a:t>
+            </a:r>
+            <a:endParaRPr lang="pt-BR" dirty="0" smtClean="0"/>
+          </a:p>
+          <a:p>
+            <a:pPr lvl="1"/>
+            <a:r>
+              <a:rPr lang="pt-BR" dirty="0" smtClean="0"/>
+              <a:t>Sistema multimodal;</a:t>
+            </a:r>
+          </a:p>
+          <a:p>
+            <a:pPr lvl="1"/>
+            <a:r>
+              <a:rPr lang="pt-BR" dirty="0" smtClean="0"/>
+              <a:t>Identificação facial</a:t>
+            </a:r>
+            <a:r>
+              <a:rPr lang="pt-BR" dirty="0" smtClean="0"/>
+              <a:t>;</a:t>
+            </a:r>
+          </a:p>
+          <a:p>
+            <a:pPr lvl="1"/>
+            <a:r>
+              <a:rPr lang="pt-BR" dirty="0" smtClean="0"/>
+              <a:t>Localização </a:t>
+            </a:r>
+            <a:r>
               <a:rPr lang="pt-BR" dirty="0"/>
-              <a:t>Rastreamento </a:t>
+              <a:t>baseado </a:t>
             </a:r>
             <a:r>
               <a:rPr lang="pt-BR" dirty="0" smtClean="0"/>
-              <a:t>multimodal;</a:t>
-            </a:r>
-          </a:p>
-          <a:p>
-            <a:pPr lvl="1"/>
-            <a:r>
-              <a:rPr lang="pt-BR" dirty="0" smtClean="0"/>
-              <a:t>Identificação </a:t>
+              <a:t>em </a:t>
             </a:r>
             <a:r>
               <a:rPr lang="pt-BR" dirty="0"/>
-              <a:t>por meio de </a:t>
-            </a:r>
-            <a:r>
-              <a:rPr lang="pt-BR" dirty="0" smtClean="0"/>
-              <a:t>reconhecimento </a:t>
-            </a:r>
-            <a:r>
-              <a:rPr lang="pt-BR" dirty="0"/>
-              <a:t>facial</a:t>
+              <a:t>áudio</a:t>
             </a:r>
             <a:r>
               <a:rPr lang="pt-BR" dirty="0" smtClean="0"/>
@@ -8231,26 +8244,19 @@
           <a:p>
             <a:r>
               <a:rPr lang="en-US" b="1" dirty="0"/>
-              <a:t>Smart </a:t>
+              <a:t>AVIARY E </a:t>
             </a:r>
             <a:r>
               <a:rPr lang="en-US" b="1" dirty="0" smtClean="0"/>
-              <a:t>Flow</a:t>
+              <a:t>MICASA</a:t>
             </a:r>
             <a:endParaRPr lang="pt-BR" dirty="0" smtClean="0"/>
           </a:p>
           <a:p>
             <a:pPr lvl="1"/>
             <a:r>
-              <a:rPr lang="pt-BR" dirty="0" smtClean="0"/>
-              <a:t>Sistema multimodal;</a:t>
-            </a:r>
-          </a:p>
-          <a:p>
-            <a:pPr lvl="1"/>
-            <a:r>
-              <a:rPr lang="pt-BR" dirty="0" smtClean="0"/>
-              <a:t>Reconhecimento facial;</a:t>
+              <a:rPr lang="pt-BR" dirty="0"/>
+              <a:t>Identificação facial;</a:t>
             </a:r>
           </a:p>
           <a:p>
@@ -8261,56 +8267,18 @@
             </a:r>
             <a:r>
               <a:rPr lang="pt-BR" dirty="0"/>
-              <a:t>baseado </a:t>
+              <a:t>não implementada</a:t>
             </a:r>
             <a:r>
               <a:rPr lang="pt-BR" dirty="0" smtClean="0"/>
-              <a:t>em </a:t>
-            </a:r>
-            <a:r>
-              <a:rPr lang="pt-BR" dirty="0"/>
-              <a:t>áudio</a:t>
-            </a:r>
-            <a:r>
-              <a:rPr lang="pt-BR" dirty="0" smtClean="0"/>
-              <a:t>.</a:t>
-            </a:r>
-          </a:p>
-          <a:p>
-            <a:r>
-              <a:rPr lang="en-US" b="1" dirty="0"/>
-              <a:t>AVIARY E MICASA</a:t>
-            </a:r>
+              <a:t>;</a:t>
+            </a:r>
+          </a:p>
+          <a:p>
+            <a:pPr marL="411162" lvl="1" indent="0">
+              <a:buNone/>
+            </a:pPr>
             <a:endParaRPr lang="pt-BR" dirty="0"/>
-          </a:p>
-          <a:p>
-            <a:pPr lvl="1"/>
-            <a:r>
-              <a:rPr lang="pt-BR" dirty="0"/>
-              <a:t>Identificação de pessoas;</a:t>
-            </a:r>
-          </a:p>
-          <a:p>
-            <a:pPr lvl="1"/>
-            <a:r>
-              <a:rPr lang="pt-BR" dirty="0"/>
-              <a:t>Detecção de intrusos;</a:t>
-            </a:r>
-          </a:p>
-          <a:p>
-            <a:pPr lvl="1"/>
-            <a:r>
-              <a:rPr lang="pt-BR" dirty="0" smtClean="0"/>
-              <a:t>Rastreamento </a:t>
-            </a:r>
-            <a:r>
-              <a:rPr lang="pt-BR" dirty="0"/>
-              <a:t>de </a:t>
-            </a:r>
-            <a:r>
-              <a:rPr lang="pt-BR" dirty="0" smtClean="0"/>
-              <a:t>várias pessoas;</a:t>
-            </a:r>
           </a:p>
           <a:p>
             <a:pPr lvl="1"/>
@@ -8614,8 +8582,9 @@
           <a:p>
             <a:r>
               <a:rPr lang="pt-BR" dirty="0" smtClean="0"/>
-              <a:t>Testes</a:t>
-            </a:r>
+              <a:t>Ambientes e resultados experimentais</a:t>
+            </a:r>
+            <a:endParaRPr lang="pt-BR" dirty="0" smtClean="0"/>
           </a:p>
           <a:p>
             <a:r>
@@ -10962,44 +10931,13 @@
           </a:p>
           <a:p>
             <a:r>
-              <a:rPr lang="en-US" dirty="0" err="1" smtClean="0"/>
-              <a:t>Imagens</a:t>
-            </a:r>
-            <a:r>
-              <a:rPr lang="en-US" dirty="0" smtClean="0"/>
-              <a:t> de </a:t>
-            </a:r>
-            <a:r>
-              <a:rPr lang="en-US" dirty="0" err="1" smtClean="0"/>
-              <a:t>Profundidade</a:t>
-            </a:r>
-            <a:endParaRPr lang="en-US" dirty="0" smtClean="0"/>
-          </a:p>
-          <a:p>
-            <a:r>
-              <a:rPr lang="en-US" dirty="0" err="1" smtClean="0"/>
-              <a:t>Rastreamento</a:t>
-            </a:r>
-            <a:endParaRPr lang="en-US" dirty="0" smtClean="0"/>
-          </a:p>
-          <a:p>
-            <a:pPr lvl="1"/>
-            <a:r>
-              <a:rPr lang="en-US" dirty="0" err="1" smtClean="0"/>
+              <a:rPr lang="en-US" dirty="0" err="1"/>
               <a:t>Subtração</a:t>
             </a:r>
             <a:r>
-              <a:rPr lang="en-US" dirty="0" smtClean="0"/>
+              <a:rPr lang="en-US" dirty="0"/>
               <a:t> de Fundo</a:t>
             </a:r>
-          </a:p>
-          <a:p>
-            <a:pPr lvl="1"/>
-            <a:r>
-              <a:rPr lang="en-US" dirty="0" err="1" smtClean="0"/>
-              <a:t>Silhuetas</a:t>
-            </a:r>
-            <a:endParaRPr lang="en-US" dirty="0" smtClean="0"/>
           </a:p>
           <a:p>
             <a:r>
@@ -13035,7 +12973,7 @@
               </a14:hiddenLine>
             </a:ext>
             <a:ext uri="{FAA26D3D-D897-4be2-8F04-BA451C77F1D7}">
-              <ma14:placeholderFlag xmlns="" xmlns:ma14="http://schemas.microsoft.com/office/mac/drawingml/2011/main" val="1"/>
+              <ma14:placeholderFlag xmlns:ma14="http://schemas.microsoft.com/office/mac/drawingml/2011/main" xmlns="" val="1"/>
             </a:ext>
           </a:extLst>
         </p:spPr>
@@ -13444,7 +13382,7 @@
               </a14:hiddenLine>
             </a:ext>
             <a:ext uri="{FAA26D3D-D897-4be2-8F04-BA451C77F1D7}">
-              <ma14:placeholderFlag xmlns="" xmlns:ma14="http://schemas.microsoft.com/office/mac/drawingml/2011/main" val="1"/>
+              <ma14:placeholderFlag xmlns:ma14="http://schemas.microsoft.com/office/mac/drawingml/2011/main" xmlns="" val="1"/>
             </a:ext>
           </a:extLst>
         </p:spPr>
@@ -13818,7 +13756,7 @@
               </a14:hiddenLine>
             </a:ext>
             <a:ext uri="{FAA26D3D-D897-4be2-8F04-BA451C77F1D7}">
-              <ma14:placeholderFlag xmlns="" xmlns:ma14="http://schemas.microsoft.com/office/mac/drawingml/2011/main" val="1"/>
+              <ma14:placeholderFlag xmlns:ma14="http://schemas.microsoft.com/office/mac/drawingml/2011/main" xmlns="" val="1"/>
             </a:ext>
           </a:extLst>
         </p:spPr>
@@ -14385,7 +14323,7 @@
               </a14:hiddenLine>
             </a:ext>
             <a:ext uri="{FAA26D3D-D897-4be2-8F04-BA451C77F1D7}">
-              <ma14:placeholderFlag xmlns="" xmlns:ma14="http://schemas.microsoft.com/office/mac/drawingml/2011/main" val="1"/>
+              <ma14:placeholderFlag xmlns:ma14="http://schemas.microsoft.com/office/mac/drawingml/2011/main" xmlns="" val="1"/>
             </a:ext>
           </a:extLst>
         </p:spPr>
@@ -18345,7 +18283,7 @@
               </a14:hiddenLine>
             </a:ext>
             <a:ext uri="{FAA26D3D-D897-4be2-8F04-BA451C77F1D7}">
-              <ma14:placeholderFlag xmlns="" xmlns:ma14="http://schemas.microsoft.com/office/mac/drawingml/2011/main" val="1"/>
+              <ma14:placeholderFlag xmlns:ma14="http://schemas.microsoft.com/office/mac/drawingml/2011/main" xmlns="" val="1"/>
             </a:ext>
           </a:extLst>
         </p:spPr>
@@ -18636,7 +18574,7 @@
               </a14:hiddenLine>
             </a:ext>
             <a:ext uri="{FAA26D3D-D897-4be2-8F04-BA451C77F1D7}">
-              <ma14:placeholderFlag xmlns="" xmlns:ma14="http://schemas.microsoft.com/office/mac/drawingml/2011/main" val="1"/>
+              <ma14:placeholderFlag xmlns:ma14="http://schemas.microsoft.com/office/mac/drawingml/2011/main" xmlns="" val="1"/>
             </a:ext>
           </a:extLst>
         </p:spPr>
@@ -20767,7 +20705,7 @@
               </a14:hiddenLine>
             </a:ext>
             <a:ext uri="{FAA26D3D-D897-4be2-8F04-BA451C77F1D7}">
-              <ma14:placeholderFlag xmlns="" xmlns:ma14="http://schemas.microsoft.com/office/mac/drawingml/2011/main" val="1"/>
+              <ma14:placeholderFlag xmlns:ma14="http://schemas.microsoft.com/office/mac/drawingml/2011/main" xmlns="" val="1"/>
             </a:ext>
           </a:extLst>
         </p:spPr>

</xml_diff>

<commit_message>
Últimos ajustes na apresentação.
</commit_message>
<xml_diff>
--- a/apresentacao/ApresentacaoSBCUP.pptx
+++ b/apresentacao/ApresentacaoSBCUP.pptx
@@ -2444,7 +2444,7 @@
           <a:p>
             <a:fld id="{5FD99E58-1C9B-E44B-8998-0A321153317B}" type="datetimeFigureOut">
               <a:rPr lang="en-US" smtClean="0"/>
-              <a:t>7/9/2012</a:t>
+              <a:t>7/10/2012</a:t>
             </a:fld>
             <a:endParaRPr lang="en-US"/>
           </a:p>
@@ -3076,11 +3076,7 @@
           <a:p>
             <a:r>
               <a:rPr lang="pt-BR" dirty="0" smtClean="0"/>
-              <a:t>Conectar </a:t>
-            </a:r>
-            <a:r>
-              <a:rPr lang="pt-BR" dirty="0" smtClean="0"/>
-              <a:t>com o slide anterior </a:t>
+              <a:t>Conectar com o slide anterior </a:t>
             </a:r>
           </a:p>
           <a:p>
@@ -3118,11 +3114,7 @@
           <a:p>
             <a:r>
               <a:rPr lang="pt-BR" baseline="0" dirty="0" smtClean="0"/>
-              <a:t>Dados os modelos de entidades, silhuetas são rastreadas por qualquer forma de correspondência ou evolução </a:t>
-            </a:r>
-            <a:r>
-              <a:rPr lang="pt-BR" baseline="0" smtClean="0"/>
-              <a:t>de contorno.</a:t>
+              <a:t>Dados os modelos de entidades, silhuetas são rastreadas por qualquer forma de correspondência ou evolução de contorno.</a:t>
             </a:r>
             <a:endParaRPr lang="pt-BR" dirty="0"/>
           </a:p>
@@ -7300,7 +7292,7 @@
           <a:p>
             <a:fld id="{7D290233-0DD1-4A80-BB1E-9ADC3556DBB6}" type="datetimeFigureOut">
               <a:rPr lang="en-US" smtClean="0"/>
-              <a:t>7/9/2012</a:t>
+              <a:t>7/10/2012</a:t>
             </a:fld>
             <a:endParaRPr lang="en-US"/>
           </a:p>
@@ -7496,7 +7488,7 @@
           <a:p>
             <a:fld id="{7D290233-0DD1-4A80-BB1E-9ADC3556DBB6}" type="datetimeFigureOut">
               <a:rPr lang="en-US" smtClean="0"/>
-              <a:t>7/9/2012</a:t>
+              <a:t>7/10/2012</a:t>
             </a:fld>
             <a:endParaRPr lang="en-US"/>
           </a:p>
@@ -7688,7 +7680,7 @@
           <a:p>
             <a:fld id="{7D290233-0DD1-4A80-BB1E-9ADC3556DBB6}" type="datetimeFigureOut">
               <a:rPr lang="en-US" smtClean="0"/>
-              <a:t>7/9/2012</a:t>
+              <a:t>7/10/2012</a:t>
             </a:fld>
             <a:endParaRPr lang="en-US"/>
           </a:p>
@@ -7870,7 +7862,7 @@
           <a:p>
             <a:fld id="{7D290233-0DD1-4A80-BB1E-9ADC3556DBB6}" type="datetimeFigureOut">
               <a:rPr lang="en-US" smtClean="0"/>
-              <a:t>7/9/2012</a:t>
+              <a:t>7/10/2012</a:t>
             </a:fld>
             <a:endParaRPr lang="en-US"/>
           </a:p>
@@ -8108,7 +8100,7 @@
           <a:p>
             <a:fld id="{7D290233-0DD1-4A80-BB1E-9ADC3556DBB6}" type="datetimeFigureOut">
               <a:rPr lang="en-US" smtClean="0"/>
-              <a:t>7/9/2012</a:t>
+              <a:t>7/10/2012</a:t>
             </a:fld>
             <a:endParaRPr lang="en-US"/>
           </a:p>
@@ -8384,7 +8376,7 @@
           <a:p>
             <a:fld id="{7D290233-0DD1-4A80-BB1E-9ADC3556DBB6}" type="datetimeFigureOut">
               <a:rPr lang="en-US" smtClean="0"/>
-              <a:t>7/9/2012</a:t>
+              <a:t>7/10/2012</a:t>
             </a:fld>
             <a:endParaRPr lang="en-US"/>
           </a:p>
@@ -8805,7 +8797,7 @@
           <a:p>
             <a:fld id="{7D290233-0DD1-4A80-BB1E-9ADC3556DBB6}" type="datetimeFigureOut">
               <a:rPr lang="en-US" smtClean="0"/>
-              <a:t>7/9/2012</a:t>
+              <a:t>7/10/2012</a:t>
             </a:fld>
             <a:endParaRPr lang="en-US"/>
           </a:p>
@@ -8953,7 +8945,7 @@
           <a:p>
             <a:fld id="{7D290233-0DD1-4A80-BB1E-9ADC3556DBB6}" type="datetimeFigureOut">
               <a:rPr lang="en-US" smtClean="0"/>
-              <a:t>7/9/2012</a:t>
+              <a:t>7/10/2012</a:t>
             </a:fld>
             <a:endParaRPr lang="en-US"/>
           </a:p>
@@ -9060,7 +9052,7 @@
           <a:p>
             <a:fld id="{7D290233-0DD1-4A80-BB1E-9ADC3556DBB6}" type="datetimeFigureOut">
               <a:rPr lang="en-US" smtClean="0"/>
-              <a:t>7/9/2012</a:t>
+              <a:t>7/10/2012</a:t>
             </a:fld>
             <a:endParaRPr lang="en-US"/>
           </a:p>
@@ -9322,7 +9314,7 @@
           <a:p>
             <a:fld id="{7D290233-0DD1-4A80-BB1E-9ADC3556DBB6}" type="datetimeFigureOut">
               <a:rPr lang="en-US" smtClean="0"/>
-              <a:t>7/9/2012</a:t>
+              <a:t>7/10/2012</a:t>
             </a:fld>
             <a:endParaRPr lang="en-US"/>
           </a:p>
@@ -9586,7 +9578,7 @@
           <a:p>
             <a:fld id="{7D290233-0DD1-4A80-BB1E-9ADC3556DBB6}" type="datetimeFigureOut">
               <a:rPr lang="en-US" smtClean="0"/>
-              <a:t>7/9/2012</a:t>
+              <a:t>7/10/2012</a:t>
             </a:fld>
             <a:endParaRPr lang="en-US"/>
           </a:p>
@@ -10427,7 +10419,7 @@
               </a14:hiddenLine>
             </a:ext>
             <a:ext uri="{FAA26D3D-D897-4be2-8F04-BA451C77F1D7}">
-              <ma14:placeholderFlag xmlns="" xmlns:ma14="http://schemas.microsoft.com/office/mac/drawingml/2011/main" val="1"/>
+              <ma14:placeholderFlag xmlns:ma14="http://schemas.microsoft.com/office/mac/drawingml/2011/main" xmlns="" val="1"/>
             </a:ext>
           </a:extLst>
         </p:spPr>
@@ -10489,7 +10481,7 @@
               </a14:hiddenLine>
             </a:ext>
             <a:ext uri="{FAA26D3D-D897-4be2-8F04-BA451C77F1D7}">
-              <ma14:placeholderFlag xmlns="" xmlns:ma14="http://schemas.microsoft.com/office/mac/drawingml/2011/main" val="1"/>
+              <ma14:placeholderFlag xmlns:ma14="http://schemas.microsoft.com/office/mac/drawingml/2011/main" xmlns="" val="1"/>
             </a:ext>
           </a:extLst>
         </p:spPr>
@@ -10576,7 +10568,7 @@
           <a:p>
             <a:fld id="{7D290233-0DD1-4A80-BB1E-9ADC3556DBB6}" type="datetimeFigureOut">
               <a:rPr lang="en-US" smtClean="0"/>
-              <a:t>7/9/2012</a:t>
+              <a:t>7/10/2012</a:t>
             </a:fld>
             <a:endParaRPr lang="en-US"/>
           </a:p>
@@ -15546,11 +15538,7 @@
             </a:pPr>
             <a:r>
               <a:rPr lang="pt-BR" sz="2400" dirty="0" smtClean="0"/>
-              <a:t>Reconhecimento </a:t>
-            </a:r>
-            <a:r>
-              <a:rPr lang="pt-BR" sz="2400" dirty="0" smtClean="0"/>
-              <a:t>facial</a:t>
+              <a:t>Reconhecimento facial</a:t>
             </a:r>
             <a:endParaRPr lang="pt-BR" sz="2400" i="1" dirty="0" smtClean="0"/>
           </a:p>
@@ -17511,7 +17499,7 @@
               </a14:hiddenLine>
             </a:ext>
             <a:ext uri="{FAA26D3D-D897-4be2-8F04-BA451C77F1D7}">
-              <ma14:placeholderFlag xmlns="" xmlns:ma14="http://schemas.microsoft.com/office/mac/drawingml/2011/main" val="1"/>
+              <ma14:placeholderFlag xmlns:ma14="http://schemas.microsoft.com/office/mac/drawingml/2011/main" xmlns="" val="1"/>
             </a:ext>
           </a:extLst>
         </p:spPr>
@@ -17920,7 +17908,7 @@
               </a14:hiddenLine>
             </a:ext>
             <a:ext uri="{FAA26D3D-D897-4be2-8F04-BA451C77F1D7}">
-              <ma14:placeholderFlag xmlns="" xmlns:ma14="http://schemas.microsoft.com/office/mac/drawingml/2011/main" val="1"/>
+              <ma14:placeholderFlag xmlns:ma14="http://schemas.microsoft.com/office/mac/drawingml/2011/main" xmlns="" val="1"/>
             </a:ext>
           </a:extLst>
         </p:spPr>
@@ -18946,7 +18934,7 @@
                               <p:par>
                                 <p:cTn id="5" presetID="10" presetClass="entr" presetSubtype="0" fill="hold" grpId="0" nodeType="withEffect">
                                   <p:stCondLst>
-                                    <p:cond delay="250"/>
+                                    <p:cond delay="0"/>
                                   </p:stCondLst>
                                   <p:childTnLst>
                                     <p:set>
@@ -18981,7 +18969,7 @@
                               <p:par>
                                 <p:cTn id="8" presetID="10" presetClass="entr" presetSubtype="0" fill="hold" grpId="0" nodeType="withEffect">
                                   <p:stCondLst>
-                                    <p:cond delay="500"/>
+                                    <p:cond delay="0"/>
                                   </p:stCondLst>
                                   <p:childTnLst>
                                     <p:set>
@@ -19016,7 +19004,7 @@
                               <p:par>
                                 <p:cTn id="11" presetID="10" presetClass="entr" presetSubtype="0" fill="hold" grpId="0" nodeType="withEffect">
                                   <p:stCondLst>
-                                    <p:cond delay="750"/>
+                                    <p:cond delay="0"/>
                                   </p:stCondLst>
                                   <p:childTnLst>
                                     <p:set>
@@ -19051,7 +19039,7 @@
                               <p:par>
                                 <p:cTn id="14" presetID="10" presetClass="entr" presetSubtype="0" fill="hold" grpId="0" nodeType="withEffect">
                                   <p:stCondLst>
-                                    <p:cond delay="1000"/>
+                                    <p:cond delay="0"/>
                                   </p:stCondLst>
                                   <p:childTnLst>
                                     <p:set>
@@ -19086,7 +19074,7 @@
                               <p:par>
                                 <p:cTn id="17" presetID="10" presetClass="entr" presetSubtype="0" fill="hold" grpId="0" nodeType="withEffect">
                                   <p:stCondLst>
-                                    <p:cond delay="1250"/>
+                                    <p:cond delay="0"/>
                                   </p:stCondLst>
                                   <p:childTnLst>
                                     <p:set>
@@ -19121,7 +19109,7 @@
                               <p:par>
                                 <p:cTn id="20" presetID="10" presetClass="entr" presetSubtype="0" fill="hold" grpId="0" nodeType="withEffect">
                                   <p:stCondLst>
-                                    <p:cond delay="1250"/>
+                                    <p:cond delay="0"/>
                                   </p:stCondLst>
                                   <p:childTnLst>
                                     <p:set>
@@ -19156,7 +19144,7 @@
                               <p:par>
                                 <p:cTn id="23" presetID="10" presetClass="entr" presetSubtype="0" fill="hold" grpId="0" nodeType="withEffect">
                                   <p:stCondLst>
-                                    <p:cond delay="1500"/>
+                                    <p:cond delay="0"/>
                                   </p:stCondLst>
                                   <p:childTnLst>
                                     <p:set>
@@ -19191,7 +19179,7 @@
                               <p:par>
                                 <p:cTn id="26" presetID="10" presetClass="entr" presetSubtype="0" fill="hold" grpId="0" nodeType="withEffect">
                                   <p:stCondLst>
-                                    <p:cond delay="1500"/>
+                                    <p:cond delay="0"/>
                                   </p:stCondLst>
                                   <p:childTnLst>
                                     <p:set>
@@ -19226,7 +19214,7 @@
                               <p:par>
                                 <p:cTn id="29" presetID="10" presetClass="entr" presetSubtype="0" fill="hold" grpId="0" nodeType="withEffect">
                                   <p:stCondLst>
-                                    <p:cond delay="1750"/>
+                                    <p:cond delay="0"/>
                                   </p:stCondLst>
                                   <p:childTnLst>
                                     <p:set>
@@ -19261,7 +19249,7 @@
                               <p:par>
                                 <p:cTn id="32" presetID="10" presetClass="entr" presetSubtype="0" fill="hold" grpId="0" nodeType="withEffect">
                                   <p:stCondLst>
-                                    <p:cond delay="1750"/>
+                                    <p:cond delay="0"/>
                                   </p:stCondLst>
                                   <p:childTnLst>
                                     <p:set>
@@ -19296,7 +19284,7 @@
                               <p:par>
                                 <p:cTn id="35" presetID="10" presetClass="entr" presetSubtype="0" fill="hold" grpId="0" nodeType="withEffect">
                                   <p:stCondLst>
-                                    <p:cond delay="2000"/>
+                                    <p:cond delay="0"/>
                                   </p:stCondLst>
                                   <p:childTnLst>
                                     <p:set>
@@ -19331,7 +19319,7 @@
                               <p:par>
                                 <p:cTn id="38" presetID="10" presetClass="entr" presetSubtype="0" fill="hold" grpId="0" nodeType="withEffect">
                                   <p:stCondLst>
-                                    <p:cond delay="2000"/>
+                                    <p:cond delay="0"/>
                                   </p:stCondLst>
                                   <p:childTnLst>
                                     <p:set>
@@ -19366,7 +19354,7 @@
                               <p:par>
                                 <p:cTn id="41" presetID="10" presetClass="entr" presetSubtype="0" fill="hold" grpId="0" nodeType="withEffect">
                                   <p:stCondLst>
-                                    <p:cond delay="2250"/>
+                                    <p:cond delay="0"/>
                                   </p:stCondLst>
                                   <p:childTnLst>
                                     <p:set>
@@ -19401,7 +19389,7 @@
                               <p:par>
                                 <p:cTn id="44" presetID="10" presetClass="entr" presetSubtype="0" fill="hold" grpId="0" nodeType="withEffect">
                                   <p:stCondLst>
-                                    <p:cond delay="2250"/>
+                                    <p:cond delay="0"/>
                                   </p:stCondLst>
                                   <p:childTnLst>
                                     <p:set>
@@ -19656,7 +19644,7 @@
               </a14:hiddenLine>
             </a:ext>
             <a:ext uri="{FAA26D3D-D897-4be2-8F04-BA451C77F1D7}">
-              <ma14:placeholderFlag xmlns="" xmlns:ma14="http://schemas.microsoft.com/office/mac/drawingml/2011/main" val="1"/>
+              <ma14:placeholderFlag xmlns:ma14="http://schemas.microsoft.com/office/mac/drawingml/2011/main" xmlns="" val="1"/>
             </a:ext>
           </a:extLst>
         </p:spPr>
@@ -20365,6 +20353,68 @@
           </a:p>
         </p:txBody>
       </p:sp>
+      <p:sp>
+        <p:nvSpPr>
+          <p:cNvPr id="6" name="CaixaDeTexto 5"/>
+          <p:cNvSpPr txBox="1"/>
+          <p:nvPr/>
+        </p:nvSpPr>
+        <p:spPr>
+          <a:xfrm>
+            <a:off x="3281689" y="5398921"/>
+            <a:ext cx="2569934" cy="369332"/>
+          </a:xfrm>
+          <a:prstGeom prst="rect">
+            <a:avLst/>
+          </a:prstGeom>
+          <a:noFill/>
+        </p:spPr>
+        <p:txBody>
+          <a:bodyPr wrap="square" rtlCol="0">
+            <a:spAutoFit/>
+          </a:bodyPr>
+          <a:lstStyle/>
+          <a:p>
+            <a:pPr algn="ctr"/>
+            <a:r>
+              <a:rPr lang="pt-BR" dirty="0" smtClean="0"/>
+              <a:t>Etapas</a:t>
+            </a:r>
+            <a:endParaRPr lang="pt-BR" dirty="0"/>
+          </a:p>
+        </p:txBody>
+      </p:sp>
+      <p:sp>
+        <p:nvSpPr>
+          <p:cNvPr id="7" name="CaixaDeTexto 6"/>
+          <p:cNvSpPr txBox="1"/>
+          <p:nvPr/>
+        </p:nvSpPr>
+        <p:spPr>
+          <a:xfrm>
+            <a:off x="3281689" y="5398921"/>
+            <a:ext cx="2569934" cy="369332"/>
+          </a:xfrm>
+          <a:prstGeom prst="rect">
+            <a:avLst/>
+          </a:prstGeom>
+          <a:noFill/>
+        </p:spPr>
+        <p:txBody>
+          <a:bodyPr wrap="square" rtlCol="0">
+            <a:spAutoFit/>
+          </a:bodyPr>
+          <a:lstStyle/>
+          <a:p>
+            <a:pPr algn="ctr"/>
+            <a:r>
+              <a:rPr lang="pt-BR" dirty="0" smtClean="0"/>
+              <a:t>Cenários</a:t>
+            </a:r>
+            <a:endParaRPr lang="pt-BR" dirty="0"/>
+          </a:p>
+        </p:txBody>
+      </p:sp>
     </p:spTree>
     <p:extLst>
       <p:ext uri="{BB962C8B-B14F-4D97-AF65-F5344CB8AC3E}">
@@ -20449,7 +20499,7 @@
                             </p:stCondLst>
                             <p:childTnLst>
                               <p:par>
-                                <p:cTn id="10" presetID="10" presetClass="entr" presetSubtype="0" fill="hold" grpId="0" nodeType="clickEffect">
+                                <p:cTn id="10" presetID="2" presetClass="entr" presetSubtype="2" fill="hold" grpId="1" nodeType="clickEffect">
                                   <p:stCondLst>
                                     <p:cond delay="0"/>
                                   </p:stCondLst>
@@ -20472,14 +20522,380 @@
                                         <p:strVal val="visible"/>
                                       </p:to>
                                     </p:set>
-                                    <p:animEffect transition="in" filter="fade">
-                                      <p:cBhvr>
-                                        <p:cTn id="12" dur="500"/>
+                                    <p:anim calcmode="lin" valueType="num">
+                                      <p:cBhvr additive="base">
+                                        <p:cTn id="12" dur="500" fill="hold"/>
                                         <p:tgtEl>
                                           <p:spTgt spid="5"/>
                                         </p:tgtEl>
+                                        <p:attrNameLst>
+                                          <p:attrName>ppt_x</p:attrName>
+                                        </p:attrNameLst>
                                       </p:cBhvr>
-                                    </p:animEffect>
+                                      <p:tavLst>
+                                        <p:tav tm="0">
+                                          <p:val>
+                                            <p:strVal val="1+#ppt_w/2"/>
+                                          </p:val>
+                                        </p:tav>
+                                        <p:tav tm="100000">
+                                          <p:val>
+                                            <p:strVal val="#ppt_x"/>
+                                          </p:val>
+                                        </p:tav>
+                                      </p:tavLst>
+                                    </p:anim>
+                                    <p:anim calcmode="lin" valueType="num">
+                                      <p:cBhvr additive="base">
+                                        <p:cTn id="13" dur="500" fill="hold"/>
+                                        <p:tgtEl>
+                                          <p:spTgt spid="5"/>
+                                        </p:tgtEl>
+                                        <p:attrNameLst>
+                                          <p:attrName>ppt_y</p:attrName>
+                                        </p:attrNameLst>
+                                      </p:cBhvr>
+                                      <p:tavLst>
+                                        <p:tav tm="0">
+                                          <p:val>
+                                            <p:strVal val="#ppt_y"/>
+                                          </p:val>
+                                        </p:tav>
+                                        <p:tav tm="100000">
+                                          <p:val>
+                                            <p:strVal val="#ppt_y"/>
+                                          </p:val>
+                                        </p:tav>
+                                      </p:tavLst>
+                                    </p:anim>
+                                  </p:childTnLst>
+                                </p:cTn>
+                              </p:par>
+                            </p:childTnLst>
+                          </p:cTn>
+                        </p:par>
+                      </p:childTnLst>
+                    </p:cTn>
+                  </p:par>
+                  <p:par>
+                    <p:cTn id="14" fill="hold">
+                      <p:stCondLst>
+                        <p:cond delay="indefinite"/>
+                      </p:stCondLst>
+                      <p:childTnLst>
+                        <p:par>
+                          <p:cTn id="15" fill="hold">
+                            <p:stCondLst>
+                              <p:cond delay="0"/>
+                            </p:stCondLst>
+                            <p:childTnLst>
+                              <p:par>
+                                <p:cTn id="16" presetID="2" presetClass="exit" presetSubtype="8" fill="hold" grpId="0" nodeType="clickEffect">
+                                  <p:stCondLst>
+                                    <p:cond delay="0"/>
+                                  </p:stCondLst>
+                                  <p:childTnLst>
+                                    <p:anim calcmode="lin" valueType="num">
+                                      <p:cBhvr additive="base">
+                                        <p:cTn id="17" dur="500"/>
+                                        <p:tgtEl>
+                                          <p:spTgt spid="5"/>
+                                        </p:tgtEl>
+                                        <p:attrNameLst>
+                                          <p:attrName>ppt_x</p:attrName>
+                                        </p:attrNameLst>
+                                      </p:cBhvr>
+                                      <p:tavLst>
+                                        <p:tav tm="0">
+                                          <p:val>
+                                            <p:strVal val="ppt_x"/>
+                                          </p:val>
+                                        </p:tav>
+                                        <p:tav tm="100000">
+                                          <p:val>
+                                            <p:strVal val="0-ppt_w/2"/>
+                                          </p:val>
+                                        </p:tav>
+                                      </p:tavLst>
+                                    </p:anim>
+                                    <p:anim calcmode="lin" valueType="num">
+                                      <p:cBhvr additive="base">
+                                        <p:cTn id="18" dur="500"/>
+                                        <p:tgtEl>
+                                          <p:spTgt spid="5"/>
+                                        </p:tgtEl>
+                                        <p:attrNameLst>
+                                          <p:attrName>ppt_y</p:attrName>
+                                        </p:attrNameLst>
+                                      </p:cBhvr>
+                                      <p:tavLst>
+                                        <p:tav tm="0">
+                                          <p:val>
+                                            <p:strVal val="ppt_y"/>
+                                          </p:val>
+                                        </p:tav>
+                                        <p:tav tm="100000">
+                                          <p:val>
+                                            <p:strVal val="ppt_y"/>
+                                          </p:val>
+                                        </p:tav>
+                                      </p:tavLst>
+                                    </p:anim>
+                                    <p:set>
+                                      <p:cBhvr>
+                                        <p:cTn id="19" dur="1" fill="hold">
+                                          <p:stCondLst>
+                                            <p:cond delay="499"/>
+                                          </p:stCondLst>
+                                        </p:cTn>
+                                        <p:tgtEl>
+                                          <p:spTgt spid="5"/>
+                                        </p:tgtEl>
+                                        <p:attrNameLst>
+                                          <p:attrName>style.visibility</p:attrName>
+                                        </p:attrNameLst>
+                                      </p:cBhvr>
+                                      <p:to>
+                                        <p:strVal val="hidden"/>
+                                      </p:to>
+                                    </p:set>
+                                  </p:childTnLst>
+                                </p:cTn>
+                              </p:par>
+                              <p:par>
+                                <p:cTn id="20" presetID="2" presetClass="entr" presetSubtype="2" fill="hold" grpId="0" nodeType="withEffect">
+                                  <p:stCondLst>
+                                    <p:cond delay="0"/>
+                                  </p:stCondLst>
+                                  <p:childTnLst>
+                                    <p:set>
+                                      <p:cBhvr>
+                                        <p:cTn id="21" dur="1" fill="hold">
+                                          <p:stCondLst>
+                                            <p:cond delay="0"/>
+                                          </p:stCondLst>
+                                        </p:cTn>
+                                        <p:tgtEl>
+                                          <p:spTgt spid="6"/>
+                                        </p:tgtEl>
+                                        <p:attrNameLst>
+                                          <p:attrName>style.visibility</p:attrName>
+                                        </p:attrNameLst>
+                                      </p:cBhvr>
+                                      <p:to>
+                                        <p:strVal val="visible"/>
+                                      </p:to>
+                                    </p:set>
+                                    <p:anim calcmode="lin" valueType="num">
+                                      <p:cBhvr additive="base">
+                                        <p:cTn id="22" dur="500" fill="hold"/>
+                                        <p:tgtEl>
+                                          <p:spTgt spid="6"/>
+                                        </p:tgtEl>
+                                        <p:attrNameLst>
+                                          <p:attrName>ppt_x</p:attrName>
+                                        </p:attrNameLst>
+                                      </p:cBhvr>
+                                      <p:tavLst>
+                                        <p:tav tm="0">
+                                          <p:val>
+                                            <p:strVal val="1+#ppt_w/2"/>
+                                          </p:val>
+                                        </p:tav>
+                                        <p:tav tm="100000">
+                                          <p:val>
+                                            <p:strVal val="#ppt_x"/>
+                                          </p:val>
+                                        </p:tav>
+                                      </p:tavLst>
+                                    </p:anim>
+                                    <p:anim calcmode="lin" valueType="num">
+                                      <p:cBhvr additive="base">
+                                        <p:cTn id="23" dur="500" fill="hold"/>
+                                        <p:tgtEl>
+                                          <p:spTgt spid="6"/>
+                                        </p:tgtEl>
+                                        <p:attrNameLst>
+                                          <p:attrName>ppt_y</p:attrName>
+                                        </p:attrNameLst>
+                                      </p:cBhvr>
+                                      <p:tavLst>
+                                        <p:tav tm="0">
+                                          <p:val>
+                                            <p:strVal val="#ppt_y"/>
+                                          </p:val>
+                                        </p:tav>
+                                        <p:tav tm="100000">
+                                          <p:val>
+                                            <p:strVal val="#ppt_y"/>
+                                          </p:val>
+                                        </p:tav>
+                                      </p:tavLst>
+                                    </p:anim>
+                                  </p:childTnLst>
+                                </p:cTn>
+                              </p:par>
+                            </p:childTnLst>
+                          </p:cTn>
+                        </p:par>
+                      </p:childTnLst>
+                    </p:cTn>
+                  </p:par>
+                  <p:par>
+                    <p:cTn id="24" fill="hold">
+                      <p:stCondLst>
+                        <p:cond delay="indefinite"/>
+                      </p:stCondLst>
+                      <p:childTnLst>
+                        <p:par>
+                          <p:cTn id="25" fill="hold">
+                            <p:stCondLst>
+                              <p:cond delay="0"/>
+                            </p:stCondLst>
+                            <p:childTnLst>
+                              <p:par>
+                                <p:cTn id="26" presetID="2" presetClass="exit" presetSubtype="8" fill="hold" grpId="1" nodeType="clickEffect">
+                                  <p:stCondLst>
+                                    <p:cond delay="0"/>
+                                  </p:stCondLst>
+                                  <p:childTnLst>
+                                    <p:anim calcmode="lin" valueType="num">
+                                      <p:cBhvr additive="base">
+                                        <p:cTn id="27" dur="500"/>
+                                        <p:tgtEl>
+                                          <p:spTgt spid="6"/>
+                                        </p:tgtEl>
+                                        <p:attrNameLst>
+                                          <p:attrName>ppt_x</p:attrName>
+                                        </p:attrNameLst>
+                                      </p:cBhvr>
+                                      <p:tavLst>
+                                        <p:tav tm="0">
+                                          <p:val>
+                                            <p:strVal val="ppt_x"/>
+                                          </p:val>
+                                        </p:tav>
+                                        <p:tav tm="100000">
+                                          <p:val>
+                                            <p:strVal val="0-ppt_w/2"/>
+                                          </p:val>
+                                        </p:tav>
+                                      </p:tavLst>
+                                    </p:anim>
+                                    <p:anim calcmode="lin" valueType="num">
+                                      <p:cBhvr additive="base">
+                                        <p:cTn id="28" dur="500"/>
+                                        <p:tgtEl>
+                                          <p:spTgt spid="6"/>
+                                        </p:tgtEl>
+                                        <p:attrNameLst>
+                                          <p:attrName>ppt_y</p:attrName>
+                                        </p:attrNameLst>
+                                      </p:cBhvr>
+                                      <p:tavLst>
+                                        <p:tav tm="0">
+                                          <p:val>
+                                            <p:strVal val="ppt_y"/>
+                                          </p:val>
+                                        </p:tav>
+                                        <p:tav tm="100000">
+                                          <p:val>
+                                            <p:strVal val="ppt_y"/>
+                                          </p:val>
+                                        </p:tav>
+                                      </p:tavLst>
+                                    </p:anim>
+                                    <p:set>
+                                      <p:cBhvr>
+                                        <p:cTn id="29" dur="1" fill="hold">
+                                          <p:stCondLst>
+                                            <p:cond delay="499"/>
+                                          </p:stCondLst>
+                                        </p:cTn>
+                                        <p:tgtEl>
+                                          <p:spTgt spid="6"/>
+                                        </p:tgtEl>
+                                        <p:attrNameLst>
+                                          <p:attrName>style.visibility</p:attrName>
+                                        </p:attrNameLst>
+                                      </p:cBhvr>
+                                      <p:to>
+                                        <p:strVal val="hidden"/>
+                                      </p:to>
+                                    </p:set>
+                                  </p:childTnLst>
+                                </p:cTn>
+                              </p:par>
+                              <p:par>
+                                <p:cTn id="30" presetID="2" presetClass="entr" presetSubtype="2" fill="hold" grpId="0" nodeType="withEffect">
+                                  <p:stCondLst>
+                                    <p:cond delay="0"/>
+                                  </p:stCondLst>
+                                  <p:childTnLst>
+                                    <p:set>
+                                      <p:cBhvr>
+                                        <p:cTn id="31" dur="1" fill="hold">
+                                          <p:stCondLst>
+                                            <p:cond delay="0"/>
+                                          </p:stCondLst>
+                                        </p:cTn>
+                                        <p:tgtEl>
+                                          <p:spTgt spid="7"/>
+                                        </p:tgtEl>
+                                        <p:attrNameLst>
+                                          <p:attrName>style.visibility</p:attrName>
+                                        </p:attrNameLst>
+                                      </p:cBhvr>
+                                      <p:to>
+                                        <p:strVal val="visible"/>
+                                      </p:to>
+                                    </p:set>
+                                    <p:anim calcmode="lin" valueType="num">
+                                      <p:cBhvr additive="base">
+                                        <p:cTn id="32" dur="500" fill="hold"/>
+                                        <p:tgtEl>
+                                          <p:spTgt spid="7"/>
+                                        </p:tgtEl>
+                                        <p:attrNameLst>
+                                          <p:attrName>ppt_x</p:attrName>
+                                        </p:attrNameLst>
+                                      </p:cBhvr>
+                                      <p:tavLst>
+                                        <p:tav tm="0">
+                                          <p:val>
+                                            <p:strVal val="1+#ppt_w/2"/>
+                                          </p:val>
+                                        </p:tav>
+                                        <p:tav tm="100000">
+                                          <p:val>
+                                            <p:strVal val="#ppt_x"/>
+                                          </p:val>
+                                        </p:tav>
+                                      </p:tavLst>
+                                    </p:anim>
+                                    <p:anim calcmode="lin" valueType="num">
+                                      <p:cBhvr additive="base">
+                                        <p:cTn id="33" dur="500" fill="hold"/>
+                                        <p:tgtEl>
+                                          <p:spTgt spid="7"/>
+                                        </p:tgtEl>
+                                        <p:attrNameLst>
+                                          <p:attrName>ppt_y</p:attrName>
+                                        </p:attrNameLst>
+                                      </p:cBhvr>
+                                      <p:tavLst>
+                                        <p:tav tm="0">
+                                          <p:val>
+                                            <p:strVal val="#ppt_y"/>
+                                          </p:val>
+                                        </p:tav>
+                                        <p:tav tm="100000">
+                                          <p:val>
+                                            <p:strVal val="#ppt_y"/>
+                                          </p:val>
+                                        </p:tav>
+                                      </p:tavLst>
+                                    </p:anim>
                                   </p:childTnLst>
                                 </p:cTn>
                               </p:par>
@@ -20512,7 +20928,11 @@
     </p:tnLst>
     <p:bldLst>
       <p:bldP spid="5" grpId="0"/>
+      <p:bldP spid="5" grpId="1"/>
       <p:bldP spid="3" grpId="0" animBg="1"/>
+      <p:bldP spid="6" grpId="0"/>
+      <p:bldP spid="6" grpId="1"/>
+      <p:bldP spid="7" grpId="0"/>
     </p:bldLst>
   </p:timing>
 </p:sld>
@@ -23288,7 +23708,7 @@
               </a14:hiddenLine>
             </a:ext>
             <a:ext uri="{FAA26D3D-D897-4be2-8F04-BA451C77F1D7}">
-              <ma14:placeholderFlag xmlns="" xmlns:ma14="http://schemas.microsoft.com/office/mac/drawingml/2011/main" val="1"/>
+              <ma14:placeholderFlag xmlns:ma14="http://schemas.microsoft.com/office/mac/drawingml/2011/main" xmlns="" val="1"/>
             </a:ext>
           </a:extLst>
         </p:spPr>
@@ -23579,7 +23999,7 @@
               </a14:hiddenLine>
             </a:ext>
             <a:ext uri="{FAA26D3D-D897-4be2-8F04-BA451C77F1D7}">
-              <ma14:placeholderFlag xmlns="" xmlns:ma14="http://schemas.microsoft.com/office/mac/drawingml/2011/main" val="1"/>
+              <ma14:placeholderFlag xmlns:ma14="http://schemas.microsoft.com/office/mac/drawingml/2011/main" xmlns="" val="1"/>
             </a:ext>
           </a:extLst>
         </p:spPr>
@@ -24174,7 +24594,7 @@
               </a14:hiddenLine>
             </a:ext>
             <a:ext uri="{FAA26D3D-D897-4be2-8F04-BA451C77F1D7}">
-              <ma14:placeholderFlag xmlns="" xmlns:ma14="http://schemas.microsoft.com/office/mac/drawingml/2011/main" val="1"/>
+              <ma14:placeholderFlag xmlns:ma14="http://schemas.microsoft.com/office/mac/drawingml/2011/main" xmlns="" val="1"/>
             </a:ext>
           </a:extLst>
         </p:spPr>
@@ -25080,12 +25500,8 @@
           <a:p>
             <a:pPr lvl="1"/>
             <a:r>
-              <a:rPr lang="en-US" dirty="0" smtClean="0"/>
-              <a:t>Um dos </a:t>
-            </a:r>
-            <a:r>
               <a:rPr lang="en-US" dirty="0" err="1" smtClean="0"/>
-              <a:t>mais</a:t>
+              <a:t>Bastante</a:t>
             </a:r>
             <a:r>
               <a:rPr lang="en-US" dirty="0" smtClean="0"/>
@@ -25093,7 +25509,7 @@
             </a:r>
             <a:r>
               <a:rPr lang="en-US" dirty="0" err="1" smtClean="0"/>
-              <a:t>utilizados</a:t>
+              <a:t>utilizado</a:t>
             </a:r>
             <a:endParaRPr lang="en-US" dirty="0" smtClean="0"/>
           </a:p>
@@ -25340,7 +25756,23 @@
             <a:pPr lvl="1"/>
             <a:r>
               <a:rPr lang="en-US" dirty="0" err="1" smtClean="0"/>
-              <a:t>Número</a:t>
+              <a:t>Realiza</a:t>
+            </a:r>
+            <a:r>
+              <a:rPr lang="en-US" dirty="0" smtClean="0"/>
+              <a:t> o </a:t>
+            </a:r>
+            <a:r>
+              <a:rPr lang="en-US" dirty="0" err="1" smtClean="0"/>
+              <a:t>reconhecimento</a:t>
+            </a:r>
+            <a:r>
+              <a:rPr lang="en-US" dirty="0" smtClean="0"/>
+              <a:t> com um </a:t>
+            </a:r>
+            <a:r>
+              <a:rPr lang="en-US" dirty="0" err="1" smtClean="0"/>
+              <a:t>número</a:t>
             </a:r>
             <a:r>
               <a:rPr lang="en-US" dirty="0" smtClean="0"/>

</xml_diff>

<commit_message>
últimas alterações solicitadas pelo fabricio
</commit_message>
<xml_diff>
--- a/apresentacao/ApresentacaoSBCUP.pptx
+++ b/apresentacao/ApresentacaoSBCUP.pptx
@@ -53,7 +53,7 @@
     <p:sldId id="291" r:id="rId44"/>
   </p:sldIdLst>
   <p:sldSz cx="9144000" cy="6858000" type="screen4x3"/>
-  <p:notesSz cx="6858000" cy="9144000"/>
+  <p:notesSz cx="7104063" cy="10234613"/>
   <p:defaultTextStyle>
     <a:defPPr>
       <a:defRPr lang="en-US"/>
@@ -973,7 +973,7 @@
       <dgm:spPr/>
     </dgm:pt>
     <dgm:pt modelId="{4F24481A-9494-445D-9762-D784843D2348}" type="pres">
-      <dgm:prSet presAssocID="{53F88B51-F804-4F7D-BEE3-5F6E30013F6E}" presName="parentText" presStyleLbl="node1" presStyleIdx="0" presStyleCnt="1" custScaleX="277778" custLinFactX="38889" custLinFactY="146615" custLinFactNeighborX="100000" custLinFactNeighborY="200000">
+      <dgm:prSet presAssocID="{53F88B51-F804-4F7D-BEE3-5F6E30013F6E}" presName="parentText" presStyleLbl="node1" presStyleIdx="0" presStyleCnt="1" custScaleX="277778" custLinFactNeighborX="136" custLinFactNeighborY="-50000">
         <dgm:presLayoutVars>
           <dgm:chMax val="1"/>
           <dgm:bulletEnabled val="1"/>
@@ -2397,17 +2397,17 @@
         <p:spPr>
           <a:xfrm>
             <a:off x="0" y="0"/>
-            <a:ext cx="2971800" cy="457200"/>
+            <a:ext cx="3078427" cy="511731"/>
           </a:xfrm>
           <a:prstGeom prst="rect">
             <a:avLst/>
           </a:prstGeom>
         </p:spPr>
         <p:txBody>
-          <a:bodyPr vert="horz" lIns="91440" tIns="45720" rIns="91440" bIns="45720" rtlCol="0"/>
+          <a:bodyPr vert="horz" lIns="99075" tIns="49538" rIns="99075" bIns="49538" rtlCol="0"/>
           <a:lstStyle>
             <a:lvl1pPr algn="l">
-              <a:defRPr sz="1200"/>
+              <a:defRPr sz="1300"/>
             </a:lvl1pPr>
           </a:lstStyle>
           <a:p>
@@ -2427,24 +2427,24 @@
         </p:nvSpPr>
         <p:spPr>
           <a:xfrm>
-            <a:off x="3884613" y="0"/>
-            <a:ext cx="2971800" cy="457200"/>
+            <a:off x="4023992" y="0"/>
+            <a:ext cx="3078427" cy="511731"/>
           </a:xfrm>
           <a:prstGeom prst="rect">
             <a:avLst/>
           </a:prstGeom>
         </p:spPr>
         <p:txBody>
-          <a:bodyPr vert="horz" lIns="91440" tIns="45720" rIns="91440" bIns="45720" rtlCol="0"/>
+          <a:bodyPr vert="horz" lIns="99075" tIns="49538" rIns="99075" bIns="49538" rtlCol="0"/>
           <a:lstStyle>
             <a:lvl1pPr algn="r">
-              <a:defRPr sz="1200"/>
+              <a:defRPr sz="1300"/>
             </a:lvl1pPr>
           </a:lstStyle>
           <a:p>
             <a:fld id="{5FD99E58-1C9B-E44B-8998-0A321153317B}" type="datetimeFigureOut">
               <a:rPr lang="en-US" smtClean="0"/>
-              <a:t>7/10/2012</a:t>
+              <a:t>7/14/2012</a:t>
             </a:fld>
             <a:endParaRPr lang="en-US"/>
           </a:p>
@@ -2462,8 +2462,8 @@
         </p:nvSpPr>
         <p:spPr>
           <a:xfrm>
-            <a:off x="1143000" y="685800"/>
-            <a:ext cx="4572000" cy="3429000"/>
+            <a:off x="995363" y="768350"/>
+            <a:ext cx="5113337" cy="3836988"/>
           </a:xfrm>
           <a:prstGeom prst="rect">
             <a:avLst/>
@@ -2476,7 +2476,7 @@
           </a:ln>
         </p:spPr>
         <p:txBody>
-          <a:bodyPr vert="horz" lIns="91440" tIns="45720" rIns="91440" bIns="45720" rtlCol="0" anchor="ctr"/>
+          <a:bodyPr vert="horz" lIns="99075" tIns="49538" rIns="99075" bIns="49538" rtlCol="0" anchor="ctr"/>
           <a:lstStyle/>
           <a:p>
             <a:endParaRPr lang="en-US"/>
@@ -2495,15 +2495,15 @@
         </p:nvSpPr>
         <p:spPr>
           <a:xfrm>
-            <a:off x="685800" y="4343400"/>
-            <a:ext cx="5486400" cy="4114800"/>
+            <a:off x="710407" y="4861441"/>
+            <a:ext cx="5683250" cy="4605576"/>
           </a:xfrm>
           <a:prstGeom prst="rect">
             <a:avLst/>
           </a:prstGeom>
         </p:spPr>
         <p:txBody>
-          <a:bodyPr vert="horz" lIns="91440" tIns="45720" rIns="91440" bIns="45720" rtlCol="0"/>
+          <a:bodyPr vert="horz" lIns="99075" tIns="49538" rIns="99075" bIns="49538" rtlCol="0"/>
           <a:lstStyle/>
           <a:p>
             <a:pPr lvl="0"/>
@@ -2555,18 +2555,18 @@
         </p:nvSpPr>
         <p:spPr>
           <a:xfrm>
-            <a:off x="0" y="8685213"/>
-            <a:ext cx="2971800" cy="457200"/>
+            <a:off x="0" y="9721106"/>
+            <a:ext cx="3078427" cy="511731"/>
           </a:xfrm>
           <a:prstGeom prst="rect">
             <a:avLst/>
           </a:prstGeom>
         </p:spPr>
         <p:txBody>
-          <a:bodyPr vert="horz" lIns="91440" tIns="45720" rIns="91440" bIns="45720" rtlCol="0" anchor="b"/>
+          <a:bodyPr vert="horz" lIns="99075" tIns="49538" rIns="99075" bIns="49538" rtlCol="0" anchor="b"/>
           <a:lstStyle>
             <a:lvl1pPr algn="l">
-              <a:defRPr sz="1200"/>
+              <a:defRPr sz="1300"/>
             </a:lvl1pPr>
           </a:lstStyle>
           <a:p>
@@ -2586,18 +2586,18 @@
         </p:nvSpPr>
         <p:spPr>
           <a:xfrm>
-            <a:off x="3884613" y="8685213"/>
-            <a:ext cx="2971800" cy="457200"/>
+            <a:off x="4023992" y="9721106"/>
+            <a:ext cx="3078427" cy="511731"/>
           </a:xfrm>
           <a:prstGeom prst="rect">
             <a:avLst/>
           </a:prstGeom>
         </p:spPr>
         <p:txBody>
-          <a:bodyPr vert="horz" lIns="91440" tIns="45720" rIns="91440" bIns="45720" rtlCol="0" anchor="b"/>
+          <a:bodyPr vert="horz" lIns="99075" tIns="49538" rIns="99075" bIns="49538" rtlCol="0" anchor="b"/>
           <a:lstStyle>
             <a:lvl1pPr algn="r">
-              <a:defRPr sz="1200"/>
+              <a:defRPr sz="1300"/>
             </a:lvl1pPr>
           </a:lstStyle>
           <a:p>
@@ -2880,7 +2880,16 @@
               <a:rPr lang="pt-BR" baseline="0" dirty="0" smtClean="0"/>
               <a:t>Etapas</a:t>
             </a:r>
-            <a:endParaRPr lang="pt-BR" dirty="0"/>
+          </a:p>
+          <a:p>
+            <a:pPr defTabSz="495376"/>
+            <a:r>
+              <a:rPr lang="pt-BR" sz="1300" dirty="0"/>
+              <a:t>Falar que o rastreamento é a continuidade da localização</a:t>
+            </a:r>
+          </a:p>
+          <a:p>
+            <a:endParaRPr lang="pt-BR" u="sng" dirty="0"/>
           </a:p>
         </p:txBody>
       </p:sp>
@@ -3696,21 +3705,7 @@
           <a:bodyPr/>
           <a:lstStyle/>
           <a:p>
-            <a:pPr marL="0" marR="0" indent="0" algn="l" defTabSz="457200" rtl="0" eaLnBrk="1" fontAlgn="auto" latinLnBrk="0" hangingPunct="1">
-              <a:lnSpc>
-                <a:spcPct val="100000"/>
-              </a:lnSpc>
-              <a:spcBef>
-                <a:spcPts val="0"/>
-              </a:spcBef>
-              <a:spcAft>
-                <a:spcPts val="0"/>
-              </a:spcAft>
-              <a:buClrTx/>
-              <a:buSzTx/>
-              <a:buFontTx/>
-              <a:buNone/>
-              <a:tabLst/>
+            <a:pPr defTabSz="495376">
               <a:defRPr/>
             </a:pPr>
             <a:r>
@@ -4224,67 +4219,34 @@
           <a:bodyPr/>
           <a:lstStyle/>
           <a:p>
-            <a:pPr marL="0" marR="0" indent="0" algn="l" defTabSz="457200" rtl="0" eaLnBrk="1" fontAlgn="auto" latinLnBrk="0" hangingPunct="1">
-              <a:lnSpc>
-                <a:spcPct val="100000"/>
-              </a:lnSpc>
-              <a:spcBef>
-                <a:spcPts val="0"/>
-              </a:spcBef>
-              <a:spcAft>
-                <a:spcPts val="0"/>
-              </a:spcAft>
-              <a:buClrTx/>
-              <a:buSzTx/>
-              <a:buFontTx/>
-              <a:buNone/>
-              <a:tabLst/>
+            <a:pPr defTabSz="495376">
               <a:defRPr/>
             </a:pPr>
             <a:r>
               <a:rPr lang="pt-BR" dirty="0" smtClean="0"/>
-              <a:t>Responsabilidade do modulo</a:t>
-            </a:r>
-          </a:p>
-          <a:p>
-            <a:pPr marL="0" marR="0" indent="0" algn="l" defTabSz="457200" rtl="0" eaLnBrk="1" fontAlgn="auto" latinLnBrk="0" hangingPunct="1">
-              <a:lnSpc>
-                <a:spcPct val="100000"/>
-              </a:lnSpc>
-              <a:spcBef>
-                <a:spcPts val="0"/>
-              </a:spcBef>
-              <a:spcAft>
-                <a:spcPts val="0"/>
-              </a:spcAft>
-              <a:buClrTx/>
-              <a:buSzTx/>
-              <a:buFontTx/>
-              <a:buNone/>
-              <a:tabLst/>
+              <a:t>Responsabilidade do </a:t>
+            </a:r>
+            <a:r>
+              <a:rPr lang="pt-BR" dirty="0" smtClean="0"/>
+              <a:t>modulo</a:t>
+            </a:r>
+          </a:p>
+          <a:p>
+            <a:pPr defTabSz="495376">
               <a:defRPr/>
             </a:pPr>
             <a:r>
               <a:rPr lang="pt-BR" dirty="0" smtClean="0"/>
-              <a:t>Driver</a:t>
-            </a:r>
-          </a:p>
-          <a:p>
-            <a:pPr marL="0" marR="0" indent="0" algn="l" defTabSz="457200" rtl="0" eaLnBrk="1" fontAlgn="auto" latinLnBrk="0" hangingPunct="1">
-              <a:lnSpc>
-                <a:spcPct val="100000"/>
-              </a:lnSpc>
-              <a:spcBef>
-                <a:spcPts val="0"/>
-              </a:spcBef>
-              <a:spcAft>
-                <a:spcPts val="0"/>
-              </a:spcAft>
-              <a:buClrTx/>
-              <a:buSzTx/>
-              <a:buFontTx/>
-              <a:buNone/>
-              <a:tabLst/>
+              <a:t>Driver - </a:t>
+            </a:r>
+            <a:r>
+              <a:rPr lang="pt-BR" sz="1300" dirty="0"/>
+              <a:t>Falar sobre o que é um driver</a:t>
+            </a:r>
+            <a:endParaRPr lang="pt-BR" dirty="0" smtClean="0"/>
+          </a:p>
+          <a:p>
+            <a:pPr defTabSz="495376">
               <a:defRPr/>
             </a:pPr>
             <a:r>
@@ -4784,13 +4746,34 @@
           <a:p>
             <a:r>
               <a:rPr lang="pt-BR" baseline="0" dirty="0" smtClean="0"/>
-              <a:t>Teste z</a:t>
-            </a:r>
-          </a:p>
-          <a:p>
+              <a:t>Teste </a:t>
+            </a:r>
             <a:r>
               <a:rPr lang="pt-BR" baseline="0" dirty="0" smtClean="0"/>
-              <a:t>Teste x</a:t>
+              <a:t>z</a:t>
+            </a:r>
+          </a:p>
+          <a:p>
+            <a:r>
+              <a:rPr lang="pt-BR" baseline="0" dirty="0" smtClean="0"/>
+              <a:t>Ranges 1 a 4 metros</a:t>
+            </a:r>
+            <a:endParaRPr lang="pt-BR" baseline="0" dirty="0" smtClean="0"/>
+          </a:p>
+          <a:p>
+            <a:r>
+              <a:rPr lang="pt-BR" baseline="0" dirty="0" smtClean="0"/>
+              <a:t>Teste </a:t>
+            </a:r>
+            <a:r>
+              <a:rPr lang="pt-BR" baseline="0" dirty="0" smtClean="0"/>
+              <a:t>x</a:t>
+            </a:r>
+          </a:p>
+          <a:p>
+            <a:r>
+              <a:rPr lang="pt-BR" baseline="0" dirty="0" smtClean="0"/>
+              <a:t>Ranges 1 metro para cada lado</a:t>
             </a:r>
             <a:endParaRPr lang="pt-BR" dirty="0"/>
           </a:p>
@@ -4980,18 +4963,18 @@
           <a:lstStyle/>
           <a:p>
             <a:r>
-              <a:rPr lang="pt-BR" dirty="0" smtClean="0"/>
-              <a:t>Ferramenta</a:t>
-            </a:r>
+              <a:rPr lang="pt-BR" sz="1300" dirty="0"/>
+              <a:t>"Para facilitar a visualização utilizamos uma matriz de confusão."</a:t>
+            </a:r>
+          </a:p>
+          <a:p>
             <a:r>
               <a:rPr lang="pt-BR" baseline="0" dirty="0" smtClean="0"/>
-              <a:t> necessária</a:t>
-            </a:r>
-          </a:p>
-          <a:p>
+              <a:t>Matriz </a:t>
+            </a:r>
             <a:r>
               <a:rPr lang="pt-BR" baseline="0" dirty="0" smtClean="0"/>
-              <a:t>Matriz de confusão</a:t>
+              <a:t>de confusão</a:t>
             </a:r>
           </a:p>
           <a:p>
@@ -5938,21 +5921,7 @@
             </a:r>
           </a:p>
           <a:p>
-            <a:pPr marL="0" marR="0" indent="0" algn="l" defTabSz="457200" rtl="0" eaLnBrk="1" fontAlgn="auto" latinLnBrk="0" hangingPunct="1">
-              <a:lnSpc>
-                <a:spcPct val="100000"/>
-              </a:lnSpc>
-              <a:spcBef>
-                <a:spcPts val="0"/>
-              </a:spcBef>
-              <a:spcAft>
-                <a:spcPts val="0"/>
-              </a:spcAft>
-              <a:buClrTx/>
-              <a:buSzTx/>
-              <a:buFontTx/>
-              <a:buNone/>
-              <a:tabLst/>
+            <a:pPr defTabSz="495376">
               <a:defRPr/>
             </a:pPr>
             <a:r>
@@ -6058,21 +6027,7 @@
             </a:r>
           </a:p>
           <a:p>
-            <a:pPr marL="0" marR="0" indent="0" algn="l" defTabSz="457200" rtl="0" eaLnBrk="1" fontAlgn="auto" latinLnBrk="0" hangingPunct="1">
-              <a:lnSpc>
-                <a:spcPct val="100000"/>
-              </a:lnSpc>
-              <a:spcBef>
-                <a:spcPts val="0"/>
-              </a:spcBef>
-              <a:spcAft>
-                <a:spcPts val="0"/>
-              </a:spcAft>
-              <a:buClrTx/>
-              <a:buSzTx/>
-              <a:buFontTx/>
-              <a:buNone/>
-              <a:tabLst/>
+            <a:pPr defTabSz="495376">
               <a:defRPr/>
             </a:pPr>
             <a:r>
@@ -6093,6 +6048,19 @@
               <a:rPr lang="pt-BR" dirty="0" smtClean="0"/>
               <a:t>Middleware</a:t>
             </a:r>
+          </a:p>
+          <a:p>
+            <a:endParaRPr lang="pt-BR" dirty="0" smtClean="0"/>
+          </a:p>
+          <a:p>
+            <a:pPr defTabSz="495376"/>
+            <a:r>
+              <a:rPr lang="pt-BR" sz="1300" dirty="0"/>
+              <a:t> "E o nosso objetivo é fornecer ambas as informações ao ambiente inteligente"</a:t>
+            </a:r>
+          </a:p>
+          <a:p>
+            <a:endParaRPr lang="pt-BR" u="sng" dirty="0" smtClean="0"/>
           </a:p>
         </p:txBody>
       </p:sp>
@@ -6208,7 +6176,28 @@
               <a:rPr lang="en-US" dirty="0" err="1" smtClean="0"/>
               <a:t>Etapas</a:t>
             </a:r>
-            <a:endParaRPr lang="pt-BR" dirty="0"/>
+            <a:endParaRPr lang="en-US" dirty="0" smtClean="0"/>
+          </a:p>
+          <a:p>
+            <a:endParaRPr lang="en-US" dirty="0" smtClean="0"/>
+          </a:p>
+          <a:p>
+            <a:pPr defTabSz="495376"/>
+            <a:r>
+              <a:rPr lang="pt-BR" sz="1300" dirty="0"/>
+              <a:t>"Antes de falar do sistema TRUE temos que conhecer algumas </a:t>
+            </a:r>
+            <a:r>
+              <a:rPr lang="pt-BR" sz="1300" dirty="0" err="1"/>
+              <a:t>tecnicas</a:t>
+            </a:r>
+            <a:r>
+              <a:rPr lang="pt-BR" sz="1300" dirty="0"/>
+              <a:t> que utilizamos para prover tais informações."</a:t>
+            </a:r>
+          </a:p>
+          <a:p>
+            <a:endParaRPr lang="pt-BR" u="sng" dirty="0"/>
           </a:p>
         </p:txBody>
       </p:sp>
@@ -7292,7 +7281,7 @@
           <a:p>
             <a:fld id="{7D290233-0DD1-4A80-BB1E-9ADC3556DBB6}" type="datetimeFigureOut">
               <a:rPr lang="en-US" smtClean="0"/>
-              <a:t>7/10/2012</a:t>
+              <a:t>7/14/2012</a:t>
             </a:fld>
             <a:endParaRPr lang="en-US"/>
           </a:p>
@@ -7488,7 +7477,7 @@
           <a:p>
             <a:fld id="{7D290233-0DD1-4A80-BB1E-9ADC3556DBB6}" type="datetimeFigureOut">
               <a:rPr lang="en-US" smtClean="0"/>
-              <a:t>7/10/2012</a:t>
+              <a:t>7/14/2012</a:t>
             </a:fld>
             <a:endParaRPr lang="en-US"/>
           </a:p>
@@ -7680,7 +7669,7 @@
           <a:p>
             <a:fld id="{7D290233-0DD1-4A80-BB1E-9ADC3556DBB6}" type="datetimeFigureOut">
               <a:rPr lang="en-US" smtClean="0"/>
-              <a:t>7/10/2012</a:t>
+              <a:t>7/14/2012</a:t>
             </a:fld>
             <a:endParaRPr lang="en-US"/>
           </a:p>
@@ -7862,7 +7851,7 @@
           <a:p>
             <a:fld id="{7D290233-0DD1-4A80-BB1E-9ADC3556DBB6}" type="datetimeFigureOut">
               <a:rPr lang="en-US" smtClean="0"/>
-              <a:t>7/10/2012</a:t>
+              <a:t>7/14/2012</a:t>
             </a:fld>
             <a:endParaRPr lang="en-US"/>
           </a:p>
@@ -8100,7 +8089,7 @@
           <a:p>
             <a:fld id="{7D290233-0DD1-4A80-BB1E-9ADC3556DBB6}" type="datetimeFigureOut">
               <a:rPr lang="en-US" smtClean="0"/>
-              <a:t>7/10/2012</a:t>
+              <a:t>7/14/2012</a:t>
             </a:fld>
             <a:endParaRPr lang="en-US"/>
           </a:p>
@@ -8376,7 +8365,7 @@
           <a:p>
             <a:fld id="{7D290233-0DD1-4A80-BB1E-9ADC3556DBB6}" type="datetimeFigureOut">
               <a:rPr lang="en-US" smtClean="0"/>
-              <a:t>7/10/2012</a:t>
+              <a:t>7/14/2012</a:t>
             </a:fld>
             <a:endParaRPr lang="en-US"/>
           </a:p>
@@ -8797,7 +8786,7 @@
           <a:p>
             <a:fld id="{7D290233-0DD1-4A80-BB1E-9ADC3556DBB6}" type="datetimeFigureOut">
               <a:rPr lang="en-US" smtClean="0"/>
-              <a:t>7/10/2012</a:t>
+              <a:t>7/14/2012</a:t>
             </a:fld>
             <a:endParaRPr lang="en-US"/>
           </a:p>
@@ -8945,7 +8934,7 @@
           <a:p>
             <a:fld id="{7D290233-0DD1-4A80-BB1E-9ADC3556DBB6}" type="datetimeFigureOut">
               <a:rPr lang="en-US" smtClean="0"/>
-              <a:t>7/10/2012</a:t>
+              <a:t>7/14/2012</a:t>
             </a:fld>
             <a:endParaRPr lang="en-US"/>
           </a:p>
@@ -9052,7 +9041,7 @@
           <a:p>
             <a:fld id="{7D290233-0DD1-4A80-BB1E-9ADC3556DBB6}" type="datetimeFigureOut">
               <a:rPr lang="en-US" smtClean="0"/>
-              <a:t>7/10/2012</a:t>
+              <a:t>7/14/2012</a:t>
             </a:fld>
             <a:endParaRPr lang="en-US"/>
           </a:p>
@@ -9314,7 +9303,7 @@
           <a:p>
             <a:fld id="{7D290233-0DD1-4A80-BB1E-9ADC3556DBB6}" type="datetimeFigureOut">
               <a:rPr lang="en-US" smtClean="0"/>
-              <a:t>7/10/2012</a:t>
+              <a:t>7/14/2012</a:t>
             </a:fld>
             <a:endParaRPr lang="en-US"/>
           </a:p>
@@ -9578,7 +9567,7 @@
           <a:p>
             <a:fld id="{7D290233-0DD1-4A80-BB1E-9ADC3556DBB6}" type="datetimeFigureOut">
               <a:rPr lang="en-US" smtClean="0"/>
-              <a:t>7/10/2012</a:t>
+              <a:t>7/14/2012</a:t>
             </a:fld>
             <a:endParaRPr lang="en-US"/>
           </a:p>
@@ -10568,7 +10557,7 @@
           <a:p>
             <a:fld id="{7D290233-0DD1-4A80-BB1E-9ADC3556DBB6}" type="datetimeFigureOut">
               <a:rPr lang="en-US" smtClean="0"/>
-              <a:t>7/10/2012</a:t>
+              <a:t>7/14/2012</a:t>
             </a:fld>
             <a:endParaRPr lang="en-US"/>
           </a:p>
@@ -11487,7 +11476,7 @@
         </p:blipFill>
         <p:spPr bwMode="auto">
           <a:xfrm>
-            <a:off x="3491547" y="2947021"/>
+            <a:off x="1633395" y="4886677"/>
             <a:ext cx="5639807" cy="1870344"/>
           </a:xfrm>
           <a:prstGeom prst="rect">
@@ -11549,7 +11538,7 @@
         </p:nvSpPr>
         <p:spPr>
           <a:xfrm>
-            <a:off x="3606149" y="2252780"/>
+            <a:off x="3495504" y="1676400"/>
             <a:ext cx="1915593" cy="914400"/>
           </a:xfrm>
           <a:prstGeom prst="roundRect">
@@ -11591,7 +11580,7 @@
         </p:nvSpPr>
         <p:spPr>
           <a:xfrm>
-            <a:off x="708617" y="4360165"/>
+            <a:off x="597972" y="3783785"/>
             <a:ext cx="1915593" cy="914400"/>
           </a:xfrm>
           <a:prstGeom prst="roundRect">
@@ -11637,7 +11626,7 @@
         </p:nvSpPr>
         <p:spPr>
           <a:xfrm>
-            <a:off x="3606148" y="4360165"/>
+            <a:off x="3495503" y="3783785"/>
             <a:ext cx="1915593" cy="914400"/>
           </a:xfrm>
           <a:prstGeom prst="roundRect">
@@ -11687,7 +11676,7 @@
         </p:nvSpPr>
         <p:spPr>
           <a:xfrm>
-            <a:off x="6678696" y="4360165"/>
+            <a:off x="6568051" y="3783785"/>
             <a:ext cx="1915593" cy="914400"/>
           </a:xfrm>
           <a:prstGeom prst="roundRect">
@@ -11729,7 +11718,7 @@
         </p:nvSpPr>
         <p:spPr>
           <a:xfrm rot="8550772">
-            <a:off x="2114084" y="3625618"/>
+            <a:off x="2003439" y="3049238"/>
             <a:ext cx="1585223" cy="231767"/>
           </a:xfrm>
           <a:prstGeom prst="rightArrow">
@@ -11770,7 +11759,7 @@
         </p:nvSpPr>
         <p:spPr>
           <a:xfrm rot="2616808">
-            <a:off x="5382924" y="3681934"/>
+            <a:off x="5272279" y="3105554"/>
             <a:ext cx="1585223" cy="231767"/>
           </a:xfrm>
           <a:prstGeom prst="rightArrow">
@@ -11811,7 +11800,7 @@
         </p:nvSpPr>
         <p:spPr>
           <a:xfrm rot="5400000">
-            <a:off x="4058838" y="3680930"/>
+            <a:off x="3948193" y="3104550"/>
             <a:ext cx="1015455" cy="231767"/>
           </a:xfrm>
           <a:prstGeom prst="rightArrow">
@@ -12071,7 +12060,7 @@
                                     <p:cond delay="250"/>
                                   </p:stCondLst>
                                   <p:childTnLst>
-                                    <p:animMotion origin="layout" path="M -1.94444E-6 3.7037E-6 L -0.33541 3.7037E-6 " pathEditMode="relative" rAng="0" ptsTypes="AA">
+                                    <p:animMotion origin="layout" path="M 8.33333E-7 2.96296E-6 L -0.33524 0.09004 " pathEditMode="relative" rAng="0" ptsTypes="AA">
                                       <p:cBhvr>
                                         <p:cTn id="22" dur="2000" fill="hold"/>
                                         <p:tgtEl>
@@ -12082,7 +12071,7 @@
                                           <p:attrName>ppt_y</p:attrName>
                                         </p:attrNameLst>
                                       </p:cBhvr>
-                                      <p:rCtr x="-16771" y="0"/>
+                                      <p:rCtr x="-16771" y="4491"/>
                                     </p:animMotion>
                                   </p:childTnLst>
                                 </p:cTn>
@@ -12093,7 +12082,7 @@
                                     <p:cond delay="250"/>
                                   </p:stCondLst>
                                   <p:childTnLst>
-                                    <p:animMotion origin="layout" path="M -1.94444E-6 1.11111E-6 L -0.33541 1.11111E-6 " pathEditMode="relative" rAng="0" ptsTypes="AA">
+                                    <p:animMotion origin="layout" path="M 8.33333E-7 -1.11111E-6 L -0.33524 0.08611 " pathEditMode="relative" rAng="0" ptsTypes="AA">
                                       <p:cBhvr>
                                         <p:cTn id="24" dur="2000" fill="hold"/>
                                         <p:tgtEl>
@@ -12104,7 +12093,7 @@
                                           <p:attrName>ppt_y</p:attrName>
                                         </p:attrNameLst>
                                       </p:cBhvr>
-                                      <p:rCtr x="-16771" y="0"/>
+                                      <p:rCtr x="-16771" y="4306"/>
                                     </p:animMotion>
                                   </p:childTnLst>
                                 </p:cTn>
@@ -12115,7 +12104,7 @@
                                     <p:cond delay="250"/>
                                   </p:stCondLst>
                                   <p:childTnLst>
-                                    <p:animMotion origin="layout" path="M 4.44444E-6 -3.7037E-6 L -0.33559 -3.7037E-6 " pathEditMode="relative" rAng="0" ptsTypes="AA">
+                                    <p:animMotion origin="layout" path="M 3.61111E-6 4.07407E-6 L -0.33559 0.08588 " pathEditMode="relative" rAng="0" ptsTypes="AA">
                                       <p:cBhvr>
                                         <p:cTn id="26" dur="2000" fill="hold"/>
                                         <p:tgtEl>
@@ -12126,7 +12115,7 @@
                                           <p:attrName>ppt_y</p:attrName>
                                         </p:attrNameLst>
                                       </p:cBhvr>
-                                      <p:rCtr x="-16788" y="0"/>
+                                      <p:rCtr x="-16788" y="4282"/>
                                     </p:animMotion>
                                   </p:childTnLst>
                                 </p:cTn>
@@ -12163,6 +12152,28 @@
                                         </p:tgtEl>
                                       </p:cBhvr>
                                     </p:animEffect>
+                                  </p:childTnLst>
+                                </p:cTn>
+                              </p:par>
+                              <p:par>
+                                <p:cTn id="30" presetID="42" presetClass="path" presetSubtype="0" accel="50000" decel="50000" fill="hold" nodeType="withEffect">
+                                  <p:stCondLst>
+                                    <p:cond delay="500"/>
+                                  </p:stCondLst>
+                                  <p:childTnLst>
+                                    <p:animMotion origin="layout" path="M 8.33333E-7 -2.59259E-6 L 0.1776 -0.29328 " pathEditMode="relative" rAng="0" ptsTypes="AA">
+                                      <p:cBhvr>
+                                        <p:cTn id="31" dur="2000" fill="hold"/>
+                                        <p:tgtEl>
+                                          <p:spTgt spid="4098"/>
+                                        </p:tgtEl>
+                                        <p:attrNameLst>
+                                          <p:attrName>ppt_x</p:attrName>
+                                          <p:attrName>ppt_y</p:attrName>
+                                        </p:attrNameLst>
+                                      </p:cBhvr>
+                                      <p:rCtr x="8872" y="-14676"/>
+                                    </p:animMotion>
                                   </p:childTnLst>
                                 </p:cTn>
                               </p:par>
@@ -12245,7 +12256,7 @@
         </p:blipFill>
         <p:spPr bwMode="auto">
           <a:xfrm>
-            <a:off x="2713578" y="2885243"/>
+            <a:off x="1432769" y="4889969"/>
             <a:ext cx="6306464" cy="1890426"/>
           </a:xfrm>
           <a:prstGeom prst="rect">
@@ -12299,7 +12310,7 @@
         </p:nvSpPr>
         <p:spPr>
           <a:xfrm>
-            <a:off x="797985" y="4535428"/>
+            <a:off x="612169" y="3783785"/>
             <a:ext cx="1915593" cy="914400"/>
           </a:xfrm>
           <a:prstGeom prst="roundRect">
@@ -12341,7 +12352,7 @@
         </p:nvSpPr>
         <p:spPr>
           <a:xfrm>
-            <a:off x="3695516" y="4535428"/>
+            <a:off x="3509700" y="3783785"/>
             <a:ext cx="1915593" cy="914400"/>
           </a:xfrm>
           <a:prstGeom prst="roundRect">
@@ -12383,7 +12394,7 @@
         </p:nvSpPr>
         <p:spPr>
           <a:xfrm>
-            <a:off x="6768064" y="4535428"/>
+            <a:off x="6582248" y="3783785"/>
             <a:ext cx="1915593" cy="914400"/>
           </a:xfrm>
           <a:prstGeom prst="roundRect">
@@ -12425,7 +12436,7 @@
         </p:nvSpPr>
         <p:spPr>
           <a:xfrm rot="8550772">
-            <a:off x="2203452" y="3800881"/>
+            <a:off x="2017636" y="3049238"/>
             <a:ext cx="1585223" cy="231767"/>
           </a:xfrm>
           <a:prstGeom prst="rightArrow">
@@ -12466,7 +12477,7 @@
         </p:nvSpPr>
         <p:spPr>
           <a:xfrm rot="2616808">
-            <a:off x="5472292" y="3857197"/>
+            <a:off x="5286476" y="3105554"/>
             <a:ext cx="1585223" cy="231767"/>
           </a:xfrm>
           <a:prstGeom prst="rightArrow">
@@ -12507,7 +12518,7 @@
         </p:nvSpPr>
         <p:spPr>
           <a:xfrm rot="5400000">
-            <a:off x="4148206" y="3867476"/>
+            <a:off x="3962390" y="3115833"/>
             <a:ext cx="1015455" cy="231767"/>
           </a:xfrm>
           <a:prstGeom prst="rightArrow">
@@ -12548,7 +12559,7 @@
         </p:nvSpPr>
         <p:spPr>
           <a:xfrm>
-            <a:off x="3695517" y="2428043"/>
+            <a:off x="3509701" y="1676400"/>
             <a:ext cx="2039469" cy="914400"/>
           </a:xfrm>
           <a:prstGeom prst="roundRect">
@@ -12804,14 +12815,58 @@
                                 </p:cTn>
                               </p:par>
                               <p:par>
-                                <p:cTn id="21" presetID="57" presetClass="path" presetSubtype="0" accel="50000" decel="50000" fill="hold" grpId="0" nodeType="withEffect">
+                                <p:cTn id="21" presetID="42" presetClass="path" presetSubtype="0" accel="50000" decel="50000" fill="hold" grpId="0" nodeType="withEffect">
                                   <p:stCondLst>
                                     <p:cond delay="250"/>
                                   </p:stCondLst>
                                   <p:childTnLst>
-                                    <p:animMotion origin="layout" path="M -4.16667E-6 7.40741E-7 L -4.16667E-6 0.00301 C -4.16667E-6 0.0044 -0.09375 0.00625 -0.16961 0.00625 L -0.33923 0.00625 " pathEditMode="relative" rAng="0" ptsTypes="FfFF">
+                                    <p:animMotion origin="layout" path="M -4.16667E-6 4.44444E-6 L -0.37135 0.08055 " pathEditMode="relative" rAng="0" ptsTypes="AA">
                                       <p:cBhvr>
                                         <p:cTn id="22" dur="2000" fill="hold"/>
+                                        <p:tgtEl>
+                                          <p:spTgt spid="5"/>
+                                        </p:tgtEl>
+                                        <p:attrNameLst>
+                                          <p:attrName>ppt_x</p:attrName>
+                                          <p:attrName>ppt_y</p:attrName>
+                                        </p:attrNameLst>
+                                      </p:cBhvr>
+                                      <p:rCtr x="-18576" y="4028"/>
+                                    </p:animMotion>
+                                  </p:childTnLst>
+                                </p:cTn>
+                              </p:par>
+                              <p:par>
+                                <p:cTn id="23" presetID="42" presetClass="path" presetSubtype="0" accel="50000" decel="50000" fill="hold" grpId="0" nodeType="withEffect">
+                                  <p:stCondLst>
+                                    <p:cond delay="250"/>
+                                  </p:stCondLst>
+                                  <p:childTnLst>
+                                    <p:animMotion origin="layout" path="M -5.55556E-7 -7.40741E-7 L -0.36493 0.1 " pathEditMode="relative" rAng="0" ptsTypes="AA">
+                                      <p:cBhvr>
+                                        <p:cTn id="24" dur="2000" fill="hold"/>
+                                        <p:tgtEl>
+                                          <p:spTgt spid="11"/>
+                                        </p:tgtEl>
+                                        <p:attrNameLst>
+                                          <p:attrName>ppt_x</p:attrName>
+                                          <p:attrName>ppt_y</p:attrName>
+                                        </p:attrNameLst>
+                                      </p:cBhvr>
+                                      <p:rCtr x="-18247" y="5000"/>
+                                    </p:animMotion>
+                                  </p:childTnLst>
+                                </p:cTn>
+                              </p:par>
+                              <p:par>
+                                <p:cTn id="25" presetID="42" presetClass="path" presetSubtype="0" accel="50000" decel="50000" fill="hold" grpId="3" nodeType="withEffect">
+                                  <p:stCondLst>
+                                    <p:cond delay="250"/>
+                                  </p:stCondLst>
+                                  <p:childTnLst>
+                                    <p:animMotion origin="layout" path="M -3.33333E-6 -1.48148E-6 L -0.36458 0.10394 " pathEditMode="relative" rAng="0" ptsTypes="AA">
+                                      <p:cBhvr>
+                                        <p:cTn id="26" dur="2000" fill="hold"/>
                                         <p:tgtEl>
                                           <p:spTgt spid="7"/>
                                         </p:tgtEl>
@@ -12820,51 +12875,7 @@
                                           <p:attrName>ppt_y</p:attrName>
                                         </p:attrNameLst>
                                       </p:cBhvr>
-                                      <p:rCtr x="-16962" y="301"/>
-                                    </p:animMotion>
-                                  </p:childTnLst>
-                                </p:cTn>
-                              </p:par>
-                              <p:par>
-                                <p:cTn id="23" presetID="57" presetClass="path" presetSubtype="0" accel="50000" decel="50000" fill="hold" grpId="0" nodeType="withEffect">
-                                  <p:stCondLst>
-                                    <p:cond delay="250"/>
-                                  </p:stCondLst>
-                                  <p:childTnLst>
-                                    <p:animMotion origin="layout" path="M 5E-6 -1.85185E-6 L 5E-6 -0.00324 C 5E-6 -0.00463 -0.09549 -0.00625 -0.17327 -0.00625 L -0.34601 -0.00625 " pathEditMode="relative" rAng="0" ptsTypes="FfFF">
-                                      <p:cBhvr>
-                                        <p:cTn id="24" dur="2000" fill="hold"/>
-                                        <p:tgtEl>
-                                          <p:spTgt spid="5"/>
-                                        </p:tgtEl>
-                                        <p:attrNameLst>
-                                          <p:attrName>ppt_x</p:attrName>
-                                          <p:attrName>ppt_y</p:attrName>
-                                        </p:attrNameLst>
-                                      </p:cBhvr>
-                                      <p:rCtr x="-17309" y="-324"/>
-                                    </p:animMotion>
-                                  </p:childTnLst>
-                                </p:cTn>
-                              </p:par>
-                              <p:par>
-                                <p:cTn id="25" presetID="57" presetClass="path" presetSubtype="0" accel="50000" decel="50000" fill="hold" grpId="0" nodeType="withEffect">
-                                  <p:stCondLst>
-                                    <p:cond delay="250"/>
-                                  </p:stCondLst>
-                                  <p:childTnLst>
-                                    <p:animMotion origin="layout" path="M -1.38889E-6 2.96296E-6 L -1.38889E-6 -0.00324 C -1.38889E-6 -0.00463 -0.09375 -0.00625 -0.16979 -0.00625 L -0.33958 -0.00625 " pathEditMode="relative" rAng="0" ptsTypes="FfFF">
-                                      <p:cBhvr>
-                                        <p:cTn id="26" dur="2000" fill="hold"/>
-                                        <p:tgtEl>
-                                          <p:spTgt spid="11"/>
-                                        </p:tgtEl>
-                                        <p:attrNameLst>
-                                          <p:attrName>ppt_x</p:attrName>
-                                          <p:attrName>ppt_y</p:attrName>
-                                        </p:attrNameLst>
-                                      </p:cBhvr>
-                                      <p:rCtr x="-16979" y="-324"/>
+                                      <p:rCtr x="-18229" y="5185"/>
                                     </p:animMotion>
                                   </p:childTnLst>
                                 </p:cTn>
@@ -12904,6 +12915,28 @@
                                   </p:childTnLst>
                                 </p:cTn>
                               </p:par>
+                              <p:par>
+                                <p:cTn id="30" presetID="42" presetClass="path" presetSubtype="0" accel="50000" decel="50000" fill="hold" nodeType="withEffect">
+                                  <p:stCondLst>
+                                    <p:cond delay="500"/>
+                                  </p:stCondLst>
+                                  <p:childTnLst>
+                                    <p:animMotion origin="layout" path="M -2.5E-6 -4.44444E-6 L 0.1007 -0.27939 " pathEditMode="relative" rAng="0" ptsTypes="AA">
+                                      <p:cBhvr>
+                                        <p:cTn id="31" dur="2000" fill="hold"/>
+                                        <p:tgtEl>
+                                          <p:spTgt spid="5122"/>
+                                        </p:tgtEl>
+                                        <p:attrNameLst>
+                                          <p:attrName>ppt_x</p:attrName>
+                                          <p:attrName>ppt_y</p:attrName>
+                                        </p:attrNameLst>
+                                      </p:cBhvr>
+                                      <p:rCtr x="5035" y="-13981"/>
+                                    </p:animMotion>
+                                  </p:childTnLst>
+                                </p:cTn>
+                              </p:par>
                             </p:childTnLst>
                           </p:cTn>
                         </p:par>
@@ -12933,8 +12966,8 @@
     </p:tnLst>
     <p:bldLst>
       <p:bldP spid="6" grpId="0" animBg="1"/>
-      <p:bldP spid="7" grpId="0" animBg="1"/>
       <p:bldP spid="7" grpId="2" animBg="1"/>
+      <p:bldP spid="7" grpId="3" animBg="1"/>
       <p:bldP spid="8" grpId="0" animBg="1"/>
       <p:bldP spid="9" grpId="0" animBg="1"/>
       <p:bldP spid="10" grpId="0" animBg="1"/>
@@ -13039,6 +13072,31 @@
           </a:extLst>
         </p:spPr>
       </p:pic>
+      <p:pic>
+        <p:nvPicPr>
+          <p:cNvPr id="4" name="Picture 2" descr="I:\Nova pasta\Sem-Título-1.gif"/>
+          <p:cNvPicPr>
+            <a:picLocks noChangeAspect="1" noChangeArrowheads="1"/>
+          </p:cNvPicPr>
+          <p:nvPr/>
+        </p:nvPicPr>
+        <p:blipFill>
+          <a:blip r:embed="rId4" cstate="print"/>
+          <a:stretch>
+            <a:fillRect/>
+          </a:stretch>
+        </p:blipFill>
+        <p:spPr bwMode="auto">
+          <a:xfrm>
+            <a:off x="8526682" y="3608668"/>
+            <a:ext cx="527265" cy="474464"/>
+          </a:xfrm>
+          <a:prstGeom prst="rect">
+            <a:avLst/>
+          </a:prstGeom>
+          <a:noFill/>
+        </p:spPr>
+      </p:pic>
     </p:spTree>
     <p:extLst>
       <p:ext uri="{BB962C8B-B14F-4D97-AF65-F5344CB8AC3E}">
@@ -13052,7 +13110,86 @@
   <p:timing>
     <p:tnLst>
       <p:par>
-        <p:cTn id="1" dur="indefinite" restart="never" nodeType="tmRoot"/>
+        <p:cTn id="1" dur="indefinite" restart="never" nodeType="tmRoot">
+          <p:childTnLst>
+            <p:seq concurrent="1" nextAc="seek">
+              <p:cTn id="2" dur="indefinite" nodeType="mainSeq">
+                <p:childTnLst>
+                  <p:par>
+                    <p:cTn id="3" fill="hold">
+                      <p:stCondLst>
+                        <p:cond delay="indefinite"/>
+                        <p:cond evt="onBegin" delay="0">
+                          <p:tn val="2"/>
+                        </p:cond>
+                      </p:stCondLst>
+                      <p:childTnLst>
+                        <p:par>
+                          <p:cTn id="4" fill="hold">
+                            <p:stCondLst>
+                              <p:cond delay="0"/>
+                            </p:stCondLst>
+                            <p:childTnLst>
+                              <p:par>
+                                <p:cTn id="5" presetID="10" presetClass="entr" presetSubtype="0" fill="hold" nodeType="withEffect">
+                                  <p:stCondLst>
+                                    <p:cond delay="0"/>
+                                  </p:stCondLst>
+                                  <p:childTnLst>
+                                    <p:set>
+                                      <p:cBhvr>
+                                        <p:cTn id="6" dur="1" fill="hold">
+                                          <p:stCondLst>
+                                            <p:cond delay="0"/>
+                                          </p:stCondLst>
+                                        </p:cTn>
+                                        <p:tgtEl>
+                                          <p:spTgt spid="4"/>
+                                        </p:tgtEl>
+                                        <p:attrNameLst>
+                                          <p:attrName>style.visibility</p:attrName>
+                                        </p:attrNameLst>
+                                      </p:cBhvr>
+                                      <p:to>
+                                        <p:strVal val="visible"/>
+                                      </p:to>
+                                    </p:set>
+                                    <p:animEffect transition="in" filter="fade">
+                                      <p:cBhvr>
+                                        <p:cTn id="7" dur="500"/>
+                                        <p:tgtEl>
+                                          <p:spTgt spid="4"/>
+                                        </p:tgtEl>
+                                      </p:cBhvr>
+                                    </p:animEffect>
+                                  </p:childTnLst>
+                                </p:cTn>
+                              </p:par>
+                            </p:childTnLst>
+                          </p:cTn>
+                        </p:par>
+                      </p:childTnLst>
+                    </p:cTn>
+                  </p:par>
+                </p:childTnLst>
+              </p:cTn>
+              <p:prevCondLst>
+                <p:cond evt="onPrev" delay="0">
+                  <p:tgtEl>
+                    <p:sldTgt/>
+                  </p:tgtEl>
+                </p:cond>
+              </p:prevCondLst>
+              <p:nextCondLst>
+                <p:cond evt="onNext" delay="0">
+                  <p:tgtEl>
+                    <p:sldTgt/>
+                  </p:tgtEl>
+                </p:cond>
+              </p:nextCondLst>
+            </p:seq>
+          </p:childTnLst>
+        </p:cTn>
       </p:par>
     </p:tnLst>
   </p:timing>
@@ -13189,6 +13326,31 @@
           </a:p>
         </p:txBody>
       </p:sp>
+      <p:pic>
+        <p:nvPicPr>
+          <p:cNvPr id="5" name="Picture 2" descr="I:\Nova pasta\Sem-Título-1.gif"/>
+          <p:cNvPicPr>
+            <a:picLocks noChangeAspect="1" noChangeArrowheads="1"/>
+          </p:cNvPicPr>
+          <p:nvPr/>
+        </p:nvPicPr>
+        <p:blipFill>
+          <a:blip r:embed="rId4" cstate="print"/>
+          <a:stretch>
+            <a:fillRect/>
+          </a:stretch>
+        </p:blipFill>
+        <p:spPr bwMode="auto">
+          <a:xfrm>
+            <a:off x="8526682" y="3608668"/>
+            <a:ext cx="527265" cy="474464"/>
+          </a:xfrm>
+          <a:prstGeom prst="rect">
+            <a:avLst/>
+          </a:prstGeom>
+          <a:noFill/>
+        </p:spPr>
+      </p:pic>
     </p:spTree>
     <p:extLst>
       <p:ext uri="{BB962C8B-B14F-4D97-AF65-F5344CB8AC3E}">
@@ -13332,6 +13494,41 @@
                                   </p:childTnLst>
                                 </p:cTn>
                               </p:par>
+                              <p:par>
+                                <p:cTn id="14" presetID="10" presetClass="entr" presetSubtype="0" fill="hold" nodeType="withEffect">
+                                  <p:stCondLst>
+                                    <p:cond delay="0"/>
+                                  </p:stCondLst>
+                                  <p:childTnLst>
+                                    <p:set>
+                                      <p:cBhvr>
+                                        <p:cTn id="15" dur="1" fill="hold">
+                                          <p:stCondLst>
+                                            <p:cond delay="0"/>
+                                          </p:stCondLst>
+                                        </p:cTn>
+                                        <p:tgtEl>
+                                          <p:spTgt spid="5"/>
+                                        </p:tgtEl>
+                                        <p:attrNameLst>
+                                          <p:attrName>style.visibility</p:attrName>
+                                        </p:attrNameLst>
+                                      </p:cBhvr>
+                                      <p:to>
+                                        <p:strVal val="visible"/>
+                                      </p:to>
+                                    </p:set>
+                                    <p:animEffect transition="in" filter="fade">
+                                      <p:cBhvr>
+                                        <p:cTn id="16" dur="500"/>
+                                        <p:tgtEl>
+                                          <p:spTgt spid="5"/>
+                                        </p:tgtEl>
+                                      </p:cBhvr>
+                                    </p:animEffect>
+                                  </p:childTnLst>
+                                </p:cTn>
+                              </p:par>
                             </p:childTnLst>
                           </p:cTn>
                         </p:par>
@@ -13450,7 +13647,7 @@
         </p:nvSpPr>
         <p:spPr>
           <a:xfrm>
-            <a:off x="10077447" y="3259626"/>
+            <a:off x="-6976839" y="1764806"/>
             <a:ext cx="6046848" cy="1569660"/>
           </a:xfrm>
           <a:prstGeom prst="rect">
@@ -13656,6 +13853,31 @@
           </a:p>
         </p:txBody>
       </p:sp>
+      <p:pic>
+        <p:nvPicPr>
+          <p:cNvPr id="6" name="Picture 2" descr="I:\Nova pasta\Sem-Título-1.gif"/>
+          <p:cNvPicPr>
+            <a:picLocks noChangeAspect="1" noChangeArrowheads="1"/>
+          </p:cNvPicPr>
+          <p:nvPr/>
+        </p:nvPicPr>
+        <p:blipFill>
+          <a:blip r:embed="rId4" cstate="print"/>
+          <a:stretch>
+            <a:fillRect/>
+          </a:stretch>
+        </p:blipFill>
+        <p:spPr bwMode="auto">
+          <a:xfrm>
+            <a:off x="8526682" y="3608668"/>
+            <a:ext cx="527265" cy="474464"/>
+          </a:xfrm>
+          <a:prstGeom prst="rect">
+            <a:avLst/>
+          </a:prstGeom>
+          <a:noFill/>
+        </p:spPr>
+      </p:pic>
     </p:spTree>
     <p:extLst>
       <p:ext uri="{BB962C8B-B14F-4D97-AF65-F5344CB8AC3E}">
@@ -13799,6 +14021,41 @@
                                   </p:childTnLst>
                                 </p:cTn>
                               </p:par>
+                              <p:par>
+                                <p:cTn id="14" presetID="10" presetClass="entr" presetSubtype="0" fill="hold" nodeType="withEffect">
+                                  <p:stCondLst>
+                                    <p:cond delay="0"/>
+                                  </p:stCondLst>
+                                  <p:childTnLst>
+                                    <p:set>
+                                      <p:cBhvr>
+                                        <p:cTn id="15" dur="1" fill="hold">
+                                          <p:stCondLst>
+                                            <p:cond delay="0"/>
+                                          </p:stCondLst>
+                                        </p:cTn>
+                                        <p:tgtEl>
+                                          <p:spTgt spid="6"/>
+                                        </p:tgtEl>
+                                        <p:attrNameLst>
+                                          <p:attrName>style.visibility</p:attrName>
+                                        </p:attrNameLst>
+                                      </p:cBhvr>
+                                      <p:to>
+                                        <p:strVal val="visible"/>
+                                      </p:to>
+                                    </p:set>
+                                    <p:animEffect transition="in" filter="fade">
+                                      <p:cBhvr>
+                                        <p:cTn id="16" dur="500"/>
+                                        <p:tgtEl>
+                                          <p:spTgt spid="6"/>
+                                        </p:tgtEl>
+                                      </p:cBhvr>
+                                    </p:animEffect>
+                                  </p:childTnLst>
+                                </p:cTn>
+                              </p:par>
                             </p:childTnLst>
                           </p:cTn>
                         </p:par>
@@ -14259,6 +14516,31 @@
           </a:p>
         </p:txBody>
       </p:sp>
+      <p:pic>
+        <p:nvPicPr>
+          <p:cNvPr id="5" name="Picture 2" descr="I:\Nova pasta\Sem-Título-1.gif"/>
+          <p:cNvPicPr>
+            <a:picLocks noChangeAspect="1" noChangeArrowheads="1"/>
+          </p:cNvPicPr>
+          <p:nvPr/>
+        </p:nvPicPr>
+        <p:blipFill>
+          <a:blip r:embed="rId4" cstate="print"/>
+          <a:stretch>
+            <a:fillRect/>
+          </a:stretch>
+        </p:blipFill>
+        <p:spPr bwMode="auto">
+          <a:xfrm>
+            <a:off x="8526682" y="3608668"/>
+            <a:ext cx="527265" cy="474464"/>
+          </a:xfrm>
+          <a:prstGeom prst="rect">
+            <a:avLst/>
+          </a:prstGeom>
+          <a:noFill/>
+        </p:spPr>
+      </p:pic>
     </p:spTree>
     <p:extLst>
       <p:ext uri="{BB962C8B-B14F-4D97-AF65-F5344CB8AC3E}">
@@ -14402,6 +14684,41 @@
                                   </p:childTnLst>
                                 </p:cTn>
                               </p:par>
+                              <p:par>
+                                <p:cTn id="14" presetID="10" presetClass="entr" presetSubtype="0" fill="hold" nodeType="withEffect">
+                                  <p:stCondLst>
+                                    <p:cond delay="0"/>
+                                  </p:stCondLst>
+                                  <p:childTnLst>
+                                    <p:set>
+                                      <p:cBhvr>
+                                        <p:cTn id="15" dur="1" fill="hold">
+                                          <p:stCondLst>
+                                            <p:cond delay="0"/>
+                                          </p:stCondLst>
+                                        </p:cTn>
+                                        <p:tgtEl>
+                                          <p:spTgt spid="5"/>
+                                        </p:tgtEl>
+                                        <p:attrNameLst>
+                                          <p:attrName>style.visibility</p:attrName>
+                                        </p:attrNameLst>
+                                      </p:cBhvr>
+                                      <p:to>
+                                        <p:strVal val="visible"/>
+                                      </p:to>
+                                    </p:set>
+                                    <p:animEffect transition="in" filter="fade">
+                                      <p:cBhvr>
+                                        <p:cTn id="16" dur="500"/>
+                                        <p:tgtEl>
+                                          <p:spTgt spid="5"/>
+                                        </p:tgtEl>
+                                      </p:cBhvr>
+                                    </p:animEffect>
+                                  </p:childTnLst>
+                                </p:cTn>
+                              </p:par>
                             </p:childTnLst>
                           </p:cTn>
                         </p:par>
@@ -14510,11 +14827,7 @@
             </a:pPr>
             <a:r>
               <a:rPr lang="pt-BR" sz="2400" dirty="0" smtClean="0"/>
-              <a:t>Pré-processamento </a:t>
-            </a:r>
-            <a:r>
-              <a:rPr lang="pt-BR" sz="2400" dirty="0" smtClean="0"/>
-              <a:t>da imagem</a:t>
+              <a:t>Pré-processamento da imagem</a:t>
             </a:r>
           </a:p>
           <a:p>
@@ -14524,13 +14837,8 @@
             </a:pPr>
             <a:r>
               <a:rPr lang="pt-BR" sz="2400" dirty="0" smtClean="0"/>
-              <a:t>Detecção </a:t>
-            </a:r>
-            <a:r>
-              <a:rPr lang="pt-BR" sz="2400" dirty="0" smtClean="0"/>
-              <a:t>facial</a:t>
-            </a:r>
-            <a:endParaRPr lang="pt-BR" sz="2400" dirty="0" smtClean="0"/>
+              <a:t>Detecção facial</a:t>
+            </a:r>
           </a:p>
           <a:p>
             <a:pPr marL="457200" indent="-457200">
@@ -15764,6 +16072,31 @@
           </a:p>
         </p:txBody>
       </p:sp>
+      <p:pic>
+        <p:nvPicPr>
+          <p:cNvPr id="5" name="Picture 2" descr="I:\Nova pasta\Sem-Título-1.gif"/>
+          <p:cNvPicPr>
+            <a:picLocks noChangeAspect="1" noChangeArrowheads="1"/>
+          </p:cNvPicPr>
+          <p:nvPr/>
+        </p:nvPicPr>
+        <p:blipFill>
+          <a:blip r:embed="rId4" cstate="print"/>
+          <a:stretch>
+            <a:fillRect/>
+          </a:stretch>
+        </p:blipFill>
+        <p:spPr bwMode="auto">
+          <a:xfrm>
+            <a:off x="8526682" y="3608668"/>
+            <a:ext cx="527265" cy="474464"/>
+          </a:xfrm>
+          <a:prstGeom prst="rect">
+            <a:avLst/>
+          </a:prstGeom>
+          <a:noFill/>
+        </p:spPr>
+      </p:pic>
     </p:spTree>
     <p:extLst>
       <p:ext uri="{BB962C8B-B14F-4D97-AF65-F5344CB8AC3E}">
@@ -15907,6 +16240,41 @@
                                   </p:childTnLst>
                                 </p:cTn>
                               </p:par>
+                              <p:par>
+                                <p:cTn id="14" presetID="10" presetClass="entr" presetSubtype="0" fill="hold" nodeType="withEffect">
+                                  <p:stCondLst>
+                                    <p:cond delay="0"/>
+                                  </p:stCondLst>
+                                  <p:childTnLst>
+                                    <p:set>
+                                      <p:cBhvr>
+                                        <p:cTn id="15" dur="1" fill="hold">
+                                          <p:stCondLst>
+                                            <p:cond delay="0"/>
+                                          </p:stCondLst>
+                                        </p:cTn>
+                                        <p:tgtEl>
+                                          <p:spTgt spid="5"/>
+                                        </p:tgtEl>
+                                        <p:attrNameLst>
+                                          <p:attrName>style.visibility</p:attrName>
+                                        </p:attrNameLst>
+                                      </p:cBhvr>
+                                      <p:to>
+                                        <p:strVal val="visible"/>
+                                      </p:to>
+                                    </p:set>
+                                    <p:animEffect transition="in" filter="fade">
+                                      <p:cBhvr>
+                                        <p:cTn id="16" dur="500"/>
+                                        <p:tgtEl>
+                                          <p:spTgt spid="5"/>
+                                        </p:tgtEl>
+                                      </p:cBhvr>
+                                    </p:animEffect>
+                                  </p:childTnLst>
+                                </p:cTn>
+                              </p:par>
                             </p:childTnLst>
                           </p:cTn>
                         </p:par>
@@ -15989,7 +16357,7 @@
       </p:sp>
       <p:pic>
         <p:nvPicPr>
-          <p:cNvPr id="1027" name="Picture 3" descr="C:\Users\Tales\Documents\GitHub\Projeto-Final\figuras\1.Introducao\dsoa.jpg"/>
+          <p:cNvPr id="1026" name="Picture 2" descr="C:\Users\Tales\Downloads\uOS_arc_rev.png"/>
           <p:cNvPicPr>
             <a:picLocks noChangeAspect="1" noChangeArrowheads="1"/>
           </p:cNvPicPr>
@@ -16010,8 +16378,8 @@
         </p:blipFill>
         <p:spPr bwMode="auto">
           <a:xfrm>
-            <a:off x="2192629" y="2152734"/>
-            <a:ext cx="4302264" cy="4227945"/>
+            <a:off x="2247899" y="1764805"/>
+            <a:ext cx="4443413" cy="4763839"/>
           </a:xfrm>
           <a:prstGeom prst="rect">
             <a:avLst/>
@@ -16109,54 +16477,6 @@
           </a:p>
         </p:txBody>
       </p:sp>
-      <p:sp>
-        <p:nvSpPr>
-          <p:cNvPr id="3" name="Content Placeholder 2"/>
-          <p:cNvSpPr>
-            <a:spLocks noGrp="1"/>
-          </p:cNvSpPr>
-          <p:nvPr>
-            <p:ph idx="1"/>
-          </p:nvPr>
-        </p:nvSpPr>
-        <p:spPr>
-          <a:xfrm>
-            <a:off x="457200" y="1981200"/>
-            <a:ext cx="3905380" cy="4592638"/>
-          </a:xfrm>
-        </p:spPr>
-        <p:txBody>
-          <a:bodyPr/>
-          <a:lstStyle/>
-          <a:p>
-            <a:r>
-              <a:rPr lang="en-US" dirty="0" err="1" smtClean="0"/>
-              <a:t>Rastreamento</a:t>
-            </a:r>
-            <a:endParaRPr lang="en-US" dirty="0" smtClean="0"/>
-          </a:p>
-          <a:p>
-            <a:r>
-              <a:rPr lang="en-US" dirty="0" err="1" smtClean="0"/>
-              <a:t>Localização</a:t>
-            </a:r>
-            <a:endParaRPr lang="en-US" dirty="0" smtClean="0"/>
-          </a:p>
-          <a:p>
-            <a:r>
-              <a:rPr lang="en-US" dirty="0" err="1" smtClean="0"/>
-              <a:t>Identificação</a:t>
-            </a:r>
-            <a:endParaRPr lang="en-US" dirty="0" smtClean="0"/>
-          </a:p>
-          <a:p>
-            <a:pPr marL="109537" indent="0">
-              <a:buNone/>
-            </a:pPr>
-            <a:endParaRPr lang="en-US" dirty="0"/>
-          </a:p>
-        </p:txBody>
-      </p:sp>
       <p:pic>
         <p:nvPicPr>
           <p:cNvPr id="4" name="Picture 3" descr="laico.png"/>
@@ -16179,8 +16499,8 @@
         </p:blipFill>
         <p:spPr>
           <a:xfrm>
-            <a:off x="4362580" y="1616022"/>
-            <a:ext cx="4324220" cy="3607251"/>
+            <a:off x="1755577" y="1985354"/>
+            <a:ext cx="5295900" cy="4417823"/>
           </a:xfrm>
           <a:prstGeom prst="rect">
             <a:avLst/>
@@ -16195,7 +16515,7 @@
         </p:nvSpPr>
         <p:spPr>
           <a:xfrm>
-            <a:off x="5159572" y="5223273"/>
+            <a:off x="3038409" y="6384127"/>
             <a:ext cx="2730235" cy="369332"/>
           </a:xfrm>
           <a:prstGeom prst="rect">
@@ -18196,7 +18516,7 @@
       </p:sp>
       <p:pic>
         <p:nvPicPr>
-          <p:cNvPr id="1027" name="Picture 3" descr="C:\Users\Tales\Documents\GitHub\Projeto-Final\figuras\5.Testes\grafico-eixo-z.png"/>
+          <p:cNvPr id="1027" name="Picture 3"/>
           <p:cNvPicPr>
             <a:picLocks noChangeAspect="1" noChangeArrowheads="1"/>
           </p:cNvPicPr>
@@ -18210,15 +18530,14 @@
               </a:ext>
             </a:extLst>
           </a:blip>
-          <a:srcRect/>
           <a:stretch>
             <a:fillRect/>
           </a:stretch>
         </p:blipFill>
         <p:spPr bwMode="auto">
           <a:xfrm>
-            <a:off x="-1" y="1838743"/>
-            <a:ext cx="4593437" cy="3474919"/>
+            <a:off x="125015" y="2405813"/>
+            <a:ext cx="4343401" cy="2609652"/>
           </a:xfrm>
           <a:prstGeom prst="rect">
             <a:avLst/>
@@ -18237,7 +18556,7 @@
       </p:pic>
       <p:pic>
         <p:nvPicPr>
-          <p:cNvPr id="1026" name="Picture 2" descr="C:\Users\Tales\Documents\GitHub\Projeto-Final\figuras\5.Testes\grafico-eixo-x.png"/>
+          <p:cNvPr id="1026" name="Picture 2"/>
           <p:cNvPicPr>
             <a:picLocks noChangeAspect="1" noChangeArrowheads="1"/>
           </p:cNvPicPr>
@@ -18251,15 +18570,14 @@
               </a:ext>
             </a:extLst>
           </a:blip>
-          <a:srcRect/>
           <a:stretch>
             <a:fillRect/>
           </a:stretch>
         </p:blipFill>
         <p:spPr bwMode="auto">
           <a:xfrm>
-            <a:off x="4593435" y="1842782"/>
-            <a:ext cx="4550563" cy="3350950"/>
+            <a:off x="4661659" y="2407320"/>
+            <a:ext cx="4302729" cy="2608146"/>
           </a:xfrm>
           <a:prstGeom prst="rect">
             <a:avLst/>
@@ -18284,8 +18602,8 @@
         </p:nvSpPr>
         <p:spPr>
           <a:xfrm>
-            <a:off x="5716598" y="5355973"/>
-            <a:ext cx="2395360" cy="307777"/>
+            <a:off x="5366022" y="5358900"/>
+            <a:ext cx="2894002" cy="369332"/>
           </a:xfrm>
           <a:prstGeom prst="rect">
             <a:avLst/>
@@ -18299,7 +18617,7 @@
           <a:lstStyle/>
           <a:p>
             <a:r>
-              <a:rPr lang="pt-BR" sz="1400" b="1" dirty="0" smtClean="0">
+              <a:rPr lang="pt-BR" b="1" dirty="0" smtClean="0">
                 <a:solidFill>
                   <a:schemeClr val="tx1">
                     <a:lumMod val="75000"/>
@@ -18311,7 +18629,7 @@
               </a:rPr>
               <a:t>Erro: (27,19mm, 79,29mm)</a:t>
             </a:r>
-            <a:endParaRPr lang="pt-BR" sz="1400" b="1" dirty="0">
+            <a:endParaRPr lang="pt-BR" b="1" dirty="0">
               <a:solidFill>
                 <a:schemeClr val="tx1">
                   <a:lumMod val="75000"/>
@@ -18332,8 +18650,8 @@
         </p:nvSpPr>
         <p:spPr>
           <a:xfrm>
-            <a:off x="1100799" y="5355975"/>
-            <a:ext cx="2391835" cy="307776"/>
+            <a:off x="849515" y="5358900"/>
+            <a:ext cx="2894400" cy="369332"/>
           </a:xfrm>
           <a:prstGeom prst="rect">
             <a:avLst/>
@@ -18347,7 +18665,7 @@
           <a:lstStyle/>
           <a:p>
             <a:r>
-              <a:rPr lang="pt-BR" sz="1400" b="1" dirty="0" smtClean="0">
+              <a:rPr lang="pt-BR" b="1" dirty="0" smtClean="0">
                 <a:solidFill>
                   <a:schemeClr val="tx1">
                     <a:lumMod val="75000"/>
@@ -18360,7 +18678,7 @@
               <a:t>Erro: (</a:t>
             </a:r>
             <a:r>
-              <a:rPr lang="pt-BR" sz="1400" b="1" dirty="0">
+              <a:rPr lang="pt-BR" b="1" dirty="0">
                 <a:solidFill>
                   <a:schemeClr val="tx1">
                     <a:lumMod val="75000"/>
@@ -18373,7 +18691,7 @@
               <a:t>3,21mm, 111,75mm</a:t>
             </a:r>
             <a:r>
-              <a:rPr lang="pt-BR" sz="1400" b="1" dirty="0" smtClean="0">
+              <a:rPr lang="pt-BR" b="1" dirty="0" smtClean="0">
                 <a:solidFill>
                   <a:schemeClr val="tx1">
                     <a:lumMod val="75000"/>
@@ -18385,7 +18703,7 @@
               </a:rPr>
               <a:t>)</a:t>
             </a:r>
-            <a:endParaRPr lang="pt-BR" sz="1400" b="1" dirty="0">
+            <a:endParaRPr lang="pt-BR" b="1" dirty="0">
               <a:solidFill>
                 <a:schemeClr val="tx1">
                   <a:lumMod val="75000"/>
@@ -18405,7 +18723,7 @@
           <p:nvPr>
             <p:extLst>
               <p:ext uri="{D42A27DB-BD31-4B8C-83A1-F6EECF244321}">
-                <p14:modId xmlns:p14="http://schemas.microsoft.com/office/powerpoint/2010/main" val="3950899193"/>
+                <p14:modId xmlns:p14="http://schemas.microsoft.com/office/powerpoint/2010/main" val="3886117378"/>
               </p:ext>
             </p:extLst>
           </p:nvPr>
@@ -18428,10 +18746,10 @@
         </p:nvGrpSpPr>
         <p:grpSpPr>
           <a:xfrm>
-            <a:off x="5593478" y="1960330"/>
-            <a:ext cx="2641600" cy="307777"/>
-            <a:chOff x="1066" y="0"/>
-            <a:chExt cx="2183343" cy="307777"/>
+            <a:off x="5450683" y="1990233"/>
+            <a:ext cx="2724678" cy="307777"/>
+            <a:chOff x="-82624" y="15024"/>
+            <a:chExt cx="2252009" cy="307777"/>
           </a:xfrm>
         </p:grpSpPr>
         <p:sp>
@@ -18442,7 +18760,7 @@
           </p:nvSpPr>
           <p:spPr>
             <a:xfrm>
-              <a:off x="1066" y="0"/>
+              <a:off x="-82624" y="15024"/>
               <a:ext cx="2183343" cy="307777"/>
             </a:xfrm>
             <a:prstGeom prst="roundRect">
@@ -18641,7 +18959,7 @@
         </p:nvSpPr>
         <p:spPr>
           <a:xfrm>
-            <a:off x="3281689" y="5108155"/>
+            <a:off x="3281689" y="4844923"/>
             <a:ext cx="2569934" cy="923330"/>
           </a:xfrm>
           <a:prstGeom prst="rect">
@@ -18742,7 +19060,7 @@
         </p:nvSpPr>
         <p:spPr>
           <a:xfrm>
-            <a:off x="3281689" y="5398921"/>
+            <a:off x="3281689" y="5811402"/>
             <a:ext cx="2569934" cy="369332"/>
           </a:xfrm>
           <a:prstGeom prst="rect">
@@ -18773,7 +19091,7 @@
         </p:nvSpPr>
         <p:spPr>
           <a:xfrm>
-            <a:off x="3281689" y="5398921"/>
+            <a:off x="3281689" y="6240355"/>
             <a:ext cx="2569934" cy="369332"/>
           </a:xfrm>
           <a:prstGeom prst="rect">
@@ -19500,8 +19818,8 @@
         </p:nvSpPr>
         <p:spPr>
           <a:xfrm>
-            <a:off x="3239410" y="3021681"/>
-            <a:ext cx="1715008" cy="472806"/>
+            <a:off x="3275879" y="3637182"/>
+            <a:ext cx="1728000" cy="468000"/>
           </a:xfrm>
           <a:prstGeom prst="roundRect">
             <a:avLst/>
@@ -19542,8 +19860,8 @@
         </p:nvSpPr>
         <p:spPr>
           <a:xfrm>
-            <a:off x="3239410" y="3606512"/>
-            <a:ext cx="1715008" cy="946745"/>
+            <a:off x="3275879" y="4274873"/>
+            <a:ext cx="1728000" cy="468000"/>
           </a:xfrm>
           <a:prstGeom prst="roundRect">
             <a:avLst/>
@@ -19570,7 +19888,7 @@
             <a:pPr algn="ctr"/>
             <a:r>
               <a:rPr lang="pt-BR" dirty="0" smtClean="0"/>
-              <a:t>Frequência de entrada e saída</a:t>
+              <a:t>Frequência</a:t>
             </a:r>
             <a:endParaRPr lang="pt-BR" dirty="0"/>
           </a:p>
@@ -19584,8 +19902,8 @@
         </p:nvSpPr>
         <p:spPr>
           <a:xfrm>
-            <a:off x="3239410" y="5170324"/>
-            <a:ext cx="1715008" cy="472806"/>
+            <a:off x="3275879" y="5538022"/>
+            <a:ext cx="1728000" cy="468000"/>
           </a:xfrm>
           <a:prstGeom prst="roundRect">
             <a:avLst/>
@@ -19626,8 +19944,8 @@
         </p:nvSpPr>
         <p:spPr>
           <a:xfrm>
-            <a:off x="3239410" y="4604246"/>
-            <a:ext cx="1715008" cy="472806"/>
+            <a:off x="3275879" y="4910535"/>
+            <a:ext cx="1728000" cy="468000"/>
           </a:xfrm>
           <a:prstGeom prst="roundRect">
             <a:avLst/>
@@ -19655,48 +19973,6 @@
             <a:r>
               <a:rPr lang="pt-BR" dirty="0" smtClean="0"/>
               <a:t>Onde estão?</a:t>
-            </a:r>
-            <a:endParaRPr lang="pt-BR" dirty="0"/>
-          </a:p>
-        </p:txBody>
-      </p:sp>
-      <p:sp>
-        <p:nvSpPr>
-          <p:cNvPr id="13" name="Rounded Rectangle 12"/>
-          <p:cNvSpPr/>
-          <p:nvPr/>
-        </p:nvSpPr>
-        <p:spPr>
-          <a:xfrm>
-            <a:off x="3239410" y="5722392"/>
-            <a:ext cx="1715008" cy="472806"/>
-          </a:xfrm>
-          <a:prstGeom prst="roundRect">
-            <a:avLst/>
-          </a:prstGeom>
-        </p:spPr>
-        <p:style>
-          <a:lnRef idx="1">
-            <a:schemeClr val="accent1"/>
-          </a:lnRef>
-          <a:fillRef idx="3">
-            <a:schemeClr val="accent1"/>
-          </a:fillRef>
-          <a:effectRef idx="2">
-            <a:schemeClr val="accent1"/>
-          </a:effectRef>
-          <a:fontRef idx="minor">
-            <a:schemeClr val="lt1"/>
-          </a:fontRef>
-        </p:style>
-        <p:txBody>
-          <a:bodyPr rtlCol="0" anchor="ctr"/>
-          <a:lstStyle/>
-          <a:p>
-            <a:pPr algn="ctr"/>
-            <a:r>
-              <a:rPr lang="pt-BR" dirty="0" smtClean="0"/>
-              <a:t>O que estão fazendo?</a:t>
             </a:r>
             <a:endParaRPr lang="pt-BR" dirty="0"/>
           </a:p>
@@ -19752,7 +20028,7 @@
         </p:nvSpPr>
         <p:spPr>
           <a:xfrm>
-            <a:off x="380838" y="4715400"/>
+            <a:off x="574758" y="4637521"/>
             <a:ext cx="1715008" cy="472806"/>
           </a:xfrm>
           <a:prstGeom prst="roundRect">
@@ -19788,54 +20064,13 @@
       </p:sp>
       <p:sp>
         <p:nvSpPr>
-          <p:cNvPr id="18" name="Right Arrow 17"/>
-          <p:cNvSpPr/>
-          <p:nvPr/>
-        </p:nvSpPr>
-        <p:spPr>
-          <a:xfrm rot="18419709">
-            <a:off x="1935703" y="3791099"/>
-            <a:ext cx="1356375" cy="275323"/>
-          </a:xfrm>
-          <a:prstGeom prst="rightArrow">
-            <a:avLst>
-              <a:gd name="adj1" fmla="val 27045"/>
-              <a:gd name="adj2" fmla="val 69491"/>
-            </a:avLst>
-          </a:prstGeom>
-        </p:spPr>
-        <p:style>
-          <a:lnRef idx="1">
-            <a:schemeClr val="accent1"/>
-          </a:lnRef>
-          <a:fillRef idx="3">
-            <a:schemeClr val="accent1"/>
-          </a:fillRef>
-          <a:effectRef idx="2">
-            <a:schemeClr val="accent1"/>
-          </a:effectRef>
-          <a:fontRef idx="minor">
-            <a:schemeClr val="lt1"/>
-          </a:fontRef>
-        </p:style>
-        <p:txBody>
-          <a:bodyPr rtlCol="0" anchor="ctr"/>
-          <a:lstStyle/>
-          <a:p>
-            <a:pPr algn="ctr"/>
-            <a:endParaRPr lang="pt-BR"/>
-          </a:p>
-        </p:txBody>
-      </p:sp>
-      <p:sp>
-        <p:nvSpPr>
           <p:cNvPr id="19" name="Right Arrow 18"/>
           <p:cNvSpPr/>
           <p:nvPr/>
         </p:nvSpPr>
         <p:spPr>
           <a:xfrm rot="19588835">
-            <a:off x="2286614" y="4388856"/>
+            <a:off x="2323083" y="4073085"/>
             <a:ext cx="952144" cy="275323"/>
           </a:xfrm>
           <a:prstGeom prst="rightArrow">
@@ -19875,8 +20110,8 @@
           <p:nvPr/>
         </p:nvSpPr>
         <p:spPr>
-          <a:xfrm rot="20737042">
-            <a:off x="2477314" y="4790167"/>
+          <a:xfrm rot="20760000">
+            <a:off x="2513783" y="4474396"/>
             <a:ext cx="711238" cy="275323"/>
           </a:xfrm>
           <a:prstGeom prst="rightArrow">
@@ -19916,9 +20151,9 @@
           <p:nvPr/>
         </p:nvSpPr>
         <p:spPr>
-          <a:xfrm rot="853244">
-            <a:off x="2402223" y="5221516"/>
-            <a:ext cx="620570" cy="275323"/>
+          <a:xfrm rot="960000">
+            <a:off x="2495409" y="4931748"/>
+            <a:ext cx="712800" cy="275323"/>
           </a:xfrm>
           <a:prstGeom prst="rightArrow">
             <a:avLst>
@@ -19957,9 +20192,9 @@
           <p:nvPr/>
         </p:nvSpPr>
         <p:spPr>
-          <a:xfrm rot="1230793">
-            <a:off x="2275060" y="5584730"/>
-            <a:ext cx="835113" cy="275323"/>
+          <a:xfrm rot="2040000">
+            <a:off x="2353429" y="5322165"/>
+            <a:ext cx="954000" cy="275323"/>
           </a:xfrm>
           <a:prstGeom prst="rightArrow">
             <a:avLst>
@@ -20178,7 +20413,7 @@
                                           </p:stCondLst>
                                         </p:cTn>
                                         <p:tgtEl>
-                                          <p:spTgt spid="18"/>
+                                          <p:spTgt spid="9"/>
                                         </p:tgtEl>
                                         <p:attrNameLst>
                                           <p:attrName>style.visibility</p:attrName>
@@ -20192,7 +20427,7 @@
                                       <p:cBhvr>
                                         <p:cTn id="19" dur="500"/>
                                         <p:tgtEl>
-                                          <p:spTgt spid="18"/>
+                                          <p:spTgt spid="9"/>
                                         </p:tgtEl>
                                       </p:cBhvr>
                                     </p:animEffect>
@@ -20213,7 +20448,7 @@
                                           </p:stCondLst>
                                         </p:cTn>
                                         <p:tgtEl>
-                                          <p:spTgt spid="9"/>
+                                          <p:spTgt spid="19"/>
                                         </p:tgtEl>
                                         <p:attrNameLst>
                                           <p:attrName>style.visibility</p:attrName>
@@ -20227,7 +20462,7 @@
                                       <p:cBhvr>
                                         <p:cTn id="22" dur="500"/>
                                         <p:tgtEl>
-                                          <p:spTgt spid="9"/>
+                                          <p:spTgt spid="19"/>
                                         </p:tgtEl>
                                       </p:cBhvr>
                                     </p:animEffect>
@@ -20248,7 +20483,7 @@
                                           </p:stCondLst>
                                         </p:cTn>
                                         <p:tgtEl>
-                                          <p:spTgt spid="19"/>
+                                          <p:spTgt spid="10"/>
                                         </p:tgtEl>
                                         <p:attrNameLst>
                                           <p:attrName>style.visibility</p:attrName>
@@ -20262,7 +20497,7 @@
                                       <p:cBhvr>
                                         <p:cTn id="25" dur="500"/>
                                         <p:tgtEl>
-                                          <p:spTgt spid="19"/>
+                                          <p:spTgt spid="10"/>
                                         </p:tgtEl>
                                       </p:cBhvr>
                                     </p:animEffect>
@@ -20283,7 +20518,7 @@
                                           </p:stCondLst>
                                         </p:cTn>
                                         <p:tgtEl>
-                                          <p:spTgt spid="10"/>
+                                          <p:spTgt spid="20"/>
                                         </p:tgtEl>
                                         <p:attrNameLst>
                                           <p:attrName>style.visibility</p:attrName>
@@ -20297,7 +20532,7 @@
                                       <p:cBhvr>
                                         <p:cTn id="28" dur="500"/>
                                         <p:tgtEl>
-                                          <p:spTgt spid="10"/>
+                                          <p:spTgt spid="20"/>
                                         </p:tgtEl>
                                       </p:cBhvr>
                                     </p:animEffect>
@@ -20318,7 +20553,7 @@
                                           </p:stCondLst>
                                         </p:cTn>
                                         <p:tgtEl>
-                                          <p:spTgt spid="20"/>
+                                          <p:spTgt spid="12"/>
                                         </p:tgtEl>
                                         <p:attrNameLst>
                                           <p:attrName>style.visibility</p:attrName>
@@ -20332,7 +20567,7 @@
                                       <p:cBhvr>
                                         <p:cTn id="31" dur="500"/>
                                         <p:tgtEl>
-                                          <p:spTgt spid="20"/>
+                                          <p:spTgt spid="12"/>
                                         </p:tgtEl>
                                       </p:cBhvr>
                                     </p:animEffect>
@@ -20353,7 +20588,7 @@
                                           </p:stCondLst>
                                         </p:cTn>
                                         <p:tgtEl>
-                                          <p:spTgt spid="12"/>
+                                          <p:spTgt spid="21"/>
                                         </p:tgtEl>
                                         <p:attrNameLst>
                                           <p:attrName>style.visibility</p:attrName>
@@ -20367,7 +20602,7 @@
                                       <p:cBhvr>
                                         <p:cTn id="34" dur="500"/>
                                         <p:tgtEl>
-                                          <p:spTgt spid="12"/>
+                                          <p:spTgt spid="21"/>
                                         </p:tgtEl>
                                       </p:cBhvr>
                                     </p:animEffect>
@@ -20388,7 +20623,7 @@
                                           </p:stCondLst>
                                         </p:cTn>
                                         <p:tgtEl>
-                                          <p:spTgt spid="21"/>
+                                          <p:spTgt spid="11"/>
                                         </p:tgtEl>
                                         <p:attrNameLst>
                                           <p:attrName>style.visibility</p:attrName>
@@ -20402,7 +20637,7 @@
                                       <p:cBhvr>
                                         <p:cTn id="37" dur="500"/>
                                         <p:tgtEl>
-                                          <p:spTgt spid="21"/>
+                                          <p:spTgt spid="11"/>
                                         </p:tgtEl>
                                       </p:cBhvr>
                                     </p:animEffect>
@@ -20423,7 +20658,7 @@
                                           </p:stCondLst>
                                         </p:cTn>
                                         <p:tgtEl>
-                                          <p:spTgt spid="11"/>
+                                          <p:spTgt spid="22"/>
                                         </p:tgtEl>
                                         <p:attrNameLst>
                                           <p:attrName>style.visibility</p:attrName>
@@ -20437,77 +20672,7 @@
                                       <p:cBhvr>
                                         <p:cTn id="40" dur="500"/>
                                         <p:tgtEl>
-                                          <p:spTgt spid="11"/>
-                                        </p:tgtEl>
-                                      </p:cBhvr>
-                                    </p:animEffect>
-                                  </p:childTnLst>
-                                </p:cTn>
-                              </p:par>
-                              <p:par>
-                                <p:cTn id="41" presetID="10" presetClass="entr" presetSubtype="0" fill="hold" grpId="0" nodeType="withEffect">
-                                  <p:stCondLst>
-                                    <p:cond delay="0"/>
-                                  </p:stCondLst>
-                                  <p:childTnLst>
-                                    <p:set>
-                                      <p:cBhvr>
-                                        <p:cTn id="42" dur="1" fill="hold">
-                                          <p:stCondLst>
-                                            <p:cond delay="0"/>
-                                          </p:stCondLst>
-                                        </p:cTn>
-                                        <p:tgtEl>
                                           <p:spTgt spid="22"/>
-                                        </p:tgtEl>
-                                        <p:attrNameLst>
-                                          <p:attrName>style.visibility</p:attrName>
-                                        </p:attrNameLst>
-                                      </p:cBhvr>
-                                      <p:to>
-                                        <p:strVal val="visible"/>
-                                      </p:to>
-                                    </p:set>
-                                    <p:animEffect transition="in" filter="fade">
-                                      <p:cBhvr>
-                                        <p:cTn id="43" dur="500"/>
-                                        <p:tgtEl>
-                                          <p:spTgt spid="22"/>
-                                        </p:tgtEl>
-                                      </p:cBhvr>
-                                    </p:animEffect>
-                                  </p:childTnLst>
-                                </p:cTn>
-                              </p:par>
-                              <p:par>
-                                <p:cTn id="44" presetID="10" presetClass="entr" presetSubtype="0" fill="hold" grpId="0" nodeType="withEffect">
-                                  <p:stCondLst>
-                                    <p:cond delay="0"/>
-                                  </p:stCondLst>
-                                  <p:childTnLst>
-                                    <p:set>
-                                      <p:cBhvr>
-                                        <p:cTn id="45" dur="1" fill="hold">
-                                          <p:stCondLst>
-                                            <p:cond delay="0"/>
-                                          </p:stCondLst>
-                                        </p:cTn>
-                                        <p:tgtEl>
-                                          <p:spTgt spid="13"/>
-                                        </p:tgtEl>
-                                        <p:attrNameLst>
-                                          <p:attrName>style.visibility</p:attrName>
-                                        </p:attrNameLst>
-                                      </p:cBhvr>
-                                      <p:to>
-                                        <p:strVal val="visible"/>
-                                      </p:to>
-                                    </p:set>
-                                    <p:animEffect transition="in" filter="fade">
-                                      <p:cBhvr>
-                                        <p:cTn id="46" dur="500"/>
-                                        <p:tgtEl>
-                                          <p:spTgt spid="13"/>
                                         </p:tgtEl>
                                       </p:cBhvr>
                                     </p:animEffect>
@@ -20521,26 +20686,26 @@
                     </p:cTn>
                   </p:par>
                   <p:par>
-                    <p:cTn id="47" fill="hold">
+                    <p:cTn id="41" fill="hold">
                       <p:stCondLst>
                         <p:cond delay="indefinite"/>
                       </p:stCondLst>
                       <p:childTnLst>
                         <p:par>
-                          <p:cTn id="48" fill="hold">
+                          <p:cTn id="42" fill="hold">
                             <p:stCondLst>
                               <p:cond delay="0"/>
                             </p:stCondLst>
                             <p:childTnLst>
                               <p:par>
-                                <p:cTn id="49" presetID="1" presetClass="emph" presetSubtype="2" fill="hold" nodeType="clickEffect">
+                                <p:cTn id="43" presetID="1" presetClass="emph" presetSubtype="2" fill="hold" nodeType="clickEffect">
                                   <p:stCondLst>
                                     <p:cond delay="0"/>
                                   </p:stCondLst>
                                   <p:childTnLst>
                                     <p:animClr clrSpc="rgb" dir="cw">
                                       <p:cBhvr>
-                                        <p:cTn id="50" dur="2000" fill="hold"/>
+                                        <p:cTn id="44" dur="2000" fill="hold"/>
                                         <p:tgtEl>
                                           <p:spTgt spid="11"/>
                                         </p:tgtEl>
@@ -20554,7 +20719,7 @@
                                     </p:animClr>
                                     <p:set>
                                       <p:cBhvr>
-                                        <p:cTn id="51" dur="2000" fill="hold"/>
+                                        <p:cTn id="45" dur="2000" fill="hold"/>
                                         <p:tgtEl>
                                           <p:spTgt spid="11"/>
                                         </p:tgtEl>
@@ -20568,7 +20733,7 @@
                                     </p:set>
                                     <p:set>
                                       <p:cBhvr>
-                                        <p:cTn id="52" dur="2000" fill="hold"/>
+                                        <p:cTn id="46" dur="2000" fill="hold"/>
                                         <p:tgtEl>
                                           <p:spTgt spid="11"/>
                                         </p:tgtEl>
@@ -20584,14 +20749,14 @@
                                 </p:cTn>
                               </p:par>
                               <p:par>
-                                <p:cTn id="53" presetID="1" presetClass="emph" presetSubtype="2" fill="hold" nodeType="withEffect">
+                                <p:cTn id="47" presetID="1" presetClass="emph" presetSubtype="2" fill="hold" nodeType="withEffect">
                                   <p:stCondLst>
                                     <p:cond delay="0"/>
                                   </p:stCondLst>
                                   <p:childTnLst>
                                     <p:animClr clrSpc="rgb" dir="cw">
                                       <p:cBhvr>
-                                        <p:cTn id="54" dur="2000" fill="hold"/>
+                                        <p:cTn id="48" dur="2000" fill="hold"/>
                                         <p:tgtEl>
                                           <p:spTgt spid="12"/>
                                         </p:tgtEl>
@@ -20605,7 +20770,7 @@
                                     </p:animClr>
                                     <p:set>
                                       <p:cBhvr>
-                                        <p:cTn id="55" dur="2000" fill="hold"/>
+                                        <p:cTn id="49" dur="2000" fill="hold"/>
                                         <p:tgtEl>
                                           <p:spTgt spid="12"/>
                                         </p:tgtEl>
@@ -20619,7 +20784,7 @@
                                     </p:set>
                                     <p:set>
                                       <p:cBhvr>
-                                        <p:cTn id="56" dur="2000" fill="hold"/>
+                                        <p:cTn id="50" dur="2000" fill="hold"/>
                                         <p:tgtEl>
                                           <p:spTgt spid="12"/>
                                         </p:tgtEl>
@@ -20668,10 +20833,8 @@
       <p:bldP spid="10" grpId="0" animBg="1"/>
       <p:bldP spid="11" grpId="0" animBg="1"/>
       <p:bldP spid="12" grpId="0" animBg="1"/>
-      <p:bldP spid="13" grpId="0" animBg="1"/>
       <p:bldP spid="14" grpId="0" animBg="1"/>
       <p:bldP spid="16" grpId="0" animBg="1"/>
-      <p:bldP spid="18" grpId="0" animBg="1"/>
       <p:bldP spid="19" grpId="0" animBg="1"/>
       <p:bldP spid="20" grpId="0" animBg="1"/>
       <p:bldP spid="21" grpId="0" animBg="1"/>
@@ -22450,6 +22613,14 @@
   <p:clrMapOvr>
     <a:masterClrMapping/>
   </p:clrMapOvr>
+  <mc:AlternateContent xmlns:mc="http://schemas.openxmlformats.org/markup-compatibility/2006">
+    <mc:Choice xmlns:p14="http://schemas.microsoft.com/office/powerpoint/2010/main" Requires="p14">
+      <p:transition spd="slow" p14:dur="2000"/>
+    </mc:Choice>
+    <mc:Fallback>
+      <p:transition spd="slow"/>
+    </mc:Fallback>
+  </mc:AlternateContent>
   <p:timing>
     <p:tnLst>
       <p:par>
@@ -23333,7 +23504,14 @@
           <a:p>
             <a:pPr lvl="1"/>
             <a:r>
-              <a:rPr lang="pt-BR" dirty="0"/>
+              <a:rPr lang="pt-BR" dirty="0" smtClean="0"/>
+              <a:t>Dois ambientes</a:t>
+            </a:r>
+          </a:p>
+          <a:p>
+            <a:pPr lvl="1"/>
+            <a:r>
+              <a:rPr lang="pt-BR" dirty="0" smtClean="0"/>
               <a:t>Identificação </a:t>
             </a:r>
             <a:r>
@@ -25988,11 +26166,7 @@
             </a:r>
             <a:r>
               <a:rPr lang="en-US" dirty="0" smtClean="0"/>
-              <a:t> </a:t>
-            </a:r>
-            <a:r>
-              <a:rPr lang="en-US" dirty="0" smtClean="0"/>
-              <a:t>as </a:t>
+              <a:t> as </a:t>
             </a:r>
             <a:r>
               <a:rPr lang="en-US" dirty="0" err="1" smtClean="0"/>
@@ -26528,7 +26702,31 @@
       </a:bgFillStyleLst>
     </a:fmtScheme>
   </a:themeElements>
-  <a:objectDefaults/>
+  <a:objectDefaults>
+    <a:spDef>
+      <a:spPr/>
+      <a:bodyPr rtlCol="0" anchor="ctr"/>
+      <a:lstStyle>
+        <a:defPPr algn="ctr">
+          <a:defRPr/>
+        </a:defPPr>
+      </a:lstStyle>
+      <a:style>
+        <a:lnRef idx="1">
+          <a:schemeClr val="accent1"/>
+        </a:lnRef>
+        <a:fillRef idx="3">
+          <a:schemeClr val="accent1"/>
+        </a:fillRef>
+        <a:effectRef idx="2">
+          <a:schemeClr val="accent1"/>
+        </a:effectRef>
+        <a:fontRef idx="minor">
+          <a:schemeClr val="lt1"/>
+        </a:fontRef>
+      </a:style>
+    </a:spDef>
+  </a:objectDefaults>
   <a:extraClrSchemeLst/>
 </a:theme>
 </file>

</xml_diff>